<commit_message>
Photon Server Settings Renewal
- Set local information using
  DropDown

- Photon setting PPT material
  update

- Delete resource data
</commit_message>
<xml_diff>
--- a/Assets/Class/Photon Server/PPT Data/Photon PlayFab.pptx
+++ b/Assets/Class/Photon Server/PPT Data/Photon PlayFab.pptx
@@ -2,27 +2,28 @@
 <file path=ppt/presentation.xml><?xml version="1.0" encoding="utf-8"?>
 <p:presentation xmlns:a="http://schemas.openxmlformats.org/drawingml/2006/main" xmlns:r="http://schemas.openxmlformats.org/officeDocument/2006/relationships" xmlns:p="http://schemas.openxmlformats.org/presentationml/2006/main" xmlns:p14="http://schemas.microsoft.com/office/powerpoint/2010/main" saveSubsetFonts="1" firstSlideNum="0">
   <p:sldMasterIdLst>
-    <p:sldMasterId id="2147486814" r:id="rId12"/>
+    <p:sldMasterId id="2147486838" r:id="rId12"/>
   </p:sldMasterIdLst>
   <p:notesMasterIdLst>
     <p:notesMasterId r:id="rId14"/>
   </p:notesMasterIdLst>
   <p:sldIdLst>
     <p:sldId id="317" r:id="rId16"/>
-    <p:sldId id="316" r:id="rId18"/>
-    <p:sldId id="318" r:id="rId20"/>
-    <p:sldId id="314" r:id="rId22"/>
-    <p:sldId id="319" r:id="rId24"/>
-    <p:sldId id="320" r:id="rId25"/>
-    <p:sldId id="321" r:id="rId26"/>
-    <p:sldId id="322" r:id="rId27"/>
-    <p:sldId id="323" r:id="rId28"/>
-    <p:sldId id="324" r:id="rId30"/>
-    <p:sldId id="325" r:id="rId32"/>
-    <p:sldId id="326" r:id="rId34"/>
-    <p:sldId id="327" r:id="rId36"/>
-    <p:sldId id="328" r:id="rId38"/>
-    <p:sldId id="329" r:id="rId40"/>
+    <p:sldId id="316" r:id="rId17"/>
+    <p:sldId id="318" r:id="rId18"/>
+    <p:sldId id="314" r:id="rId19"/>
+    <p:sldId id="319" r:id="rId20"/>
+    <p:sldId id="320" r:id="rId21"/>
+    <p:sldId id="321" r:id="rId22"/>
+    <p:sldId id="322" r:id="rId23"/>
+    <p:sldId id="330" r:id="rId24"/>
+    <p:sldId id="323" r:id="rId25"/>
+    <p:sldId id="324" r:id="rId26"/>
+    <p:sldId id="325" r:id="rId27"/>
+    <p:sldId id="326" r:id="rId28"/>
+    <p:sldId id="327" r:id="rId29"/>
+    <p:sldId id="328" r:id="rId30"/>
+    <p:sldId id="329" r:id="rId31"/>
   </p:sldIdLst>
   <p:sldSz cx="12192000" cy="6858000"/>
   <p:notesSz cx="6858000" cy="9144000"/>
@@ -1363,6 +1364,148 @@
         <p:spPr>
           <a:xfrm rot="0">
             <a:off x="685800" y="1143000"/>
+            <a:ext cx="5494020" cy="3093720"/>
+          </a:xfrm>
+          <a:prstGeom prst="rect"/>
+          <a:noFill/>
+          <a:ln w="12700" cap="flat" cmpd="sng">
+            <a:solidFill>
+              <a:srgbClr val="000000">
+                <a:alpha val="100000"/>
+              </a:srgbClr>
+            </a:solidFill>
+            <a:prstDash val="solid"/>
+          </a:ln>
+        </p:spPr>
+        <p:txBody>
+          <a:bodyPr wrap="square" lIns="91440" tIns="45720" rIns="91440" bIns="45720" numCol="1" vert="horz" anchor="ctr">
+            <a:noAutofit/>
+          </a:bodyPr>
+          <a:lstStyle/>
+          <a:p>
+            <a:pPr marL="0" indent="0" latinLnBrk="0">
+              <a:buFontTx/>
+              <a:buNone/>
+            </a:pPr>
+          </a:p>
+        </p:txBody>
+      </p:sp>
+      <p:sp>
+        <p:nvSpPr>
+          <p:cNvPr id="3" name="슬라이드 노트 개체 틀 4"/>
+          <p:cNvSpPr txBox="1">
+            <a:spLocks/>
+          </p:cNvSpPr>
+          <p:nvPr>
+            <p:ph type="body" idx="3"/>
+          </p:nvPr>
+        </p:nvSpPr>
+        <p:spPr>
+          <a:xfrm rot="0">
+            <a:off x="685800" y="4400550"/>
+            <a:ext cx="5494020" cy="3608070"/>
+          </a:xfrm>
+          <a:prstGeom prst="rect"/>
+        </p:spPr>
+        <p:txBody>
+          <a:bodyPr wrap="square" lIns="91440" tIns="45720" rIns="91440" bIns="45720" numCol="1" vert="horz" anchor="t">
+            <a:noAutofit/>
+          </a:bodyPr>
+          <a:lstStyle/>
+          <a:p>
+            <a:pPr marL="0" indent="0" latinLnBrk="0">
+              <a:buFontTx/>
+              <a:buNone/>
+            </a:pPr>
+          </a:p>
+        </p:txBody>
+      </p:sp>
+      <p:sp>
+        <p:nvSpPr>
+          <p:cNvPr id="4" name="슬라이드 번호 개체 틀 6"/>
+          <p:cNvSpPr txBox="1">
+            <a:spLocks/>
+          </p:cNvSpPr>
+          <p:nvPr>
+            <p:ph type="sldNum" idx="5"/>
+          </p:nvPr>
+        </p:nvSpPr>
+        <p:spPr>
+          <a:xfrm rot="0">
+            <a:off x="3884930" y="8685530"/>
+            <a:ext cx="2979420" cy="466090"/>
+          </a:xfrm>
+          <a:prstGeom prst="rect"/>
+        </p:spPr>
+        <p:txBody>
+          <a:bodyPr wrap="square" lIns="91440" tIns="45720" rIns="91440" bIns="45720" numCol="1" vert="horz" anchor="b">
+            <a:noAutofit/>
+          </a:bodyPr>
+          <a:lstStyle>
+            <a:lvl1pPr marL="0" indent="0" algn="r" latinLnBrk="0">
+              <a:buFontTx/>
+              <a:buNone/>
+              <a:defRPr lang="en-GB" altLang="en-US" sz="1200"/>
+            </a:lvl1pPr>
+          </a:lstStyle>
+          <a:p>
+            <a:pPr marL="0" indent="0" latinLnBrk="0">
+              <a:buFontTx/>
+              <a:buNone/>
+            </a:pPr>
+            <a:fld id="{B9320F77-B9A0-41C5-862A-B4B631284C64}" type="slidenum">
+              <a:rPr lang="ko-KR" altLang="en-US"/>
+              <a:t>‹#›</a:t>
+            </a:fld>
+          </a:p>
+        </p:txBody>
+      </p:sp>
+    </p:spTree>
+  </p:cSld>
+  <p:clrMapOvr>
+    <a:masterClrMapping/>
+  </p:clrMapOvr>
+  <mc:AlternateContent xmlns:mc="http://schemas.openxmlformats.org/markup-compatibility/2006">
+    <mc:Choice xmlns:p14="http://schemas.microsoft.com/office/powerpoint/2010/main" Requires="p14">
+      <p:transition spd="slow" p14:dur="0"/>
+    </mc:Choice>
+    <mc:Fallback>
+      <p:transition spd="slow"/>
+    </mc:Fallback>
+  </mc:AlternateContent>
+</p:notes>
+</file>
+
+<file path=ppt/notesSlides/notesSlide16.xml><?xml version="1.0" encoding="utf-8"?>
+<p:notes xmlns:a="http://schemas.openxmlformats.org/drawingml/2006/main" xmlns:r="http://schemas.openxmlformats.org/officeDocument/2006/relationships" xmlns:p="http://schemas.openxmlformats.org/presentationml/2006/main">
+  <p:cSld>
+    <p:spTree>
+      <p:nvGrpSpPr>
+        <p:cNvPr id="1" name=""/>
+        <p:cNvGrpSpPr/>
+        <p:nvPr/>
+      </p:nvGrpSpPr>
+      <p:grpSpPr>
+        <a:xfrm>
+          <a:off x="0" y="0"/>
+          <a:ext cx="0" cy="0"/>
+          <a:chOff x="0" y="0"/>
+          <a:chExt cx="0" cy="0"/>
+        </a:xfrm>
+      </p:grpSpPr>
+      <p:sp>
+        <p:nvSpPr>
+          <p:cNvPr id="2" name="슬라이드 이미지 개체 틀 3"/>
+          <p:cNvSpPr>
+            <a:spLocks noChangeAspect="1"/>
+          </p:cNvSpPr>
+          <p:nvPr>
+            <p:ph type="sldImg" idx="2"/>
+          </p:nvPr>
+        </p:nvSpPr>
+        <p:spPr>
+          <a:xfrm rot="0">
+            <a:off x="685800" y="1143000"/>
             <a:ext cx="5494655" cy="3094355"/>
           </a:xfrm>
           <a:prstGeom prst="rect"/>
@@ -2499,7 +2642,7 @@
         <p:spPr>
           <a:xfrm rot="0">
             <a:off x="685800" y="1143000"/>
-            <a:ext cx="5494020" cy="3093720"/>
+            <a:ext cx="5494655" cy="3094355"/>
           </a:xfrm>
           <a:prstGeom prst="rect"/>
           <a:noFill/>
@@ -2538,7 +2681,7 @@
         <p:spPr>
           <a:xfrm rot="0">
             <a:off x="685800" y="4400550"/>
-            <a:ext cx="5494020" cy="3608070"/>
+            <a:ext cx="5494655" cy="3608705"/>
           </a:xfrm>
           <a:prstGeom prst="rect"/>
         </p:spPr>
@@ -2568,7 +2711,7 @@
         <p:spPr>
           <a:xfrm rot="0">
             <a:off x="3884930" y="8685530"/>
-            <a:ext cx="2979420" cy="466090"/>
+            <a:ext cx="2980055" cy="466725"/>
           </a:xfrm>
           <a:prstGeom prst="rect"/>
         </p:spPr>
@@ -7574,8 +7717,8 @@
         </p:nvSpPr>
         <p:spPr>
           <a:xfrm rot="0">
-            <a:off x="1247775" y="4850765"/>
-            <a:ext cx="4124325" cy="955040"/>
+            <a:off x="6800850" y="5233035"/>
+            <a:ext cx="4149725" cy="954405"/>
           </a:xfrm>
           <a:prstGeom prst="rect"/>
           <a:noFill/>
@@ -7616,98 +7759,14 @@
                 <a:latin typeface="맑은 고딕" charset="0"/>
                 <a:ea typeface="맑은 고딕" charset="0"/>
               </a:rPr>
-              <a:t>Google에서</a:t>
+              <a:t>첫번째로 </a:t>
             </a:r>
             <a:r>
               <a:rPr lang="ko-KR" sz="1800">
                 <a:latin typeface="맑은 고딕" charset="0"/>
                 <a:ea typeface="맑은 고딕" charset="0"/>
               </a:rPr>
-              <a:t> </a:t>
-            </a:r>
-            <a:r>
-              <a:rPr lang="ko-KR" sz="1800">
-                <a:latin typeface="맑은 고딕" charset="0"/>
-                <a:ea typeface="맑은 고딕" charset="0"/>
-              </a:rPr>
-              <a:t>PlayFab을</a:t>
-            </a:r>
-            <a:r>
-              <a:rPr lang="ko-KR" sz="1800">
-                <a:latin typeface="맑은 고딕" charset="0"/>
-                <a:ea typeface="맑은 고딕" charset="0"/>
-              </a:rPr>
-              <a:t> </a:t>
-            </a:r>
-            <a:r>
-              <a:rPr lang="ko-KR" sz="1800">
-                <a:latin typeface="맑은 고딕" charset="0"/>
-                <a:ea typeface="맑은 고딕" charset="0"/>
-              </a:rPr>
-              <a:t>입력하고</a:t>
-            </a:r>
-            <a:r>
-              <a:rPr lang="ko-KR" sz="1800">
-                <a:latin typeface="맑은 고딕" charset="0"/>
-                <a:ea typeface="맑은 고딕" charset="0"/>
-              </a:rPr>
-              <a:t> </a:t>
-            </a:r>
-            <a:r>
-              <a:rPr lang="ko-KR" sz="1800">
-                <a:latin typeface="맑은 고딕" charset="0"/>
-                <a:ea typeface="맑은 고딕" charset="0"/>
-              </a:rPr>
-              <a:t>Azure</a:t>
-            </a:r>
-            <a:r>
-              <a:rPr lang="ko-KR" sz="1800">
-                <a:latin typeface="맑은 고딕" charset="0"/>
-                <a:ea typeface="맑은 고딕" charset="0"/>
-              </a:rPr>
-              <a:t> </a:t>
-            </a:r>
-            <a:r>
-              <a:rPr lang="ko-KR" sz="1800">
-                <a:latin typeface="맑은 고딕" charset="0"/>
-                <a:ea typeface="맑은 고딕" charset="0"/>
-              </a:rPr>
-              <a:t>PlayFab이라는</a:t>
-            </a:r>
-            <a:r>
-              <a:rPr lang="ko-KR" sz="1800">
-                <a:latin typeface="맑은 고딕" charset="0"/>
-                <a:ea typeface="맑은 고딕" charset="0"/>
-              </a:rPr>
-              <a:t> </a:t>
-            </a:r>
-            <a:r>
-              <a:rPr lang="ko-KR" sz="1800">
-                <a:latin typeface="맑은 고딕" charset="0"/>
-                <a:ea typeface="맑은 고딕" charset="0"/>
-              </a:rPr>
-              <a:t>사이트에</a:t>
-            </a:r>
-            <a:r>
-              <a:rPr lang="ko-KR" sz="1800">
-                <a:latin typeface="맑은 고딕" charset="0"/>
-                <a:ea typeface="맑은 고딕" charset="0"/>
-              </a:rPr>
-              <a:t> </a:t>
-            </a:r>
-            <a:r>
-              <a:rPr lang="ko-KR" sz="1800">
-                <a:latin typeface="맑은 고딕" charset="0"/>
-                <a:ea typeface="맑은 고딕" charset="0"/>
-              </a:rPr>
-              <a:t>접속합니다.</a:t>
-            </a:r>
-            <a:r>
-              <a:rPr lang="ko-KR" sz="1800">
-                <a:latin typeface="맑은 고딕" charset="0"/>
-                <a:ea typeface="맑은 고딕" charset="0"/>
-              </a:rPr>
-              <a:t> </a:t>
+              <a:t>Google에서 PlayFab을 입력하고 Azure PlayFab이라는 사이트에 접속합니다. </a:t>
             </a:r>
             <a:endParaRPr lang="ko-KR" altLang="en-US" sz="1800">
               <a:latin typeface="맑은 고딕" charset="0"/>
@@ -7716,99 +7775,9 @@
           </a:p>
         </p:txBody>
       </p:sp>
-      <p:sp>
-        <p:nvSpPr>
-          <p:cNvPr id="7" name="Rect 0"/>
-          <p:cNvSpPr txBox="1">
-            <a:spLocks/>
-          </p:cNvSpPr>
-          <p:nvPr/>
-        </p:nvSpPr>
-        <p:spPr>
-          <a:xfrm rot="0">
-            <a:off x="6800215" y="5121910"/>
-            <a:ext cx="4124325" cy="678180"/>
-          </a:xfrm>
-          <a:prstGeom prst="rect"/>
-          <a:noFill/>
-          <a:ln w="0">
-            <a:noFill/>
-            <a:prstDash/>
-          </a:ln>
-        </p:spPr>
-        <p:txBody>
-          <a:bodyPr wrap="square" lIns="89535" tIns="46355" rIns="89535" bIns="46355" numCol="1" vert="horz" anchor="t">
-            <a:spAutoFit/>
-          </a:bodyPr>
-          <a:lstStyle/>
-          <a:p>
-            <a:pPr marL="0" indent="0" rtl="0" algn="l" defTabSz="914400" eaLnBrk="1" latinLnBrk="0" hangingPunct="1">
-              <a:buFontTx/>
-              <a:buNone/>
-            </a:pPr>
-            <a:r>
-              <a:rPr lang="ko-KR" sz="2000" b="1">
-                <a:solidFill>
-                  <a:srgbClr val="0611F2"/>
-                </a:solidFill>
-                <a:latin typeface="맑은 고딕" charset="0"/>
-                <a:ea typeface="맑은 고딕" charset="0"/>
-              </a:rPr>
-              <a:t>2. </a:t>
-            </a:r>
-            <a:r>
-              <a:rPr sz="1800">
-                <a:latin typeface="맑은 고딕" charset="0"/>
-                <a:ea typeface="맑은 고딕" charset="0"/>
-              </a:rPr>
-              <a:t>그</a:t>
-            </a:r>
-            <a:r>
-              <a:rPr lang="ko-KR" sz="1800">
-                <a:latin typeface="맑은 고딕" charset="0"/>
-                <a:ea typeface="맑은 고딕" charset="0"/>
-              </a:rPr>
-              <a:t>다음 소개 화면에 PlayFab에 로그인을 선택합니다.</a:t>
-            </a:r>
-            <a:endParaRPr lang="ko-KR" altLang="en-US" sz="1800">
-              <a:latin typeface="맑은 고딕" charset="0"/>
-              <a:ea typeface="맑은 고딕" charset="0"/>
-            </a:endParaRPr>
-          </a:p>
-        </p:txBody>
-      </p:sp>
       <p:pic>
         <p:nvPicPr>
-          <p:cNvPr id="15" name="그림 1" descr="C:/Users/Admin1/AppData/Roaming/PolarisOffice/ETemp/17244_9822856/fImage20639513741.png"/>
-          <p:cNvPicPr>
-            <a:picLocks noChangeAspect="1"/>
-          </p:cNvPicPr>
-          <p:nvPr/>
-        </p:nvPicPr>
-        <p:blipFill rotWithShape="1">
-          <a:blip r:embed="rId7" cstate="hqprint">
-            <a:extLst>
-              <a:ext uri="{28A0092B-C50C-407E-A947-70E740481C1C}">
-                <a14:useLocalDpi xmlns:a14="http://schemas.microsoft.com/office/drawing/2010/main"/>
-              </a:ext>
-            </a:extLst>
-          </a:blip>
-          <a:stretch>
-            <a:fillRect/>
-          </a:stretch>
-        </p:blipFill>
-        <p:spPr>
-          <a:xfrm rot="0">
-            <a:off x="6800850" y="1088390"/>
-            <a:ext cx="4124325" cy="3907790"/>
-          </a:xfrm>
-          <a:prstGeom prst="rect"/>
-          <a:noFill/>
-        </p:spPr>
-      </p:pic>
-      <p:pic>
-        <p:nvPicPr>
-          <p:cNvPr id="16" name="그림 2" descr="C:/Users/Admin1/AppData/Roaming/PolarisOffice/ETemp/17244_9822856/fImage221221388467.png"/>
+          <p:cNvPr id="16" name="그림 2" descr="C:/Users/Admin1/AppData/Roaming/PolarisOffice/ETemp/17716_5745816/fImage221221388467.png"/>
           <p:cNvPicPr>
             <a:picLocks noChangeAspect="1"/>
           </p:cNvPicPr>
@@ -7828,13 +7797,107 @@
         </p:blipFill>
         <p:spPr>
           <a:xfrm rot="0">
-            <a:off x="1246505" y="1080770"/>
-            <a:ext cx="4058285" cy="3666490"/>
+            <a:off x="6791960" y="1296670"/>
+            <a:ext cx="4157980" cy="3808095"/>
+          </a:xfrm>
+          <a:prstGeom prst="roundRect"/>
+          <a:solidFill>
+            <a:srgbClr val="EDEDED"/>
+          </a:solidFill>
+        </p:spPr>
+      </p:pic>
+      <p:pic>
+        <p:nvPicPr>
+          <p:cNvPr id="19" name="그림 5" descr="C:/Users/Admin1/AppData/Roaming/PolarisOffice/ETemp/17716_5745816/fImage4795621241.png"/>
+          <p:cNvPicPr>
+            <a:picLocks noChangeAspect="1"/>
+          </p:cNvPicPr>
+          <p:nvPr/>
+        </p:nvPicPr>
+        <p:blipFill rotWithShape="1">
+          <a:blip r:embed="rId9" cstate="print">
+            <a:extLst>
+              <a:ext uri="{28A0092B-C50C-407E-A947-70E740481C1C}">
+                <a14:useLocalDpi xmlns:a14="http://schemas.microsoft.com/office/drawing/2010/main" val="0"/>
+              </a:ext>
+            </a:extLst>
+          </a:blip>
+          <a:stretch>
+            <a:fillRect/>
+          </a:stretch>
+        </p:blipFill>
+        <p:spPr>
+          <a:xfrm rot="0">
+            <a:off x="1222375" y="1288415"/>
+            <a:ext cx="4148455" cy="3600450"/>
+          </a:xfrm>
+          <a:prstGeom prst="roundRect"/>
+          <a:solidFill>
+            <a:srgbClr val="EDEDED"/>
+          </a:solidFill>
+        </p:spPr>
+      </p:pic>
+      <p:sp>
+        <p:nvSpPr>
+          <p:cNvPr id="20" name="텍스트 상자 16"/>
+          <p:cNvSpPr txBox="1">
+            <a:spLocks/>
+          </p:cNvSpPr>
+          <p:nvPr/>
+        </p:nvSpPr>
+        <p:spPr>
+          <a:xfrm rot="0">
+            <a:off x="1230630" y="4980940"/>
+            <a:ext cx="4138930" cy="1200785"/>
           </a:xfrm>
           <a:prstGeom prst="rect"/>
           <a:noFill/>
-        </p:spPr>
-      </p:pic>
+          <a:ln w="0">
+            <a:noFill/>
+            <a:prstDash/>
+          </a:ln>
+        </p:spPr>
+        <p:txBody>
+          <a:bodyPr wrap="square" lIns="89535" tIns="46355" rIns="89535" bIns="46355" numCol="1" vert="horz" anchor="t">
+            <a:spAutoFit/>
+          </a:bodyPr>
+          <a:lstStyle/>
+          <a:p>
+            <a:pPr marL="0" indent="0" rtl="0" algn="l" defTabSz="914400" eaLnBrk="1" latinLnBrk="0" hangingPunct="1">
+              <a:buFontTx/>
+              <a:buNone/>
+            </a:pPr>
+            <a:r>
+              <a:rPr lang="ko-KR" sz="1800">
+                <a:latin typeface="맑은 고딕" charset="0"/>
+                <a:ea typeface="맑은 고딕" charset="0"/>
+              </a:rPr>
+              <a:t>PlayFab이란?</a:t>
+            </a:r>
+            <a:endParaRPr lang="ko-KR" altLang="en-US" sz="1800">
+              <a:latin typeface="맑은 고딕" charset="0"/>
+              <a:ea typeface="맑은 고딕" charset="0"/>
+            </a:endParaRPr>
+          </a:p>
+          <a:p>
+            <a:pPr marL="0" indent="0" rtl="0" algn="l" defTabSz="914400" eaLnBrk="1" latinLnBrk="0" hangingPunct="1">
+              <a:buFontTx/>
+              <a:buNone/>
+            </a:pPr>
+            <a:r>
+              <a:rPr lang="ko-KR" sz="1800">
+                <a:latin typeface="맑은 고딕" charset="0"/>
+                <a:ea typeface="맑은 고딕" charset="0"/>
+              </a:rPr>
+              <a:t>게임 서비스를 사용하는 실시간 라이브 게임을 위한 서버 시스템입니다.</a:t>
+            </a:r>
+            <a:endParaRPr lang="ko-KR" altLang="en-US" sz="1800">
+              <a:latin typeface="맑은 고딕" charset="0"/>
+              <a:ea typeface="맑은 고딕" charset="0"/>
+            </a:endParaRPr>
+          </a:p>
+        </p:txBody>
+      </p:sp>
     </p:spTree>
   </p:cSld>
   <p:clrMapOvr>
@@ -7921,9 +7984,9 @@
           <p:nvPr/>
         </p:nvSpPr>
         <p:spPr>
-          <a:xfrm rot="0">
+          <a:xfrm>
             <a:off x="4342765" y="467995"/>
-            <a:ext cx="3503930" cy="554990"/>
+            <a:ext cx="3504565" cy="554990"/>
           </a:xfrm>
           <a:prstGeom prst="rect"/>
           <a:noFill/>
@@ -7947,14 +8010,14 @@
                 <a:latin typeface="맑은 고딕" charset="0"/>
                 <a:ea typeface="맑은 고딕" charset="0"/>
               </a:rPr>
-              <a:t>열 </a:t>
+              <a:t>열</a:t>
             </a:r>
             <a:r>
               <a:rPr lang="ko-KR" sz="3000" b="1">
                 <a:latin typeface="맑은 고딕" charset="0"/>
                 <a:ea typeface="맑은 고딕" charset="0"/>
               </a:rPr>
-              <a:t>번째 튜토리얼</a:t>
+              <a:t> 번째 튜토리얼</a:t>
             </a:r>
             <a:r>
               <a:rPr sz="3000" b="1">
@@ -7980,8 +8043,8 @@
         </p:nvSpPr>
         <p:spPr>
           <a:xfrm rot="0">
-            <a:off x="1229995" y="4734560"/>
-            <a:ext cx="4130675" cy="954405"/>
+            <a:off x="1203960" y="4872990"/>
+            <a:ext cx="4062095" cy="954405"/>
           </a:xfrm>
           <a:prstGeom prst="rect"/>
           <a:noFill/>
@@ -8008,7 +8071,7 @@
                 <a:latin typeface="맑은 고딕" charset="0"/>
                 <a:ea typeface="맑은 고딕" charset="0"/>
               </a:rPr>
-              <a:t>22.</a:t>
+              <a:t>20.</a:t>
             </a:r>
             <a:r>
               <a:rPr lang="ko-KR" sz="2000">
@@ -8025,7 +8088,24 @@
                 <a:latin typeface="맑은 고딕" charset="0"/>
                 <a:ea typeface="맑은 고딕" charset="0"/>
               </a:rPr>
-              <a:t>Photon Setting 스크립트에서 입 력을 받기 위해 InputField 변수를 여러 개 생성합니다.</a:t>
+              <a:t>UI를 배치하고 나면 InputFiled(Password Input)에 Content Type을 </a:t>
+            </a:r>
+            <a:r>
+              <a:rPr lang="ko-KR" sz="1800">
+                <a:solidFill>
+                  <a:srgbClr val="009900"/>
+                </a:solidFill>
+                <a:latin typeface="맑은 고딕" charset="0"/>
+                <a:ea typeface="맑은 고딕" charset="0"/>
+              </a:rPr>
+              <a:t>[Password]</a:t>
+            </a:r>
+            <a:r>
+              <a:rPr lang="ko-KR" sz="1800">
+                <a:latin typeface="맑은 고딕" charset="0"/>
+                <a:ea typeface="맑은 고딕" charset="0"/>
+              </a:rPr>
+              <a:t>로 설정합니다. </a:t>
             </a:r>
             <a:endParaRPr lang="ko-KR" altLang="en-US" sz="1800">
               <a:latin typeface="맑은 고딕" charset="0"/>
@@ -8034,9 +8114,100 @@
           </a:p>
         </p:txBody>
       </p:sp>
+      <p:sp>
+        <p:nvSpPr>
+          <p:cNvPr id="54" name="Rect 0"/>
+          <p:cNvSpPr txBox="1">
+            <a:spLocks/>
+          </p:cNvSpPr>
+          <p:nvPr/>
+        </p:nvSpPr>
+        <p:spPr>
+          <a:xfrm rot="0">
+            <a:off x="6870065" y="4053205"/>
+            <a:ext cx="4153535" cy="1784985"/>
+          </a:xfrm>
+          <a:prstGeom prst="rect"/>
+          <a:noFill/>
+          <a:ln w="0">
+            <a:noFill/>
+            <a:prstDash/>
+          </a:ln>
+        </p:spPr>
+        <p:txBody>
+          <a:bodyPr wrap="square" lIns="89535" tIns="46355" rIns="89535" bIns="46355" numCol="1" vert="horz" anchor="t">
+            <a:spAutoFit/>
+          </a:bodyPr>
+          <a:lstStyle/>
+          <a:p>
+            <a:pPr marL="0" indent="0" rtl="0" algn="l" defTabSz="914400" eaLnBrk="1" latinLnBrk="0" hangingPunct="1">
+              <a:buFontTx/>
+              <a:buNone/>
+            </a:pPr>
+            <a:r>
+              <a:rPr lang="ko-KR" sz="2000" b="1">
+                <a:solidFill>
+                  <a:srgbClr val="0611F2"/>
+                </a:solidFill>
+                <a:latin typeface="맑은 고딕" charset="0"/>
+                <a:ea typeface="맑은 고딕" charset="0"/>
+              </a:rPr>
+              <a:t>21.</a:t>
+            </a:r>
+            <a:r>
+              <a:rPr lang="ko-KR" sz="2000">
+                <a:solidFill>
+                  <a:srgbClr val="0611F2"/>
+                </a:solidFill>
+                <a:latin typeface="맑은 고딕" charset="0"/>
+                <a:ea typeface="맑은 고딕" charset="0"/>
+              </a:rPr>
+              <a:t> </a:t>
+            </a:r>
+            <a:r>
+              <a:rPr lang="ko-KR" sz="1800">
+                <a:latin typeface="맑은 고딕" charset="0"/>
+                <a:ea typeface="맑은 고딕" charset="0"/>
+              </a:rPr>
+              <a:t>그리고 빈 게임 오브젝트 생성하고 이름을 Photon Setting으로 설정합니다.</a:t>
+            </a:r>
+            <a:endParaRPr lang="ko-KR" altLang="en-US" sz="1800">
+              <a:latin typeface="맑은 고딕" charset="0"/>
+              <a:ea typeface="맑은 고딕" charset="0"/>
+            </a:endParaRPr>
+          </a:p>
+          <a:p>
+            <a:pPr marL="0" indent="0" rtl="0" algn="l" defTabSz="914400" eaLnBrk="1" latinLnBrk="0" hangingPunct="1">
+              <a:buFontTx/>
+              <a:buNone/>
+            </a:pPr>
+            <a:endParaRPr lang="ko-KR" altLang="en-US" sz="1800">
+              <a:latin typeface="맑은 고딕" charset="0"/>
+              <a:ea typeface="맑은 고딕" charset="0"/>
+            </a:endParaRPr>
+          </a:p>
+          <a:p>
+            <a:pPr marL="0" indent="0" rtl="0" algn="l" defTabSz="914400" eaLnBrk="1" latinLnBrk="0" hangingPunct="1">
+              <a:buFontTx/>
+              <a:buNone/>
+            </a:pPr>
+            <a:r>
+              <a:rPr lang="ko-KR" sz="1800">
+                <a:latin typeface="맑은 고딕" charset="0"/>
+                <a:ea typeface="맑은 고딕" charset="0"/>
+              </a:rPr>
+              <a:t>그리고 PhotonSetting이라는 스크립트를 생성하고 넣어줍니다.</a:t>
+            </a:r>
+            <a:endParaRPr lang="ko-KR" altLang="en-US" sz="1800">
+              <a:latin typeface="맑은 고딕" charset="0"/>
+              <a:ea typeface="맑은 고딕" charset="0"/>
+            </a:endParaRPr>
+          </a:p>
+        </p:txBody>
+      </p:sp>
       <p:pic>
         <p:nvPicPr>
-          <p:cNvPr id="55" name="그림 46"/>
+          <p:cNvPr id="59" name="그림 32"/>
           <p:cNvPicPr>
             <a:picLocks noChangeAspect="1"/>
           </p:cNvPicPr>
@@ -8056,18 +8227,16 @@
         </p:blipFill>
         <p:spPr>
           <a:xfrm rot="0">
-            <a:off x="1229360" y="3281680"/>
-            <a:ext cx="4122420" cy="1256665"/>
-          </a:xfrm>
-          <a:prstGeom prst="roundRect"/>
-          <a:solidFill>
-            <a:srgbClr val="EDEDED"/>
-          </a:solidFill>
+            <a:off x="2950845" y="1336675"/>
+            <a:ext cx="2409825" cy="3340100"/>
+          </a:xfrm>
+          <a:prstGeom prst="rect"/>
+          <a:noFill/>
         </p:spPr>
       </p:pic>
       <p:pic>
         <p:nvPicPr>
-          <p:cNvPr id="56" name="그림 49"/>
+          <p:cNvPr id="60" name="그림 35"/>
           <p:cNvPicPr>
             <a:picLocks noChangeAspect="1"/>
           </p:cNvPicPr>
@@ -8087,79 +8256,54 @@
         </p:blipFill>
         <p:spPr>
           <a:xfrm rot="0">
-            <a:off x="1229360" y="1393190"/>
-            <a:ext cx="4140200" cy="1586230"/>
-          </a:xfrm>
-          <a:prstGeom prst="roundRect"/>
-          <a:solidFill>
-            <a:srgbClr val="EDEDED"/>
-          </a:solidFill>
+            <a:off x="1204595" y="1331595"/>
+            <a:ext cx="1505585" cy="3335655"/>
+          </a:xfrm>
+          <a:prstGeom prst="rect"/>
+          <a:noFill/>
         </p:spPr>
       </p:pic>
-      <p:sp>
-        <p:nvSpPr>
-          <p:cNvPr id="57" name="텍스트 상자 59"/>
-          <p:cNvSpPr txBox="1">
-            <a:spLocks/>
-          </p:cNvSpPr>
-          <p:nvPr/>
-        </p:nvSpPr>
-        <p:spPr>
-          <a:xfrm rot="0">
-            <a:off x="6555105" y="4460875"/>
-            <a:ext cx="4200525" cy="1231265"/>
-          </a:xfrm>
-          <a:prstGeom prst="rect"/>
-          <a:noFill/>
-          <a:ln w="0">
-            <a:noFill/>
-            <a:prstDash/>
-          </a:ln>
-        </p:spPr>
-        <p:txBody>
-          <a:bodyPr wrap="square" lIns="89535" tIns="46355" rIns="89535" bIns="46355" numCol="1" vert="horz" anchor="t">
-            <a:spAutoFit/>
-          </a:bodyPr>
-          <a:lstStyle/>
-          <a:p>
-            <a:pPr marL="0" indent="0" rtl="0" algn="l" defTabSz="914400" eaLnBrk="1" latinLnBrk="0" hangingPunct="1">
-              <a:buFontTx/>
-              <a:buNone/>
-            </a:pPr>
-            <a:r>
-              <a:rPr lang="ko-KR" sz="2000" b="1">
-                <a:solidFill>
-                  <a:srgbClr val="0611F2"/>
-                </a:solidFill>
-                <a:latin typeface="맑은 고딕" charset="0"/>
-                <a:ea typeface="맑은 고딕" charset="0"/>
-              </a:rPr>
-              <a:t>23. </a:t>
-            </a:r>
-            <a:r>
-              <a:rPr lang="ko-KR" sz="1800">
-                <a:latin typeface="맑은 고딕" charset="0"/>
-                <a:ea typeface="맑은 고딕" charset="0"/>
-              </a:rPr>
-              <a:t>그다음 로그인이 성공했을 때 게임 버전과 지역 그리고 유저 이름을 설정하고 씬을 이동할 수 있는 함수를 생성합니다.</a:t>
-            </a:r>
-            <a:endParaRPr lang="ko-KR" altLang="en-US" sz="1800">
-              <a:latin typeface="맑은 고딕" charset="0"/>
-              <a:ea typeface="맑은 고딕" charset="0"/>
-            </a:endParaRPr>
-          </a:p>
-        </p:txBody>
-      </p:sp>
       <p:pic>
         <p:nvPicPr>
-          <p:cNvPr id="58" name="그림 60"/>
+          <p:cNvPr id="61" name="그림 37"/>
           <p:cNvPicPr>
             <a:picLocks noChangeAspect="1"/>
           </p:cNvPicPr>
           <p:nvPr/>
         </p:nvPicPr>
         <p:blipFill rotWithShape="1">
-          <a:blip r:embed="rId4" cstate="print">
+          <a:blip r:embed="rId4" cstate="hqprint">
+            <a:extLst>
+              <a:ext uri="{28A0092B-C50C-407E-A947-70E740481C1C}">
+                <a14:useLocalDpi xmlns:a14="http://schemas.microsoft.com/office/drawing/2010/main"/>
+              </a:ext>
+            </a:extLst>
+          </a:blip>
+          <a:stretch>
+            <a:fillRect/>
+          </a:stretch>
+        </p:blipFill>
+        <p:spPr>
+          <a:xfrm rot="0">
+            <a:off x="6863715" y="1329690"/>
+            <a:ext cx="1891665" cy="2559685"/>
+          </a:xfrm>
+          <a:prstGeom prst="roundRect"/>
+          <a:solidFill>
+            <a:srgbClr val="EDEDED"/>
+          </a:solidFill>
+        </p:spPr>
+      </p:pic>
+      <p:pic>
+        <p:nvPicPr>
+          <p:cNvPr id="62" name="그림 38"/>
+          <p:cNvPicPr>
+            <a:picLocks noChangeAspect="1"/>
+          </p:cNvPicPr>
+          <p:nvPr/>
+        </p:nvPicPr>
+        <p:blipFill rotWithShape="1">
+          <a:blip r:embed="rId5" cstate="print">
             <a:extLst>
               <a:ext uri="{28A0092B-C50C-407E-A947-70E740481C1C}">
                 <a14:useLocalDpi xmlns:a14="http://schemas.microsoft.com/office/drawing/2010/main" val="0"/>
@@ -8172,13 +8316,82 @@
         </p:blipFill>
         <p:spPr>
           <a:xfrm rot="0">
-            <a:off x="6563995" y="1343025"/>
-            <a:ext cx="4192905" cy="2943860"/>
-          </a:xfrm>
-          <a:prstGeom prst="rect"/>
-          <a:noFill/>
+            <a:off x="9620250" y="3100070"/>
+            <a:ext cx="890270" cy="796925"/>
+          </a:xfrm>
+          <a:prstGeom prst="roundRect"/>
+          <a:solidFill>
+            <a:srgbClr val="EDEDED"/>
+          </a:solidFill>
         </p:spPr>
       </p:pic>
+      <p:pic>
+        <p:nvPicPr>
+          <p:cNvPr id="63" name="그림 42"/>
+          <p:cNvPicPr>
+            <a:picLocks noChangeAspect="1"/>
+          </p:cNvPicPr>
+          <p:nvPr/>
+        </p:nvPicPr>
+        <p:blipFill rotWithShape="1">
+          <a:blip r:embed="rId6" cstate="print">
+            <a:extLst>
+              <a:ext uri="{28A0092B-C50C-407E-A947-70E740481C1C}">
+                <a14:useLocalDpi xmlns:a14="http://schemas.microsoft.com/office/drawing/2010/main" val="0"/>
+              </a:ext>
+            </a:extLst>
+          </a:blip>
+          <a:stretch>
+            <a:fillRect/>
+          </a:stretch>
+        </p:blipFill>
+        <p:spPr>
+          <a:xfrm rot="0">
+            <a:off x="9170035" y="1331595"/>
+            <a:ext cx="1784350" cy="1390015"/>
+          </a:xfrm>
+          <a:prstGeom prst="roundRect"/>
+          <a:solidFill>
+            <a:srgbClr val="EDEDED"/>
+          </a:solidFill>
+        </p:spPr>
+      </p:pic>
+      <p:cxnSp>
+        <p:nvCxnSpPr>
+          <p:cNvPr id="64" name="도형 45"/>
+          <p:cNvCxnSpPr>
+            <a:stCxn id="62" idx="0"/>
+            <a:endCxn id="63" idx="2"/>
+          </p:cNvCxnSpPr>
+          <p:nvPr/>
+        </p:nvCxnSpPr>
+        <p:spPr>
+          <a:xfrm rot="0" flipH="1" flipV="1">
+            <a:off x="10061575" y="2720975"/>
+            <a:ext cx="3810" cy="379730"/>
+          </a:xfrm>
+          <a:prstGeom prst="straightConnector1"/>
+          <a:ln w="6350" cap="flat" cmpd="sng">
+            <a:prstDash/>
+            <a:headEnd type="none" w="med" len="med"/>
+            <a:tailEnd type="triangle" w="med" len="med"/>
+          </a:ln>
+        </p:spPr>
+        <p:style>
+          <a:lnRef idx="1">
+            <a:schemeClr val="accent1"/>
+          </a:lnRef>
+          <a:fillRef idx="0">
+            <a:schemeClr val="accent1"/>
+          </a:fillRef>
+          <a:effectRef idx="0">
+            <a:schemeClr val="accent1"/>
+          </a:effectRef>
+          <a:fontRef idx="minor">
+            <a:schemeClr val="tx1"/>
+          </a:fontRef>
+        </p:style>
+      </p:cxnSp>
     </p:spTree>
   </p:cSld>
   <p:clrMapOvr>
@@ -8266,8 +8479,8 @@
         </p:nvSpPr>
         <p:spPr>
           <a:xfrm rot="0">
-            <a:off x="4334510" y="467995"/>
-            <a:ext cx="3520440" cy="554990"/>
+            <a:off x="4342765" y="467995"/>
+            <a:ext cx="3580130" cy="554990"/>
           </a:xfrm>
           <a:prstGeom prst="rect"/>
           <a:noFill/>
@@ -8291,14 +8504,21 @@
                 <a:latin typeface="맑은 고딕" charset="0"/>
                 <a:ea typeface="맑은 고딕" charset="0"/>
               </a:rPr>
-              <a:t>열한 </a:t>
+              <a:t>열</a:t>
             </a:r>
             <a:r>
               <a:rPr lang="ko-KR" sz="3000" b="1">
                 <a:latin typeface="맑은 고딕" charset="0"/>
                 <a:ea typeface="맑은 고딕" charset="0"/>
               </a:rPr>
-              <a:t>번째 튜토리얼</a:t>
+              <a:t>한</a:t>
+            </a:r>
+            <a:r>
+              <a:rPr lang="ko-KR" sz="3000" b="1">
+                <a:latin typeface="맑은 고딕" charset="0"/>
+                <a:ea typeface="맑은 고딕" charset="0"/>
+              </a:rPr>
+              <a:t> 번째 튜토리얼</a:t>
             </a:r>
             <a:r>
               <a:rPr sz="3000" b="1">
@@ -8316,7 +8536,7 @@
       </p:sp>
       <p:sp>
         <p:nvSpPr>
-          <p:cNvPr id="57" name="텍스트 상자 57"/>
+          <p:cNvPr id="48" name="Rect 0"/>
           <p:cNvSpPr txBox="1">
             <a:spLocks/>
           </p:cNvSpPr>
@@ -8324,8 +8544,8 @@
         </p:nvSpPr>
         <p:spPr>
           <a:xfrm rot="0">
-            <a:off x="6797675" y="3568065"/>
-            <a:ext cx="4140200" cy="2616200"/>
+            <a:off x="1229995" y="4734560"/>
+            <a:ext cx="4130675" cy="954405"/>
           </a:xfrm>
           <a:prstGeom prst="rect"/>
           <a:noFill/>
@@ -8352,7 +8572,7 @@
                 <a:latin typeface="맑은 고딕" charset="0"/>
                 <a:ea typeface="맑은 고딕" charset="0"/>
               </a:rPr>
-              <a:t>25.</a:t>
+              <a:t>22.</a:t>
             </a:r>
             <a:r>
               <a:rPr lang="ko-KR" sz="2000">
@@ -8369,55 +8589,28 @@
                 <a:latin typeface="맑은 고딕" charset="0"/>
                 <a:ea typeface="맑은 고딕" charset="0"/>
               </a:rPr>
-              <a:t>그다음 회원가입을 하기 위한 함수를 생성하고 RegisterPlayFabUserRequest 클래스에서 Email과 비밀번호 그리고 유저 이름을 입력해서 저장합니다.</a:t>
+              <a:t>Photon Setting 스크립트에서 입 력을 받기 위해 InputField 변수를 여러 개 생성합니다.</a:t>
             </a:r>
             <a:endParaRPr lang="ko-KR" altLang="en-US" sz="1800">
               <a:latin typeface="맑은 고딕" charset="0"/>
               <a:ea typeface="맑은 고딕" charset="0"/>
             </a:endParaRPr>
           </a:p>
-          <a:p>
-            <a:pPr marL="0" indent="0" rtl="0" algn="l" defTabSz="914400" eaLnBrk="1" latinLnBrk="0" hangingPunct="1">
-              <a:buFontTx/>
-              <a:buNone/>
-            </a:pPr>
-            <a:endParaRPr lang="ko-KR" altLang="en-US" sz="1800">
-              <a:latin typeface="맑은 고딕" charset="0"/>
-              <a:ea typeface="맑은 고딕" charset="0"/>
-            </a:endParaRPr>
-          </a:p>
-          <a:p>
-            <a:pPr marL="0" indent="0" rtl="0" algn="l" defTabSz="914400" eaLnBrk="1" latinLnBrk="0" hangingPunct="1">
-              <a:buFontTx/>
-              <a:buNone/>
-            </a:pPr>
-            <a:r>
-              <a:rPr lang="ko-KR" sz="1800">
-                <a:latin typeface="맑은 고딕" charset="0"/>
-                <a:ea typeface="맑은 고딕" charset="0"/>
-              </a:rPr>
-              <a:t>그런 다음 RegosterPlayFabUser 라는 함수에서 회원가입의 여부를 확인합니다.</a:t>
-            </a:r>
-            <a:endParaRPr lang="ko-KR" altLang="en-US" sz="1800">
-              <a:latin typeface="맑은 고딕" charset="0"/>
-              <a:ea typeface="맑은 고딕" charset="0"/>
-            </a:endParaRPr>
-          </a:p>
         </p:txBody>
       </p:sp>
       <p:pic>
         <p:nvPicPr>
-          <p:cNvPr id="58" name="그림 58" descr="C:/Users/Admin1/AppData/Roaming/PolarisOffice/ETemp/6432_22183288/fImage648723249718.png"/>
+          <p:cNvPr id="55" name="그림 46"/>
           <p:cNvPicPr>
             <a:picLocks noChangeAspect="1"/>
           </p:cNvPicPr>
           <p:nvPr/>
         </p:nvPicPr>
         <p:blipFill rotWithShape="1">
-          <a:blip r:embed="rId2" cstate="hqprint">
+          <a:blip r:embed="rId2" cstate="print">
             <a:extLst>
               <a:ext uri="{28A0092B-C50C-407E-A947-70E740481C1C}">
-                <a14:useLocalDpi xmlns:a14="http://schemas.microsoft.com/office/drawing/2010/main"/>
+                <a14:useLocalDpi xmlns:a14="http://schemas.microsoft.com/office/drawing/2010/main" val="0"/>
               </a:ext>
             </a:extLst>
           </a:blip>
@@ -8427,90 +8620,28 @@
         </p:blipFill>
         <p:spPr>
           <a:xfrm rot="0">
-            <a:off x="6797675" y="1395095"/>
-            <a:ext cx="4141470" cy="2105025"/>
-          </a:xfrm>
-          <a:prstGeom prst="rect"/>
-          <a:noFill/>
+            <a:off x="1229360" y="3281680"/>
+            <a:ext cx="4122420" cy="1256665"/>
+          </a:xfrm>
+          <a:prstGeom prst="roundRect"/>
+          <a:solidFill>
+            <a:srgbClr val="EDEDED"/>
+          </a:solidFill>
         </p:spPr>
       </p:pic>
-      <p:sp>
-        <p:nvSpPr>
-          <p:cNvPr id="59" name="텍스트 상자 64"/>
-          <p:cNvSpPr txBox="1">
-            <a:spLocks/>
-          </p:cNvSpPr>
-          <p:nvPr/>
-        </p:nvSpPr>
-        <p:spPr>
-          <a:xfrm rot="0">
-            <a:off x="1229995" y="5235575"/>
-            <a:ext cx="4131310" cy="955040"/>
-          </a:xfrm>
-          <a:prstGeom prst="rect"/>
-          <a:noFill/>
-          <a:ln w="0">
-            <a:noFill/>
-            <a:prstDash/>
-          </a:ln>
-        </p:spPr>
-        <p:txBody>
-          <a:bodyPr wrap="square" lIns="89535" tIns="46355" rIns="89535" bIns="46355" numCol="1" vert="horz" anchor="t">
-            <a:spAutoFit/>
-          </a:bodyPr>
-          <a:lstStyle/>
-          <a:p>
-            <a:pPr marL="0" indent="0" rtl="0" algn="l" defTabSz="914400" eaLnBrk="1" latinLnBrk="0" hangingPunct="1">
-              <a:buFontTx/>
-              <a:buNone/>
-            </a:pPr>
-            <a:r>
-              <a:rPr lang="ko-KR" sz="2000" b="1">
-                <a:solidFill>
-                  <a:srgbClr val="0611F2"/>
-                </a:solidFill>
-                <a:latin typeface="맑은 고딕" charset="0"/>
-                <a:ea typeface="맑은 고딕" charset="0"/>
-              </a:rPr>
-              <a:t>24.</a:t>
-            </a:r>
-            <a:r>
-              <a:rPr lang="ko-KR" sz="2000">
-                <a:solidFill>
-                  <a:srgbClr val="0611F2"/>
-                </a:solidFill>
-                <a:latin typeface="맑은 고딕" charset="0"/>
-                <a:ea typeface="맑은 고딕" charset="0"/>
-              </a:rPr>
-              <a:t> </a:t>
-            </a:r>
-            <a:r>
-              <a:rPr lang="ko-KR" sz="1800">
-                <a:latin typeface="맑은 고딕" charset="0"/>
-                <a:ea typeface="맑은 고딕" charset="0"/>
-              </a:rPr>
-              <a:t>그리고 로그인이 실패했을 때 그리고 회원가입이 성공했을 때와 실패했을 때의 함수를 생성합니다.</a:t>
-            </a:r>
-            <a:endParaRPr lang="ko-KR" altLang="en-US" sz="1800">
-              <a:latin typeface="맑은 고딕" charset="0"/>
-              <a:ea typeface="맑은 고딕" charset="0"/>
-            </a:endParaRPr>
-          </a:p>
-        </p:txBody>
-      </p:sp>
       <p:pic>
         <p:nvPicPr>
-          <p:cNvPr id="60" name="그림 65" descr="C:/Users/Admin1/AppData/Roaming/PolarisOffice/ETemp/6432_22183288/fImage430523409895.png"/>
+          <p:cNvPr id="56" name="그림 49"/>
           <p:cNvPicPr>
             <a:picLocks noChangeAspect="1"/>
           </p:cNvPicPr>
           <p:nvPr/>
         </p:nvPicPr>
         <p:blipFill rotWithShape="1">
-          <a:blip r:embed="rId3" cstate="hqprint">
+          <a:blip r:embed="rId3" cstate="print">
             <a:extLst>
               <a:ext uri="{28A0092B-C50C-407E-A947-70E740481C1C}">
-                <a14:useLocalDpi xmlns:a14="http://schemas.microsoft.com/office/drawing/2010/main"/>
+                <a14:useLocalDpi xmlns:a14="http://schemas.microsoft.com/office/drawing/2010/main" val="0"/>
               </a:ext>
             </a:extLst>
           </a:blip>
@@ -8520,8 +8651,93 @@
         </p:blipFill>
         <p:spPr>
           <a:xfrm rot="0">
-            <a:off x="1228090" y="1412240"/>
-            <a:ext cx="4124960" cy="3700780"/>
+            <a:off x="1229360" y="1393190"/>
+            <a:ext cx="4140200" cy="1586230"/>
+          </a:xfrm>
+          <a:prstGeom prst="roundRect"/>
+          <a:solidFill>
+            <a:srgbClr val="EDEDED"/>
+          </a:solidFill>
+        </p:spPr>
+      </p:pic>
+      <p:sp>
+        <p:nvSpPr>
+          <p:cNvPr id="57" name="텍스트 상자 59"/>
+          <p:cNvSpPr txBox="1">
+            <a:spLocks/>
+          </p:cNvSpPr>
+          <p:nvPr/>
+        </p:nvSpPr>
+        <p:spPr>
+          <a:xfrm rot="0">
+            <a:off x="6555105" y="4460875"/>
+            <a:ext cx="4200525" cy="1231265"/>
+          </a:xfrm>
+          <a:prstGeom prst="rect"/>
+          <a:noFill/>
+          <a:ln w="0">
+            <a:noFill/>
+            <a:prstDash/>
+          </a:ln>
+        </p:spPr>
+        <p:txBody>
+          <a:bodyPr wrap="square" lIns="89535" tIns="46355" rIns="89535" bIns="46355" numCol="1" vert="horz" anchor="t">
+            <a:spAutoFit/>
+          </a:bodyPr>
+          <a:lstStyle/>
+          <a:p>
+            <a:pPr marL="0" indent="0" rtl="0" algn="l" defTabSz="914400" eaLnBrk="1" latinLnBrk="0" hangingPunct="1">
+              <a:buFontTx/>
+              <a:buNone/>
+            </a:pPr>
+            <a:r>
+              <a:rPr lang="ko-KR" sz="2000" b="1">
+                <a:solidFill>
+                  <a:srgbClr val="0611F2"/>
+                </a:solidFill>
+                <a:latin typeface="맑은 고딕" charset="0"/>
+                <a:ea typeface="맑은 고딕" charset="0"/>
+              </a:rPr>
+              <a:t>23. </a:t>
+            </a:r>
+            <a:r>
+              <a:rPr lang="ko-KR" sz="1800">
+                <a:latin typeface="맑은 고딕" charset="0"/>
+                <a:ea typeface="맑은 고딕" charset="0"/>
+              </a:rPr>
+              <a:t>그다음 로그인이 성공했을 때 게임 버전과 지역 그리고 유저 이름을 설정하고 씬을 이동할 수 있는 함수를 생성합니다.</a:t>
+            </a:r>
+            <a:endParaRPr lang="ko-KR" altLang="en-US" sz="1800">
+              <a:latin typeface="맑은 고딕" charset="0"/>
+              <a:ea typeface="맑은 고딕" charset="0"/>
+            </a:endParaRPr>
+          </a:p>
+        </p:txBody>
+      </p:sp>
+      <p:pic>
+        <p:nvPicPr>
+          <p:cNvPr id="58" name="그림 60"/>
+          <p:cNvPicPr>
+            <a:picLocks noChangeAspect="1"/>
+          </p:cNvPicPr>
+          <p:nvPr/>
+        </p:nvPicPr>
+        <p:blipFill rotWithShape="1">
+          <a:blip r:embed="rId4" cstate="print">
+            <a:extLst>
+              <a:ext uri="{28A0092B-C50C-407E-A947-70E740481C1C}">
+                <a14:useLocalDpi xmlns:a14="http://schemas.microsoft.com/office/drawing/2010/main" val="0"/>
+              </a:ext>
+            </a:extLst>
+          </a:blip>
+          <a:stretch>
+            <a:fillRect/>
+          </a:stretch>
+        </p:blipFill>
+        <p:spPr>
+          <a:xfrm rot="0">
+            <a:off x="6563995" y="1343025"/>
+            <a:ext cx="4192905" cy="2943860"/>
           </a:xfrm>
           <a:prstGeom prst="rect"/>
           <a:noFill/>
@@ -8613,9 +8829,9 @@
           <p:nvPr/>
         </p:nvSpPr>
         <p:spPr>
-          <a:xfrm rot="0">
+          <a:xfrm>
             <a:off x="4334510" y="467995"/>
-            <a:ext cx="3520440" cy="554990"/>
+            <a:ext cx="3521075" cy="554990"/>
           </a:xfrm>
           <a:prstGeom prst="rect"/>
           <a:noFill/>
@@ -8639,14 +8855,21 @@
                 <a:latin typeface="맑은 고딕" charset="0"/>
                 <a:ea typeface="맑은 고딕" charset="0"/>
               </a:rPr>
-              <a:t>열두 </a:t>
+              <a:t>열</a:t>
             </a:r>
             <a:r>
               <a:rPr lang="ko-KR" sz="3000" b="1">
                 <a:latin typeface="맑은 고딕" charset="0"/>
                 <a:ea typeface="맑은 고딕" charset="0"/>
               </a:rPr>
-              <a:t>번째 튜토리얼</a:t>
+              <a:t>두</a:t>
+            </a:r>
+            <a:r>
+              <a:rPr lang="ko-KR" sz="3000" b="1">
+                <a:latin typeface="맑은 고딕" charset="0"/>
+                <a:ea typeface="맑은 고딕" charset="0"/>
+              </a:rPr>
+              <a:t> 번째 튜토리얼</a:t>
             </a:r>
             <a:r>
               <a:rPr sz="3000" b="1">
@@ -8664,7 +8887,7 @@
       </p:sp>
       <p:sp>
         <p:nvSpPr>
-          <p:cNvPr id="57" name="Rect 0"/>
+          <p:cNvPr id="57" name="텍스트 상자 57"/>
           <p:cNvSpPr txBox="1">
             <a:spLocks/>
           </p:cNvSpPr>
@@ -8672,8 +8895,8 @@
         </p:nvSpPr>
         <p:spPr>
           <a:xfrm rot="0">
-            <a:off x="6797675" y="4789170"/>
-            <a:ext cx="4139565" cy="954405"/>
+            <a:off x="6797675" y="3568065"/>
+            <a:ext cx="4140200" cy="2616200"/>
           </a:xfrm>
           <a:prstGeom prst="rect"/>
           <a:noFill/>
@@ -8700,7 +8923,7 @@
                 <a:latin typeface="맑은 고딕" charset="0"/>
                 <a:ea typeface="맑은 고딕" charset="0"/>
               </a:rPr>
-              <a:t>27.</a:t>
+              <a:t>25.</a:t>
             </a:r>
             <a:r>
               <a:rPr lang="ko-KR" sz="2000">
@@ -8717,92 +8940,55 @@
                 <a:latin typeface="맑은 고딕" charset="0"/>
                 <a:ea typeface="맑은 고딕" charset="0"/>
               </a:rPr>
-              <a:t>그다음 빈 게임 오브젝트(Photon Setting)에 있는 스크립트에 각각의 InputField를 넣어줍니다. </a:t>
+              <a:t>그다음 회원가입을 하기 위한 함수를 생성하고 RegisterPlayFabUserRequest 클래스에서 Email과 비밀번호 그리고 유저 이름을 입력해서 저장합니다.</a:t>
             </a:r>
             <a:endParaRPr lang="ko-KR" altLang="en-US" sz="1800">
               <a:latin typeface="맑은 고딕" charset="0"/>
               <a:ea typeface="맑은 고딕" charset="0"/>
             </a:endParaRPr>
           </a:p>
-        </p:txBody>
-      </p:sp>
-      <p:sp>
-        <p:nvSpPr>
-          <p:cNvPr id="60" name="텍스트 상자 62"/>
-          <p:cNvSpPr txBox="1">
-            <a:spLocks/>
-          </p:cNvSpPr>
-          <p:nvPr/>
-        </p:nvSpPr>
-        <p:spPr>
-          <a:xfrm rot="0">
-            <a:off x="1212215" y="4509135"/>
-            <a:ext cx="4148455" cy="1231265"/>
-          </a:xfrm>
-          <a:prstGeom prst="rect"/>
-          <a:noFill/>
-          <a:ln w="0">
-            <a:noFill/>
-            <a:prstDash/>
-          </a:ln>
-        </p:spPr>
-        <p:txBody>
-          <a:bodyPr wrap="square" lIns="89535" tIns="46355" rIns="89535" bIns="46355" numCol="1" vert="horz" anchor="t">
-            <a:spAutoFit/>
-          </a:bodyPr>
-          <a:lstStyle/>
           <a:p>
             <a:pPr marL="0" indent="0" rtl="0" algn="l" defTabSz="914400" eaLnBrk="1" latinLnBrk="0" hangingPunct="1">
               <a:buFontTx/>
               <a:buNone/>
             </a:pPr>
-            <a:r>
-              <a:rPr lang="ko-KR" sz="2000" b="1">
-                <a:solidFill>
-                  <a:srgbClr val="0611F2"/>
-                </a:solidFill>
-                <a:latin typeface="맑은 고딕" charset="0"/>
-                <a:ea typeface="맑은 고딕" charset="0"/>
-              </a:rPr>
-              <a:t>26.</a:t>
-            </a:r>
-            <a:r>
-              <a:rPr lang="ko-KR" sz="2000">
-                <a:solidFill>
-                  <a:srgbClr val="0611F2"/>
-                </a:solidFill>
-                <a:latin typeface="맑은 고딕" charset="0"/>
-                <a:ea typeface="맑은 고딕" charset="0"/>
-              </a:rPr>
-              <a:t> </a:t>
-            </a:r>
-            <a:r>
-              <a:rPr lang="ko-KR" sz="1800">
-                <a:latin typeface="맑은 고딕" charset="0"/>
-                <a:ea typeface="맑은 고딕" charset="0"/>
-              </a:rPr>
-              <a:t>그리고 로그인에 대한 정보를 입력받고 로그인의 여부를 설정하는 LoginWithEmailAddress 라는 함수로 로그인할 수 있는 여부를 설정합니다.</a:t>
-            </a:r>
             <a:endParaRPr lang="ko-KR" altLang="en-US" sz="1800">
               <a:latin typeface="맑은 고딕" charset="0"/>
               <a:ea typeface="맑은 고딕" charset="0"/>
             </a:endParaRPr>
           </a:p>
+          <a:p>
+            <a:pPr marL="0" indent="0" rtl="0" algn="l" defTabSz="914400" eaLnBrk="1" latinLnBrk="0" hangingPunct="1">
+              <a:buFontTx/>
+              <a:buNone/>
+            </a:pPr>
+            <a:r>
+              <a:rPr lang="ko-KR" sz="1800">
+                <a:latin typeface="맑은 고딕" charset="0"/>
+                <a:ea typeface="맑은 고딕" charset="0"/>
+              </a:rPr>
+              <a:t>그런 다음 RegosterPlayFabUser 라는 함수에서 회원가입의 여부를 확인합니다.</a:t>
+            </a:r>
+            <a:endParaRPr lang="ko-KR" altLang="en-US" sz="1800">
+              <a:latin typeface="맑은 고딕" charset="0"/>
+              <a:ea typeface="맑은 고딕" charset="0"/>
+            </a:endParaRPr>
+          </a:p>
         </p:txBody>
       </p:sp>
       <p:pic>
         <p:nvPicPr>
-          <p:cNvPr id="61" name="그림 63"/>
+          <p:cNvPr id="58" name="그림 58"/>
           <p:cNvPicPr>
             <a:picLocks noChangeAspect="1"/>
           </p:cNvPicPr>
           <p:nvPr/>
         </p:nvPicPr>
         <p:blipFill rotWithShape="1">
-          <a:blip r:embed="rId2" cstate="print">
+          <a:blip r:embed="rId2" cstate="hqprint">
             <a:extLst>
               <a:ext uri="{28A0092B-C50C-407E-A947-70E740481C1C}">
-                <a14:useLocalDpi xmlns:a14="http://schemas.microsoft.com/office/drawing/2010/main" val="0"/>
+                <a14:useLocalDpi xmlns:a14="http://schemas.microsoft.com/office/drawing/2010/main"/>
               </a:ext>
             </a:extLst>
           </a:blip>
@@ -8812,26 +8998,90 @@
         </p:blipFill>
         <p:spPr>
           <a:xfrm rot="0">
-            <a:off x="1219200" y="1333500"/>
-            <a:ext cx="4150360" cy="2979420"/>
+            <a:off x="6797675" y="1395095"/>
+            <a:ext cx="4141470" cy="2105025"/>
           </a:xfrm>
           <a:prstGeom prst="rect"/>
           <a:noFill/>
         </p:spPr>
       </p:pic>
+      <p:sp>
+        <p:nvSpPr>
+          <p:cNvPr id="59" name="텍스트 상자 64"/>
+          <p:cNvSpPr txBox="1">
+            <a:spLocks/>
+          </p:cNvSpPr>
+          <p:nvPr/>
+        </p:nvSpPr>
+        <p:spPr>
+          <a:xfrm rot="0">
+            <a:off x="1229995" y="5235575"/>
+            <a:ext cx="4131310" cy="955040"/>
+          </a:xfrm>
+          <a:prstGeom prst="rect"/>
+          <a:noFill/>
+          <a:ln w="0">
+            <a:noFill/>
+            <a:prstDash/>
+          </a:ln>
+        </p:spPr>
+        <p:txBody>
+          <a:bodyPr wrap="square" lIns="89535" tIns="46355" rIns="89535" bIns="46355" numCol="1" vert="horz" anchor="t">
+            <a:spAutoFit/>
+          </a:bodyPr>
+          <a:lstStyle/>
+          <a:p>
+            <a:pPr marL="0" indent="0" rtl="0" algn="l" defTabSz="914400" eaLnBrk="1" latinLnBrk="0" hangingPunct="1">
+              <a:buFontTx/>
+              <a:buNone/>
+            </a:pPr>
+            <a:r>
+              <a:rPr lang="ko-KR" sz="2000" b="1">
+                <a:solidFill>
+                  <a:srgbClr val="0611F2"/>
+                </a:solidFill>
+                <a:latin typeface="맑은 고딕" charset="0"/>
+                <a:ea typeface="맑은 고딕" charset="0"/>
+              </a:rPr>
+              <a:t>24.</a:t>
+            </a:r>
+            <a:r>
+              <a:rPr lang="ko-KR" sz="2000">
+                <a:solidFill>
+                  <a:srgbClr val="0611F2"/>
+                </a:solidFill>
+                <a:latin typeface="맑은 고딕" charset="0"/>
+                <a:ea typeface="맑은 고딕" charset="0"/>
+              </a:rPr>
+              <a:t> </a:t>
+            </a:r>
+            <a:r>
+              <a:rPr lang="ko-KR" sz="1800">
+                <a:latin typeface="맑은 고딕" charset="0"/>
+                <a:ea typeface="맑은 고딕" charset="0"/>
+              </a:rPr>
+              <a:t>그리고 로그인이 실패했을 때 그리고 회원가입이 성공했을 때와 실패했을 때의 함수를 생성합니다.</a:t>
+            </a:r>
+            <a:endParaRPr lang="ko-KR" altLang="en-US" sz="1800">
+              <a:latin typeface="맑은 고딕" charset="0"/>
+              <a:ea typeface="맑은 고딕" charset="0"/>
+            </a:endParaRPr>
+          </a:p>
+        </p:txBody>
+      </p:sp>
       <p:pic>
         <p:nvPicPr>
-          <p:cNvPr id="62" name="그림 66"/>
+          <p:cNvPr id="60" name="그림 65"/>
           <p:cNvPicPr>
             <a:picLocks noChangeAspect="1"/>
           </p:cNvPicPr>
           <p:nvPr/>
         </p:nvPicPr>
         <p:blipFill rotWithShape="1">
-          <a:blip r:embed="rId3" cstate="print">
+          <a:blip r:embed="rId3" cstate="hqprint">
             <a:extLst>
               <a:ext uri="{28A0092B-C50C-407E-A947-70E740481C1C}">
-                <a14:useLocalDpi xmlns:a14="http://schemas.microsoft.com/office/drawing/2010/main" val="0"/>
+                <a14:useLocalDpi xmlns:a14="http://schemas.microsoft.com/office/drawing/2010/main"/>
               </a:ext>
             </a:extLst>
           </a:blip>
@@ -8841,174 +9091,13 @@
         </p:blipFill>
         <p:spPr>
           <a:xfrm rot="0">
-            <a:off x="6794500" y="1335405"/>
-            <a:ext cx="2385060" cy="3373755"/>
+            <a:off x="1228090" y="1412240"/>
+            <a:ext cx="4124960" cy="3700780"/>
           </a:xfrm>
           <a:prstGeom prst="rect"/>
           <a:noFill/>
         </p:spPr>
       </p:pic>
-      <p:pic>
-        <p:nvPicPr>
-          <p:cNvPr id="63" name="그림 67"/>
-          <p:cNvPicPr>
-            <a:picLocks noChangeAspect="1"/>
-          </p:cNvPicPr>
-          <p:nvPr/>
-        </p:nvPicPr>
-        <p:blipFill rotWithShape="1">
-          <a:blip r:embed="rId4" cstate="print">
-            <a:extLst>
-              <a:ext uri="{28A0092B-C50C-407E-A947-70E740481C1C}">
-                <a14:useLocalDpi xmlns:a14="http://schemas.microsoft.com/office/drawing/2010/main" val="0"/>
-              </a:ext>
-            </a:extLst>
-          </a:blip>
-          <a:stretch>
-            <a:fillRect/>
-          </a:stretch>
-        </p:blipFill>
-        <p:spPr>
-          <a:xfrm rot="0">
-            <a:off x="9430385" y="1331595"/>
-            <a:ext cx="1505585" cy="3379470"/>
-          </a:xfrm>
-          <a:prstGeom prst="rect"/>
-          <a:noFill/>
-        </p:spPr>
-      </p:pic>
-      <p:cxnSp>
-        <p:nvCxnSpPr>
-          <p:cNvPr id="64" name="도형 68"/>
-          <p:cNvCxnSpPr/>
-          <p:nvPr/>
-        </p:nvCxnSpPr>
-        <p:spPr>
-          <a:xfrm rot="0" flipH="1">
-            <a:off x="9109710" y="2424430"/>
-            <a:ext cx="606425" cy="1680845"/>
-          </a:xfrm>
-          <a:prstGeom prst="straightConnector1"/>
-          <a:ln w="6350" cap="flat" cmpd="sng">
-            <a:prstDash/>
-            <a:headEnd type="none" w="med" len="med"/>
-            <a:tailEnd type="triangle" w="med" len="med"/>
-          </a:ln>
-        </p:spPr>
-        <p:style>
-          <a:lnRef idx="1">
-            <a:schemeClr val="accent1"/>
-          </a:lnRef>
-          <a:fillRef idx="0">
-            <a:schemeClr val="accent1"/>
-          </a:fillRef>
-          <a:effectRef idx="0">
-            <a:schemeClr val="accent1"/>
-          </a:effectRef>
-          <a:fontRef idx="minor">
-            <a:schemeClr val="tx1"/>
-          </a:fontRef>
-        </p:style>
-      </p:cxnSp>
-      <p:cxnSp>
-        <p:nvCxnSpPr>
-          <p:cNvPr id="65" name="도형 69"/>
-          <p:cNvCxnSpPr/>
-          <p:nvPr/>
-        </p:nvCxnSpPr>
-        <p:spPr>
-          <a:xfrm rot="0" flipH="1">
-            <a:off x="9117965" y="2233930"/>
-            <a:ext cx="607060" cy="1654810"/>
-          </a:xfrm>
-          <a:prstGeom prst="straightConnector1"/>
-          <a:ln w="6350" cap="flat" cmpd="sng">
-            <a:prstDash/>
-            <a:headEnd type="none" w="med" len="med"/>
-            <a:tailEnd type="triangle" w="med" len="med"/>
-          </a:ln>
-        </p:spPr>
-        <p:style>
-          <a:lnRef idx="1">
-            <a:schemeClr val="accent1"/>
-          </a:lnRef>
-          <a:fillRef idx="0">
-            <a:schemeClr val="accent1"/>
-          </a:fillRef>
-          <a:effectRef idx="0">
-            <a:schemeClr val="accent1"/>
-          </a:effectRef>
-          <a:fontRef idx="minor">
-            <a:schemeClr val="tx1"/>
-          </a:fontRef>
-        </p:style>
-      </p:cxnSp>
-      <p:cxnSp>
-        <p:nvCxnSpPr>
-          <p:cNvPr id="66" name="도형 70"/>
-          <p:cNvCxnSpPr/>
-          <p:nvPr/>
-        </p:nvCxnSpPr>
-        <p:spPr>
-          <a:xfrm rot="0" flipH="1">
-            <a:off x="9126855" y="2614930"/>
-            <a:ext cx="589280" cy="1724025"/>
-          </a:xfrm>
-          <a:prstGeom prst="straightConnector1"/>
-          <a:ln w="6350" cap="flat" cmpd="sng">
-            <a:prstDash/>
-            <a:headEnd type="none" w="med" len="med"/>
-            <a:tailEnd type="triangle" w="med" len="med"/>
-          </a:ln>
-        </p:spPr>
-        <p:style>
-          <a:lnRef idx="1">
-            <a:schemeClr val="accent1"/>
-          </a:lnRef>
-          <a:fillRef idx="0">
-            <a:schemeClr val="accent1"/>
-          </a:fillRef>
-          <a:effectRef idx="0">
-            <a:schemeClr val="accent1"/>
-          </a:effectRef>
-          <a:fontRef idx="minor">
-            <a:schemeClr val="tx1"/>
-          </a:fontRef>
-        </p:style>
-      </p:cxnSp>
-      <p:cxnSp>
-        <p:nvCxnSpPr>
-          <p:cNvPr id="67" name="도형 71"/>
-          <p:cNvCxnSpPr/>
-          <p:nvPr/>
-        </p:nvCxnSpPr>
-        <p:spPr>
-          <a:xfrm rot="0" flipH="1">
-            <a:off x="9152890" y="2796540"/>
-            <a:ext cx="581025" cy="1750060"/>
-          </a:xfrm>
-          <a:prstGeom prst="straightConnector1"/>
-          <a:ln w="6350" cap="flat" cmpd="sng">
-            <a:prstDash/>
-            <a:headEnd type="none" w="med" len="med"/>
-            <a:tailEnd type="triangle" w="med" len="med"/>
-          </a:ln>
-        </p:spPr>
-        <p:style>
-          <a:lnRef idx="1">
-            <a:schemeClr val="accent1"/>
-          </a:lnRef>
-          <a:fillRef idx="0">
-            <a:schemeClr val="accent1"/>
-          </a:fillRef>
-          <a:effectRef idx="0">
-            <a:schemeClr val="accent1"/>
-          </a:effectRef>
-          <a:fontRef idx="minor">
-            <a:schemeClr val="tx1"/>
-          </a:fontRef>
-        </p:style>
-      </p:cxnSp>
     </p:spTree>
   </p:cSld>
   <p:clrMapOvr>
@@ -9095,9 +9184,9 @@
           <p:nvPr/>
         </p:nvSpPr>
         <p:spPr>
-          <a:xfrm rot="0">
+          <a:xfrm>
             <a:off x="4334510" y="467995"/>
-            <a:ext cx="3520440" cy="554990"/>
+            <a:ext cx="3521075" cy="554990"/>
           </a:xfrm>
           <a:prstGeom prst="rect"/>
           <a:noFill/>
@@ -9121,14 +9210,21 @@
                 <a:latin typeface="맑은 고딕" charset="0"/>
                 <a:ea typeface="맑은 고딕" charset="0"/>
               </a:rPr>
-              <a:t>열세 </a:t>
+              <a:t>열</a:t>
             </a:r>
             <a:r>
               <a:rPr lang="ko-KR" sz="3000" b="1">
                 <a:latin typeface="맑은 고딕" charset="0"/>
                 <a:ea typeface="맑은 고딕" charset="0"/>
               </a:rPr>
-              <a:t>번째 튜토리얼</a:t>
+              <a:t>세</a:t>
+            </a:r>
+            <a:r>
+              <a:rPr lang="ko-KR" sz="3000" b="1">
+                <a:latin typeface="맑은 고딕" charset="0"/>
+                <a:ea typeface="맑은 고딕" charset="0"/>
+              </a:rPr>
+              <a:t> 번째 튜토리얼</a:t>
             </a:r>
             <a:r>
               <a:rPr sz="3000" b="1">
@@ -9154,8 +9250,8 @@
         </p:nvSpPr>
         <p:spPr>
           <a:xfrm rot="0">
-            <a:off x="6711315" y="4330065"/>
-            <a:ext cx="4407535" cy="954405"/>
+            <a:off x="6797675" y="4789170"/>
+            <a:ext cx="4139565" cy="954405"/>
           </a:xfrm>
           <a:prstGeom prst="rect"/>
           <a:noFill/>
@@ -9199,45 +9295,18 @@
                 <a:latin typeface="맑은 고딕" charset="0"/>
                 <a:ea typeface="맑은 고딕" charset="0"/>
               </a:rPr>
-              <a:t>그리고 함수를 추가하기 위해 PhotonSetting를 선택하시고 </a:t>
+              <a:t>그다음 빈 게임 오브젝트(Photon Setting)에 있는 스크립트에 각각의 InputField를 넣어줍니다. </a:t>
             </a:r>
             <a:endParaRPr lang="ko-KR" altLang="en-US" sz="1800">
               <a:latin typeface="맑은 고딕" charset="0"/>
               <a:ea typeface="맑은 고딕" charset="0"/>
             </a:endParaRPr>
           </a:p>
-          <a:p>
-            <a:pPr marL="0" indent="0" rtl="0" algn="l" defTabSz="914400" eaLnBrk="1" latinLnBrk="0" hangingPunct="1">
-              <a:buFontTx/>
-              <a:buNone/>
-            </a:pPr>
-            <a:r>
-              <a:rPr lang="ko-KR" sz="1800">
-                <a:solidFill>
-                  <a:srgbClr val="009900"/>
-                </a:solidFill>
-                <a:latin typeface="맑은 고딕" charset="0"/>
-                <a:ea typeface="맑은 고딕" charset="0"/>
-              </a:rPr>
-              <a:t>[ SignUp( ) ]</a:t>
-            </a:r>
-            <a:r>
-              <a:rPr lang="ko-KR" sz="1800">
-                <a:latin typeface="맑은 고딕" charset="0"/>
-                <a:ea typeface="맑은 고딕" charset="0"/>
-              </a:rPr>
-              <a:t>이라는 함수를 설정합니다. </a:t>
-            </a:r>
-            <a:endParaRPr lang="ko-KR" altLang="en-US" sz="1800">
-              <a:latin typeface="맑은 고딕" charset="0"/>
-              <a:ea typeface="맑은 고딕" charset="0"/>
-            </a:endParaRPr>
-          </a:p>
-        </p:txBody>
-      </p:sp>
-      <p:sp>
-        <p:nvSpPr>
-          <p:cNvPr id="60" name="Rect 0"/>
+        </p:txBody>
+      </p:sp>
+      <p:sp>
+        <p:nvSpPr>
+          <p:cNvPr id="60" name="텍스트 상자 62"/>
           <p:cNvSpPr txBox="1">
             <a:spLocks/>
           </p:cNvSpPr>
@@ -9245,8 +9314,8 @@
         </p:nvSpPr>
         <p:spPr>
           <a:xfrm rot="0">
-            <a:off x="1229360" y="4327525"/>
-            <a:ext cx="4148455" cy="954405"/>
+            <a:off x="1212215" y="4509135"/>
+            <a:ext cx="4148455" cy="1231265"/>
           </a:xfrm>
           <a:prstGeom prst="rect"/>
           <a:noFill/>
@@ -9273,7 +9342,7 @@
                 <a:latin typeface="맑은 고딕" charset="0"/>
                 <a:ea typeface="맑은 고딕" charset="0"/>
               </a:rPr>
-              <a:t>28.</a:t>
+              <a:t>26.</a:t>
             </a:r>
             <a:r>
               <a:rPr lang="ko-KR" sz="2000">
@@ -9290,7 +9359,7 @@
                 <a:latin typeface="맑은 고딕" charset="0"/>
                 <a:ea typeface="맑은 고딕" charset="0"/>
               </a:rPr>
-              <a:t>이제 Sign Up Button이라는 버튼 컴포넌트의 On Click 함수에 Photon Setting 오브젝트를 넣어줍니다.</a:t>
+              <a:t>그리고 로그인에 대한 정보를 입력받고 로그인의 여부를 설정하는 LoginWithEmailAddress 라는 함수로 로그인할 수 있는 여부를 설정합니다.</a:t>
             </a:r>
             <a:endParaRPr lang="ko-KR" altLang="en-US" sz="1800">
               <a:latin typeface="맑은 고딕" charset="0"/>
@@ -9301,7 +9370,7 @@
       </p:sp>
       <p:pic>
         <p:nvPicPr>
-          <p:cNvPr id="62" name="그림 73"/>
+          <p:cNvPr id="61" name="그림 63"/>
           <p:cNvPicPr>
             <a:picLocks noChangeAspect="1"/>
           </p:cNvPicPr>
@@ -9321,8 +9390,8 @@
         </p:blipFill>
         <p:spPr>
           <a:xfrm rot="0">
-            <a:off x="6708775" y="1337310"/>
-            <a:ext cx="4420235" cy="2741930"/>
+            <a:off x="1219200" y="1333500"/>
+            <a:ext cx="4150360" cy="2979420"/>
           </a:xfrm>
           <a:prstGeom prst="rect"/>
           <a:noFill/>
@@ -9330,7 +9399,7 @@
       </p:pic>
       <p:pic>
         <p:nvPicPr>
-          <p:cNvPr id="63" name="그림 75"/>
+          <p:cNvPr id="62" name="그림 66"/>
           <p:cNvPicPr>
             <a:picLocks noChangeAspect="1"/>
           </p:cNvPicPr>
@@ -9350,8 +9419,8 @@
         </p:blipFill>
         <p:spPr>
           <a:xfrm rot="0">
-            <a:off x="1230630" y="1333500"/>
-            <a:ext cx="2259965" cy="2832100"/>
+            <a:off x="6794500" y="1335405"/>
+            <a:ext cx="2385060" cy="3373755"/>
           </a:xfrm>
           <a:prstGeom prst="rect"/>
           <a:noFill/>
@@ -9359,7 +9428,7 @@
       </p:pic>
       <p:pic>
         <p:nvPicPr>
-          <p:cNvPr id="64" name="그림 76"/>
+          <p:cNvPr id="63" name="그림 67"/>
           <p:cNvPicPr>
             <a:picLocks noChangeAspect="1"/>
           </p:cNvPicPr>
@@ -9379,25 +9448,122 @@
         </p:blipFill>
         <p:spPr>
           <a:xfrm rot="0">
-            <a:off x="3776345" y="1704340"/>
-            <a:ext cx="1505585" cy="1943735"/>
-          </a:xfrm>
-          <a:prstGeom prst="roundRect"/>
-          <a:solidFill>
-            <a:srgbClr val="EDEDED"/>
-          </a:solidFill>
+            <a:off x="9430385" y="1331595"/>
+            <a:ext cx="1505585" cy="3379470"/>
+          </a:xfrm>
+          <a:prstGeom prst="rect"/>
+          <a:noFill/>
         </p:spPr>
       </p:pic>
       <p:cxnSp>
         <p:nvCxnSpPr>
-          <p:cNvPr id="65" name="도형 79"/>
+          <p:cNvPr id="64" name="도형 68"/>
           <p:cNvCxnSpPr/>
           <p:nvPr/>
         </p:nvCxnSpPr>
         <p:spPr>
           <a:xfrm rot="0" flipH="1">
-            <a:off x="1939925" y="3472180"/>
-            <a:ext cx="2087245" cy="442595"/>
+            <a:off x="9109710" y="2424430"/>
+            <a:ext cx="606425" cy="1680845"/>
+          </a:xfrm>
+          <a:prstGeom prst="straightConnector1"/>
+          <a:ln w="6350" cap="flat" cmpd="sng">
+            <a:prstDash/>
+            <a:headEnd type="none" w="med" len="med"/>
+            <a:tailEnd type="triangle" w="med" len="med"/>
+          </a:ln>
+        </p:spPr>
+        <p:style>
+          <a:lnRef idx="1">
+            <a:schemeClr val="accent1"/>
+          </a:lnRef>
+          <a:fillRef idx="0">
+            <a:schemeClr val="accent1"/>
+          </a:fillRef>
+          <a:effectRef idx="0">
+            <a:schemeClr val="accent1"/>
+          </a:effectRef>
+          <a:fontRef idx="minor">
+            <a:schemeClr val="tx1"/>
+          </a:fontRef>
+        </p:style>
+      </p:cxnSp>
+      <p:cxnSp>
+        <p:nvCxnSpPr>
+          <p:cNvPr id="65" name="도형 69"/>
+          <p:cNvCxnSpPr/>
+          <p:nvPr/>
+        </p:nvCxnSpPr>
+        <p:spPr>
+          <a:xfrm rot="0" flipH="1">
+            <a:off x="9117965" y="2233930"/>
+            <a:ext cx="607060" cy="1654810"/>
+          </a:xfrm>
+          <a:prstGeom prst="straightConnector1"/>
+          <a:ln w="6350" cap="flat" cmpd="sng">
+            <a:prstDash/>
+            <a:headEnd type="none" w="med" len="med"/>
+            <a:tailEnd type="triangle" w="med" len="med"/>
+          </a:ln>
+        </p:spPr>
+        <p:style>
+          <a:lnRef idx="1">
+            <a:schemeClr val="accent1"/>
+          </a:lnRef>
+          <a:fillRef idx="0">
+            <a:schemeClr val="accent1"/>
+          </a:fillRef>
+          <a:effectRef idx="0">
+            <a:schemeClr val="accent1"/>
+          </a:effectRef>
+          <a:fontRef idx="minor">
+            <a:schemeClr val="tx1"/>
+          </a:fontRef>
+        </p:style>
+      </p:cxnSp>
+      <p:cxnSp>
+        <p:nvCxnSpPr>
+          <p:cNvPr id="66" name="도형 70"/>
+          <p:cNvCxnSpPr/>
+          <p:nvPr/>
+        </p:nvCxnSpPr>
+        <p:spPr>
+          <a:xfrm rot="0" flipH="1">
+            <a:off x="9126855" y="2614930"/>
+            <a:ext cx="589280" cy="1724025"/>
+          </a:xfrm>
+          <a:prstGeom prst="straightConnector1"/>
+          <a:ln w="6350" cap="flat" cmpd="sng">
+            <a:prstDash/>
+            <a:headEnd type="none" w="med" len="med"/>
+            <a:tailEnd type="triangle" w="med" len="med"/>
+          </a:ln>
+        </p:spPr>
+        <p:style>
+          <a:lnRef idx="1">
+            <a:schemeClr val="accent1"/>
+          </a:lnRef>
+          <a:fillRef idx="0">
+            <a:schemeClr val="accent1"/>
+          </a:fillRef>
+          <a:effectRef idx="0">
+            <a:schemeClr val="accent1"/>
+          </a:effectRef>
+          <a:fontRef idx="minor">
+            <a:schemeClr val="tx1"/>
+          </a:fontRef>
+        </p:style>
+      </p:cxnSp>
+      <p:cxnSp>
+        <p:nvCxnSpPr>
+          <p:cNvPr id="67" name="도형 71"/>
+          <p:cNvCxnSpPr/>
+          <p:nvPr/>
+        </p:nvCxnSpPr>
+        <p:spPr>
+          <a:xfrm rot="0" flipH="1">
+            <a:off x="9152890" y="2796540"/>
+            <a:ext cx="581025" cy="1750060"/>
           </a:xfrm>
           <a:prstGeom prst="straightConnector1"/>
           <a:ln w="6350" cap="flat" cmpd="sng">
@@ -9507,9 +9673,9 @@
           <p:nvPr/>
         </p:nvSpPr>
         <p:spPr>
-          <a:xfrm rot="0">
+          <a:xfrm>
             <a:off x="4334510" y="467995"/>
-            <a:ext cx="3520440" cy="554990"/>
+            <a:ext cx="3521075" cy="554990"/>
           </a:xfrm>
           <a:prstGeom prst="rect"/>
           <a:noFill/>
@@ -9533,14 +9699,21 @@
                 <a:latin typeface="맑은 고딕" charset="0"/>
                 <a:ea typeface="맑은 고딕" charset="0"/>
               </a:rPr>
-              <a:t>열네 </a:t>
+              <a:t>열</a:t>
             </a:r>
             <a:r>
               <a:rPr lang="ko-KR" sz="3000" b="1">
                 <a:latin typeface="맑은 고딕" charset="0"/>
                 <a:ea typeface="맑은 고딕" charset="0"/>
               </a:rPr>
-              <a:t>번째 튜토리얼</a:t>
+              <a:t>네</a:t>
+            </a:r>
+            <a:r>
+              <a:rPr lang="ko-KR" sz="3000" b="1">
+                <a:latin typeface="맑은 고딕" charset="0"/>
+                <a:ea typeface="맑은 고딕" charset="0"/>
+              </a:rPr>
+              <a:t> 번째 튜토리얼</a:t>
             </a:r>
             <a:r>
               <a:rPr sz="3000" b="1">
@@ -9566,7 +9739,7 @@
         </p:nvSpPr>
         <p:spPr>
           <a:xfrm rot="0">
-            <a:off x="6737350" y="4399280"/>
+            <a:off x="6711315" y="4330065"/>
             <a:ext cx="4407535" cy="954405"/>
           </a:xfrm>
           <a:prstGeom prst="rect"/>
@@ -9594,7 +9767,7 @@
                 <a:latin typeface="맑은 고딕" charset="0"/>
                 <a:ea typeface="맑은 고딕" charset="0"/>
               </a:rPr>
-              <a:t>30.</a:t>
+              <a:t>27.</a:t>
             </a:r>
             <a:r>
               <a:rPr lang="ko-KR" sz="2000">
@@ -9631,7 +9804,7 @@
                 <a:latin typeface="맑은 고딕" charset="0"/>
                 <a:ea typeface="맑은 고딕" charset="0"/>
               </a:rPr>
-              <a:t>[ Login( ) ]</a:t>
+              <a:t>[ SignUp( ) ]</a:t>
             </a:r>
             <a:r>
               <a:rPr lang="ko-KR" sz="1800">
@@ -9657,8 +9830,8 @@
         </p:nvSpPr>
         <p:spPr>
           <a:xfrm rot="0">
-            <a:off x="1229360" y="4396740"/>
-            <a:ext cx="4148455" cy="1231265"/>
+            <a:off x="1229360" y="4327525"/>
+            <a:ext cx="4148455" cy="954405"/>
           </a:xfrm>
           <a:prstGeom prst="rect"/>
           <a:noFill/>
@@ -9685,7 +9858,7 @@
                 <a:latin typeface="맑은 고딕" charset="0"/>
                 <a:ea typeface="맑은 고딕" charset="0"/>
               </a:rPr>
-              <a:t>29.</a:t>
+              <a:t>28.</a:t>
             </a:r>
             <a:r>
               <a:rPr lang="ko-KR" sz="2000">
@@ -9702,7 +9875,7 @@
                 <a:latin typeface="맑은 고딕" charset="0"/>
                 <a:ea typeface="맑은 고딕" charset="0"/>
               </a:rPr>
-              <a:t>마지막으로 Login Button이라는 버튼 컴포넌트의 On Click 함수에 Photon Setting 오브젝트를 넣어줍니다.</a:t>
+              <a:t>이제 Sign Up Button이라는 버튼 컴포넌트의 On Click 함수에 Photon Setting 오브젝트를 넣어줍니다.</a:t>
             </a:r>
             <a:endParaRPr lang="ko-KR" altLang="en-US" sz="1800">
               <a:latin typeface="맑은 고딕" charset="0"/>
@@ -9713,7 +9886,7 @@
       </p:sp>
       <p:pic>
         <p:nvPicPr>
-          <p:cNvPr id="64" name="Picture "/>
+          <p:cNvPr id="62" name="그림 73"/>
           <p:cNvPicPr>
             <a:picLocks noChangeAspect="1"/>
           </p:cNvPicPr>
@@ -9733,18 +9906,16 @@
         </p:blipFill>
         <p:spPr>
           <a:xfrm rot="0">
-            <a:off x="3776345" y="1704340"/>
-            <a:ext cx="1505585" cy="1943735"/>
-          </a:xfrm>
-          <a:prstGeom prst="roundRect"/>
-          <a:solidFill>
-            <a:srgbClr val="EDEDED"/>
-          </a:solidFill>
+            <a:off x="6708775" y="1337310"/>
+            <a:ext cx="4420235" cy="2741930"/>
+          </a:xfrm>
+          <a:prstGeom prst="rect"/>
+          <a:noFill/>
         </p:spPr>
       </p:pic>
       <p:pic>
         <p:nvPicPr>
-          <p:cNvPr id="66" name="그림 80"/>
+          <p:cNvPr id="63" name="그림 75"/>
           <p:cNvPicPr>
             <a:picLocks noChangeAspect="1"/>
           </p:cNvPicPr>
@@ -9764,49 +9935,16 @@
         </p:blipFill>
         <p:spPr>
           <a:xfrm rot="0">
-            <a:off x="1229995" y="1325245"/>
-            <a:ext cx="2286635" cy="2961640"/>
+            <a:off x="1230630" y="1333500"/>
+            <a:ext cx="2259965" cy="2832100"/>
           </a:xfrm>
           <a:prstGeom prst="rect"/>
           <a:noFill/>
         </p:spPr>
       </p:pic>
-      <p:cxnSp>
-        <p:nvCxnSpPr>
-          <p:cNvPr id="65" name="Rect 0"/>
-          <p:cNvCxnSpPr/>
-          <p:nvPr/>
-        </p:nvCxnSpPr>
-        <p:spPr>
-          <a:xfrm rot="0" flipH="1">
-            <a:off x="1957070" y="3472180"/>
-            <a:ext cx="2070100" cy="546100"/>
-          </a:xfrm>
-          <a:prstGeom prst="straightConnector1"/>
-          <a:ln w="6350" cap="flat" cmpd="sng">
-            <a:prstDash/>
-            <a:headEnd type="none" w="med" len="med"/>
-            <a:tailEnd type="triangle" w="med" len="med"/>
-          </a:ln>
-        </p:spPr>
-        <p:style>
-          <a:lnRef idx="1">
-            <a:schemeClr val="accent1"/>
-          </a:lnRef>
-          <a:fillRef idx="0">
-            <a:schemeClr val="accent1"/>
-          </a:fillRef>
-          <a:effectRef idx="0">
-            <a:schemeClr val="accent1"/>
-          </a:effectRef>
-          <a:fontRef idx="minor">
-            <a:schemeClr val="tx1"/>
-          </a:fontRef>
-        </p:style>
-      </p:cxnSp>
       <p:pic>
         <p:nvPicPr>
-          <p:cNvPr id="67" name="그림 81"/>
+          <p:cNvPr id="64" name="그림 76"/>
           <p:cNvPicPr>
             <a:picLocks noChangeAspect="1"/>
           </p:cNvPicPr>
@@ -9826,13 +9964,48 @@
         </p:blipFill>
         <p:spPr>
           <a:xfrm rot="0">
-            <a:off x="6797675" y="1336675"/>
-            <a:ext cx="4165600" cy="2950210"/>
-          </a:xfrm>
-          <a:prstGeom prst="rect"/>
-          <a:noFill/>
+            <a:off x="3776345" y="1704340"/>
+            <a:ext cx="1505585" cy="1943735"/>
+          </a:xfrm>
+          <a:prstGeom prst="roundRect"/>
+          <a:solidFill>
+            <a:srgbClr val="EDEDED"/>
+          </a:solidFill>
         </p:spPr>
       </p:pic>
+      <p:cxnSp>
+        <p:nvCxnSpPr>
+          <p:cNvPr id="65" name="도형 79"/>
+          <p:cNvCxnSpPr/>
+          <p:nvPr/>
+        </p:nvCxnSpPr>
+        <p:spPr>
+          <a:xfrm rot="0" flipH="1">
+            <a:off x="1939925" y="3472180"/>
+            <a:ext cx="2087245" cy="442595"/>
+          </a:xfrm>
+          <a:prstGeom prst="straightConnector1"/>
+          <a:ln w="6350" cap="flat" cmpd="sng">
+            <a:prstDash/>
+            <a:headEnd type="none" w="med" len="med"/>
+            <a:tailEnd type="triangle" w="med" len="med"/>
+          </a:ln>
+        </p:spPr>
+        <p:style>
+          <a:lnRef idx="1">
+            <a:schemeClr val="accent1"/>
+          </a:lnRef>
+          <a:fillRef idx="0">
+            <a:schemeClr val="accent1"/>
+          </a:fillRef>
+          <a:effectRef idx="0">
+            <a:schemeClr val="accent1"/>
+          </a:effectRef>
+          <a:fontRef idx="minor">
+            <a:schemeClr val="tx1"/>
+          </a:fontRef>
+        </p:style>
+      </p:cxnSp>
     </p:spTree>
   </p:cSld>
   <p:clrMapOvr>
@@ -9884,7 +10057,7 @@
         <p:spPr>
           <a:xfrm rot="0">
             <a:off x="1229995" y="1337310"/>
-            <a:ext cx="4039870" cy="371475"/>
+            <a:ext cx="4039235" cy="370840"/>
           </a:xfrm>
           <a:prstGeom prst="rect"/>
           <a:noFill/>
@@ -9920,8 +10093,8 @@
         </p:nvSpPr>
         <p:spPr>
           <a:xfrm rot="0">
-            <a:off x="4156710" y="443230"/>
-            <a:ext cx="3883025" cy="554990"/>
+            <a:off x="4126865" y="467995"/>
+            <a:ext cx="3937635" cy="554990"/>
           </a:xfrm>
           <a:prstGeom prst="rect"/>
           <a:noFill/>
@@ -9945,14 +10118,7 @@
                 <a:latin typeface="맑은 고딕" charset="0"/>
                 <a:ea typeface="맑은 고딕" charset="0"/>
               </a:rPr>
-              <a:t>열</a:t>
-            </a:r>
-            <a:r>
-              <a:rPr lang="ko-KR" sz="3000" b="1">
-                <a:latin typeface="맑은 고딕" charset="0"/>
-                <a:ea typeface="맑은 고딕" charset="0"/>
-              </a:rPr>
-              <a:t>다섯</a:t>
+              <a:t>열다섯</a:t>
             </a:r>
             <a:r>
               <a:rPr lang="ko-KR" sz="3000" b="1">
@@ -9985,8 +10151,8 @@
         </p:nvSpPr>
         <p:spPr>
           <a:xfrm rot="0">
-            <a:off x="6654800" y="5022850"/>
-            <a:ext cx="4460875" cy="1231900"/>
+            <a:off x="6737350" y="4399280"/>
+            <a:ext cx="4407535" cy="954405"/>
           </a:xfrm>
           <a:prstGeom prst="rect"/>
           <a:noFill/>
@@ -10013,7 +10179,7 @@
                 <a:latin typeface="맑은 고딕" charset="0"/>
                 <a:ea typeface="맑은 고딕" charset="0"/>
               </a:rPr>
-              <a:t>32.</a:t>
+              <a:t>30.</a:t>
             </a:r>
             <a:r>
               <a:rPr lang="ko-KR" sz="2000">
@@ -10030,13 +10196,40 @@
                 <a:latin typeface="맑은 고딕" charset="0"/>
                 <a:ea typeface="맑은 고딕" charset="0"/>
               </a:rPr>
-              <a:t>그런 다음 유저의 ID를 선택하면 Master player account에 접근해서 비밀번호를 변경하거나 비밀번호를 직접 볼 수 있습니다.</a:t>
+              <a:t>그리고 함수를 추가하기 위해 PhotonSetting를 선택하시고 </a:t>
             </a:r>
             <a:endParaRPr lang="ko-KR" altLang="en-US" sz="1800">
               <a:latin typeface="맑은 고딕" charset="0"/>
               <a:ea typeface="맑은 고딕" charset="0"/>
             </a:endParaRPr>
           </a:p>
+          <a:p>
+            <a:pPr marL="0" indent="0" rtl="0" algn="l" defTabSz="914400" eaLnBrk="1" latinLnBrk="0" hangingPunct="1">
+              <a:buFontTx/>
+              <a:buNone/>
+            </a:pPr>
+            <a:r>
+              <a:rPr lang="ko-KR" sz="1800">
+                <a:solidFill>
+                  <a:srgbClr val="009900"/>
+                </a:solidFill>
+                <a:latin typeface="맑은 고딕" charset="0"/>
+                <a:ea typeface="맑은 고딕" charset="0"/>
+              </a:rPr>
+              <a:t>[ Login( ) ]</a:t>
+            </a:r>
+            <a:r>
+              <a:rPr lang="ko-KR" sz="1800">
+                <a:latin typeface="맑은 고딕" charset="0"/>
+                <a:ea typeface="맑은 고딕" charset="0"/>
+              </a:rPr>
+              <a:t>이라는 함수를 설정합니다. </a:t>
+            </a:r>
+            <a:endParaRPr lang="ko-KR" altLang="en-US" sz="1800">
+              <a:latin typeface="맑은 고딕" charset="0"/>
+              <a:ea typeface="맑은 고딕" charset="0"/>
+            </a:endParaRPr>
+          </a:p>
         </p:txBody>
       </p:sp>
       <p:sp>
@@ -10049,8 +10242,8 @@
         </p:nvSpPr>
         <p:spPr>
           <a:xfrm rot="0">
-            <a:off x="1229995" y="5019675"/>
-            <a:ext cx="4173855" cy="1231900"/>
+            <a:off x="1229360" y="4396740"/>
+            <a:ext cx="4148455" cy="1231265"/>
           </a:xfrm>
           <a:prstGeom prst="rect"/>
           <a:noFill/>
@@ -10077,7 +10270,7 @@
                 <a:latin typeface="맑은 고딕" charset="0"/>
                 <a:ea typeface="맑은 고딕" charset="0"/>
               </a:rPr>
-              <a:t>31.</a:t>
+              <a:t>29.</a:t>
             </a:r>
             <a:r>
               <a:rPr lang="ko-KR" sz="2000">
@@ -10094,7 +10287,7 @@
                 <a:latin typeface="맑은 고딕" charset="0"/>
                 <a:ea typeface="맑은 고딕" charset="0"/>
               </a:rPr>
-              <a:t>게임을 실행하고 회원가입을 완료한 후에 PlayFab의 타이틀로 가서 방금 생성한 유저의 정보가 서버에 저장되게 됩니다.</a:t>
+              <a:t>마지막으로 Login Button이라는 버튼 컴포넌트의 On Click 함수에 Photon Setting 오브젝트를 넣어줍니다.</a:t>
             </a:r>
             <a:endParaRPr lang="ko-KR" altLang="en-US" sz="1800">
               <a:latin typeface="맑은 고딕" charset="0"/>
@@ -10105,7 +10298,399 @@
       </p:sp>
       <p:pic>
         <p:nvPicPr>
-          <p:cNvPr id="61" name="그림 2" descr="C:/Users/Admin1/AppData/Roaming/PolarisOffice/ETemp/20820_9877576/fImage6140028341.png"/>
+          <p:cNvPr id="64" name="Picture "/>
+          <p:cNvPicPr>
+            <a:picLocks noChangeAspect="1"/>
+          </p:cNvPicPr>
+          <p:nvPr/>
+        </p:nvPicPr>
+        <p:blipFill rotWithShape="1">
+          <a:blip r:embed="rId2" cstate="print">
+            <a:extLst>
+              <a:ext uri="{28A0092B-C50C-407E-A947-70E740481C1C}">
+                <a14:useLocalDpi xmlns:a14="http://schemas.microsoft.com/office/drawing/2010/main" val="0"/>
+              </a:ext>
+            </a:extLst>
+          </a:blip>
+          <a:stretch>
+            <a:fillRect/>
+          </a:stretch>
+        </p:blipFill>
+        <p:spPr>
+          <a:xfrm rot="0">
+            <a:off x="3776345" y="1704340"/>
+            <a:ext cx="1505585" cy="1943735"/>
+          </a:xfrm>
+          <a:prstGeom prst="roundRect"/>
+          <a:solidFill>
+            <a:srgbClr val="EDEDED"/>
+          </a:solidFill>
+        </p:spPr>
+      </p:pic>
+      <p:pic>
+        <p:nvPicPr>
+          <p:cNvPr id="66" name="그림 80"/>
+          <p:cNvPicPr>
+            <a:picLocks noChangeAspect="1"/>
+          </p:cNvPicPr>
+          <p:nvPr/>
+        </p:nvPicPr>
+        <p:blipFill rotWithShape="1">
+          <a:blip r:embed="rId3" cstate="print">
+            <a:extLst>
+              <a:ext uri="{28A0092B-C50C-407E-A947-70E740481C1C}">
+                <a14:useLocalDpi xmlns:a14="http://schemas.microsoft.com/office/drawing/2010/main" val="0"/>
+              </a:ext>
+            </a:extLst>
+          </a:blip>
+          <a:stretch>
+            <a:fillRect/>
+          </a:stretch>
+        </p:blipFill>
+        <p:spPr>
+          <a:xfrm rot="0">
+            <a:off x="1229995" y="1325245"/>
+            <a:ext cx="2286635" cy="2961640"/>
+          </a:xfrm>
+          <a:prstGeom prst="rect"/>
+          <a:noFill/>
+        </p:spPr>
+      </p:pic>
+      <p:cxnSp>
+        <p:nvCxnSpPr>
+          <p:cNvPr id="65" name="Rect 0"/>
+          <p:cNvCxnSpPr/>
+          <p:nvPr/>
+        </p:nvCxnSpPr>
+        <p:spPr>
+          <a:xfrm rot="0" flipH="1">
+            <a:off x="1957070" y="3472180"/>
+            <a:ext cx="2070100" cy="546100"/>
+          </a:xfrm>
+          <a:prstGeom prst="straightConnector1"/>
+          <a:ln w="6350" cap="flat" cmpd="sng">
+            <a:prstDash/>
+            <a:headEnd type="none" w="med" len="med"/>
+            <a:tailEnd type="triangle" w="med" len="med"/>
+          </a:ln>
+        </p:spPr>
+        <p:style>
+          <a:lnRef idx="1">
+            <a:schemeClr val="accent1"/>
+          </a:lnRef>
+          <a:fillRef idx="0">
+            <a:schemeClr val="accent1"/>
+          </a:fillRef>
+          <a:effectRef idx="0">
+            <a:schemeClr val="accent1"/>
+          </a:effectRef>
+          <a:fontRef idx="minor">
+            <a:schemeClr val="tx1"/>
+          </a:fontRef>
+        </p:style>
+      </p:cxnSp>
+      <p:pic>
+        <p:nvPicPr>
+          <p:cNvPr id="67" name="그림 81"/>
+          <p:cNvPicPr>
+            <a:picLocks noChangeAspect="1"/>
+          </p:cNvPicPr>
+          <p:nvPr/>
+        </p:nvPicPr>
+        <p:blipFill rotWithShape="1">
+          <a:blip r:embed="rId4" cstate="print">
+            <a:extLst>
+              <a:ext uri="{28A0092B-C50C-407E-A947-70E740481C1C}">
+                <a14:useLocalDpi xmlns:a14="http://schemas.microsoft.com/office/drawing/2010/main" val="0"/>
+              </a:ext>
+            </a:extLst>
+          </a:blip>
+          <a:stretch>
+            <a:fillRect/>
+          </a:stretch>
+        </p:blipFill>
+        <p:spPr>
+          <a:xfrm rot="0">
+            <a:off x="6797675" y="1336675"/>
+            <a:ext cx="4165600" cy="2950210"/>
+          </a:xfrm>
+          <a:prstGeom prst="rect"/>
+          <a:noFill/>
+        </p:spPr>
+      </p:pic>
+    </p:spTree>
+  </p:cSld>
+  <p:clrMapOvr>
+    <a:masterClrMapping/>
+  </p:clrMapOvr>
+  <mc:AlternateContent xmlns:mc="http://schemas.openxmlformats.org/markup-compatibility/2006">
+    <mc:Choice xmlns:p14="http://schemas.microsoft.com/office/powerpoint/2010/main" Requires="p14">
+      <p:transition spd="slow" p14:dur="2000"/>
+    </mc:Choice>
+    <mc:Fallback>
+      <p:transition spd="slow"/>
+    </mc:Fallback>
+  </mc:AlternateContent>
+  <p:timing>
+    <p:tnLst>
+      <p:par>
+        <p:cTn id="1" dur="indefinite" restart="never" nodeType="tmRoot"/>
+      </p:par>
+    </p:tnLst>
+  </p:timing>
+</p:sld>
+</file>
+
+<file path=ppt/slides/slide16.xml><?xml version="1.0" encoding="utf-8"?>
+<p:sld xmlns:a="http://schemas.openxmlformats.org/drawingml/2006/main" xmlns:r="http://schemas.openxmlformats.org/officeDocument/2006/relationships" xmlns:p="http://schemas.openxmlformats.org/presentationml/2006/main" xmlns:p14="http://schemas.microsoft.com/office/powerpoint/2010/main">
+  <p:cSld>
+    <p:spTree>
+      <p:nvGrpSpPr>
+        <p:cNvPr id="1" name=""/>
+        <p:cNvGrpSpPr/>
+        <p:nvPr/>
+      </p:nvGrpSpPr>
+      <p:grpSpPr>
+        <a:xfrm>
+          <a:off x="0" y="0"/>
+          <a:ext cx="0" cy="0"/>
+          <a:chOff x="0" y="0"/>
+          <a:chExt cx="0" cy="0"/>
+        </a:xfrm>
+      </p:grpSpPr>
+      <p:sp>
+        <p:nvSpPr>
+          <p:cNvPr id="29" name="Rect 0"/>
+          <p:cNvSpPr txBox="1">
+            <a:spLocks/>
+          </p:cNvSpPr>
+          <p:nvPr/>
+        </p:nvSpPr>
+        <p:spPr>
+          <a:xfrm rot="0">
+            <a:off x="1229995" y="1337310"/>
+            <a:ext cx="4039870" cy="371475"/>
+          </a:xfrm>
+          <a:prstGeom prst="rect"/>
+          <a:noFill/>
+          <a:ln w="0">
+            <a:noFill/>
+            <a:prstDash/>
+          </a:ln>
+        </p:spPr>
+        <p:txBody>
+          <a:bodyPr wrap="square" lIns="89535" tIns="46355" rIns="89535" bIns="46355" numCol="1" vert="horz" anchor="t">
+            <a:spAutoFit/>
+          </a:bodyPr>
+          <a:lstStyle/>
+          <a:p>
+            <a:pPr marL="0" indent="0" algn="l" latinLnBrk="0" hangingPunct="1">
+              <a:buFontTx/>
+              <a:buNone/>
+            </a:pPr>
+            <a:endParaRPr lang="ko-KR" altLang="en-US" sz="1800">
+              <a:latin typeface="맑은 고딕" charset="0"/>
+              <a:ea typeface="맑은 고딕" charset="0"/>
+            </a:endParaRPr>
+          </a:p>
+        </p:txBody>
+      </p:sp>
+      <p:sp>
+        <p:nvSpPr>
+          <p:cNvPr id="35" name="Rect 0"/>
+          <p:cNvSpPr txBox="1">
+            <a:spLocks/>
+          </p:cNvSpPr>
+          <p:nvPr/>
+        </p:nvSpPr>
+        <p:spPr>
+          <a:xfrm>
+            <a:off x="4156710" y="443230"/>
+            <a:ext cx="3883660" cy="554990"/>
+          </a:xfrm>
+          <a:prstGeom prst="rect"/>
+          <a:noFill/>
+          <a:ln w="0">
+            <a:noFill/>
+            <a:prstDash/>
+          </a:ln>
+        </p:spPr>
+        <p:txBody>
+          <a:bodyPr wrap="square" lIns="89535" tIns="46355" rIns="89535" bIns="46355" numCol="1" vert="horz" anchor="t">
+            <a:spAutoFit/>
+          </a:bodyPr>
+          <a:lstStyle/>
+          <a:p>
+            <a:pPr marL="0" indent="0" rtl="0" algn="l" defTabSz="914400" eaLnBrk="1" latinLnBrk="0" hangingPunct="1">
+              <a:buFontTx/>
+              <a:buNone/>
+            </a:pPr>
+            <a:r>
+              <a:rPr lang="ko-KR" sz="3000" b="1">
+                <a:latin typeface="맑은 고딕" charset="0"/>
+                <a:ea typeface="맑은 고딕" charset="0"/>
+              </a:rPr>
+              <a:t>열</a:t>
+            </a:r>
+            <a:r>
+              <a:rPr lang="ko-KR" sz="3000" b="1">
+                <a:latin typeface="맑은 고딕" charset="0"/>
+                <a:ea typeface="맑은 고딕" charset="0"/>
+              </a:rPr>
+              <a:t>여섯</a:t>
+            </a:r>
+            <a:r>
+              <a:rPr lang="ko-KR" sz="3000" b="1">
+                <a:latin typeface="맑은 고딕" charset="0"/>
+                <a:ea typeface="맑은 고딕" charset="0"/>
+              </a:rPr>
+              <a:t> 번째 튜토리얼</a:t>
+            </a:r>
+            <a:r>
+              <a:rPr sz="3000" b="1">
+                <a:latin typeface="맑은 고딕" charset="0"/>
+                <a:ea typeface="맑은 고딕" charset="0"/>
+              </a:rPr>
+              <a:t> </a:t>
+            </a:r>
+            <a:endParaRPr lang="ko-KR" altLang="en-US" sz="3000" b="1">
+              <a:latin typeface="맑은 고딕" charset="0"/>
+              <a:ea typeface="맑은 고딕" charset="0"/>
+            </a:endParaRPr>
+          </a:p>
+        </p:txBody>
+      </p:sp>
+      <p:sp>
+        <p:nvSpPr>
+          <p:cNvPr id="57" name="Rect 0"/>
+          <p:cNvSpPr txBox="1">
+            <a:spLocks/>
+          </p:cNvSpPr>
+          <p:nvPr/>
+        </p:nvSpPr>
+        <p:spPr>
+          <a:xfrm rot="0">
+            <a:off x="6654800" y="5022850"/>
+            <a:ext cx="4460875" cy="1231900"/>
+          </a:xfrm>
+          <a:prstGeom prst="rect"/>
+          <a:noFill/>
+          <a:ln w="0">
+            <a:noFill/>
+            <a:prstDash/>
+          </a:ln>
+        </p:spPr>
+        <p:txBody>
+          <a:bodyPr wrap="square" lIns="89535" tIns="46355" rIns="89535" bIns="46355" numCol="1" vert="horz" anchor="t">
+            <a:spAutoFit/>
+          </a:bodyPr>
+          <a:lstStyle/>
+          <a:p>
+            <a:pPr marL="0" indent="0" rtl="0" algn="l" defTabSz="914400" eaLnBrk="1" latinLnBrk="0" hangingPunct="1">
+              <a:buFontTx/>
+              <a:buNone/>
+            </a:pPr>
+            <a:r>
+              <a:rPr lang="ko-KR" sz="2000" b="1">
+                <a:solidFill>
+                  <a:srgbClr val="0611F2"/>
+                </a:solidFill>
+                <a:latin typeface="맑은 고딕" charset="0"/>
+                <a:ea typeface="맑은 고딕" charset="0"/>
+              </a:rPr>
+              <a:t>32.</a:t>
+            </a:r>
+            <a:r>
+              <a:rPr lang="ko-KR" sz="2000">
+                <a:solidFill>
+                  <a:srgbClr val="0611F2"/>
+                </a:solidFill>
+                <a:latin typeface="맑은 고딕" charset="0"/>
+                <a:ea typeface="맑은 고딕" charset="0"/>
+              </a:rPr>
+              <a:t> </a:t>
+            </a:r>
+            <a:r>
+              <a:rPr lang="ko-KR" sz="1800">
+                <a:latin typeface="맑은 고딕" charset="0"/>
+                <a:ea typeface="맑은 고딕" charset="0"/>
+              </a:rPr>
+              <a:t>그런 다음 유저의 ID를 선택하면 Master player account에 접근해서 비밀번호를 변경하거나 비밀번호를 직접 볼 수 있습니다.</a:t>
+            </a:r>
+            <a:endParaRPr lang="ko-KR" altLang="en-US" sz="1800">
+              <a:latin typeface="맑은 고딕" charset="0"/>
+              <a:ea typeface="맑은 고딕" charset="0"/>
+            </a:endParaRPr>
+          </a:p>
+        </p:txBody>
+      </p:sp>
+      <p:sp>
+        <p:nvSpPr>
+          <p:cNvPr id="60" name="Rect 0"/>
+          <p:cNvSpPr txBox="1">
+            <a:spLocks/>
+          </p:cNvSpPr>
+          <p:nvPr/>
+        </p:nvSpPr>
+        <p:spPr>
+          <a:xfrm rot="0">
+            <a:off x="1229995" y="5019675"/>
+            <a:ext cx="4173855" cy="1231900"/>
+          </a:xfrm>
+          <a:prstGeom prst="rect"/>
+          <a:noFill/>
+          <a:ln w="0">
+            <a:noFill/>
+            <a:prstDash/>
+          </a:ln>
+        </p:spPr>
+        <p:txBody>
+          <a:bodyPr wrap="square" lIns="89535" tIns="46355" rIns="89535" bIns="46355" numCol="1" vert="horz" anchor="t">
+            <a:spAutoFit/>
+          </a:bodyPr>
+          <a:lstStyle/>
+          <a:p>
+            <a:pPr marL="0" indent="0" rtl="0" algn="l" defTabSz="914400" eaLnBrk="1" latinLnBrk="0" hangingPunct="1">
+              <a:buFontTx/>
+              <a:buNone/>
+            </a:pPr>
+            <a:r>
+              <a:rPr lang="ko-KR" sz="2000" b="1">
+                <a:solidFill>
+                  <a:srgbClr val="0611F2"/>
+                </a:solidFill>
+                <a:latin typeface="맑은 고딕" charset="0"/>
+                <a:ea typeface="맑은 고딕" charset="0"/>
+              </a:rPr>
+              <a:t>31.</a:t>
+            </a:r>
+            <a:r>
+              <a:rPr lang="ko-KR" sz="2000">
+                <a:solidFill>
+                  <a:srgbClr val="0611F2"/>
+                </a:solidFill>
+                <a:latin typeface="맑은 고딕" charset="0"/>
+                <a:ea typeface="맑은 고딕" charset="0"/>
+              </a:rPr>
+              <a:t> </a:t>
+            </a:r>
+            <a:r>
+              <a:rPr lang="ko-KR" sz="1800">
+                <a:latin typeface="맑은 고딕" charset="0"/>
+                <a:ea typeface="맑은 고딕" charset="0"/>
+              </a:rPr>
+              <a:t>게임을 실행하고 회원가입을 완료한 후에 PlayFab의 타이틀로 가서 방금 생성한 유저의 정보가 서버에 저장되게 됩니다.</a:t>
+            </a:r>
+            <a:endParaRPr lang="ko-KR" altLang="en-US" sz="1800">
+              <a:latin typeface="맑은 고딕" charset="0"/>
+              <a:ea typeface="맑은 고딕" charset="0"/>
+            </a:endParaRPr>
+          </a:p>
+        </p:txBody>
+      </p:sp>
+      <p:pic>
+        <p:nvPicPr>
+          <p:cNvPr id="61" name="그림 2"/>
           <p:cNvPicPr>
             <a:picLocks noChangeAspect="1"/>
           </p:cNvPicPr>
@@ -10136,7 +10721,7 @@
       </p:pic>
       <p:pic>
         <p:nvPicPr>
-          <p:cNvPr id="62" name="그림 3" descr="C:/Users/Admin1/AppData/Roaming/PolarisOffice/ETemp/20820_9877576/fImage441932848467.png"/>
+          <p:cNvPr id="62" name="그림 3"/>
           <p:cNvPicPr>
             <a:picLocks noChangeAspect="1"/>
           </p:cNvPicPr>
@@ -10258,7 +10843,7 @@
       </p:sp>
       <p:sp>
         <p:nvSpPr>
-          <p:cNvPr id="6" name="텍스트 상자 14"/>
+          <p:cNvPr id="7" name="텍스트 상자 15"/>
           <p:cNvSpPr txBox="1">
             <a:spLocks/>
           </p:cNvSpPr>
@@ -10266,8 +10851,8 @@
         </p:nvSpPr>
         <p:spPr>
           <a:xfrm rot="0">
-            <a:off x="1239520" y="4999990"/>
-            <a:ext cx="4123690" cy="955040"/>
+            <a:off x="6656705" y="5412105"/>
+            <a:ext cx="4318635" cy="955675"/>
           </a:xfrm>
           <a:prstGeom prst="rect"/>
           <a:noFill/>
@@ -10294,14 +10879,14 @@
                 <a:latin typeface="맑은 고딕" charset="0"/>
                 <a:ea typeface="맑은 고딕" charset="0"/>
               </a:rPr>
-              <a:t>3. </a:t>
+              <a:t>4. </a:t>
             </a:r>
             <a:r>
               <a:rPr lang="ko-KR" sz="1800">
                 <a:latin typeface="맑은 고딕" charset="0"/>
                 <a:ea typeface="맑은 고딕" charset="0"/>
               </a:rPr>
-              <a:t>로그인 화면에 들어오면 먼저 회원가입을 해야 하므로 회원가입을 선택합니다.</a:t>
+              <a:t>그리고 현재 자기가 사용하는 Email 주소와 암호를 입력하고 PlayFab의 서비스 약관에 동의를 설정합니다.</a:t>
             </a:r>
             <a:endParaRPr lang="ko-KR" altLang="en-US" sz="1800">
               <a:latin typeface="맑은 고딕" charset="0"/>
@@ -10310,63 +10895,40 @@
           </a:p>
         </p:txBody>
       </p:sp>
-      <p:sp>
-        <p:nvSpPr>
-          <p:cNvPr id="7" name="텍스트 상자 15"/>
-          <p:cNvSpPr txBox="1">
-            <a:spLocks/>
-          </p:cNvSpPr>
-          <p:nvPr/>
-        </p:nvSpPr>
-        <p:spPr>
-          <a:xfrm rot="0">
-            <a:off x="6656705" y="4996180"/>
-            <a:ext cx="4318000" cy="955040"/>
-          </a:xfrm>
-          <a:prstGeom prst="rect"/>
-          <a:noFill/>
-          <a:ln w="0">
-            <a:noFill/>
-            <a:prstDash/>
-          </a:ln>
-        </p:spPr>
-        <p:txBody>
-          <a:bodyPr wrap="square" lIns="89535" tIns="46355" rIns="89535" bIns="46355" numCol="1" vert="horz" anchor="t">
-            <a:spAutoFit/>
-          </a:bodyPr>
-          <a:lstStyle/>
-          <a:p>
-            <a:pPr marL="0" indent="0" rtl="0" algn="l" defTabSz="914400" eaLnBrk="1" latinLnBrk="0" hangingPunct="1">
-              <a:buFontTx/>
-              <a:buNone/>
-            </a:pPr>
-            <a:r>
-              <a:rPr lang="ko-KR" sz="2000" b="1">
-                <a:solidFill>
-                  <a:srgbClr val="0611F2"/>
-                </a:solidFill>
-                <a:latin typeface="맑은 고딕" charset="0"/>
-                <a:ea typeface="맑은 고딕" charset="0"/>
-              </a:rPr>
-              <a:t>4. </a:t>
-            </a:r>
-            <a:r>
-              <a:rPr lang="ko-KR" sz="1800">
-                <a:latin typeface="맑은 고딕" charset="0"/>
-                <a:ea typeface="맑은 고딕" charset="0"/>
-              </a:rPr>
-              <a:t>그리고 현재 자기가 사용하는 Email 주소와 암호를 입력하고 PlayFab의 서비스 약관에 동의를 설정합니다.</a:t>
-            </a:r>
-            <a:endParaRPr lang="ko-KR" altLang="en-US" sz="1800">
-              <a:latin typeface="맑은 고딕" charset="0"/>
-              <a:ea typeface="맑은 고딕" charset="0"/>
-            </a:endParaRPr>
-          </a:p>
-        </p:txBody>
-      </p:sp>
       <p:pic>
         <p:nvPicPr>
-          <p:cNvPr id="8" name="그림 3" descr="C:/Users/Admin1/AppData/Roaming/PolarisOffice/ETemp/6432_22183288/fImage409501396334.png"/>
+          <p:cNvPr id="9" name="그림 4" descr="C:/Users/Admin1/AppData/Roaming/PolarisOffice/ETemp/17716_5745816/fImage522971406500.png"/>
+          <p:cNvPicPr>
+            <a:picLocks noChangeAspect="1"/>
+          </p:cNvPicPr>
+          <p:nvPr/>
+        </p:nvPicPr>
+        <p:blipFill rotWithShape="1">
+          <a:blip r:embed="rId9" cstate="hqprint">
+            <a:extLst>
+              <a:ext uri="{28A0092B-C50C-407E-A947-70E740481C1C}">
+                <a14:useLocalDpi xmlns:a14="http://schemas.microsoft.com/office/drawing/2010/main"/>
+              </a:ext>
+            </a:extLst>
+          </a:blip>
+          <a:stretch>
+            <a:fillRect/>
+          </a:stretch>
+        </p:blipFill>
+        <p:spPr>
+          <a:xfrm rot="0">
+            <a:off x="6650355" y="1271905"/>
+            <a:ext cx="4322445" cy="3990975"/>
+          </a:xfrm>
+          <a:prstGeom prst="roundRect"/>
+          <a:solidFill>
+            <a:srgbClr val="EDEDED"/>
+          </a:solidFill>
+        </p:spPr>
+      </p:pic>
+      <p:pic>
+        <p:nvPicPr>
+          <p:cNvPr id="10" name="그림 6" descr="C:/Users/Admin1/AppData/Roaming/PolarisOffice/ETemp/17716_5745816/fImage409501396334.png"/>
           <p:cNvPicPr>
             <a:picLocks noChangeAspect="1"/>
           </p:cNvPicPr>
@@ -10386,23 +10948,161 @@
         </p:blipFill>
         <p:spPr>
           <a:xfrm rot="0">
-            <a:off x="1238885" y="1268730"/>
-            <a:ext cx="4132580" cy="3478530"/>
+            <a:off x="1139190" y="3931920"/>
+            <a:ext cx="4239895" cy="1713865"/>
+          </a:xfrm>
+          <a:prstGeom prst="roundRect"/>
+          <a:solidFill>
+            <a:srgbClr val="EDEDED"/>
+          </a:solidFill>
+        </p:spPr>
+      </p:pic>
+      <p:sp>
+        <p:nvSpPr>
+          <p:cNvPr id="11" name="텍스트 상자 7"/>
+          <p:cNvSpPr txBox="1">
+            <a:spLocks/>
+          </p:cNvSpPr>
+          <p:nvPr/>
+        </p:nvSpPr>
+        <p:spPr>
+          <a:xfrm rot="0">
+            <a:off x="1130300" y="5697855"/>
+            <a:ext cx="4254500" cy="677545"/>
           </a:xfrm>
           <a:prstGeom prst="rect"/>
           <a:noFill/>
-        </p:spPr>
-      </p:pic>
+          <a:ln w="0">
+            <a:noFill/>
+            <a:prstDash/>
+          </a:ln>
+        </p:spPr>
+        <p:txBody>
+          <a:bodyPr wrap="square" lIns="89535" tIns="46355" rIns="89535" bIns="46355" numCol="1" vert="horz" anchor="t">
+            <a:spAutoFit/>
+          </a:bodyPr>
+          <a:lstStyle/>
+          <a:p>
+            <a:pPr marL="0" indent="0" rtl="0" algn="l" defTabSz="914400" eaLnBrk="1" latinLnBrk="0" hangingPunct="1">
+              <a:buFontTx/>
+              <a:buNone/>
+            </a:pPr>
+            <a:r>
+              <a:rPr lang="ko-KR" sz="2000" b="1">
+                <a:solidFill>
+                  <a:srgbClr val="0611F2"/>
+                </a:solidFill>
+                <a:latin typeface="맑은 고딕" charset="0"/>
+                <a:ea typeface="맑은 고딕" charset="0"/>
+              </a:rPr>
+              <a:t>3. </a:t>
+            </a:r>
+            <a:r>
+              <a:rPr lang="ko-KR" sz="1800">
+                <a:latin typeface="맑은 고딕" charset="0"/>
+                <a:ea typeface="맑은 고딕" charset="0"/>
+              </a:rPr>
+              <a:t>그런 다음 로</a:t>
+            </a:r>
+            <a:r>
+              <a:rPr lang="ko-KR" sz="1800">
+                <a:latin typeface="맑은 고딕" charset="0"/>
+                <a:ea typeface="맑은 고딕" charset="0"/>
+              </a:rPr>
+              <a:t>그인 화면에</a:t>
+            </a:r>
+            <a:r>
+              <a:rPr lang="ko-KR" sz="1800">
+                <a:latin typeface="맑은 고딕" charset="0"/>
+                <a:ea typeface="맑은 고딕" charset="0"/>
+              </a:rPr>
+              <a:t>서 Join</a:t>
+            </a:r>
+            <a:r>
+              <a:rPr lang="ko-KR" sz="1800">
+                <a:latin typeface="맑은 고딕" charset="0"/>
+                <a:ea typeface="맑은 고딕" charset="0"/>
+              </a:rPr>
+              <a:t>을 선택합니다.</a:t>
+            </a:r>
+            <a:endParaRPr lang="ko-KR" altLang="en-US" sz="1800">
+              <a:latin typeface="맑은 고딕" charset="0"/>
+              <a:ea typeface="맑은 고딕" charset="0"/>
+            </a:endParaRPr>
+          </a:p>
+        </p:txBody>
+      </p:sp>
+      <p:sp>
+        <p:nvSpPr>
+          <p:cNvPr id="12" name="텍스트 상자 8"/>
+          <p:cNvSpPr txBox="1">
+            <a:spLocks/>
+          </p:cNvSpPr>
+          <p:nvPr/>
+        </p:nvSpPr>
+        <p:spPr>
+          <a:xfrm rot="0">
+            <a:off x="1139190" y="3176905"/>
+            <a:ext cx="4239895" cy="677545"/>
+          </a:xfrm>
+          <a:prstGeom prst="rect"/>
+          <a:noFill/>
+          <a:ln w="0">
+            <a:noFill/>
+            <a:prstDash/>
+          </a:ln>
+        </p:spPr>
+        <p:txBody>
+          <a:bodyPr wrap="square" lIns="89535" tIns="46355" rIns="89535" bIns="46355" numCol="1" vert="horz" anchor="t">
+            <a:spAutoFit/>
+          </a:bodyPr>
+          <a:lstStyle/>
+          <a:p>
+            <a:pPr marL="0" indent="0" rtl="0" algn="l" defTabSz="914400" eaLnBrk="1" latinLnBrk="0" hangingPunct="1">
+              <a:buFontTx/>
+              <a:buNone/>
+            </a:pPr>
+            <a:r>
+              <a:rPr lang="ko-KR" sz="2000" b="1">
+                <a:solidFill>
+                  <a:srgbClr val="0611F2"/>
+                </a:solidFill>
+                <a:latin typeface="맑은 고딕" charset="0"/>
+                <a:ea typeface="맑은 고딕" charset="0"/>
+              </a:rPr>
+              <a:t>2. </a:t>
+            </a:r>
+            <a:r>
+              <a:rPr sz="1800">
+                <a:latin typeface="맑은 고딕" charset="0"/>
+                <a:ea typeface="맑은 고딕" charset="0"/>
+              </a:rPr>
+              <a:t>그</a:t>
+            </a:r>
+            <a:r>
+              <a:rPr lang="ko-KR" sz="1800">
+                <a:latin typeface="맑은 고딕" charset="0"/>
+                <a:ea typeface="맑은 고딕" charset="0"/>
+              </a:rPr>
+              <a:t>다음 소개 화면에 PlayFab에 로그인을 선택합니다.</a:t>
+            </a:r>
+            <a:endParaRPr lang="ko-KR" altLang="en-US" sz="1800">
+              <a:latin typeface="맑은 고딕" charset="0"/>
+              <a:ea typeface="맑은 고딕" charset="0"/>
+            </a:endParaRPr>
+          </a:p>
+        </p:txBody>
+      </p:sp>
       <p:pic>
         <p:nvPicPr>
-          <p:cNvPr id="9" name="그림 4" descr="C:/Users/Admin1/AppData/Roaming/PolarisOffice/ETemp/6432_22183288/fImage522971406500.png"/>
+          <p:cNvPr id="13" name="그림 9" descr="C:/Users/Admin1/AppData/Roaming/PolarisOffice/ETemp/17716_5745816/fImage20639513741.png"/>
           <p:cNvPicPr>
             <a:picLocks noChangeAspect="1"/>
           </p:cNvPicPr>
           <p:nvPr/>
         </p:nvPicPr>
         <p:blipFill rotWithShape="1">
-          <a:blip r:embed="rId9" cstate="hqprint">
+          <a:blip r:embed="rId10" cstate="hqprint">
             <a:extLst>
               <a:ext uri="{28A0092B-C50C-407E-A947-70E740481C1C}">
                 <a14:useLocalDpi xmlns:a14="http://schemas.microsoft.com/office/drawing/2010/main"/>
@@ -10415,13 +11115,11 @@
         </p:blipFill>
         <p:spPr>
           <a:xfrm rot="0">
-            <a:off x="6650355" y="1271905"/>
-            <a:ext cx="4321810" cy="3482975"/>
-          </a:xfrm>
-          <a:prstGeom prst="roundRect"/>
-          <a:solidFill>
-            <a:srgbClr val="EDEDED"/>
-          </a:solidFill>
+            <a:off x="1130935" y="1271905"/>
+            <a:ext cx="4248150" cy="1821180"/>
+          </a:xfrm>
+          <a:prstGeom prst="rect"/>
+          <a:noFill/>
         </p:spPr>
       </p:pic>
     </p:spTree>
@@ -10525,8 +11223,8 @@
         </p:nvSpPr>
         <p:spPr>
           <a:xfrm rot="0">
-            <a:off x="1081405" y="5266690"/>
-            <a:ext cx="4240530" cy="708660"/>
+            <a:off x="1081405" y="5565775"/>
+            <a:ext cx="4241165" cy="708025"/>
           </a:xfrm>
           <a:prstGeom prst="rect"/>
           <a:noFill/>
@@ -10570,7 +11268,14 @@
                 <a:latin typeface="맑은 고딕" charset="0"/>
                 <a:ea typeface="맑은 고딕" charset="0"/>
               </a:rPr>
-              <a:t>회원가입할 때 입력한 전자 메일에 </a:t>
+              <a:t>이제 회</a:t>
+            </a:r>
+            <a:r>
+              <a:rPr lang="ko-KR" sz="1800">
+                <a:latin typeface="맑은 고딕" charset="0"/>
+                <a:ea typeface="맑은 고딕" charset="0"/>
+              </a:rPr>
+              <a:t>원가입할 때 입력한 전자 메일에 </a:t>
             </a:r>
             <a:r>
               <a:rPr lang="ko-KR" sz="1800">
@@ -10580,47 +11285,7 @@
                 <a:latin typeface="맑은 고딕" charset="0"/>
                 <a:ea typeface="맑은 고딕" charset="0"/>
               </a:rPr>
-              <a:t>[확인</a:t>
-            </a:r>
-            <a:r>
-              <a:rPr lang="ko-KR" sz="1800">
-                <a:solidFill>
-                  <a:srgbClr val="009900"/>
-                </a:solidFill>
-                <a:latin typeface="맑은 고딕" charset="0"/>
-                <a:ea typeface="맑은 고딕" charset="0"/>
-              </a:rPr>
-              <a:t> </a:t>
-            </a:r>
-            <a:r>
-              <a:rPr lang="ko-KR" sz="1800">
-                <a:solidFill>
-                  <a:srgbClr val="009900"/>
-                </a:solidFill>
-                <a:latin typeface="맑은 고딕" charset="0"/>
-                <a:ea typeface="맑은 고딕" charset="0"/>
-              </a:rPr>
-              <a:t>전자</a:t>
-            </a:r>
-            <a:r>
-              <a:rPr lang="ko-KR" sz="1800">
-                <a:solidFill>
-                  <a:srgbClr val="009900"/>
-                </a:solidFill>
-                <a:latin typeface="맑은 고딕" charset="0"/>
-                <a:ea typeface="맑은 고딕" charset="0"/>
-              </a:rPr>
-              <a:t> </a:t>
-            </a:r>
-            <a:r>
-              <a:rPr lang="ko-KR" sz="1800">
-                <a:solidFill>
-                  <a:srgbClr val="009900"/>
-                </a:solidFill>
-                <a:latin typeface="맑은 고딕" charset="0"/>
-                <a:ea typeface="맑은 고딕" charset="0"/>
-              </a:rPr>
-              <a:t>메일]</a:t>
+              <a:t>[확인 전자 메일]</a:t>
             </a:r>
             <a:r>
               <a:rPr lang="ko-KR" sz="1800">
@@ -10651,7 +11316,7 @@
       </p:sp>
       <p:pic>
         <p:nvPicPr>
-          <p:cNvPr id="26" name="그림 5" descr="C:/Users/Admin1/AppData/Roaming/PolarisOffice/ETemp/6432_22183288/fImage337991419169.png"/>
+          <p:cNvPr id="26" name="그림 5" descr="C:/Users/Admin1/AppData/Roaming/PolarisOffice/ETemp/17716_5745816/fImage337991419169.png"/>
           <p:cNvPicPr>
             <a:picLocks noChangeAspect="1"/>
           </p:cNvPicPr>
@@ -10671,8 +11336,8 @@
         </p:blipFill>
         <p:spPr>
           <a:xfrm rot="0">
-            <a:off x="1082040" y="1210310"/>
-            <a:ext cx="4239895" cy="3902710"/>
+            <a:off x="1082040" y="1255395"/>
+            <a:ext cx="4240530" cy="4123690"/>
           </a:xfrm>
           <a:prstGeom prst="roundRect"/>
           <a:solidFill>
@@ -10682,7 +11347,7 @@
       </p:pic>
       <p:pic>
         <p:nvPicPr>
-          <p:cNvPr id="27" name="그림 6" descr="C:/Users/Admin1/AppData/Roaming/PolarisOffice/ETemp/6432_22183288/fImage178001425724.png"/>
+          <p:cNvPr id="27" name="그림 6" descr="C:/Users/Admin1/AppData/Roaming/PolarisOffice/ETemp/17716_5745816/fImage178001425724.png"/>
           <p:cNvPicPr>
             <a:picLocks noChangeAspect="1"/>
           </p:cNvPicPr>
@@ -10702,13 +11367,11 @@
         </p:blipFill>
         <p:spPr>
           <a:xfrm rot="0">
-            <a:off x="6835140" y="1216660"/>
-            <a:ext cx="4089400" cy="3721735"/>
-          </a:xfrm>
-          <a:prstGeom prst="roundRect"/>
-          <a:solidFill>
-            <a:srgbClr val="EDEDED"/>
-          </a:solidFill>
+            <a:off x="6835140" y="1255395"/>
+            <a:ext cx="4413250" cy="3907790"/>
+          </a:xfrm>
+          <a:prstGeom prst="rect"/>
+          <a:noFill/>
         </p:spPr>
       </p:pic>
       <p:sp>
@@ -10721,8 +11384,8 @@
         </p:nvSpPr>
         <p:spPr>
           <a:xfrm rot="0">
-            <a:off x="6824980" y="5022215"/>
-            <a:ext cx="4107815" cy="955040"/>
+            <a:off x="6824980" y="5321300"/>
+            <a:ext cx="4423410" cy="954405"/>
           </a:xfrm>
           <a:prstGeom prst="rect"/>
           <a:noFill/>
@@ -10766,7 +11429,14 @@
                 <a:latin typeface="맑은 고딕" charset="0"/>
                 <a:ea typeface="맑은 고딕" charset="0"/>
               </a:rPr>
-              <a:t>Email에 가서 전자 메일을 도착했는지 확인하고 전자 메일 주소 확인을 선택합니다.</a:t>
+              <a:t>그다음 E</a:t>
+            </a:r>
+            <a:r>
+              <a:rPr lang="ko-KR" sz="1800">
+                <a:latin typeface="맑은 고딕" charset="0"/>
+                <a:ea typeface="맑은 고딕" charset="0"/>
+              </a:rPr>
+              <a:t>mail에 가서 전자 메일을 도착했는지 확인하고 전자 메일 주소 확인을 선택합니다.</a:t>
             </a:r>
             <a:endParaRPr lang="ko-KR" altLang="en-US" sz="1800">
               <a:latin typeface="맑은 고딕" charset="0"/>
@@ -10825,8 +11495,8 @@
         </p:nvSpPr>
         <p:spPr>
           <a:xfrm rot="0">
-            <a:off x="1229995" y="2576830"/>
-            <a:ext cx="4142105" cy="1231900"/>
+            <a:off x="1222375" y="2884170"/>
+            <a:ext cx="4158615" cy="954405"/>
           </a:xfrm>
           <a:prstGeom prst="rect"/>
           <a:noFill/>
@@ -10870,34 +11540,28 @@
                 <a:latin typeface="맑은 고딕" charset="0"/>
                 <a:ea typeface="맑은 고딕" charset="0"/>
               </a:rPr>
-              <a:t>이제 자신의 스튜디오가 생성되면서 타이틀이 생성됩니다.</a:t>
-            </a:r>
-            <a:endParaRPr lang="ko-KR" altLang="en-US" sz="1800">
-              <a:latin typeface="맑은 고딕" charset="0"/>
-              <a:ea typeface="맑은 고딕" charset="0"/>
-            </a:endParaRPr>
-          </a:p>
-          <a:p>
-            <a:pPr marL="0" indent="0" rtl="0" algn="l" defTabSz="914400" eaLnBrk="1" latinLnBrk="0" hangingPunct="1">
-              <a:buFontTx/>
-              <a:buNone/>
-            </a:pPr>
-            <a:endParaRPr lang="ko-KR" altLang="en-US" sz="1800">
-              <a:latin typeface="맑은 고딕" charset="0"/>
-              <a:ea typeface="맑은 고딕" charset="0"/>
-            </a:endParaRPr>
-          </a:p>
-          <a:p>
-            <a:pPr marL="0" indent="0" rtl="0" algn="l" defTabSz="914400" eaLnBrk="1" latinLnBrk="0" hangingPunct="1">
-              <a:buFontTx/>
-              <a:buNone/>
-            </a:pPr>
+              <a:t>그런 다음</a:t>
+            </a:r>
             <a:r>
               <a:rPr lang="ko-KR" sz="1800">
                 <a:latin typeface="맑은 고딕" charset="0"/>
                 <a:ea typeface="맑은 고딕" charset="0"/>
               </a:rPr>
-              <a:t>그런 다음 타이틀 이름을 선택합니다.</a:t>
+              <a:t> </a:t>
+            </a:r>
+            <a:r>
+              <a:rPr lang="ko-KR" sz="1800">
+                <a:latin typeface="맑은 고딕" charset="0"/>
+                <a:ea typeface="맑은 고딕" charset="0"/>
+              </a:rPr>
+              <a:t>게임 내에 있는 사용자 정보를 관리할 수 있는 DataBase가 생성되며 DataBase이름</a:t>
+            </a:r>
+            <a:r>
+              <a:rPr lang="ko-KR" sz="1800">
+                <a:latin typeface="맑은 고딕" charset="0"/>
+                <a:ea typeface="맑은 고딕" charset="0"/>
+              </a:rPr>
+              <a:t>을 선택합니다.</a:t>
             </a:r>
             <a:endParaRPr lang="ko-KR" altLang="en-US" sz="1800">
               <a:latin typeface="맑은 고딕" charset="0"/>
@@ -10959,14 +11623,14 @@
       </p:sp>
       <p:pic>
         <p:nvPicPr>
-          <p:cNvPr id="36" name="그림 8"/>
+          <p:cNvPr id="39" name="그림 13" descr="C:/Users/Admin1/AppData/Roaming/PolarisOffice/ETemp/17716_5745816/fImage507371496962.png"/>
           <p:cNvPicPr>
             <a:picLocks noChangeAspect="1"/>
           </p:cNvPicPr>
           <p:nvPr/>
         </p:nvPicPr>
         <p:blipFill rotWithShape="1">
-          <a:blip r:embed="rId8" cstate="hqprint">
+          <a:blip r:embed="rId10" cstate="hqprint">
             <a:extLst>
               <a:ext uri="{28A0092B-C50C-407E-A947-70E740481C1C}">
                 <a14:useLocalDpi xmlns:a14="http://schemas.microsoft.com/office/drawing/2010/main"/>
@@ -10979,8 +11643,108 @@
         </p:blipFill>
         <p:spPr>
           <a:xfrm rot="0">
-            <a:off x="1230630" y="1339850"/>
-            <a:ext cx="4140835" cy="1171575"/>
+            <a:off x="6824980" y="1463040"/>
+            <a:ext cx="4216400" cy="3990975"/>
+          </a:xfrm>
+          <a:prstGeom prst="rect"/>
+          <a:noFill/>
+        </p:spPr>
+      </p:pic>
+      <p:sp>
+        <p:nvSpPr>
+          <p:cNvPr id="40" name="텍스트 상자 14"/>
+          <p:cNvSpPr txBox="1">
+            <a:spLocks/>
+          </p:cNvSpPr>
+          <p:nvPr/>
+        </p:nvSpPr>
+        <p:spPr>
+          <a:xfrm rot="0">
+            <a:off x="6816725" y="5629910"/>
+            <a:ext cx="4215130" cy="677545"/>
+          </a:xfrm>
+          <a:prstGeom prst="rect"/>
+          <a:noFill/>
+          <a:ln w="0">
+            <a:noFill/>
+            <a:prstDash/>
+          </a:ln>
+        </p:spPr>
+        <p:txBody>
+          <a:bodyPr wrap="square" lIns="89535" tIns="46355" rIns="89535" bIns="46355" numCol="1" vert="horz" anchor="t">
+            <a:spAutoFit/>
+          </a:bodyPr>
+          <a:lstStyle/>
+          <a:p>
+            <a:pPr marL="0" indent="0" rtl="0" algn="l" defTabSz="914400" eaLnBrk="1" latinLnBrk="0" hangingPunct="1">
+              <a:buFontTx/>
+              <a:buNone/>
+            </a:pPr>
+            <a:r>
+              <a:rPr lang="ko-KR" sz="2000" b="1">
+                <a:solidFill>
+                  <a:srgbClr val="0611F2"/>
+                </a:solidFill>
+                <a:latin typeface="맑은 고딕" charset="0"/>
+                <a:ea typeface="맑은 고딕" charset="0"/>
+              </a:rPr>
+              <a:t>9.</a:t>
+            </a:r>
+            <a:r>
+              <a:rPr lang="ko-KR" sz="2000">
+                <a:solidFill>
+                  <a:srgbClr val="0611F2"/>
+                </a:solidFill>
+                <a:latin typeface="맑은 고딕" charset="0"/>
+                <a:ea typeface="맑은 고딕" charset="0"/>
+              </a:rPr>
+              <a:t> </a:t>
+            </a:r>
+            <a:r>
+              <a:rPr lang="ko-KR" sz="1800">
+                <a:latin typeface="맑은 고딕" charset="0"/>
+                <a:ea typeface="맑은 고딕" charset="0"/>
+              </a:rPr>
+              <a:t>이제 도움</a:t>
+            </a:r>
+            <a:r>
+              <a:rPr lang="ko-KR" sz="1800">
+                <a:latin typeface="맑은 고딕" charset="0"/>
+                <a:ea typeface="맑은 고딕" charset="0"/>
+              </a:rPr>
+              <a:t>말 화면이 나타나면 참조 자료에 SDK 다운로드를 선택합니다.</a:t>
+            </a:r>
+            <a:endParaRPr lang="ko-KR" altLang="en-US" sz="1800">
+              <a:latin typeface="맑은 고딕" charset="0"/>
+              <a:ea typeface="맑은 고딕" charset="0"/>
+            </a:endParaRPr>
+          </a:p>
+        </p:txBody>
+      </p:sp>
+      <p:pic>
+        <p:nvPicPr>
+          <p:cNvPr id="41" name="그림 26" descr="C:/Users/Admin1/AppData/Roaming/PolarisOffice/ETemp/17716_5745816/fImage113693008467.png"/>
+          <p:cNvPicPr>
+            <a:picLocks noChangeAspect="1"/>
+          </p:cNvPicPr>
+          <p:nvPr/>
+        </p:nvPicPr>
+        <p:blipFill rotWithShape="1">
+          <a:blip r:embed="rId11" cstate="print">
+            <a:extLst>
+              <a:ext uri="{28A0092B-C50C-407E-A947-70E740481C1C}">
+                <a14:useLocalDpi xmlns:a14="http://schemas.microsoft.com/office/drawing/2010/main" val="0"/>
+              </a:ext>
+            </a:extLst>
+          </a:blip>
+          <a:stretch>
+            <a:fillRect/>
+          </a:stretch>
+        </p:blipFill>
+        <p:spPr>
+          <a:xfrm rot="0">
+            <a:off x="1221740" y="1463675"/>
+            <a:ext cx="4157345" cy="1346835"/>
           </a:xfrm>
           <a:prstGeom prst="rect"/>
           <a:noFill/>
@@ -10988,7 +11752,7 @@
       </p:pic>
       <p:pic>
         <p:nvPicPr>
-          <p:cNvPr id="37" name="그림 11"/>
+          <p:cNvPr id="42" name="그림 31" descr="C:/Users/Admin1/AppData/Roaming/PolarisOffice/ETemp/17716_5745816/fImage364671479358.png"/>
           <p:cNvPicPr>
             <a:picLocks noChangeAspect="1"/>
           </p:cNvPicPr>
@@ -11008,8 +11772,8 @@
         </p:blipFill>
         <p:spPr>
           <a:xfrm rot="0">
-            <a:off x="1238885" y="3931920"/>
-            <a:ext cx="4107180" cy="2378075"/>
+            <a:off x="1222375" y="3931920"/>
+            <a:ext cx="4148455" cy="1355725"/>
           </a:xfrm>
           <a:prstGeom prst="rect"/>
           <a:noFill/>
@@ -11017,7 +11781,7 @@
       </p:pic>
       <p:sp>
         <p:nvSpPr>
-          <p:cNvPr id="38" name="텍스트 상자 12"/>
+          <p:cNvPr id="43" name="텍스트 상자 32"/>
           <p:cNvSpPr txBox="1">
             <a:spLocks/>
           </p:cNvSpPr>
@@ -11025,8 +11789,8 @@
         </p:nvSpPr>
         <p:spPr>
           <a:xfrm rot="0">
-            <a:off x="6816725" y="1335405"/>
-            <a:ext cx="4220845" cy="955040"/>
+            <a:off x="1219200" y="5330825"/>
+            <a:ext cx="4143375" cy="954405"/>
           </a:xfrm>
           <a:prstGeom prst="rect"/>
           <a:noFill/>
@@ -11071,99 +11835,6 @@
                 <a:ea typeface="맑은 고딕" charset="0"/>
               </a:rPr>
               <a:t>그리고 PlayFab 타이틀로 들어와서 도움말 버튼을 입력하고 지원을 선택합니다.</a:t>
-            </a:r>
-            <a:endParaRPr lang="ko-KR" altLang="en-US" sz="1800">
-              <a:latin typeface="맑은 고딕" charset="0"/>
-              <a:ea typeface="맑은 고딕" charset="0"/>
-            </a:endParaRPr>
-          </a:p>
-        </p:txBody>
-      </p:sp>
-      <p:pic>
-        <p:nvPicPr>
-          <p:cNvPr id="39" name="그림 13"/>
-          <p:cNvPicPr>
-            <a:picLocks noChangeAspect="1"/>
-          </p:cNvPicPr>
-          <p:nvPr/>
-        </p:nvPicPr>
-        <p:blipFill rotWithShape="1">
-          <a:blip r:embed="rId10" cstate="hqprint">
-            <a:extLst>
-              <a:ext uri="{28A0092B-C50C-407E-A947-70E740481C1C}">
-                <a14:useLocalDpi xmlns:a14="http://schemas.microsoft.com/office/drawing/2010/main"/>
-              </a:ext>
-            </a:extLst>
-          </a:blip>
-          <a:stretch>
-            <a:fillRect/>
-          </a:stretch>
-        </p:blipFill>
-        <p:spPr>
-          <a:xfrm rot="0">
-            <a:off x="6824980" y="2451735"/>
-            <a:ext cx="4215765" cy="3002280"/>
-          </a:xfrm>
-          <a:prstGeom prst="rect"/>
-          <a:noFill/>
-        </p:spPr>
-      </p:pic>
-      <p:sp>
-        <p:nvSpPr>
-          <p:cNvPr id="40" name="텍스트 상자 14"/>
-          <p:cNvSpPr txBox="1">
-            <a:spLocks/>
-          </p:cNvSpPr>
-          <p:nvPr/>
-        </p:nvSpPr>
-        <p:spPr>
-          <a:xfrm rot="0">
-            <a:off x="6816725" y="5629910"/>
-            <a:ext cx="4217670" cy="678180"/>
-          </a:xfrm>
-          <a:prstGeom prst="rect"/>
-          <a:noFill/>
-          <a:ln w="0">
-            <a:noFill/>
-            <a:prstDash/>
-          </a:ln>
-        </p:spPr>
-        <p:txBody>
-          <a:bodyPr wrap="square" lIns="89535" tIns="46355" rIns="89535" bIns="46355" numCol="1" vert="horz" anchor="t">
-            <a:spAutoFit/>
-          </a:bodyPr>
-          <a:lstStyle/>
-          <a:p>
-            <a:pPr marL="0" indent="0" rtl="0" algn="l" defTabSz="914400" eaLnBrk="1" latinLnBrk="0" hangingPunct="1">
-              <a:buFontTx/>
-              <a:buNone/>
-            </a:pPr>
-            <a:r>
-              <a:rPr lang="ko-KR" sz="2000" b="1">
-                <a:solidFill>
-                  <a:srgbClr val="0611F2"/>
-                </a:solidFill>
-                <a:latin typeface="맑은 고딕" charset="0"/>
-                <a:ea typeface="맑은 고딕" charset="0"/>
-              </a:rPr>
-              <a:t>9.</a:t>
-            </a:r>
-            <a:r>
-              <a:rPr lang="ko-KR" sz="2000">
-                <a:solidFill>
-                  <a:srgbClr val="0611F2"/>
-                </a:solidFill>
-                <a:latin typeface="맑은 고딕" charset="0"/>
-                <a:ea typeface="맑은 고딕" charset="0"/>
-              </a:rPr>
-              <a:t> </a:t>
-            </a:r>
-            <a:r>
-              <a:rPr lang="ko-KR" sz="1800">
-                <a:latin typeface="맑은 고딕" charset="0"/>
-                <a:ea typeface="맑은 고딕" charset="0"/>
-              </a:rPr>
-              <a:t>도움말 화면이 나타나면 참조 자료에 SDK 다운로드를 선택합니다.</a:t>
             </a:r>
             <a:endParaRPr lang="ko-KR" altLang="en-US" sz="1800">
               <a:latin typeface="맑은 고딕" charset="0"/>
@@ -11346,9 +12017,9 @@
           <p:nvPr/>
         </p:nvSpPr>
         <p:spPr>
-          <a:xfrm rot="0">
+          <a:xfrm>
             <a:off x="1232535" y="2764155"/>
-            <a:ext cx="4114165" cy="955040"/>
+            <a:ext cx="4114800" cy="954405"/>
           </a:xfrm>
           <a:prstGeom prst="rect"/>
           <a:noFill/>
@@ -11392,7 +12063,14 @@
                 <a:latin typeface="맑은 고딕" charset="0"/>
                 <a:ea typeface="맑은 고딕" charset="0"/>
               </a:rPr>
-              <a:t>SDK 다운로드를 할 수 있는 Azure PlayFab 설명서 화면에서 게임 엔진을 선택합니다. </a:t>
+              <a:t>그다음 S</a:t>
+            </a:r>
+            <a:r>
+              <a:rPr lang="ko-KR" sz="1800">
+                <a:latin typeface="맑은 고딕" charset="0"/>
+                <a:ea typeface="맑은 고딕" charset="0"/>
+              </a:rPr>
+              <a:t>DK 다운로드를 할 수 있는 Azure PlayFab 설명서 화면에서 게임 엔진을 선택합니다. </a:t>
             </a:r>
             <a:endParaRPr lang="ko-KR" altLang="en-US" sz="1800">
               <a:latin typeface="맑은 고딕" charset="0"/>
@@ -11403,7 +12081,7 @@
       </p:sp>
       <p:pic>
         <p:nvPicPr>
-          <p:cNvPr id="44" name="그림 15" descr="C:/Users/Admin1/AppData/Roaming/PolarisOffice/ETemp/20820_9877576/fImage175531514464.png"/>
+          <p:cNvPr id="44" name="그림 15"/>
           <p:cNvPicPr>
             <a:picLocks noChangeAspect="1"/>
           </p:cNvPicPr>
@@ -11434,7 +12112,7 @@
       </p:pic>
       <p:pic>
         <p:nvPicPr>
-          <p:cNvPr id="45" name="그림 16" descr="C:/Users/Admin1/AppData/Roaming/PolarisOffice/ETemp/20820_9877576/fImage265691525705.png"/>
+          <p:cNvPr id="45" name="그림 16"/>
           <p:cNvPicPr>
             <a:picLocks noChangeAspect="1"/>
           </p:cNvPicPr>
@@ -11529,7 +12207,7 @@
       </p:sp>
       <p:pic>
         <p:nvPicPr>
-          <p:cNvPr id="47" name="그림 18" descr="C:/Users/Admin1/AppData/Roaming/PolarisOffice/ETemp/20820_9877576/fImage330901548145.png"/>
+          <p:cNvPr id="47" name="그림 18" descr="C:/Users/Admin1/AppData/Roaming/PolarisOffice/ETemp/17716_5745816/fImage330901548145.png"/>
           <p:cNvPicPr>
             <a:picLocks noChangeAspect="1"/>
           </p:cNvPicPr>
@@ -11549,8 +12227,8 @@
         </p:blipFill>
         <p:spPr>
           <a:xfrm rot="0">
-            <a:off x="6840220" y="1413510"/>
-            <a:ext cx="3952240" cy="3516630"/>
+            <a:off x="6824980" y="1413510"/>
+            <a:ext cx="4323715" cy="3766185"/>
           </a:xfrm>
           <a:prstGeom prst="rect"/>
           <a:noFill/>
@@ -11566,8 +12244,8 @@
         </p:nvSpPr>
         <p:spPr>
           <a:xfrm rot="0">
-            <a:off x="6841490" y="5027295"/>
-            <a:ext cx="3941445" cy="1231265"/>
+            <a:off x="6816725" y="5326380"/>
+            <a:ext cx="4331970" cy="954405"/>
           </a:xfrm>
           <a:prstGeom prst="rect"/>
           <a:noFill/>
@@ -11819,8 +12497,8 @@
         </p:nvSpPr>
         <p:spPr>
           <a:xfrm rot="0">
-            <a:off x="1232535" y="5158740"/>
-            <a:ext cx="4114165" cy="955040"/>
+            <a:off x="1232535" y="5291455"/>
+            <a:ext cx="4154805" cy="954405"/>
           </a:xfrm>
           <a:prstGeom prst="rect"/>
           <a:noFill/>
@@ -11864,7 +12542,14 @@
                 <a:latin typeface="맑은 고딕" charset="0"/>
                 <a:ea typeface="맑은 고딕" charset="0"/>
               </a:rPr>
-              <a:t>다운로드가 완료되면 유니티에 적용할 파일 내역을 확인하고 Import를 선택합니다.</a:t>
+              <a:t>이제 다</a:t>
+            </a:r>
+            <a:r>
+              <a:rPr lang="ko-KR" sz="1800">
+                <a:latin typeface="맑은 고딕" charset="0"/>
+                <a:ea typeface="맑은 고딕" charset="0"/>
+              </a:rPr>
+              <a:t>운로드가 완료되면 유니티에 적용할 파일 내역을 확인하고 Import를 선택합니다.</a:t>
             </a:r>
             <a:endParaRPr lang="ko-KR" altLang="en-US" sz="1800">
               <a:latin typeface="맑은 고딕" charset="0"/>
@@ -11883,8 +12568,8 @@
         </p:nvSpPr>
         <p:spPr>
           <a:xfrm rot="0">
-            <a:off x="6800215" y="5434330"/>
-            <a:ext cx="4182745" cy="677545"/>
+            <a:off x="6800215" y="5559425"/>
+            <a:ext cx="4215130" cy="677545"/>
           </a:xfrm>
           <a:prstGeom prst="rect"/>
           <a:noFill/>
@@ -11939,7 +12624,7 @@
       </p:sp>
       <p:pic>
         <p:nvPicPr>
-          <p:cNvPr id="49" name="그림 22" descr="C:/Users/Admin1/AppData/Roaming/PolarisOffice/ETemp/20820_9877576/fImage364772413281.png"/>
+          <p:cNvPr id="49" name="그림 22" descr="C:/Users/Admin1/AppData/Roaming/PolarisOffice/ETemp/17716_5745816/fImage364772413281.png"/>
           <p:cNvPicPr>
             <a:picLocks noChangeAspect="1"/>
           </p:cNvPicPr>
@@ -11959,8 +12644,8 @@
         </p:blipFill>
         <p:spPr>
           <a:xfrm rot="0">
-            <a:off x="1230630" y="1338580"/>
-            <a:ext cx="4107815" cy="3716655"/>
+            <a:off x="1230630" y="1379855"/>
+            <a:ext cx="4156710" cy="3782695"/>
           </a:xfrm>
           <a:prstGeom prst="rect"/>
           <a:noFill/>
@@ -11968,7 +12653,7 @@
       </p:pic>
       <p:pic>
         <p:nvPicPr>
-          <p:cNvPr id="50" name="그림 23" descr="C:/Users/Admin1/AppData/Roaming/PolarisOffice/ETemp/20820_9877576/fImage183122426827.png"/>
+          <p:cNvPr id="50" name="그림 23" descr="C:/Users/Admin1/AppData/Roaming/PolarisOffice/ETemp/17716_5745816/fImage183122426827.png"/>
           <p:cNvPicPr>
             <a:picLocks noChangeAspect="1"/>
           </p:cNvPicPr>
@@ -11988,8 +12673,8 @@
         </p:blipFill>
         <p:spPr>
           <a:xfrm rot="0">
-            <a:off x="6833235" y="1336675"/>
-            <a:ext cx="4191000" cy="3975735"/>
+            <a:off x="6816725" y="1379855"/>
+            <a:ext cx="4208145" cy="4123690"/>
           </a:xfrm>
           <a:prstGeom prst="rect"/>
           <a:noFill/>
@@ -12139,9 +12824,9 @@
           <p:nvPr/>
         </p:nvSpPr>
         <p:spPr>
-          <a:xfrm rot="0">
+          <a:xfrm>
             <a:off x="1213485" y="2880995"/>
-            <a:ext cx="4124325" cy="954405"/>
+            <a:ext cx="4124960" cy="954405"/>
           </a:xfrm>
           <a:prstGeom prst="rect"/>
           <a:noFill/>
@@ -12185,7 +12870,14 @@
                 <a:latin typeface="맑은 고딕" charset="0"/>
                 <a:ea typeface="맑은 고딕" charset="0"/>
               </a:rPr>
-              <a:t>PlayFab 로그인 화면이 나타나면 PlayFab에서 가입했던 ID와 비밀번호를 입력합니다.</a:t>
+              <a:t>그다음 P</a:t>
+            </a:r>
+            <a:r>
+              <a:rPr lang="ko-KR" sz="1800">
+                <a:latin typeface="맑은 고딕" charset="0"/>
+                <a:ea typeface="맑은 고딕" charset="0"/>
+              </a:rPr>
+              <a:t>layFab 로그인 화면이 나타나면 PlayFab에서 가입했던 ID와 비밀번호를 입력합니다.</a:t>
             </a:r>
             <a:endParaRPr lang="ko-KR" altLang="en-US" sz="1800">
               <a:latin typeface="맑은 고딕" charset="0"/>
@@ -12260,7 +12952,7 @@
       </p:sp>
       <p:pic>
         <p:nvPicPr>
-          <p:cNvPr id="51" name="그림 24" descr="C:/Users/Admin1/AppData/Roaming/PolarisOffice/ETemp/20820_9877576/fImage123742539961.png"/>
+          <p:cNvPr id="51" name="그림 24"/>
           <p:cNvPicPr>
             <a:picLocks noChangeAspect="1"/>
           </p:cNvPicPr>
@@ -12291,7 +12983,7 @@
       </p:pic>
       <p:pic>
         <p:nvPicPr>
-          <p:cNvPr id="52" name="그림 25" descr="C:/Users/Admin1/AppData/Roaming/PolarisOffice/ETemp/20820_9877576/fImage11611254491.png"/>
+          <p:cNvPr id="52" name="그림 25"/>
           <p:cNvPicPr>
             <a:picLocks noChangeAspect="1"/>
           </p:cNvPicPr>
@@ -12322,7 +13014,7 @@
       </p:pic>
       <p:pic>
         <p:nvPicPr>
-          <p:cNvPr id="53" name="그림 26" descr="C:/Users/Admin1/AppData/Roaming/PolarisOffice/ETemp/20820_9877576/fImage234462552995.png"/>
+          <p:cNvPr id="53" name="그림 26"/>
           <p:cNvPicPr>
             <a:picLocks noChangeAspect="1"/>
           </p:cNvPicPr>
@@ -12360,7 +13052,7 @@
         <p:spPr>
           <a:xfrm rot="0">
             <a:off x="6899910" y="5521325"/>
-            <a:ext cx="4049395" cy="677545"/>
+            <a:ext cx="4032250" cy="677545"/>
           </a:xfrm>
           <a:prstGeom prst="rect"/>
           <a:noFill/>
@@ -12404,7 +13096,14 @@
                 <a:latin typeface="맑은 고딕" charset="0"/>
                 <a:ea typeface="맑은 고딕" charset="0"/>
               </a:rPr>
-              <a:t>그리고 SDK가 추가되면 </a:t>
+              <a:t>마지막으로</a:t>
+            </a:r>
+            <a:r>
+              <a:rPr lang="ko-KR" sz="1800">
+                <a:latin typeface="맑은 고딕" charset="0"/>
+                <a:ea typeface="맑은 고딕" charset="0"/>
+              </a:rPr>
+              <a:t> SDK가 추가되면 </a:t>
             </a:r>
             <a:r>
               <a:rPr lang="ko-KR" sz="1800">
@@ -12576,7 +13275,7 @@
         <p:spPr>
           <a:xfrm rot="0">
             <a:off x="1230630" y="5212715"/>
-            <a:ext cx="4053840" cy="955675"/>
+            <a:ext cx="4123690" cy="954405"/>
           </a:xfrm>
           <a:prstGeom prst="rect"/>
           <a:noFill/>
@@ -12620,7 +13319,14 @@
                 <a:latin typeface="맑은 고딕" charset="0"/>
                 <a:ea typeface="맑은 고딕" charset="0"/>
               </a:rPr>
-              <a:t>SETTINGS의 PROJECT에서 STUDIO를 선택하고 PlayFab에서 생성한 Studio를 선택합니다. </a:t>
+              <a:t>이제 S</a:t>
+            </a:r>
+            <a:r>
+              <a:rPr lang="ko-KR" sz="1800">
+                <a:latin typeface="맑은 고딕" charset="0"/>
+                <a:ea typeface="맑은 고딕" charset="0"/>
+              </a:rPr>
+              <a:t>ETTINGS의 PROJECT에서 STUDIO를 선택하고 PlayFab에서 생성한 Studio를 선택합니다. </a:t>
             </a:r>
             <a:endParaRPr lang="ko-KR" altLang="en-US" sz="1800">
               <a:latin typeface="맑은 고딕" charset="0"/>
@@ -12639,8 +13345,8 @@
         </p:nvSpPr>
         <p:spPr>
           <a:xfrm rot="0">
-            <a:off x="6946900" y="5489575"/>
-            <a:ext cx="4154805" cy="678815"/>
+            <a:off x="6913880" y="4940935"/>
+            <a:ext cx="4184650" cy="1231265"/>
           </a:xfrm>
           <a:prstGeom prst="rect"/>
           <a:noFill/>
@@ -12684,7 +13390,28 @@
                 <a:latin typeface="맑은 고딕" charset="0"/>
                 <a:ea typeface="맑은 고딕" charset="0"/>
               </a:rPr>
-              <a:t>그다음 로그인과 회원가입을 위한 UI(InputField, Button)를 생성합니다.</a:t>
+              <a:t>그</a:t>
+            </a:r>
+            <a:r>
+              <a:rPr lang="ko-KR" sz="1800">
+                <a:latin typeface="맑은 고딕" charset="0"/>
+                <a:ea typeface="맑은 고딕" charset="0"/>
+              </a:rPr>
+              <a:t>리고</a:t>
+            </a:r>
+            <a:r>
+              <a:rPr lang="ko-KR" sz="1800">
+                <a:latin typeface="맑은 고딕" charset="0"/>
+                <a:ea typeface="맑은 고딕" charset="0"/>
+              </a:rPr>
+              <a:t> </a:t>
+            </a:r>
+            <a:r>
+              <a:rPr lang="ko-KR" sz="1800">
+                <a:latin typeface="맑은 고딕" charset="0"/>
+                <a:ea typeface="맑은 고딕" charset="0"/>
+              </a:rPr>
+              <a:t>UI에서 Button 2개를 생성하고 각각의 Button의 이름을 Sign In Button과 Sign Up Button이라는 이름으로 정의합니다.</a:t>
             </a:r>
             <a:endParaRPr lang="ko-KR" altLang="en-US" sz="1800">
               <a:latin typeface="맑은 고딕" charset="0"/>
@@ -12695,7 +13422,7 @@
       </p:sp>
       <p:pic>
         <p:nvPicPr>
-          <p:cNvPr id="55" name="그림 28" descr="C:/Users/Admin1/AppData/Roaming/PolarisOffice/ETemp/20820_9877576/fImage250602681942.png"/>
+          <p:cNvPr id="55" name="그림 28" descr="C:/Users/Admin1/AppData/Roaming/PolarisOffice/ETemp/17716_5745816/fImage250602681942.png"/>
           <p:cNvPicPr>
             <a:picLocks noChangeAspect="1"/>
           </p:cNvPicPr>
@@ -12715,8 +13442,8 @@
         </p:blipFill>
         <p:spPr>
           <a:xfrm rot="0">
-            <a:off x="1226185" y="1518285"/>
-            <a:ext cx="4066540" cy="3619500"/>
+            <a:off x="1226185" y="1388110"/>
+            <a:ext cx="4136390" cy="3750310"/>
           </a:xfrm>
           <a:prstGeom prst="rect"/>
           <a:noFill/>
@@ -12724,7 +13451,7 @@
       </p:pic>
       <p:pic>
         <p:nvPicPr>
-          <p:cNvPr id="56" name="그림 29" descr="C:/Users/Admin1/AppData/Roaming/PolarisOffice/ETemp/20820_9877576/fImage191382694827.png"/>
+          <p:cNvPr id="56" name="그림 29" descr="C:/Users/Admin1/AppData/Roaming/PolarisOffice/ETemp/17716_5745816/fImage191382694827.png"/>
           <p:cNvPicPr>
             <a:picLocks noChangeAspect="1"/>
           </p:cNvPicPr>
@@ -12744,8 +13471,8 @@
         </p:blipFill>
         <p:spPr>
           <a:xfrm rot="0">
-            <a:off x="6917690" y="1337310"/>
-            <a:ext cx="1994535" cy="3966845"/>
+            <a:off x="6917690" y="1379855"/>
+            <a:ext cx="2244090" cy="3434080"/>
           </a:xfrm>
           <a:prstGeom prst="roundRect"/>
           <a:solidFill>
@@ -12755,17 +13482,17 @@
       </p:pic>
       <p:pic>
         <p:nvPicPr>
-          <p:cNvPr id="57" name="그림 30" descr="C:/Users/Admin1/AppData/Roaming/PolarisOffice/ETemp/20820_9877576/fImage191502705436.png"/>
+          <p:cNvPr id="57" name="그림 34" descr="C:/Users/Admin1/AppData/Roaming/PolarisOffice/ETemp/17716_5745816/fImage64373136334.png"/>
           <p:cNvPicPr>
             <a:picLocks noChangeAspect="1"/>
           </p:cNvPicPr>
           <p:nvPr/>
         </p:nvPicPr>
         <p:blipFill rotWithShape="1">
-          <a:blip r:embed="rId4" cstate="hqprint">
+          <a:blip r:embed="rId6" cstate="print">
             <a:extLst>
               <a:ext uri="{28A0092B-C50C-407E-A947-70E740481C1C}">
-                <a14:useLocalDpi xmlns:a14="http://schemas.microsoft.com/office/drawing/2010/main"/>
+                <a14:useLocalDpi xmlns:a14="http://schemas.microsoft.com/office/drawing/2010/main" val="0"/>
               </a:ext>
             </a:extLst>
           </a:blip>
@@ -12775,8 +13502,8 @@
         </p:blipFill>
         <p:spPr>
           <a:xfrm rot="0">
-            <a:off x="9057640" y="1334135"/>
-            <a:ext cx="2002155" cy="3961765"/>
+            <a:off x="9377045" y="1812290"/>
+            <a:ext cx="1729740" cy="2560955"/>
           </a:xfrm>
           <a:prstGeom prst="roundRect"/>
           <a:solidFill>
@@ -12808,7 +13535,7 @@
 </file>
 
 <file path=ppt/slides/slide9.xml><?xml version="1.0" encoding="utf-8"?>
-<p:sld xmlns:a="http://schemas.openxmlformats.org/drawingml/2006/main" xmlns:r="http://schemas.openxmlformats.org/officeDocument/2006/relationships" xmlns:p="http://schemas.openxmlformats.org/presentationml/2006/main" xmlns:p14="http://schemas.microsoft.com/office/powerpoint/2010/main">
+<p:sld xmlns:a="http://schemas.openxmlformats.org/drawingml/2006/main" xmlns:r="http://schemas.openxmlformats.org/officeDocument/2006/relationships" xmlns:p="http://schemas.openxmlformats.org/presentationml/2006/main">
   <p:cSld>
     <p:spTree>
       <p:nvGrpSpPr>
@@ -12835,7 +13562,7 @@
         <p:spPr>
           <a:xfrm rot="0">
             <a:off x="1229995" y="1337310"/>
-            <a:ext cx="4039235" cy="370840"/>
+            <a:ext cx="4039870" cy="371475"/>
           </a:xfrm>
           <a:prstGeom prst="rect"/>
           <a:noFill/>
@@ -12872,7 +13599,7 @@
         <p:spPr>
           <a:xfrm rot="0">
             <a:off x="4342765" y="467995"/>
-            <a:ext cx="3503930" cy="554990"/>
+            <a:ext cx="3504565" cy="554990"/>
           </a:xfrm>
           <a:prstGeom prst="rect"/>
           <a:noFill/>
@@ -12929,8 +13656,8 @@
         </p:nvSpPr>
         <p:spPr>
           <a:xfrm rot="0">
-            <a:off x="1203960" y="4872990"/>
-            <a:ext cx="4062095" cy="954405"/>
+            <a:off x="1230630" y="4930140"/>
+            <a:ext cx="4131945" cy="1231265"/>
           </a:xfrm>
           <a:prstGeom prst="rect"/>
           <a:noFill/>
@@ -12957,7 +13684,17 @@
                 <a:latin typeface="맑은 고딕" charset="0"/>
                 <a:ea typeface="맑은 고딕" charset="0"/>
               </a:rPr>
-              <a:t>20.</a:t>
+              <a:t>20</a:t>
+            </a:r>
+            <a:r>
+              <a:rPr lang="ko-KR" sz="2000" b="1">
+                <a:solidFill>
+                  <a:srgbClr val="0611F2"/>
+                </a:solidFill>
+                <a:latin typeface="맑은 고딕" charset="0"/>
+                <a:ea typeface="맑은 고딕" charset="0"/>
+              </a:rPr>
+              <a:t>.</a:t>
             </a:r>
             <a:r>
               <a:rPr lang="ko-KR" sz="2000">
@@ -12974,24 +13711,7 @@
                 <a:latin typeface="맑은 고딕" charset="0"/>
                 <a:ea typeface="맑은 고딕" charset="0"/>
               </a:rPr>
-              <a:t>UI를 배치하고 나면 InputFiled(Password Input)에 Content Type을 </a:t>
-            </a:r>
-            <a:r>
-              <a:rPr lang="ko-KR" sz="1800">
-                <a:solidFill>
-                  <a:srgbClr val="009900"/>
-                </a:solidFill>
-                <a:latin typeface="맑은 고딕" charset="0"/>
-                <a:ea typeface="맑은 고딕" charset="0"/>
-              </a:rPr>
-              <a:t>[Password]</a:t>
-            </a:r>
-            <a:r>
-              <a:rPr lang="ko-KR" sz="1800">
-                <a:latin typeface="맑은 고딕" charset="0"/>
-                <a:ea typeface="맑은 고딕" charset="0"/>
-              </a:rPr>
-              <a:t>로 설정합니다. </a:t>
+              <a:t>그런 다음 UI에서 Input Field를 3개 생성하고 각각의 이름을 Email Input과 Password Input 그리고 UserName Input으로 정의합니다.</a:t>
             </a:r>
             <a:endParaRPr lang="ko-KR" altLang="en-US" sz="1800">
               <a:latin typeface="맑은 고딕" charset="0"/>
@@ -13000,110 +13720,19 @@
           </a:p>
         </p:txBody>
       </p:sp>
-      <p:sp>
-        <p:nvSpPr>
-          <p:cNvPr id="54" name="Rect 0"/>
-          <p:cNvSpPr txBox="1">
-            <a:spLocks/>
-          </p:cNvSpPr>
-          <p:nvPr/>
-        </p:nvSpPr>
-        <p:spPr>
-          <a:xfrm rot="0">
-            <a:off x="6870065" y="4053205"/>
-            <a:ext cx="4153535" cy="1784985"/>
-          </a:xfrm>
-          <a:prstGeom prst="rect"/>
-          <a:noFill/>
-          <a:ln w="0">
-            <a:noFill/>
-            <a:prstDash/>
-          </a:ln>
-        </p:spPr>
-        <p:txBody>
-          <a:bodyPr wrap="square" lIns="89535" tIns="46355" rIns="89535" bIns="46355" numCol="1" vert="horz" anchor="t">
-            <a:spAutoFit/>
-          </a:bodyPr>
-          <a:lstStyle/>
-          <a:p>
-            <a:pPr marL="0" indent="0" rtl="0" algn="l" defTabSz="914400" eaLnBrk="1" latinLnBrk="0" hangingPunct="1">
-              <a:buFontTx/>
-              <a:buNone/>
-            </a:pPr>
-            <a:r>
-              <a:rPr lang="ko-KR" sz="2000" b="1">
-                <a:solidFill>
-                  <a:srgbClr val="0611F2"/>
-                </a:solidFill>
-                <a:latin typeface="맑은 고딕" charset="0"/>
-                <a:ea typeface="맑은 고딕" charset="0"/>
-              </a:rPr>
-              <a:t>21.</a:t>
-            </a:r>
-            <a:r>
-              <a:rPr lang="ko-KR" sz="2000">
-                <a:solidFill>
-                  <a:srgbClr val="0611F2"/>
-                </a:solidFill>
-                <a:latin typeface="맑은 고딕" charset="0"/>
-                <a:ea typeface="맑은 고딕" charset="0"/>
-              </a:rPr>
-              <a:t> </a:t>
-            </a:r>
-            <a:r>
-              <a:rPr lang="ko-KR" sz="1800">
-                <a:latin typeface="맑은 고딕" charset="0"/>
-                <a:ea typeface="맑은 고딕" charset="0"/>
-              </a:rPr>
-              <a:t>그리고 빈 게임 오브젝트 생성하고 이름을 Photon Setting으로 설정합니다.</a:t>
-            </a:r>
-            <a:endParaRPr lang="ko-KR" altLang="en-US" sz="1800">
-              <a:latin typeface="맑은 고딕" charset="0"/>
-              <a:ea typeface="맑은 고딕" charset="0"/>
-            </a:endParaRPr>
-          </a:p>
-          <a:p>
-            <a:pPr marL="0" indent="0" rtl="0" algn="l" defTabSz="914400" eaLnBrk="1" latinLnBrk="0" hangingPunct="1">
-              <a:buFontTx/>
-              <a:buNone/>
-            </a:pPr>
-            <a:endParaRPr lang="ko-KR" altLang="en-US" sz="1800">
-              <a:latin typeface="맑은 고딕" charset="0"/>
-              <a:ea typeface="맑은 고딕" charset="0"/>
-            </a:endParaRPr>
-          </a:p>
-          <a:p>
-            <a:pPr marL="0" indent="0" rtl="0" algn="l" defTabSz="914400" eaLnBrk="1" latinLnBrk="0" hangingPunct="1">
-              <a:buFontTx/>
-              <a:buNone/>
-            </a:pPr>
-            <a:r>
-              <a:rPr lang="ko-KR" sz="1800">
-                <a:latin typeface="맑은 고딕" charset="0"/>
-                <a:ea typeface="맑은 고딕" charset="0"/>
-              </a:rPr>
-              <a:t>그리고 PhotonSetting이라는 스크립트를 생성하고 넣어줍니다.</a:t>
-            </a:r>
-            <a:endParaRPr lang="ko-KR" altLang="en-US" sz="1800">
-              <a:latin typeface="맑은 고딕" charset="0"/>
-              <a:ea typeface="맑은 고딕" charset="0"/>
-            </a:endParaRPr>
-          </a:p>
-        </p:txBody>
-      </p:sp>
       <p:pic>
         <p:nvPicPr>
-          <p:cNvPr id="59" name="그림 32"/>
+          <p:cNvPr id="57" name="Picture " descr="C:/Users/Admin1/AppData/Roaming/PolarisOffice/ETemp/17716_5745816/fImage191502705436.png"/>
           <p:cNvPicPr>
             <a:picLocks noChangeAspect="1"/>
           </p:cNvPicPr>
           <p:nvPr/>
         </p:nvPicPr>
         <p:blipFill rotWithShape="1">
-          <a:blip r:embed="rId2" cstate="print">
+          <a:blip r:embed="rId2" cstate="hqprint">
             <a:extLst>
               <a:ext uri="{28A0092B-C50C-407E-A947-70E740481C1C}">
-                <a14:useLocalDpi xmlns:a14="http://schemas.microsoft.com/office/drawing/2010/main" val="0"/>
+                <a14:useLocalDpi xmlns:a14="http://schemas.microsoft.com/office/drawing/2010/main"/>
               </a:ext>
             </a:extLst>
           </a:blip>
@@ -13113,16 +13742,18 @@
         </p:blipFill>
         <p:spPr>
           <a:xfrm rot="0">
-            <a:off x="2950845" y="1336675"/>
-            <a:ext cx="2409825" cy="3340100"/>
-          </a:xfrm>
-          <a:prstGeom prst="rect"/>
-          <a:noFill/>
+            <a:off x="1222375" y="1338580"/>
+            <a:ext cx="2486025" cy="3416935"/>
+          </a:xfrm>
+          <a:prstGeom prst="roundRect"/>
+          <a:solidFill>
+            <a:srgbClr val="EDEDED"/>
+          </a:solidFill>
         </p:spPr>
       </p:pic>
       <p:pic>
         <p:nvPicPr>
-          <p:cNvPr id="60" name="그림 35"/>
+          <p:cNvPr id="58" name="그림 37" descr="C:/Users/Admin1/AppData/Roaming/PolarisOffice/ETemp/17716_5745816/fImage83363146500.png"/>
           <p:cNvPicPr>
             <a:picLocks noChangeAspect="1"/>
           </p:cNvPicPr>
@@ -13142,37 +13773,8 @@
         </p:blipFill>
         <p:spPr>
           <a:xfrm rot="0">
-            <a:off x="1204595" y="1331595"/>
-            <a:ext cx="1505585" cy="3335655"/>
-          </a:xfrm>
-          <a:prstGeom prst="rect"/>
-          <a:noFill/>
-        </p:spPr>
-      </p:pic>
-      <p:pic>
-        <p:nvPicPr>
-          <p:cNvPr id="61" name="그림 37" descr="C:/Users/Admin1/AppData/Roaming/PolarisOffice/ETemp/6432_22183288/fImage330252883902.png"/>
-          <p:cNvPicPr>
-            <a:picLocks noChangeAspect="1"/>
-          </p:cNvPicPr>
-          <p:nvPr/>
-        </p:nvPicPr>
-        <p:blipFill rotWithShape="1">
-          <a:blip r:embed="rId4" cstate="hqprint">
-            <a:extLst>
-              <a:ext uri="{28A0092B-C50C-407E-A947-70E740481C1C}">
-                <a14:useLocalDpi xmlns:a14="http://schemas.microsoft.com/office/drawing/2010/main"/>
-              </a:ext>
-            </a:extLst>
-          </a:blip>
-          <a:stretch>
-            <a:fillRect/>
-          </a:stretch>
-        </p:blipFill>
-        <p:spPr>
-          <a:xfrm rot="0">
-            <a:off x="6863715" y="1329690"/>
-            <a:ext cx="1891665" cy="2559685"/>
+            <a:off x="3890645" y="1855470"/>
+            <a:ext cx="1463675" cy="2385060"/>
           </a:xfrm>
           <a:prstGeom prst="roundRect"/>
           <a:solidFill>
@@ -13180,104 +13782,6 @@
           </a:solidFill>
         </p:spPr>
       </p:pic>
-      <p:pic>
-        <p:nvPicPr>
-          <p:cNvPr id="62" name="그림 38"/>
-          <p:cNvPicPr>
-            <a:picLocks noChangeAspect="1"/>
-          </p:cNvPicPr>
-          <p:nvPr/>
-        </p:nvPicPr>
-        <p:blipFill rotWithShape="1">
-          <a:blip r:embed="rId5" cstate="print">
-            <a:extLst>
-              <a:ext uri="{28A0092B-C50C-407E-A947-70E740481C1C}">
-                <a14:useLocalDpi xmlns:a14="http://schemas.microsoft.com/office/drawing/2010/main" val="0"/>
-              </a:ext>
-            </a:extLst>
-          </a:blip>
-          <a:stretch>
-            <a:fillRect/>
-          </a:stretch>
-        </p:blipFill>
-        <p:spPr>
-          <a:xfrm rot="0">
-            <a:off x="9620250" y="3100070"/>
-            <a:ext cx="890270" cy="796925"/>
-          </a:xfrm>
-          <a:prstGeom prst="roundRect"/>
-          <a:solidFill>
-            <a:srgbClr val="EDEDED"/>
-          </a:solidFill>
-        </p:spPr>
-      </p:pic>
-      <p:pic>
-        <p:nvPicPr>
-          <p:cNvPr id="63" name="그림 42"/>
-          <p:cNvPicPr>
-            <a:picLocks noChangeAspect="1"/>
-          </p:cNvPicPr>
-          <p:nvPr/>
-        </p:nvPicPr>
-        <p:blipFill rotWithShape="1">
-          <a:blip r:embed="rId6" cstate="print">
-            <a:extLst>
-              <a:ext uri="{28A0092B-C50C-407E-A947-70E740481C1C}">
-                <a14:useLocalDpi xmlns:a14="http://schemas.microsoft.com/office/drawing/2010/main" val="0"/>
-              </a:ext>
-            </a:extLst>
-          </a:blip>
-          <a:stretch>
-            <a:fillRect/>
-          </a:stretch>
-        </p:blipFill>
-        <p:spPr>
-          <a:xfrm rot="0">
-            <a:off x="9170035" y="1331595"/>
-            <a:ext cx="1784350" cy="1390015"/>
-          </a:xfrm>
-          <a:prstGeom prst="roundRect"/>
-          <a:solidFill>
-            <a:srgbClr val="EDEDED"/>
-          </a:solidFill>
-        </p:spPr>
-      </p:pic>
-      <p:cxnSp>
-        <p:nvCxnSpPr>
-          <p:cNvPr id="64" name="도형 45"/>
-          <p:cNvCxnSpPr>
-            <a:stCxn id="62" idx="0"/>
-            <a:endCxn id="63" idx="2"/>
-          </p:cNvCxnSpPr>
-          <p:nvPr/>
-        </p:nvCxnSpPr>
-        <p:spPr>
-          <a:xfrm rot="0" flipH="1" flipV="1">
-            <a:off x="10061575" y="2720975"/>
-            <a:ext cx="3810" cy="379730"/>
-          </a:xfrm>
-          <a:prstGeom prst="straightConnector1"/>
-          <a:ln w="6350" cap="flat" cmpd="sng">
-            <a:prstDash/>
-            <a:headEnd type="none" w="med" len="med"/>
-            <a:tailEnd type="triangle" w="med" len="med"/>
-          </a:ln>
-        </p:spPr>
-        <p:style>
-          <a:lnRef idx="1">
-            <a:schemeClr val="accent1"/>
-          </a:lnRef>
-          <a:fillRef idx="0">
-            <a:schemeClr val="accent1"/>
-          </a:fillRef>
-          <a:effectRef idx="0">
-            <a:schemeClr val="accent1"/>
-          </a:effectRef>
-          <a:fontRef idx="minor">
-            <a:schemeClr val="tx1"/>
-          </a:fontRef>
-        </p:style>
-      </p:cxnSp>
     </p:spTree>
   </p:cSld>
   <p:clrMapOvr>

</xml_diff>

<commit_message>
Photon Lobby Tutorial Renewal
- Render 3D objects in 2D UI space

- Implemented a function to access
  the lobby with a single button

- Add and delete resource data
</commit_message>
<xml_diff>
--- a/Assets/Class/Photon Server/PPT Data/Photon PlayFab.pptx
+++ b/Assets/Class/Photon Server/PPT Data/Photon PlayFab.pptx
@@ -2,7 +2,7 @@
 <file path=ppt/presentation.xml><?xml version="1.0" encoding="utf-8"?>
 <p:presentation xmlns:a="http://schemas.openxmlformats.org/drawingml/2006/main" xmlns:r="http://schemas.openxmlformats.org/officeDocument/2006/relationships" xmlns:p="http://schemas.openxmlformats.org/presentationml/2006/main" xmlns:p14="http://schemas.microsoft.com/office/powerpoint/2010/main" saveSubsetFonts="1" firstSlideNum="0">
   <p:sldMasterIdLst>
-    <p:sldMasterId id="2147486838" r:id="rId12"/>
+    <p:sldMasterId id="2147486863" r:id="rId12"/>
   </p:sldMasterIdLst>
   <p:notesMasterIdLst>
     <p:notesMasterId r:id="rId14"/>
@@ -23,7 +23,8 @@
     <p:sldId id="326" r:id="rId28"/>
     <p:sldId id="327" r:id="rId29"/>
     <p:sldId id="328" r:id="rId30"/>
-    <p:sldId id="329" r:id="rId31"/>
+    <p:sldId id="331" r:id="rId31"/>
+    <p:sldId id="332" r:id="rId32"/>
   </p:sldIdLst>
   <p:sldSz cx="12192000" cy="6858000"/>
   <p:notesSz cx="6858000" cy="9144000"/>
@@ -1618,6 +1619,148 @@
 </p:notes>
 </file>
 
+<file path=ppt/notesSlides/notesSlide17.xml><?xml version="1.0" encoding="utf-8"?>
+<p:notes xmlns:a="http://schemas.openxmlformats.org/drawingml/2006/main" xmlns:r="http://schemas.openxmlformats.org/officeDocument/2006/relationships" xmlns:p="http://schemas.openxmlformats.org/presentationml/2006/main">
+  <p:cSld>
+    <p:spTree>
+      <p:nvGrpSpPr>
+        <p:cNvPr id="1" name=""/>
+        <p:cNvGrpSpPr/>
+        <p:nvPr/>
+      </p:nvGrpSpPr>
+      <p:grpSpPr>
+        <a:xfrm>
+          <a:off x="0" y="0"/>
+          <a:ext cx="0" cy="0"/>
+          <a:chOff x="0" y="0"/>
+          <a:chExt cx="0" cy="0"/>
+        </a:xfrm>
+      </p:grpSpPr>
+      <p:sp>
+        <p:nvSpPr>
+          <p:cNvPr id="2" name="슬라이드 이미지 개체 틀 3"/>
+          <p:cNvSpPr>
+            <a:spLocks noChangeAspect="1"/>
+          </p:cNvSpPr>
+          <p:nvPr>
+            <p:ph type="sldImg" idx="2"/>
+          </p:nvPr>
+        </p:nvSpPr>
+        <p:spPr>
+          <a:xfrm rot="0">
+            <a:off x="685800" y="1143000"/>
+            <a:ext cx="5494655" cy="3094355"/>
+          </a:xfrm>
+          <a:prstGeom prst="rect"/>
+          <a:noFill/>
+          <a:ln w="12700" cap="flat" cmpd="sng">
+            <a:solidFill>
+              <a:srgbClr val="000000">
+                <a:alpha val="100000"/>
+              </a:srgbClr>
+            </a:solidFill>
+            <a:prstDash val="solid"/>
+          </a:ln>
+        </p:spPr>
+        <p:txBody>
+          <a:bodyPr wrap="square" lIns="91440" tIns="45720" rIns="91440" bIns="45720" numCol="1" vert="horz" anchor="ctr">
+            <a:noAutofit/>
+          </a:bodyPr>
+          <a:lstStyle/>
+          <a:p>
+            <a:pPr marL="0" indent="0" latinLnBrk="0">
+              <a:buFontTx/>
+              <a:buNone/>
+            </a:pPr>
+          </a:p>
+        </p:txBody>
+      </p:sp>
+      <p:sp>
+        <p:nvSpPr>
+          <p:cNvPr id="3" name="슬라이드 노트 개체 틀 4"/>
+          <p:cNvSpPr txBox="1">
+            <a:spLocks/>
+          </p:cNvSpPr>
+          <p:nvPr>
+            <p:ph type="body" idx="3"/>
+          </p:nvPr>
+        </p:nvSpPr>
+        <p:spPr>
+          <a:xfrm rot="0">
+            <a:off x="685800" y="4400550"/>
+            <a:ext cx="5494655" cy="3608705"/>
+          </a:xfrm>
+          <a:prstGeom prst="rect"/>
+        </p:spPr>
+        <p:txBody>
+          <a:bodyPr wrap="square" lIns="91440" tIns="45720" rIns="91440" bIns="45720" numCol="1" vert="horz" anchor="t">
+            <a:noAutofit/>
+          </a:bodyPr>
+          <a:lstStyle/>
+          <a:p>
+            <a:pPr marL="0" indent="0" latinLnBrk="0">
+              <a:buFontTx/>
+              <a:buNone/>
+            </a:pPr>
+          </a:p>
+        </p:txBody>
+      </p:sp>
+      <p:sp>
+        <p:nvSpPr>
+          <p:cNvPr id="4" name="슬라이드 번호 개체 틀 6"/>
+          <p:cNvSpPr txBox="1">
+            <a:spLocks/>
+          </p:cNvSpPr>
+          <p:nvPr>
+            <p:ph type="sldNum" idx="5"/>
+          </p:nvPr>
+        </p:nvSpPr>
+        <p:spPr>
+          <a:xfrm rot="0">
+            <a:off x="3884930" y="8685530"/>
+            <a:ext cx="2980055" cy="466725"/>
+          </a:xfrm>
+          <a:prstGeom prst="rect"/>
+        </p:spPr>
+        <p:txBody>
+          <a:bodyPr wrap="square" lIns="91440" tIns="45720" rIns="91440" bIns="45720" numCol="1" vert="horz" anchor="b">
+            <a:noAutofit/>
+          </a:bodyPr>
+          <a:lstStyle>
+            <a:lvl1pPr marL="0" indent="0" algn="r" latinLnBrk="0">
+              <a:buFontTx/>
+              <a:buNone/>
+              <a:defRPr lang="en-GB" altLang="en-US" sz="1200"/>
+            </a:lvl1pPr>
+          </a:lstStyle>
+          <a:p>
+            <a:pPr marL="0" indent="0" latinLnBrk="0">
+              <a:buFontTx/>
+              <a:buNone/>
+            </a:pPr>
+            <a:fld id="{B9320F77-B9A0-41C5-862A-B4B631284C64}" type="slidenum">
+              <a:rPr lang="ko-KR" altLang="en-US"/>
+              <a:t>‹#›</a:t>
+            </a:fld>
+          </a:p>
+        </p:txBody>
+      </p:sp>
+    </p:spTree>
+  </p:cSld>
+  <p:clrMapOvr>
+    <a:masterClrMapping/>
+  </p:clrMapOvr>
+  <mc:AlternateContent xmlns:mc="http://schemas.openxmlformats.org/markup-compatibility/2006">
+    <mc:Choice xmlns:p14="http://schemas.microsoft.com/office/powerpoint/2010/main" Requires="p14">
+      <p:transition spd="slow" p14:dur="0"/>
+    </mc:Choice>
+    <mc:Fallback>
+      <p:transition spd="slow"/>
+    </mc:Fallback>
+  </mc:AlternateContent>
+</p:notes>
+</file>
+
 <file path=ppt/notesSlides/notesSlide2.xml><?xml version="1.0" encoding="utf-8"?>
 <p:notes xmlns:a="http://schemas.openxmlformats.org/drawingml/2006/main" xmlns:r="http://schemas.openxmlformats.org/officeDocument/2006/relationships" xmlns:p="http://schemas.openxmlformats.org/presentationml/2006/main">
   <p:cSld>
@@ -7777,7 +7920,7 @@
       </p:sp>
       <p:pic>
         <p:nvPicPr>
-          <p:cNvPr id="16" name="그림 2" descr="C:/Users/Admin1/AppData/Roaming/PolarisOffice/ETemp/17716_5745816/fImage221221388467.png"/>
+          <p:cNvPr id="16" name="그림 2"/>
           <p:cNvPicPr>
             <a:picLocks noChangeAspect="1"/>
           </p:cNvPicPr>
@@ -7808,7 +7951,7 @@
       </p:pic>
       <p:pic>
         <p:nvPicPr>
-          <p:cNvPr id="19" name="그림 5" descr="C:/Users/Admin1/AppData/Roaming/PolarisOffice/ETemp/17716_5745816/fImage4795621241.png"/>
+          <p:cNvPr id="19" name="그림 5"/>
           <p:cNvPicPr>
             <a:picLocks noChangeAspect="1"/>
           </p:cNvPicPr>
@@ -8043,8 +8186,8 @@
         </p:nvSpPr>
         <p:spPr>
           <a:xfrm rot="0">
-            <a:off x="1203960" y="4872990"/>
-            <a:ext cx="4062095" cy="954405"/>
+            <a:off x="1212215" y="5197475"/>
+            <a:ext cx="4062730" cy="954405"/>
           </a:xfrm>
           <a:prstGeom prst="rect"/>
           <a:noFill/>
@@ -8071,7 +8214,27 @@
                 <a:latin typeface="맑은 고딕" charset="0"/>
                 <a:ea typeface="맑은 고딕" charset="0"/>
               </a:rPr>
-              <a:t>20.</a:t>
+              <a:t>2</a:t>
+            </a:r>
+            <a:r>
+              <a:rPr lang="ko-KR" sz="2000" b="1">
+                <a:solidFill>
+                  <a:srgbClr val="0611F2"/>
+                </a:solidFill>
+                <a:latin typeface="맑은 고딕" charset="0"/>
+                <a:ea typeface="맑은 고딕" charset="0"/>
+              </a:rPr>
+              <a:t>2</a:t>
+            </a:r>
+            <a:r>
+              <a:rPr lang="ko-KR" sz="2000" b="1">
+                <a:solidFill>
+                  <a:srgbClr val="0611F2"/>
+                </a:solidFill>
+                <a:latin typeface="맑은 고딕" charset="0"/>
+                <a:ea typeface="맑은 고딕" charset="0"/>
+              </a:rPr>
+              <a:t>.</a:t>
             </a:r>
             <a:r>
               <a:rPr lang="ko-KR" sz="2000">
@@ -8088,7 +8251,14 @@
                 <a:latin typeface="맑은 고딕" charset="0"/>
                 <a:ea typeface="맑은 고딕" charset="0"/>
               </a:rPr>
-              <a:t>UI를 배치하고 나면 InputFiled(Password Input)에 Content Type을 </a:t>
+              <a:t>이제 Password Input 오브젝트를 선택하고 </a:t>
+            </a:r>
+            <a:r>
+              <a:rPr lang="ko-KR" sz="1800">
+                <a:latin typeface="맑은 고딕" charset="0"/>
+                <a:ea typeface="맑은 고딕" charset="0"/>
+              </a:rPr>
+              <a:t>Content Type을 </a:t>
             </a:r>
             <a:r>
               <a:rPr lang="ko-KR" sz="1800">
@@ -8124,8 +8294,8 @@
         </p:nvSpPr>
         <p:spPr>
           <a:xfrm rot="0">
-            <a:off x="6870065" y="4053205"/>
-            <a:ext cx="4153535" cy="1784985"/>
+            <a:off x="6861810" y="4368800"/>
+            <a:ext cx="4154170" cy="1784985"/>
           </a:xfrm>
           <a:prstGeom prst="rect"/>
           <a:noFill/>
@@ -8152,7 +8322,27 @@
                 <a:latin typeface="맑은 고딕" charset="0"/>
                 <a:ea typeface="맑은 고딕" charset="0"/>
               </a:rPr>
-              <a:t>21.</a:t>
+              <a:t>2</a:t>
+            </a:r>
+            <a:r>
+              <a:rPr lang="ko-KR" sz="2000" b="1">
+                <a:solidFill>
+                  <a:srgbClr val="0611F2"/>
+                </a:solidFill>
+                <a:latin typeface="맑은 고딕" charset="0"/>
+                <a:ea typeface="맑은 고딕" charset="0"/>
+              </a:rPr>
+              <a:t>3</a:t>
+            </a:r>
+            <a:r>
+              <a:rPr lang="ko-KR" sz="2000" b="1">
+                <a:solidFill>
+                  <a:srgbClr val="0611F2"/>
+                </a:solidFill>
+                <a:latin typeface="맑은 고딕" charset="0"/>
+                <a:ea typeface="맑은 고딕" charset="0"/>
+              </a:rPr>
+              <a:t>.</a:t>
             </a:r>
             <a:r>
               <a:rPr lang="ko-KR" sz="2000">
@@ -8169,7 +8359,21 @@
                 <a:latin typeface="맑은 고딕" charset="0"/>
                 <a:ea typeface="맑은 고딕" charset="0"/>
               </a:rPr>
-              <a:t>그리고 빈 게임 오브젝트 생성하고 이름을 Photon Setting으로 설정합니다.</a:t>
+              <a:t>그리고 빈 게임 오브젝트 생성</a:t>
+            </a:r>
+            <a:r>
+              <a:rPr lang="ko-KR" sz="1800">
+                <a:latin typeface="맑은 고딕" charset="0"/>
+                <a:ea typeface="맑은 고딕" charset="0"/>
+              </a:rPr>
+              <a:t>한 다음</a:t>
+            </a:r>
+            <a:r>
+              <a:rPr lang="ko-KR" sz="1800">
+                <a:latin typeface="맑은 고딕" charset="0"/>
+                <a:ea typeface="맑은 고딕" charset="0"/>
+              </a:rPr>
+              <a:t> 이름을 Photon Setting으로 설정합니다.</a:t>
             </a:r>
             <a:endParaRPr lang="ko-KR" altLang="en-US" sz="1800">
               <a:latin typeface="맑은 고딕" charset="0"/>
@@ -8196,7 +8400,14 @@
                 <a:latin typeface="맑은 고딕" charset="0"/>
                 <a:ea typeface="맑은 고딕" charset="0"/>
               </a:rPr>
-              <a:t>그리고 PhotonSetting이라는 스크립트를 생성하고 넣어줍니다.</a:t>
+              <a:t>마지막으로</a:t>
+            </a:r>
+            <a:r>
+              <a:rPr lang="ko-KR" sz="1800">
+                <a:latin typeface="맑은 고딕" charset="0"/>
+                <a:ea typeface="맑은 고딕" charset="0"/>
+              </a:rPr>
+              <a:t> PhotonSetting이라는 스크립트를 생성하고 넣어줍니다.</a:t>
             </a:r>
             <a:endParaRPr lang="ko-KR" altLang="en-US" sz="1800">
               <a:latin typeface="맑은 고딕" charset="0"/>
@@ -8207,17 +8418,17 @@
       </p:sp>
       <p:pic>
         <p:nvPicPr>
-          <p:cNvPr id="59" name="그림 32"/>
+          <p:cNvPr id="59" name="그림 32" descr="C:/Users/Admin1/AppData/Roaming/PolarisOffice/ETemp/2936_21704408/fImage241662822391.png"/>
           <p:cNvPicPr>
             <a:picLocks noChangeAspect="1"/>
           </p:cNvPicPr>
           <p:nvPr/>
         </p:nvPicPr>
         <p:blipFill rotWithShape="1">
-          <a:blip r:embed="rId2" cstate="print">
+          <a:blip r:embed="rId2" cstate="hqprint">
             <a:extLst>
               <a:ext uri="{28A0092B-C50C-407E-A947-70E740481C1C}">
-                <a14:useLocalDpi xmlns:a14="http://schemas.microsoft.com/office/drawing/2010/main" val="0"/>
+                <a14:useLocalDpi xmlns:a14="http://schemas.microsoft.com/office/drawing/2010/main"/>
               </a:ext>
             </a:extLst>
           </a:blip>
@@ -8228,7 +8439,7 @@
         <p:spPr>
           <a:xfrm rot="0">
             <a:off x="2950845" y="1336675"/>
-            <a:ext cx="2409825" cy="3340100"/>
+            <a:ext cx="2411730" cy="3701415"/>
           </a:xfrm>
           <a:prstGeom prst="rect"/>
           <a:noFill/>
@@ -8236,36 +8447,7 @@
       </p:pic>
       <p:pic>
         <p:nvPicPr>
-          <p:cNvPr id="60" name="그림 35"/>
-          <p:cNvPicPr>
-            <a:picLocks noChangeAspect="1"/>
-          </p:cNvPicPr>
-          <p:nvPr/>
-        </p:nvPicPr>
-        <p:blipFill rotWithShape="1">
-          <a:blip r:embed="rId3" cstate="print">
-            <a:extLst>
-              <a:ext uri="{28A0092B-C50C-407E-A947-70E740481C1C}">
-                <a14:useLocalDpi xmlns:a14="http://schemas.microsoft.com/office/drawing/2010/main" val="0"/>
-              </a:ext>
-            </a:extLst>
-          </a:blip>
-          <a:stretch>
-            <a:fillRect/>
-          </a:stretch>
-        </p:blipFill>
-        <p:spPr>
-          <a:xfrm rot="0">
-            <a:off x="1204595" y="1331595"/>
-            <a:ext cx="1505585" cy="3335655"/>
-          </a:xfrm>
-          <a:prstGeom prst="rect"/>
-          <a:noFill/>
-        </p:spPr>
-      </p:pic>
-      <p:pic>
-        <p:nvPicPr>
-          <p:cNvPr id="61" name="그림 37"/>
+          <p:cNvPr id="61" name="그림 37" descr="C:/Users/Admin1/AppData/Roaming/PolarisOffice/ETemp/2936_21704408/fImage330252883902.png"/>
           <p:cNvPicPr>
             <a:picLocks noChangeAspect="1"/>
           </p:cNvPicPr>
@@ -8285,8 +8467,8 @@
         </p:blipFill>
         <p:spPr>
           <a:xfrm rot="0">
-            <a:off x="6863715" y="1329690"/>
-            <a:ext cx="1891665" cy="2559685"/>
+            <a:off x="6863715" y="1338580"/>
+            <a:ext cx="2347595" cy="2884805"/>
           </a:xfrm>
           <a:prstGeom prst="roundRect"/>
           <a:solidFill>
@@ -8296,14 +8478,45 @@
       </p:pic>
       <p:pic>
         <p:nvPicPr>
-          <p:cNvPr id="62" name="그림 38"/>
+          <p:cNvPr id="62" name="그림 38" descr="C:/Users/Admin1/AppData/Roaming/PolarisOffice/ETemp/2936_21704408/fImage2273289153.png"/>
           <p:cNvPicPr>
             <a:picLocks noChangeAspect="1"/>
           </p:cNvPicPr>
           <p:nvPr/>
         </p:nvPicPr>
         <p:blipFill rotWithShape="1">
-          <a:blip r:embed="rId5" cstate="print">
+          <a:blip r:embed="rId5" cstate="hqprint">
+            <a:extLst>
+              <a:ext uri="{28A0092B-C50C-407E-A947-70E740481C1C}">
+                <a14:useLocalDpi xmlns:a14="http://schemas.microsoft.com/office/drawing/2010/main"/>
+              </a:ext>
+            </a:extLst>
+          </a:blip>
+          <a:stretch>
+            <a:fillRect/>
+          </a:stretch>
+        </p:blipFill>
+        <p:spPr>
+          <a:xfrm rot="0">
+            <a:off x="9876155" y="3516630"/>
+            <a:ext cx="699135" cy="705485"/>
+          </a:xfrm>
+          <a:prstGeom prst="roundRect"/>
+          <a:solidFill>
+            <a:srgbClr val="EDEDED"/>
+          </a:solidFill>
+        </p:spPr>
+      </p:pic>
+      <p:pic>
+        <p:nvPicPr>
+          <p:cNvPr id="65" name="그림 11" descr="C:/Users/Admin1/AppData/Roaming/PolarisOffice/ETemp/2936_21704408/fImage90882266334.png"/>
+          <p:cNvPicPr>
+            <a:picLocks noChangeAspect="1"/>
+          </p:cNvPicPr>
+          <p:nvPr/>
+        </p:nvPicPr>
+        <p:blipFill rotWithShape="1">
+          <a:blip r:embed="rId8" cstate="print">
             <a:extLst>
               <a:ext uri="{28A0092B-C50C-407E-A947-70E740481C1C}">
                 <a14:useLocalDpi xmlns:a14="http://schemas.microsoft.com/office/drawing/2010/main" val="0"/>
@@ -8316,8 +8529,8 @@
         </p:blipFill>
         <p:spPr>
           <a:xfrm rot="0">
-            <a:off x="9620250" y="3100070"/>
-            <a:ext cx="890270" cy="796925"/>
+            <a:off x="1233170" y="1812290"/>
+            <a:ext cx="1562735" cy="2752090"/>
           </a:xfrm>
           <a:prstGeom prst="roundRect"/>
           <a:solidFill>
@@ -8327,14 +8540,14 @@
       </p:pic>
       <p:pic>
         <p:nvPicPr>
-          <p:cNvPr id="63" name="그림 42"/>
+          <p:cNvPr id="66" name="그림 14" descr="C:/Users/Admin1/AppData/Roaming/PolarisOffice/ETemp/2936_21704408/fImage97242276500.png"/>
           <p:cNvPicPr>
             <a:picLocks noChangeAspect="1"/>
           </p:cNvPicPr>
           <p:nvPr/>
         </p:nvPicPr>
         <p:blipFill rotWithShape="1">
-          <a:blip r:embed="rId6" cstate="print">
+          <a:blip r:embed="rId9" cstate="print">
             <a:extLst>
               <a:ext uri="{28A0092B-C50C-407E-A947-70E740481C1C}">
                 <a14:useLocalDpi xmlns:a14="http://schemas.microsoft.com/office/drawing/2010/main" val="0"/>
@@ -8347,8 +8560,8 @@
         </p:blipFill>
         <p:spPr>
           <a:xfrm rot="0">
-            <a:off x="9170035" y="1331595"/>
-            <a:ext cx="1784350" cy="1390015"/>
+            <a:off x="9427210" y="1341755"/>
+            <a:ext cx="1588135" cy="1818005"/>
           </a:xfrm>
           <a:prstGeom prst="roundRect"/>
           <a:solidFill>
@@ -8358,17 +8571,17 @@
       </p:pic>
       <p:cxnSp>
         <p:nvCxnSpPr>
-          <p:cNvPr id="64" name="도형 45"/>
+          <p:cNvPr id="67" name="도형 17"/>
           <p:cNvCxnSpPr>
             <a:stCxn id="62" idx="0"/>
-            <a:endCxn id="63" idx="2"/>
+            <a:endCxn id="66" idx="2"/>
           </p:cNvCxnSpPr>
           <p:nvPr/>
         </p:nvCxnSpPr>
         <p:spPr>
           <a:xfrm rot="0" flipH="1" flipV="1">
-            <a:off x="10061575" y="2720975"/>
-            <a:ext cx="3810" cy="379730"/>
+            <a:off x="10220960" y="3159125"/>
+            <a:ext cx="5080" cy="358140"/>
           </a:xfrm>
           <a:prstGeom prst="straightConnector1"/>
           <a:ln w="6350" cap="flat" cmpd="sng">
@@ -8544,8 +8757,8 @@
         </p:nvSpPr>
         <p:spPr>
           <a:xfrm rot="0">
-            <a:off x="1229995" y="4734560"/>
-            <a:ext cx="4130675" cy="954405"/>
+            <a:off x="1229995" y="3903345"/>
+            <a:ext cx="4124325" cy="2338705"/>
           </a:xfrm>
           <a:prstGeom prst="rect"/>
           <a:noFill/>
@@ -8572,7 +8785,27 @@
                 <a:latin typeface="맑은 고딕" charset="0"/>
                 <a:ea typeface="맑은 고딕" charset="0"/>
               </a:rPr>
-              <a:t>22.</a:t>
+              <a:t>2</a:t>
+            </a:r>
+            <a:r>
+              <a:rPr lang="ko-KR" sz="2000" b="1">
+                <a:solidFill>
+                  <a:srgbClr val="0611F2"/>
+                </a:solidFill>
+                <a:latin typeface="맑은 고딕" charset="0"/>
+                <a:ea typeface="맑은 고딕" charset="0"/>
+              </a:rPr>
+              <a:t>4</a:t>
+            </a:r>
+            <a:r>
+              <a:rPr lang="ko-KR" sz="2000" b="1">
+                <a:solidFill>
+                  <a:srgbClr val="0611F2"/>
+                </a:solidFill>
+                <a:latin typeface="맑은 고딕" charset="0"/>
+                <a:ea typeface="맑은 고딕" charset="0"/>
+              </a:rPr>
+              <a:t>.</a:t>
             </a:r>
             <a:r>
               <a:rPr lang="ko-KR" sz="2000">
@@ -8589,25 +8822,266 @@
                 <a:latin typeface="맑은 고딕" charset="0"/>
                 <a:ea typeface="맑은 고딕" charset="0"/>
               </a:rPr>
-              <a:t>Photon Setting 스크립트에서 입 력을 받기 위해 InputField 변수를 여러 개 생성합니다.</a:t>
+              <a:t>그런 다음 P</a:t>
+            </a:r>
+            <a:r>
+              <a:rPr lang="ko-KR" sz="1800">
+                <a:latin typeface="맑은 고딕" charset="0"/>
+                <a:ea typeface="맑은 고딕" charset="0"/>
+              </a:rPr>
+              <a:t>hotonSetting</a:t>
+            </a:r>
+            <a:r>
+              <a:rPr lang="ko-KR" sz="1800">
+                <a:latin typeface="맑은 고딕" charset="0"/>
+                <a:ea typeface="맑은 고딕" charset="0"/>
+              </a:rPr>
+              <a:t> 스크립트</a:t>
+            </a:r>
+            <a:r>
+              <a:rPr lang="ko-KR" sz="1800">
+                <a:latin typeface="맑은 고딕" charset="0"/>
+                <a:ea typeface="맑은 고딕" charset="0"/>
+              </a:rPr>
+              <a:t>에서</a:t>
+            </a:r>
+            <a:r>
+              <a:rPr lang="ko-KR" sz="1800">
+                <a:latin typeface="맑은 고딕" charset="0"/>
+                <a:ea typeface="맑은 고딕" charset="0"/>
+              </a:rPr>
+              <a:t> MonoBehaviourPunCallbacks 클래스를 상속받도록 설정합니다.</a:t>
             </a:r>
             <a:endParaRPr lang="ko-KR" altLang="en-US" sz="1800">
               <a:latin typeface="맑은 고딕" charset="0"/>
               <a:ea typeface="맑은 고딕" charset="0"/>
             </a:endParaRPr>
           </a:p>
+          <a:p>
+            <a:pPr marL="0" indent="0" rtl="0" algn="l" defTabSz="914400" eaLnBrk="1" latinLnBrk="0" hangingPunct="1">
+              <a:buFontTx/>
+              <a:buNone/>
+            </a:pPr>
+            <a:endParaRPr lang="ko-KR" altLang="en-US" sz="1800">
+              <a:latin typeface="맑은 고딕" charset="0"/>
+              <a:ea typeface="맑은 고딕" charset="0"/>
+            </a:endParaRPr>
+          </a:p>
+          <a:p>
+            <a:pPr marL="0" indent="0" rtl="0" algn="l" defTabSz="914400" eaLnBrk="1" latinLnBrk="0" hangingPunct="1">
+              <a:buFontTx/>
+              <a:buNone/>
+            </a:pPr>
+            <a:r>
+              <a:rPr lang="ko-KR" sz="1800">
+                <a:latin typeface="맑은 고딕" charset="0"/>
+                <a:ea typeface="맑은 고딕" charset="0"/>
+              </a:rPr>
+              <a:t>그다음으로 InputField 변수를 3개 선언하고 DropDown 변수를 선언합니다.</a:t>
+            </a:r>
+            <a:endParaRPr lang="ko-KR" altLang="en-US" sz="1800">
+              <a:latin typeface="맑은 고딕" charset="0"/>
+              <a:ea typeface="맑은 고딕" charset="0"/>
+            </a:endParaRPr>
+          </a:p>
+        </p:txBody>
+      </p:sp>
+      <p:sp>
+        <p:nvSpPr>
+          <p:cNvPr id="57" name="텍스트 상자 59"/>
+          <p:cNvSpPr txBox="1">
+            <a:spLocks/>
+          </p:cNvSpPr>
+          <p:nvPr/>
+        </p:nvSpPr>
+        <p:spPr>
+          <a:xfrm rot="0">
+            <a:off x="6555105" y="4178300"/>
+            <a:ext cx="4201160" cy="2061845"/>
+          </a:xfrm>
+          <a:prstGeom prst="rect"/>
+          <a:noFill/>
+          <a:ln w="0">
+            <a:noFill/>
+            <a:prstDash/>
+          </a:ln>
+        </p:spPr>
+        <p:txBody>
+          <a:bodyPr wrap="square" lIns="89535" tIns="46355" rIns="89535" bIns="46355" numCol="1" vert="horz" anchor="t">
+            <a:spAutoFit/>
+          </a:bodyPr>
+          <a:lstStyle/>
+          <a:p>
+            <a:pPr marL="0" indent="0" rtl="0" algn="l" defTabSz="914400" eaLnBrk="1" latinLnBrk="0" hangingPunct="1">
+              <a:buFontTx/>
+              <a:buNone/>
+            </a:pPr>
+            <a:r>
+              <a:rPr lang="ko-KR" sz="2000" b="1">
+                <a:solidFill>
+                  <a:srgbClr val="0611F2"/>
+                </a:solidFill>
+                <a:latin typeface="맑은 고딕" charset="0"/>
+                <a:ea typeface="맑은 고딕" charset="0"/>
+              </a:rPr>
+              <a:t>2</a:t>
+            </a:r>
+            <a:r>
+              <a:rPr lang="ko-KR" sz="2000" b="1">
+                <a:solidFill>
+                  <a:srgbClr val="0611F2"/>
+                </a:solidFill>
+                <a:latin typeface="맑은 고딕" charset="0"/>
+                <a:ea typeface="맑은 고딕" charset="0"/>
+              </a:rPr>
+              <a:t>5</a:t>
+            </a:r>
+            <a:r>
+              <a:rPr lang="ko-KR" sz="2000" b="1">
+                <a:solidFill>
+                  <a:srgbClr val="0611F2"/>
+                </a:solidFill>
+                <a:latin typeface="맑은 고딕" charset="0"/>
+                <a:ea typeface="맑은 고딕" charset="0"/>
+              </a:rPr>
+              <a:t>. </a:t>
+            </a:r>
+            <a:r>
+              <a:rPr lang="ko-KR" sz="1800">
+                <a:latin typeface="맑은 고딕" charset="0"/>
+                <a:ea typeface="맑은 고딕" charset="0"/>
+              </a:rPr>
+              <a:t>이제</a:t>
+            </a:r>
+            <a:r>
+              <a:rPr lang="ko-KR" sz="1800">
+                <a:latin typeface="맑은 고딕" charset="0"/>
+                <a:ea typeface="맑은 고딕" charset="0"/>
+              </a:rPr>
+              <a:t> </a:t>
+            </a:r>
+            <a:r>
+              <a:rPr lang="ko-KR" sz="1800">
+                <a:latin typeface="맑은 고딕" charset="0"/>
+                <a:ea typeface="맑은 고딕" charset="0"/>
+              </a:rPr>
+              <a:t>LoginSuccess( ) 함수를 생성하고 </a:t>
+            </a:r>
+            <a:r>
+              <a:rPr lang="ko-KR" sz="1800">
+                <a:latin typeface="맑은 고딕" charset="0"/>
+                <a:ea typeface="맑은 고딕" charset="0"/>
+              </a:rPr>
+              <a:t>게임 버전과 지역 그리고 유저 이름을 설정</a:t>
+            </a:r>
+            <a:r>
+              <a:rPr lang="ko-KR" sz="1800">
+                <a:latin typeface="맑은 고딕" charset="0"/>
+                <a:ea typeface="맑은 고딕" charset="0"/>
+              </a:rPr>
+              <a:t>합니다.</a:t>
+            </a:r>
+            <a:endParaRPr lang="ko-KR" altLang="en-US" sz="1800">
+              <a:latin typeface="맑은 고딕" charset="0"/>
+              <a:ea typeface="맑은 고딕" charset="0"/>
+            </a:endParaRPr>
+          </a:p>
+          <a:p>
+            <a:pPr marL="0" indent="0" rtl="0" algn="l" defTabSz="914400" eaLnBrk="1" latinLnBrk="0" hangingPunct="1">
+              <a:buFontTx/>
+              <a:buNone/>
+            </a:pPr>
+            <a:endParaRPr lang="ko-KR" altLang="en-US" sz="1800">
+              <a:latin typeface="맑은 고딕" charset="0"/>
+              <a:ea typeface="맑은 고딕" charset="0"/>
+            </a:endParaRPr>
+          </a:p>
+          <a:p>
+            <a:pPr marL="0" indent="0" rtl="0" algn="l" defTabSz="914400" eaLnBrk="1" latinLnBrk="0" hangingPunct="1">
+              <a:buFontTx/>
+              <a:buNone/>
+            </a:pPr>
+            <a:r>
+              <a:rPr lang="ko-KR" sz="1800">
+                <a:latin typeface="맑은 고딕" charset="0"/>
+                <a:ea typeface="맑은 고딕" charset="0"/>
+              </a:rPr>
+              <a:t>그다음 로그인 절차가 성공적으로 되었다면</a:t>
+            </a:r>
+            <a:r>
+              <a:rPr lang="ko-KR" sz="1800">
+                <a:latin typeface="맑은 고딕" charset="0"/>
+                <a:ea typeface="맑은 고딕" charset="0"/>
+              </a:rPr>
+              <a:t> </a:t>
+            </a:r>
+            <a:r>
+              <a:rPr lang="ko-KR" sz="1800">
+                <a:latin typeface="맑은 고딕" charset="0"/>
+                <a:ea typeface="맑은 고딕" charset="0"/>
+              </a:rPr>
+              <a:t>Photon Lobby 씬으로</a:t>
+            </a:r>
+            <a:r>
+              <a:rPr lang="ko-KR" sz="1800">
+                <a:latin typeface="맑은 고딕" charset="0"/>
+                <a:ea typeface="맑은 고딕" charset="0"/>
+              </a:rPr>
+              <a:t> 이동</a:t>
+            </a:r>
+            <a:r>
+              <a:rPr lang="ko-KR" sz="1800">
+                <a:latin typeface="맑은 고딕" charset="0"/>
+                <a:ea typeface="맑은 고딕" charset="0"/>
+              </a:rPr>
+              <a:t>하도록 설정합니다.</a:t>
+            </a:r>
+            <a:endParaRPr lang="ko-KR" altLang="en-US" sz="1800">
+              <a:latin typeface="맑은 고딕" charset="0"/>
+              <a:ea typeface="맑은 고딕" charset="0"/>
+            </a:endParaRPr>
+          </a:p>
         </p:txBody>
       </p:sp>
       <p:pic>
         <p:nvPicPr>
-          <p:cNvPr id="55" name="그림 46"/>
+          <p:cNvPr id="58" name="그림 60" descr="C:/Users/Admin1/AppData/Roaming/PolarisOffice/ETemp/2936_21704408/fImage673483268716.png"/>
           <p:cNvPicPr>
             <a:picLocks noChangeAspect="1"/>
           </p:cNvPicPr>
           <p:nvPr/>
         </p:nvPicPr>
         <p:blipFill rotWithShape="1">
-          <a:blip r:embed="rId2" cstate="print">
+          <a:blip r:embed="rId4" cstate="hqprint">
+            <a:extLst>
+              <a:ext uri="{28A0092B-C50C-407E-A947-70E740481C1C}">
+                <a14:useLocalDpi xmlns:a14="http://schemas.microsoft.com/office/drawing/2010/main"/>
+              </a:ext>
+            </a:extLst>
+          </a:blip>
+          <a:stretch>
+            <a:fillRect/>
+          </a:stretch>
+        </p:blipFill>
+        <p:spPr>
+          <a:xfrm rot="0">
+            <a:off x="6563995" y="1404620"/>
+            <a:ext cx="4193540" cy="2669540"/>
+          </a:xfrm>
+          <a:prstGeom prst="rect"/>
+          <a:noFill/>
+        </p:spPr>
+      </p:pic>
+      <p:pic>
+        <p:nvPicPr>
+          <p:cNvPr id="59" name="그림 21" descr="C:/Users/Admin1/AppData/Roaming/PolarisOffice/ETemp/2936_21704408/fImage621232309169.png"/>
+          <p:cNvPicPr>
+            <a:picLocks noChangeAspect="1"/>
+          </p:cNvPicPr>
+          <p:nvPr/>
+        </p:nvPicPr>
+        <p:blipFill rotWithShape="1">
+          <a:blip r:embed="rId6" cstate="print">
             <a:extLst>
               <a:ext uri="{28A0092B-C50C-407E-A947-70E740481C1C}">
                 <a14:useLocalDpi xmlns:a14="http://schemas.microsoft.com/office/drawing/2010/main" val="0"/>
@@ -8620,124 +9094,8 @@
         </p:blipFill>
         <p:spPr>
           <a:xfrm rot="0">
-            <a:off x="1229360" y="3281680"/>
-            <a:ext cx="4122420" cy="1256665"/>
-          </a:xfrm>
-          <a:prstGeom prst="roundRect"/>
-          <a:solidFill>
-            <a:srgbClr val="EDEDED"/>
-          </a:solidFill>
-        </p:spPr>
-      </p:pic>
-      <p:pic>
-        <p:nvPicPr>
-          <p:cNvPr id="56" name="그림 49"/>
-          <p:cNvPicPr>
-            <a:picLocks noChangeAspect="1"/>
-          </p:cNvPicPr>
-          <p:nvPr/>
-        </p:nvPicPr>
-        <p:blipFill rotWithShape="1">
-          <a:blip r:embed="rId3" cstate="print">
-            <a:extLst>
-              <a:ext uri="{28A0092B-C50C-407E-A947-70E740481C1C}">
-                <a14:useLocalDpi xmlns:a14="http://schemas.microsoft.com/office/drawing/2010/main" val="0"/>
-              </a:ext>
-            </a:extLst>
-          </a:blip>
-          <a:stretch>
-            <a:fillRect/>
-          </a:stretch>
-        </p:blipFill>
-        <p:spPr>
-          <a:xfrm rot="0">
-            <a:off x="1229360" y="1393190"/>
-            <a:ext cx="4140200" cy="1586230"/>
-          </a:xfrm>
-          <a:prstGeom prst="roundRect"/>
-          <a:solidFill>
-            <a:srgbClr val="EDEDED"/>
-          </a:solidFill>
-        </p:spPr>
-      </p:pic>
-      <p:sp>
-        <p:nvSpPr>
-          <p:cNvPr id="57" name="텍스트 상자 59"/>
-          <p:cNvSpPr txBox="1">
-            <a:spLocks/>
-          </p:cNvSpPr>
-          <p:nvPr/>
-        </p:nvSpPr>
-        <p:spPr>
-          <a:xfrm rot="0">
-            <a:off x="6555105" y="4460875"/>
-            <a:ext cx="4200525" cy="1231265"/>
-          </a:xfrm>
-          <a:prstGeom prst="rect"/>
-          <a:noFill/>
-          <a:ln w="0">
-            <a:noFill/>
-            <a:prstDash/>
-          </a:ln>
-        </p:spPr>
-        <p:txBody>
-          <a:bodyPr wrap="square" lIns="89535" tIns="46355" rIns="89535" bIns="46355" numCol="1" vert="horz" anchor="t">
-            <a:spAutoFit/>
-          </a:bodyPr>
-          <a:lstStyle/>
-          <a:p>
-            <a:pPr marL="0" indent="0" rtl="0" algn="l" defTabSz="914400" eaLnBrk="1" latinLnBrk="0" hangingPunct="1">
-              <a:buFontTx/>
-              <a:buNone/>
-            </a:pPr>
-            <a:r>
-              <a:rPr lang="ko-KR" sz="2000" b="1">
-                <a:solidFill>
-                  <a:srgbClr val="0611F2"/>
-                </a:solidFill>
-                <a:latin typeface="맑은 고딕" charset="0"/>
-                <a:ea typeface="맑은 고딕" charset="0"/>
-              </a:rPr>
-              <a:t>23. </a:t>
-            </a:r>
-            <a:r>
-              <a:rPr lang="ko-KR" sz="1800">
-                <a:latin typeface="맑은 고딕" charset="0"/>
-                <a:ea typeface="맑은 고딕" charset="0"/>
-              </a:rPr>
-              <a:t>그다음 로그인이 성공했을 때 게임 버전과 지역 그리고 유저 이름을 설정하고 씬을 이동할 수 있는 함수를 생성합니다.</a:t>
-            </a:r>
-            <a:endParaRPr lang="ko-KR" altLang="en-US" sz="1800">
-              <a:latin typeface="맑은 고딕" charset="0"/>
-              <a:ea typeface="맑은 고딕" charset="0"/>
-            </a:endParaRPr>
-          </a:p>
-        </p:txBody>
-      </p:sp>
-      <p:pic>
-        <p:nvPicPr>
-          <p:cNvPr id="58" name="그림 60"/>
-          <p:cNvPicPr>
-            <a:picLocks noChangeAspect="1"/>
-          </p:cNvPicPr>
-          <p:nvPr/>
-        </p:nvPicPr>
-        <p:blipFill rotWithShape="1">
-          <a:blip r:embed="rId4" cstate="print">
-            <a:extLst>
-              <a:ext uri="{28A0092B-C50C-407E-A947-70E740481C1C}">
-                <a14:useLocalDpi xmlns:a14="http://schemas.microsoft.com/office/drawing/2010/main" val="0"/>
-              </a:ext>
-            </a:extLst>
-          </a:blip>
-          <a:stretch>
-            <a:fillRect/>
-          </a:stretch>
-        </p:blipFill>
-        <p:spPr>
-          <a:xfrm rot="0">
-            <a:off x="6563995" y="1343025"/>
-            <a:ext cx="4192905" cy="2943860"/>
+            <a:off x="1231265" y="1404620"/>
+            <a:ext cx="4131310" cy="2419985"/>
           </a:xfrm>
           <a:prstGeom prst="rect"/>
           <a:noFill/>
@@ -8895,8 +9253,8 @@
         </p:nvSpPr>
         <p:spPr>
           <a:xfrm rot="0">
-            <a:off x="6797675" y="3568065"/>
-            <a:ext cx="4140200" cy="2616200"/>
+            <a:off x="6816725" y="3858895"/>
+            <a:ext cx="4157345" cy="2338705"/>
           </a:xfrm>
           <a:prstGeom prst="rect"/>
           <a:noFill/>
@@ -8923,7 +9281,27 @@
                 <a:latin typeface="맑은 고딕" charset="0"/>
                 <a:ea typeface="맑은 고딕" charset="0"/>
               </a:rPr>
-              <a:t>25.</a:t>
+              <a:t>2</a:t>
+            </a:r>
+            <a:r>
+              <a:rPr lang="ko-KR" sz="2000" b="1">
+                <a:solidFill>
+                  <a:srgbClr val="0611F2"/>
+                </a:solidFill>
+                <a:latin typeface="맑은 고딕" charset="0"/>
+                <a:ea typeface="맑은 고딕" charset="0"/>
+              </a:rPr>
+              <a:t>7</a:t>
+            </a:r>
+            <a:r>
+              <a:rPr lang="ko-KR" sz="2000" b="1">
+                <a:solidFill>
+                  <a:srgbClr val="0611F2"/>
+                </a:solidFill>
+                <a:latin typeface="맑은 고딕" charset="0"/>
+                <a:ea typeface="맑은 고딕" charset="0"/>
+              </a:rPr>
+              <a:t>.</a:t>
             </a:r>
             <a:r>
               <a:rPr lang="ko-KR" sz="2000">
@@ -8940,7 +9318,35 @@
                 <a:latin typeface="맑은 고딕" charset="0"/>
                 <a:ea typeface="맑은 고딕" charset="0"/>
               </a:rPr>
-              <a:t>그다음 회원가입을 하기 위한 함수를 생성하고 RegisterPlayFabUserRequest 클래스에서 Email과 비밀번호 그리고 유저 이름을 입력해서 저장합니다.</a:t>
+              <a:t>그다음</a:t>
+            </a:r>
+            <a:r>
+              <a:rPr lang="ko-KR" sz="1800">
+                <a:latin typeface="맑은 고딕" charset="0"/>
+                <a:ea typeface="맑은 고딕" charset="0"/>
+              </a:rPr>
+              <a:t>으로</a:t>
+            </a:r>
+            <a:r>
+              <a:rPr lang="ko-KR" sz="1800">
+                <a:latin typeface="맑은 고딕" charset="0"/>
+                <a:ea typeface="맑은 고딕" charset="0"/>
+              </a:rPr>
+              <a:t> </a:t>
+            </a:r>
+            <a:r>
+              <a:rPr lang="ko-KR" sz="1800">
+                <a:latin typeface="맑은 고딕" charset="0"/>
+                <a:ea typeface="맑은 고딕" charset="0"/>
+              </a:rPr>
+              <a:t>SignUp( ) 함수를</a:t>
+            </a:r>
+            <a:r>
+              <a:rPr lang="ko-KR" sz="1800">
+                <a:latin typeface="맑은 고딕" charset="0"/>
+                <a:ea typeface="맑은 고딕" charset="0"/>
+              </a:rPr>
+              <a:t> 생성하고 RegisterPlayFabUserRequest 클래스에서 Email과 비밀번호 그리고 유저 이름을 입력해서 저장합니다.</a:t>
             </a:r>
             <a:endParaRPr lang="ko-KR" altLang="en-US" sz="1800">
               <a:latin typeface="맑은 고딕" charset="0"/>
@@ -8967,7 +9373,21 @@
                 <a:latin typeface="맑은 고딕" charset="0"/>
                 <a:ea typeface="맑은 고딕" charset="0"/>
               </a:rPr>
-              <a:t>그런 다음 RegosterPlayFabUser 라는 함수에서 회원가입의 여부를 확인합니다.</a:t>
+              <a:t>그런 다음 Reg</a:t>
+            </a:r>
+            <a:r>
+              <a:rPr lang="ko-KR" sz="1800">
+                <a:latin typeface="맑은 고딕" charset="0"/>
+                <a:ea typeface="맑은 고딕" charset="0"/>
+              </a:rPr>
+              <a:t>i</a:t>
+            </a:r>
+            <a:r>
+              <a:rPr lang="ko-KR" sz="1800">
+                <a:latin typeface="맑은 고딕" charset="0"/>
+                <a:ea typeface="맑은 고딕" charset="0"/>
+              </a:rPr>
+              <a:t>sterPlayFabUser 라는 함수에서 회원가입의 여부를 확인합니다.</a:t>
             </a:r>
             <a:endParaRPr lang="ko-KR" altLang="en-US" sz="1800">
               <a:latin typeface="맑은 고딕" charset="0"/>
@@ -8976,47 +9396,18 @@
           </a:p>
         </p:txBody>
       </p:sp>
-      <p:pic>
-        <p:nvPicPr>
-          <p:cNvPr id="58" name="그림 58"/>
-          <p:cNvPicPr>
-            <a:picLocks noChangeAspect="1"/>
-          </p:cNvPicPr>
+      <p:sp>
+        <p:nvSpPr>
+          <p:cNvPr id="59" name="텍스트 상자 64"/>
+          <p:cNvSpPr txBox="1">
+            <a:spLocks/>
+          </p:cNvSpPr>
           <p:nvPr/>
-        </p:nvPicPr>
-        <p:blipFill rotWithShape="1">
-          <a:blip r:embed="rId2" cstate="hqprint">
-            <a:extLst>
-              <a:ext uri="{28A0092B-C50C-407E-A947-70E740481C1C}">
-                <a14:useLocalDpi xmlns:a14="http://schemas.microsoft.com/office/drawing/2010/main"/>
-              </a:ext>
-            </a:extLst>
-          </a:blip>
-          <a:stretch>
-            <a:fillRect/>
-          </a:stretch>
-        </p:blipFill>
-        <p:spPr>
-          <a:xfrm rot="0">
-            <a:off x="6797675" y="1395095"/>
-            <a:ext cx="4141470" cy="2105025"/>
-          </a:xfrm>
-          <a:prstGeom prst="rect"/>
-          <a:noFill/>
-        </p:spPr>
-      </p:pic>
-      <p:sp>
-        <p:nvSpPr>
-          <p:cNvPr id="59" name="텍스트 상자 64"/>
-          <p:cNvSpPr txBox="1">
-            <a:spLocks/>
-          </p:cNvSpPr>
-          <p:nvPr/>
-        </p:nvSpPr>
-        <p:spPr>
-          <a:xfrm rot="0">
+        </p:nvSpPr>
+        <p:spPr>
+          <a:xfrm>
             <a:off x="1229995" y="5235575"/>
-            <a:ext cx="4131310" cy="955040"/>
+            <a:ext cx="4131945" cy="954405"/>
           </a:xfrm>
           <a:prstGeom prst="rect"/>
           <a:noFill/>
@@ -9043,7 +9434,27 @@
                 <a:latin typeface="맑은 고딕" charset="0"/>
                 <a:ea typeface="맑은 고딕" charset="0"/>
               </a:rPr>
-              <a:t>24.</a:t>
+              <a:t>2</a:t>
+            </a:r>
+            <a:r>
+              <a:rPr lang="ko-KR" sz="2000" b="1">
+                <a:solidFill>
+                  <a:srgbClr val="0611F2"/>
+                </a:solidFill>
+                <a:latin typeface="맑은 고딕" charset="0"/>
+                <a:ea typeface="맑은 고딕" charset="0"/>
+              </a:rPr>
+              <a:t>6</a:t>
+            </a:r>
+            <a:r>
+              <a:rPr lang="ko-KR" sz="2000" b="1">
+                <a:solidFill>
+                  <a:srgbClr val="0611F2"/>
+                </a:solidFill>
+                <a:latin typeface="맑은 고딕" charset="0"/>
+                <a:ea typeface="맑은 고딕" charset="0"/>
+              </a:rPr>
+              <a:t>.</a:t>
             </a:r>
             <a:r>
               <a:rPr lang="ko-KR" sz="2000">
@@ -9093,6 +9504,35 @@
           <a:xfrm rot="0">
             <a:off x="1228090" y="1412240"/>
             <a:ext cx="4124960" cy="3700780"/>
+          </a:xfrm>
+          <a:prstGeom prst="rect"/>
+          <a:noFill/>
+        </p:spPr>
+      </p:pic>
+      <p:pic>
+        <p:nvPicPr>
+          <p:cNvPr id="61" name="그림 26" descr="C:/Users/Admin1/AppData/Roaming/PolarisOffice/ETemp/2936_21704408/fImage727162315724.png"/>
+          <p:cNvPicPr>
+            <a:picLocks noChangeAspect="1"/>
+          </p:cNvPicPr>
+          <p:nvPr/>
+        </p:nvPicPr>
+        <p:blipFill rotWithShape="1">
+          <a:blip r:embed="rId5" cstate="print">
+            <a:extLst>
+              <a:ext uri="{28A0092B-C50C-407E-A947-70E740481C1C}">
+                <a14:useLocalDpi xmlns:a14="http://schemas.microsoft.com/office/drawing/2010/main" val="0"/>
+              </a:ext>
+            </a:extLst>
+          </a:blip>
+          <a:stretch>
+            <a:fillRect/>
+          </a:stretch>
+        </p:blipFill>
+        <p:spPr>
+          <a:xfrm rot="0">
+            <a:off x="6816725" y="1413510"/>
+            <a:ext cx="4157345" cy="2344420"/>
           </a:xfrm>
           <a:prstGeom prst="rect"/>
           <a:noFill/>
@@ -9250,8 +9690,8 @@
         </p:nvSpPr>
         <p:spPr>
           <a:xfrm rot="0">
-            <a:off x="6797675" y="4789170"/>
-            <a:ext cx="4139565" cy="954405"/>
+            <a:off x="6781165" y="4398645"/>
+            <a:ext cx="4117975" cy="1784985"/>
           </a:xfrm>
           <a:prstGeom prst="rect"/>
           <a:noFill/>
@@ -9278,7 +9718,27 @@
                 <a:latin typeface="맑은 고딕" charset="0"/>
                 <a:ea typeface="맑은 고딕" charset="0"/>
               </a:rPr>
-              <a:t>27.</a:t>
+              <a:t>2</a:t>
+            </a:r>
+            <a:r>
+              <a:rPr lang="ko-KR" sz="2000" b="1">
+                <a:solidFill>
+                  <a:srgbClr val="0611F2"/>
+                </a:solidFill>
+                <a:latin typeface="맑은 고딕" charset="0"/>
+                <a:ea typeface="맑은 고딕" charset="0"/>
+              </a:rPr>
+              <a:t>9</a:t>
+            </a:r>
+            <a:r>
+              <a:rPr lang="ko-KR" sz="2000" b="1">
+                <a:solidFill>
+                  <a:srgbClr val="0611F2"/>
+                </a:solidFill>
+                <a:latin typeface="맑은 고딕" charset="0"/>
+                <a:ea typeface="맑은 고딕" charset="0"/>
+              </a:rPr>
+              <a:t>.</a:t>
             </a:r>
             <a:r>
               <a:rPr lang="ko-KR" sz="2000">
@@ -9295,13 +9755,68 @@
                 <a:latin typeface="맑은 고딕" charset="0"/>
                 <a:ea typeface="맑은 고딕" charset="0"/>
               </a:rPr>
-              <a:t>그다음 빈 게임 오브젝트(Photon Setting)에 있는 스크립트에 각각의 InputField를 넣어줍니다. </a:t>
+              <a:t>이제</a:t>
+            </a:r>
+            <a:r>
+              <a:rPr lang="ko-KR" sz="1800">
+                <a:latin typeface="맑은 고딕" charset="0"/>
+                <a:ea typeface="맑은 고딕" charset="0"/>
+              </a:rPr>
+              <a:t> Photon Setting</a:t>
+            </a:r>
+            <a:r>
+              <a:rPr lang="ko-KR" sz="1800">
+                <a:latin typeface="맑은 고딕" charset="0"/>
+                <a:ea typeface="맑은 고딕" charset="0"/>
+              </a:rPr>
+              <a:t> 오브젝트</a:t>
+            </a:r>
+            <a:r>
+              <a:rPr lang="ko-KR" sz="1800">
+                <a:latin typeface="맑은 고딕" charset="0"/>
+                <a:ea typeface="맑은 고딕" charset="0"/>
+              </a:rPr>
+              <a:t>에 있는 스크립트에 각각의 InputField</a:t>
+            </a:r>
+            <a:r>
+              <a:rPr lang="ko-KR" sz="1800">
+                <a:latin typeface="맑은 고딕" charset="0"/>
+                <a:ea typeface="맑은 고딕" charset="0"/>
+              </a:rPr>
+              <a:t>와 Dropdown 오브젝트를 넣어줍니다.</a:t>
             </a:r>
             <a:endParaRPr lang="ko-KR" altLang="en-US" sz="1800">
               <a:latin typeface="맑은 고딕" charset="0"/>
               <a:ea typeface="맑은 고딕" charset="0"/>
             </a:endParaRPr>
           </a:p>
+          <a:p>
+            <a:pPr marL="0" indent="0" rtl="0" algn="l" defTabSz="914400" eaLnBrk="1" latinLnBrk="0" hangingPunct="1">
+              <a:buFontTx/>
+              <a:buNone/>
+            </a:pPr>
+            <a:endParaRPr lang="ko-KR" altLang="en-US" sz="1800">
+              <a:latin typeface="맑은 고딕" charset="0"/>
+              <a:ea typeface="맑은 고딕" charset="0"/>
+            </a:endParaRPr>
+          </a:p>
+          <a:p>
+            <a:pPr marL="0" indent="0" rtl="0" algn="l" defTabSz="914400" eaLnBrk="1" latinLnBrk="0" hangingPunct="1">
+              <a:buFontTx/>
+              <a:buNone/>
+            </a:pPr>
+            <a:r>
+              <a:rPr lang="ko-KR" sz="1800">
+                <a:latin typeface="맑은 고딕" charset="0"/>
+                <a:ea typeface="맑은 고딕" charset="0"/>
+              </a:rPr>
+              <a:t>그다음 Photon Setting 오브젝트의 위치와 회전 값을 초기화시켜줍니다.</a:t>
+            </a:r>
+            <a:endParaRPr lang="ko-KR" altLang="en-US" sz="1800">
+              <a:latin typeface="맑은 고딕" charset="0"/>
+              <a:ea typeface="맑은 고딕" charset="0"/>
+            </a:endParaRPr>
+          </a:p>
         </p:txBody>
       </p:sp>
       <p:sp>
@@ -9314,8 +9829,8 @@
         </p:nvSpPr>
         <p:spPr>
           <a:xfrm rot="0">
-            <a:off x="1212215" y="4509135"/>
-            <a:ext cx="4148455" cy="1231265"/>
+            <a:off x="1214120" y="4126865"/>
+            <a:ext cx="4156710" cy="2061845"/>
           </a:xfrm>
           <a:prstGeom prst="rect"/>
           <a:noFill/>
@@ -9342,7 +9857,27 @@
                 <a:latin typeface="맑은 고딕" charset="0"/>
                 <a:ea typeface="맑은 고딕" charset="0"/>
               </a:rPr>
-              <a:t>26.</a:t>
+              <a:t>2</a:t>
+            </a:r>
+            <a:r>
+              <a:rPr lang="ko-KR" sz="2000" b="1">
+                <a:solidFill>
+                  <a:srgbClr val="0611F2"/>
+                </a:solidFill>
+                <a:latin typeface="맑은 고딕" charset="0"/>
+                <a:ea typeface="맑은 고딕" charset="0"/>
+              </a:rPr>
+              <a:t>8</a:t>
+            </a:r>
+            <a:r>
+              <a:rPr lang="ko-KR" sz="2000" b="1">
+                <a:solidFill>
+                  <a:srgbClr val="0611F2"/>
+                </a:solidFill>
+                <a:latin typeface="맑은 고딕" charset="0"/>
+                <a:ea typeface="맑은 고딕" charset="0"/>
+              </a:rPr>
+              <a:t>.</a:t>
             </a:r>
             <a:r>
               <a:rPr lang="ko-KR" sz="2000">
@@ -9359,25 +9894,144 @@
                 <a:latin typeface="맑은 고딕" charset="0"/>
                 <a:ea typeface="맑은 고딕" charset="0"/>
               </a:rPr>
-              <a:t>그리고 로그인에 대한 정보를 입력받고 로그인의 여부를 설정하는 LoginWithEmailAddress 라는 함수로 로그인할 수 있는 여부를 설정합니다.</a:t>
+              <a:t>마지막으로 Login( ) 함수를 생성하고 </a:t>
+            </a:r>
+            <a:r>
+              <a:rPr lang="ko-KR" sz="1800">
+                <a:latin typeface="맑은 고딕" charset="0"/>
+                <a:ea typeface="맑은 고딕" charset="0"/>
+              </a:rPr>
+              <a:t>로그인에 대한 정보를 입력받</a:t>
+            </a:r>
+            <a:r>
+              <a:rPr lang="ko-KR" sz="1800">
+                <a:latin typeface="맑은 고딕" charset="0"/>
+                <a:ea typeface="맑은 고딕" charset="0"/>
+              </a:rPr>
+              <a:t>습니다.</a:t>
             </a:r>
             <a:endParaRPr lang="ko-KR" altLang="en-US" sz="1800">
               <a:latin typeface="맑은 고딕" charset="0"/>
               <a:ea typeface="맑은 고딕" charset="0"/>
             </a:endParaRPr>
           </a:p>
+          <a:p>
+            <a:pPr marL="0" indent="0" rtl="0" algn="l" defTabSz="914400" eaLnBrk="1" latinLnBrk="0" hangingPunct="1">
+              <a:buFontTx/>
+              <a:buNone/>
+            </a:pPr>
+            <a:endParaRPr lang="ko-KR" altLang="en-US" sz="1800">
+              <a:latin typeface="맑은 고딕" charset="0"/>
+              <a:ea typeface="맑은 고딕" charset="0"/>
+            </a:endParaRPr>
+          </a:p>
+          <a:p>
+            <a:pPr marL="0" indent="0" rtl="0" algn="l" defTabSz="914400" eaLnBrk="1" latinLnBrk="0" hangingPunct="1">
+              <a:buFontTx/>
+              <a:buNone/>
+            </a:pPr>
+            <a:r>
+              <a:rPr lang="ko-KR" sz="1800">
+                <a:latin typeface="맑은 고딕" charset="0"/>
+                <a:ea typeface="맑은 고딕" charset="0"/>
+              </a:rPr>
+              <a:t>그리고</a:t>
+            </a:r>
+            <a:r>
+              <a:rPr lang="ko-KR" sz="1800">
+                <a:latin typeface="맑은 고딕" charset="0"/>
+                <a:ea typeface="맑은 고딕" charset="0"/>
+              </a:rPr>
+              <a:t> 로그인의 여부를 설정하는 LoginWithEmailAddress라는 함수로</a:t>
+            </a:r>
+            <a:r>
+              <a:rPr lang="ko-KR" sz="1800">
+                <a:latin typeface="맑은 고딕" charset="0"/>
+                <a:ea typeface="맑은 고딕" charset="0"/>
+              </a:rPr>
+              <a:t> 로그인</a:t>
+            </a:r>
+            <a:r>
+              <a:rPr lang="ko-KR" sz="1800">
+                <a:latin typeface="맑은 고딕" charset="0"/>
+                <a:ea typeface="맑은 고딕" charset="0"/>
+              </a:rPr>
+              <a:t> </a:t>
+            </a:r>
+            <a:r>
+              <a:rPr lang="ko-KR" sz="1800">
+                <a:latin typeface="맑은 고딕" charset="0"/>
+                <a:ea typeface="맑은 고딕" charset="0"/>
+              </a:rPr>
+              <a:t>인증 절차</a:t>
+            </a:r>
+            <a:r>
+              <a:rPr lang="ko-KR" sz="1800">
+                <a:latin typeface="맑은 고딕" charset="0"/>
+                <a:ea typeface="맑은 고딕" charset="0"/>
+              </a:rPr>
+              <a:t>를 </a:t>
+            </a:r>
+            <a:r>
+              <a:rPr lang="ko-KR" sz="1800">
+                <a:latin typeface="맑은 고딕" charset="0"/>
+                <a:ea typeface="맑은 고딕" charset="0"/>
+              </a:rPr>
+              <a:t>확인</a:t>
+            </a:r>
+            <a:r>
+              <a:rPr lang="ko-KR" sz="1800">
+                <a:latin typeface="맑은 고딕" charset="0"/>
+                <a:ea typeface="맑은 고딕" charset="0"/>
+              </a:rPr>
+              <a:t>합니다.</a:t>
+            </a:r>
+            <a:endParaRPr lang="ko-KR" altLang="en-US" sz="1800">
+              <a:latin typeface="맑은 고딕" charset="0"/>
+              <a:ea typeface="맑은 고딕" charset="0"/>
+            </a:endParaRPr>
+          </a:p>
         </p:txBody>
       </p:sp>
       <p:pic>
         <p:nvPicPr>
-          <p:cNvPr id="61" name="그림 63"/>
+          <p:cNvPr id="61" name="그림 63" descr="C:/Users/Admin1/AppData/Roaming/PolarisOffice/ETemp/2936_21704408/fImage341333385447.png"/>
           <p:cNvPicPr>
             <a:picLocks noChangeAspect="1"/>
           </p:cNvPicPr>
           <p:nvPr/>
         </p:nvPicPr>
         <p:blipFill rotWithShape="1">
-          <a:blip r:embed="rId2" cstate="print">
+          <a:blip r:embed="rId2" cstate="hqprint">
+            <a:extLst>
+              <a:ext uri="{28A0092B-C50C-407E-A947-70E740481C1C}">
+                <a14:useLocalDpi xmlns:a14="http://schemas.microsoft.com/office/drawing/2010/main"/>
+              </a:ext>
+            </a:extLst>
+          </a:blip>
+          <a:stretch>
+            <a:fillRect/>
+          </a:stretch>
+        </p:blipFill>
+        <p:spPr>
+          <a:xfrm rot="0">
+            <a:off x="1222375" y="1404620"/>
+            <a:ext cx="4148455" cy="2602865"/>
+          </a:xfrm>
+          <a:prstGeom prst="rect"/>
+          <a:noFill/>
+        </p:spPr>
+      </p:pic>
+      <p:pic>
+        <p:nvPicPr>
+          <p:cNvPr id="68" name="그림 27" descr="C:/Users/Admin1/AppData/Roaming/PolarisOffice/ETemp/2936_21704408/fImage98262321478.png"/>
+          <p:cNvPicPr>
+            <a:picLocks noChangeAspect="1"/>
+          </p:cNvPicPr>
+          <p:nvPr/>
+        </p:nvPicPr>
+        <p:blipFill rotWithShape="1">
+          <a:blip r:embed="rId6" cstate="print">
             <a:extLst>
               <a:ext uri="{28A0092B-C50C-407E-A947-70E740481C1C}">
                 <a14:useLocalDpi xmlns:a14="http://schemas.microsoft.com/office/drawing/2010/main" val="0"/>
@@ -9390,23 +10044,25 @@
         </p:blipFill>
         <p:spPr>
           <a:xfrm rot="0">
-            <a:off x="1219200" y="1333500"/>
-            <a:ext cx="4150360" cy="2979420"/>
-          </a:xfrm>
-          <a:prstGeom prst="rect"/>
-          <a:noFill/>
+            <a:off x="9651365" y="1762125"/>
+            <a:ext cx="1247775" cy="2129155"/>
+          </a:xfrm>
+          <a:prstGeom prst="roundRect"/>
+          <a:solidFill>
+            <a:srgbClr val="EDEDED"/>
+          </a:solidFill>
         </p:spPr>
       </p:pic>
       <p:pic>
         <p:nvPicPr>
-          <p:cNvPr id="62" name="그림 66"/>
+          <p:cNvPr id="69" name="그림 30" descr="C:/Users/Admin1/AppData/Roaming/PolarisOffice/ETemp/2936_21704408/fImage282492339358.png"/>
           <p:cNvPicPr>
             <a:picLocks noChangeAspect="1"/>
           </p:cNvPicPr>
           <p:nvPr/>
         </p:nvPicPr>
         <p:blipFill rotWithShape="1">
-          <a:blip r:embed="rId3" cstate="print">
+          <a:blip r:embed="rId7" cstate="print">
             <a:extLst>
               <a:ext uri="{28A0092B-C50C-407E-A947-70E740481C1C}">
                 <a14:useLocalDpi xmlns:a14="http://schemas.microsoft.com/office/drawing/2010/main" val="0"/>
@@ -9419,37 +10075,8 @@
         </p:blipFill>
         <p:spPr>
           <a:xfrm rot="0">
-            <a:off x="6794500" y="1335405"/>
-            <a:ext cx="2385060" cy="3373755"/>
-          </a:xfrm>
-          <a:prstGeom prst="rect"/>
-          <a:noFill/>
-        </p:spPr>
-      </p:pic>
-      <p:pic>
-        <p:nvPicPr>
-          <p:cNvPr id="63" name="그림 67"/>
-          <p:cNvPicPr>
-            <a:picLocks noChangeAspect="1"/>
-          </p:cNvPicPr>
-          <p:nvPr/>
-        </p:nvPicPr>
-        <p:blipFill rotWithShape="1">
-          <a:blip r:embed="rId4" cstate="print">
-            <a:extLst>
-              <a:ext uri="{28A0092B-C50C-407E-A947-70E740481C1C}">
-                <a14:useLocalDpi xmlns:a14="http://schemas.microsoft.com/office/drawing/2010/main" val="0"/>
-              </a:ext>
-            </a:extLst>
-          </a:blip>
-          <a:stretch>
-            <a:fillRect/>
-          </a:stretch>
-        </p:blipFill>
-        <p:spPr>
-          <a:xfrm rot="0">
-            <a:off x="9430385" y="1331595"/>
-            <a:ext cx="1505585" cy="3379470"/>
+            <a:off x="6794500" y="1396365"/>
+            <a:ext cx="2691130" cy="2852420"/>
           </a:xfrm>
           <a:prstGeom prst="rect"/>
           <a:noFill/>
@@ -9457,14 +10084,14 @@
       </p:pic>
       <p:cxnSp>
         <p:nvCxnSpPr>
-          <p:cNvPr id="64" name="도형 68"/>
+          <p:cNvPr id="70" name="도형 33"/>
           <p:cNvCxnSpPr/>
           <p:nvPr/>
         </p:nvCxnSpPr>
         <p:spPr>
           <a:xfrm rot="0" flipH="1">
-            <a:off x="9109710" y="2424430"/>
-            <a:ext cx="606425" cy="1680845"/>
+            <a:off x="9427210" y="2867660"/>
+            <a:ext cx="457835" cy="798830"/>
           </a:xfrm>
           <a:prstGeom prst="straightConnector1"/>
           <a:ln w="6350" cap="flat" cmpd="sng">
@@ -9490,14 +10117,14 @@
       </p:cxnSp>
       <p:cxnSp>
         <p:nvCxnSpPr>
-          <p:cNvPr id="65" name="도형 69"/>
+          <p:cNvPr id="71" name="도형 34"/>
           <p:cNvCxnSpPr/>
           <p:nvPr/>
         </p:nvCxnSpPr>
         <p:spPr>
           <a:xfrm rot="0" flipH="1">
-            <a:off x="9117965" y="2233930"/>
-            <a:ext cx="607060" cy="1654810"/>
+            <a:off x="9435465" y="3051175"/>
+            <a:ext cx="433070" cy="806450"/>
           </a:xfrm>
           <a:prstGeom prst="straightConnector1"/>
           <a:ln w="6350" cap="flat" cmpd="sng">
@@ -9523,14 +10150,14 @@
       </p:cxnSp>
       <p:cxnSp>
         <p:nvCxnSpPr>
-          <p:cNvPr id="66" name="도형 70"/>
+          <p:cNvPr id="72" name="도형 37"/>
           <p:cNvCxnSpPr/>
           <p:nvPr/>
         </p:nvCxnSpPr>
         <p:spPr>
           <a:xfrm rot="0" flipH="1">
-            <a:off x="9126855" y="2614930"/>
-            <a:ext cx="589280" cy="1724025"/>
+            <a:off x="9427210" y="3234055"/>
+            <a:ext cx="449580" cy="840105"/>
           </a:xfrm>
           <a:prstGeom prst="straightConnector1"/>
           <a:ln w="6350" cap="flat" cmpd="sng">
@@ -9556,14 +10183,14 @@
       </p:cxnSp>
       <p:cxnSp>
         <p:nvCxnSpPr>
-          <p:cNvPr id="67" name="도형 71"/>
+          <p:cNvPr id="73" name="도형 38"/>
           <p:cNvCxnSpPr/>
           <p:nvPr/>
         </p:nvCxnSpPr>
         <p:spPr>
           <a:xfrm rot="0" flipH="1">
-            <a:off x="9152890" y="2796540"/>
-            <a:ext cx="581025" cy="1750060"/>
+            <a:off x="9418955" y="3449955"/>
+            <a:ext cx="457835" cy="8890"/>
           </a:xfrm>
           <a:prstGeom prst="straightConnector1"/>
           <a:ln w="6350" cap="flat" cmpd="sng">
@@ -9739,8 +10366,8 @@
         </p:nvSpPr>
         <p:spPr>
           <a:xfrm rot="0">
-            <a:off x="6711315" y="4330065"/>
-            <a:ext cx="4407535" cy="954405"/>
+            <a:off x="6711315" y="5468620"/>
+            <a:ext cx="4271010" cy="677545"/>
           </a:xfrm>
           <a:prstGeom prst="rect"/>
           <a:noFill/>
@@ -9767,7 +10394,17 @@
                 <a:latin typeface="맑은 고딕" charset="0"/>
                 <a:ea typeface="맑은 고딕" charset="0"/>
               </a:rPr>
-              <a:t>27.</a:t>
+              <a:t>31</a:t>
+            </a:r>
+            <a:r>
+              <a:rPr lang="ko-KR" sz="2000" b="1">
+                <a:solidFill>
+                  <a:srgbClr val="0611F2"/>
+                </a:solidFill>
+                <a:latin typeface="맑은 고딕" charset="0"/>
+                <a:ea typeface="맑은 고딕" charset="0"/>
+              </a:rPr>
+              <a:t>.</a:t>
             </a:r>
             <a:r>
               <a:rPr lang="ko-KR" sz="2000">
@@ -9784,7 +10421,14 @@
                 <a:latin typeface="맑은 고딕" charset="0"/>
                 <a:ea typeface="맑은 고딕" charset="0"/>
               </a:rPr>
-              <a:t>그리고 함수를 추가하기 위해 PhotonSetting를 선택하시고 </a:t>
+              <a:t>그리고 PhotonSetting를 선택</a:t>
+            </a:r>
+            <a:r>
+              <a:rPr lang="ko-KR" sz="1800">
+                <a:latin typeface="맑은 고딕" charset="0"/>
+                <a:ea typeface="맑은 고딕" charset="0"/>
+              </a:rPr>
+              <a:t>하고</a:t>
             </a:r>
             <a:endParaRPr lang="ko-KR" altLang="en-US" sz="1800">
               <a:latin typeface="맑은 고딕" charset="0"/>
@@ -9830,8 +10474,8 @@
         </p:nvSpPr>
         <p:spPr>
           <a:xfrm rot="0">
-            <a:off x="1229360" y="4327525"/>
-            <a:ext cx="4148455" cy="954405"/>
+            <a:off x="1229360" y="5192395"/>
+            <a:ext cx="4116705" cy="954405"/>
           </a:xfrm>
           <a:prstGeom prst="rect"/>
           <a:noFill/>
@@ -9858,7 +10502,17 @@
                 <a:latin typeface="맑은 고딕" charset="0"/>
                 <a:ea typeface="맑은 고딕" charset="0"/>
               </a:rPr>
-              <a:t>28.</a:t>
+              <a:t>30</a:t>
+            </a:r>
+            <a:r>
+              <a:rPr lang="ko-KR" sz="2000" b="1">
+                <a:solidFill>
+                  <a:srgbClr val="0611F2"/>
+                </a:solidFill>
+                <a:latin typeface="맑은 고딕" charset="0"/>
+                <a:ea typeface="맑은 고딕" charset="0"/>
+              </a:rPr>
+              <a:t>.</a:t>
             </a:r>
             <a:r>
               <a:rPr lang="ko-KR" sz="2000">
@@ -9875,7 +10529,42 @@
                 <a:latin typeface="맑은 고딕" charset="0"/>
                 <a:ea typeface="맑은 고딕" charset="0"/>
               </a:rPr>
-              <a:t>이제 Sign Up Button이라는 버튼 컴포넌트의 On Click 함수에 Photon Setting 오브젝트를 넣어줍니다.</a:t>
+              <a:t>그런 다음</a:t>
+            </a:r>
+            <a:r>
+              <a:rPr lang="ko-KR" sz="1800">
+                <a:latin typeface="맑은 고딕" charset="0"/>
+                <a:ea typeface="맑은 고딕" charset="0"/>
+              </a:rPr>
+              <a:t> Sign Up Button</a:t>
+            </a:r>
+            <a:r>
+              <a:rPr lang="ko-KR" sz="1800">
+                <a:latin typeface="맑은 고딕" charset="0"/>
+                <a:ea typeface="맑은 고딕" charset="0"/>
+              </a:rPr>
+              <a:t> 오브젝트의</a:t>
+            </a:r>
+            <a:r>
+              <a:rPr lang="ko-KR" sz="1800">
+                <a:latin typeface="맑은 고딕" charset="0"/>
+                <a:ea typeface="맑은 고딕" charset="0"/>
+              </a:rPr>
+              <a:t> On Click</a:t>
+            </a:r>
+            <a:r>
+              <a:rPr lang="ko-KR" sz="1800">
+                <a:latin typeface="맑은 고딕" charset="0"/>
+                <a:ea typeface="맑은 고딕" charset="0"/>
+              </a:rPr>
+              <a:t>( )</a:t>
+            </a:r>
+            <a:r>
+              <a:rPr lang="ko-KR" sz="1800">
+                <a:latin typeface="맑은 고딕" charset="0"/>
+                <a:ea typeface="맑은 고딕" charset="0"/>
+              </a:rPr>
+              <a:t> 함수에 Photon Setting 오브젝트를 넣어줍니다.</a:t>
             </a:r>
             <a:endParaRPr lang="ko-KR" altLang="en-US" sz="1800">
               <a:latin typeface="맑은 고딕" charset="0"/>
@@ -9886,14 +10575,74 @@
       </p:sp>
       <p:pic>
         <p:nvPicPr>
-          <p:cNvPr id="62" name="그림 73"/>
+          <p:cNvPr id="62" name="그림 73" descr="C:/Users/Admin1/AppData/Roaming/PolarisOffice/ETemp/2936_21704408/fImage259493621538.png"/>
           <p:cNvPicPr>
             <a:picLocks noChangeAspect="1"/>
           </p:cNvPicPr>
           <p:nvPr/>
         </p:nvPicPr>
         <p:blipFill rotWithShape="1">
-          <a:blip r:embed="rId2" cstate="print">
+          <a:blip r:embed="rId2" cstate="hqprint">
+            <a:extLst>
+              <a:ext uri="{28A0092B-C50C-407E-A947-70E740481C1C}">
+                <a14:useLocalDpi xmlns:a14="http://schemas.microsoft.com/office/drawing/2010/main"/>
+              </a:ext>
+            </a:extLst>
+          </a:blip>
+          <a:stretch>
+            <a:fillRect/>
+          </a:stretch>
+        </p:blipFill>
+        <p:spPr>
+          <a:xfrm rot="0">
+            <a:off x="6708775" y="1521460"/>
+            <a:ext cx="4265295" cy="3766185"/>
+          </a:xfrm>
+          <a:prstGeom prst="rect"/>
+          <a:noFill/>
+        </p:spPr>
+      </p:pic>
+      <p:pic>
+        <p:nvPicPr>
+          <p:cNvPr id="63" name="그림 75" descr="C:/Users/Admin1/AppData/Roaming/PolarisOffice/ETemp/2936_21704408/fImage362653641869.png"/>
+          <p:cNvPicPr>
+            <a:picLocks noChangeAspect="1"/>
+          </p:cNvPicPr>
+          <p:nvPr/>
+        </p:nvPicPr>
+        <p:blipFill rotWithShape="1">
+          <a:blip r:embed="rId3" cstate="hqprint">
+            <a:extLst>
+              <a:ext uri="{28A0092B-C50C-407E-A947-70E740481C1C}">
+                <a14:useLocalDpi xmlns:a14="http://schemas.microsoft.com/office/drawing/2010/main"/>
+              </a:ext>
+            </a:extLst>
+          </a:blip>
+          <a:stretch>
+            <a:fillRect/>
+          </a:stretch>
+        </p:blipFill>
+        <p:spPr>
+          <a:xfrm rot="0">
+            <a:off x="1230630" y="1529715"/>
+            <a:ext cx="2260600" cy="3566795"/>
+          </a:xfrm>
+          <a:prstGeom prst="roundRect"/>
+          <a:solidFill>
+            <a:srgbClr val="EDEDED"/>
+          </a:solidFill>
+        </p:spPr>
+      </p:pic>
+      <p:pic>
+        <p:nvPicPr>
+          <p:cNvPr id="66" name="그림 41" descr="C:/Users/Admin1/AppData/Roaming/PolarisOffice/ETemp/2936_21704408/fImage97242386962.png"/>
+          <p:cNvPicPr>
+            <a:picLocks noChangeAspect="1"/>
+          </p:cNvPicPr>
+          <p:nvPr/>
+        </p:nvPicPr>
+        <p:blipFill rotWithShape="1">
+          <a:blip r:embed="rId6" cstate="print">
             <a:extLst>
               <a:ext uri="{28A0092B-C50C-407E-A947-70E740481C1C}">
                 <a14:useLocalDpi xmlns:a14="http://schemas.microsoft.com/office/drawing/2010/main" val="0"/>
@@ -9906,66 +10655,8 @@
         </p:blipFill>
         <p:spPr>
           <a:xfrm rot="0">
-            <a:off x="6708775" y="1337310"/>
-            <a:ext cx="4420235" cy="2741930"/>
-          </a:xfrm>
-          <a:prstGeom prst="rect"/>
-          <a:noFill/>
-        </p:spPr>
-      </p:pic>
-      <p:pic>
-        <p:nvPicPr>
-          <p:cNvPr id="63" name="그림 75"/>
-          <p:cNvPicPr>
-            <a:picLocks noChangeAspect="1"/>
-          </p:cNvPicPr>
-          <p:nvPr/>
-        </p:nvPicPr>
-        <p:blipFill rotWithShape="1">
-          <a:blip r:embed="rId3" cstate="print">
-            <a:extLst>
-              <a:ext uri="{28A0092B-C50C-407E-A947-70E740481C1C}">
-                <a14:useLocalDpi xmlns:a14="http://schemas.microsoft.com/office/drawing/2010/main" val="0"/>
-              </a:ext>
-            </a:extLst>
-          </a:blip>
-          <a:stretch>
-            <a:fillRect/>
-          </a:stretch>
-        </p:blipFill>
-        <p:spPr>
-          <a:xfrm rot="0">
-            <a:off x="1230630" y="1333500"/>
-            <a:ext cx="2259965" cy="2832100"/>
-          </a:xfrm>
-          <a:prstGeom prst="rect"/>
-          <a:noFill/>
-        </p:spPr>
-      </p:pic>
-      <p:pic>
-        <p:nvPicPr>
-          <p:cNvPr id="64" name="그림 76"/>
-          <p:cNvPicPr>
-            <a:picLocks noChangeAspect="1"/>
-          </p:cNvPicPr>
-          <p:nvPr/>
-        </p:nvPicPr>
-        <p:blipFill rotWithShape="1">
-          <a:blip r:embed="rId4" cstate="print">
-            <a:extLst>
-              <a:ext uri="{28A0092B-C50C-407E-A947-70E740481C1C}">
-                <a14:useLocalDpi xmlns:a14="http://schemas.microsoft.com/office/drawing/2010/main" val="0"/>
-              </a:ext>
-            </a:extLst>
-          </a:blip>
-          <a:stretch>
-            <a:fillRect/>
-          </a:stretch>
-        </p:blipFill>
-        <p:spPr>
-          <a:xfrm rot="0">
-            <a:off x="3776345" y="1704340"/>
-            <a:ext cx="1505585" cy="1943735"/>
+            <a:off x="3766185" y="1970405"/>
+            <a:ext cx="1579880" cy="2552700"/>
           </a:xfrm>
           <a:prstGeom prst="roundRect"/>
           <a:solidFill>
@@ -9981,13 +10672,12 @@
         </p:nvCxnSpPr>
         <p:spPr>
           <a:xfrm rot="0" flipH="1">
-            <a:off x="1939925" y="3472180"/>
-            <a:ext cx="2087245" cy="442595"/>
+            <a:off x="1945640" y="4331335"/>
+            <a:ext cx="2070100" cy="457835"/>
           </a:xfrm>
           <a:prstGeom prst="straightConnector1"/>
           <a:ln w="6350" cap="flat" cmpd="sng">
             <a:prstDash/>
-            <a:headEnd type="none" w="med" len="med"/>
             <a:tailEnd type="triangle" w="med" len="med"/>
           </a:ln>
         </p:spPr>
@@ -10048,7 +10738,7 @@
       </p:grpSpPr>
       <p:sp>
         <p:nvSpPr>
-          <p:cNvPr id="29" name="Rect 0"/>
+          <p:cNvPr id="35" name="Rect 0"/>
           <p:cNvSpPr txBox="1">
             <a:spLocks/>
           </p:cNvSpPr>
@@ -10056,8 +10746,8 @@
         </p:nvSpPr>
         <p:spPr>
           <a:xfrm rot="0">
-            <a:off x="1229995" y="1337310"/>
-            <a:ext cx="4039235" cy="370840"/>
+            <a:off x="4126865" y="467995"/>
+            <a:ext cx="3937635" cy="554990"/>
           </a:xfrm>
           <a:prstGeom prst="rect"/>
           <a:noFill/>
@@ -10072,11 +10762,32 @@
           </a:bodyPr>
           <a:lstStyle/>
           <a:p>
-            <a:pPr marL="0" indent="0" algn="l" latinLnBrk="0" hangingPunct="1">
-              <a:buFontTx/>
-              <a:buNone/>
-            </a:pPr>
-            <a:endParaRPr lang="ko-KR" altLang="en-US" sz="1800">
+            <a:pPr marL="0" indent="0" rtl="0" algn="l" defTabSz="914400" eaLnBrk="1" latinLnBrk="0" hangingPunct="1">
+              <a:buFontTx/>
+              <a:buNone/>
+            </a:pPr>
+            <a:r>
+              <a:rPr lang="ko-KR" sz="3000" b="1">
+                <a:latin typeface="맑은 고딕" charset="0"/>
+                <a:ea typeface="맑은 고딕" charset="0"/>
+              </a:rPr>
+              <a:t>열다섯</a:t>
+            </a:r>
+            <a:r>
+              <a:rPr lang="ko-KR" sz="3000" b="1">
+                <a:latin typeface="맑은 고딕" charset="0"/>
+                <a:ea typeface="맑은 고딕" charset="0"/>
+              </a:rPr>
+              <a:t> 번째 튜토리얼</a:t>
+            </a:r>
+            <a:r>
+              <a:rPr sz="3000" b="1">
+                <a:latin typeface="맑은 고딕" charset="0"/>
+                <a:ea typeface="맑은 고딕" charset="0"/>
+              </a:rPr>
+              <a:t> </a:t>
+            </a:r>
+            <a:endParaRPr lang="ko-KR" altLang="en-US" sz="3000" b="1">
               <a:latin typeface="맑은 고딕" charset="0"/>
               <a:ea typeface="맑은 고딕" charset="0"/>
             </a:endParaRPr>
@@ -10085,7 +10796,7 @@
       </p:sp>
       <p:sp>
         <p:nvSpPr>
-          <p:cNvPr id="35" name="Rect 0"/>
+          <p:cNvPr id="57" name="Rect 0"/>
           <p:cNvSpPr txBox="1">
             <a:spLocks/>
           </p:cNvSpPr>
@@ -10093,8 +10804,8 @@
         </p:nvSpPr>
         <p:spPr>
           <a:xfrm rot="0">
-            <a:off x="4126865" y="467995"/>
-            <a:ext cx="3937635" cy="554990"/>
+            <a:off x="6824980" y="5480050"/>
+            <a:ext cx="4123690" cy="677545"/>
           </a:xfrm>
           <a:prstGeom prst="rect"/>
           <a:noFill/>
@@ -10114,36 +10825,103 @@
               <a:buNone/>
             </a:pPr>
             <a:r>
-              <a:rPr lang="ko-KR" sz="3000" b="1">
-                <a:latin typeface="맑은 고딕" charset="0"/>
-                <a:ea typeface="맑은 고딕" charset="0"/>
-              </a:rPr>
-              <a:t>열다섯</a:t>
-            </a:r>
-            <a:r>
-              <a:rPr lang="ko-KR" sz="3000" b="1">
-                <a:latin typeface="맑은 고딕" charset="0"/>
-                <a:ea typeface="맑은 고딕" charset="0"/>
-              </a:rPr>
-              <a:t> 번째 튜토리얼</a:t>
-            </a:r>
-            <a:r>
-              <a:rPr sz="3000" b="1">
+              <a:rPr lang="ko-KR" sz="2000" b="1">
+                <a:solidFill>
+                  <a:srgbClr val="0611F2"/>
+                </a:solidFill>
+                <a:latin typeface="맑은 고딕" charset="0"/>
+                <a:ea typeface="맑은 고딕" charset="0"/>
+              </a:rPr>
+              <a:t>3</a:t>
+            </a:r>
+            <a:r>
+              <a:rPr lang="ko-KR" sz="2000" b="1">
+                <a:solidFill>
+                  <a:srgbClr val="0611F2"/>
+                </a:solidFill>
+                <a:latin typeface="맑은 고딕" charset="0"/>
+                <a:ea typeface="맑은 고딕" charset="0"/>
+              </a:rPr>
+              <a:t>3</a:t>
+            </a:r>
+            <a:r>
+              <a:rPr lang="ko-KR" sz="2000" b="1">
+                <a:solidFill>
+                  <a:srgbClr val="0611F2"/>
+                </a:solidFill>
+                <a:latin typeface="맑은 고딕" charset="0"/>
+                <a:ea typeface="맑은 고딕" charset="0"/>
+              </a:rPr>
+              <a:t>.</a:t>
+            </a:r>
+            <a:r>
+              <a:rPr lang="ko-KR" sz="2000">
+                <a:solidFill>
+                  <a:srgbClr val="0611F2"/>
+                </a:solidFill>
                 <a:latin typeface="맑은 고딕" charset="0"/>
                 <a:ea typeface="맑은 고딕" charset="0"/>
               </a:rPr>
               <a:t> </a:t>
             </a:r>
-            <a:endParaRPr lang="ko-KR" altLang="en-US" sz="3000" b="1">
+            <a:r>
+              <a:rPr lang="ko-KR" sz="1800">
+                <a:latin typeface="맑은 고딕" charset="0"/>
+                <a:ea typeface="맑은 고딕" charset="0"/>
+              </a:rPr>
+              <a:t>이제</a:t>
+            </a:r>
+            <a:r>
+              <a:rPr lang="ko-KR" sz="1800">
+                <a:latin typeface="맑은 고딕" charset="0"/>
+                <a:ea typeface="맑은 고딕" charset="0"/>
+              </a:rPr>
+              <a:t> PhotonSetting를 선택</a:t>
+            </a:r>
+            <a:r>
+              <a:rPr lang="ko-KR" sz="1800">
+                <a:latin typeface="맑은 고딕" charset="0"/>
+                <a:ea typeface="맑은 고딕" charset="0"/>
+              </a:rPr>
+              <a:t>하고</a:t>
+            </a:r>
+            <a:endParaRPr lang="ko-KR" altLang="en-US" sz="1800">
               <a:latin typeface="맑은 고딕" charset="0"/>
               <a:ea typeface="맑은 고딕" charset="0"/>
             </a:endParaRPr>
           </a:p>
-        </p:txBody>
-      </p:sp>
-      <p:sp>
-        <p:nvSpPr>
-          <p:cNvPr id="57" name="Rect 0"/>
+          <a:p>
+            <a:pPr marL="0" indent="0" rtl="0" algn="l" defTabSz="914400" eaLnBrk="1" latinLnBrk="0" hangingPunct="1">
+              <a:buFontTx/>
+              <a:buNone/>
+            </a:pPr>
+            <a:r>
+              <a:rPr lang="ko-KR" sz="1800">
+                <a:solidFill>
+                  <a:srgbClr val="009900"/>
+                </a:solidFill>
+                <a:latin typeface="맑은 고딕" charset="0"/>
+                <a:ea typeface="맑은 고딕" charset="0"/>
+              </a:rPr>
+              <a:t>[ Login( ) ]</a:t>
+            </a:r>
+            <a:r>
+              <a:rPr lang="ko-KR" sz="1800">
+                <a:latin typeface="맑은 고딕" charset="0"/>
+                <a:ea typeface="맑은 고딕" charset="0"/>
+              </a:rPr>
+              <a:t>이라는 함수를 설정합니다. </a:t>
+            </a:r>
+            <a:endParaRPr lang="ko-KR" altLang="en-US" sz="1800">
+              <a:latin typeface="맑은 고딕" charset="0"/>
+              <a:ea typeface="맑은 고딕" charset="0"/>
+            </a:endParaRPr>
+          </a:p>
+        </p:txBody>
+      </p:sp>
+      <p:sp>
+        <p:nvSpPr>
+          <p:cNvPr id="60" name="Rect 0"/>
           <p:cNvSpPr txBox="1">
             <a:spLocks/>
           </p:cNvSpPr>
@@ -10151,8 +10929,8 @@
         </p:nvSpPr>
         <p:spPr>
           <a:xfrm rot="0">
-            <a:off x="6737350" y="4399280"/>
-            <a:ext cx="4407535" cy="954405"/>
+            <a:off x="1229360" y="5203190"/>
+            <a:ext cx="4149090" cy="954405"/>
           </a:xfrm>
           <a:prstGeom prst="rect"/>
           <a:noFill/>
@@ -10179,7 +10957,17 @@
                 <a:latin typeface="맑은 고딕" charset="0"/>
                 <a:ea typeface="맑은 고딕" charset="0"/>
               </a:rPr>
-              <a:t>30.</a:t>
+              <a:t>32</a:t>
+            </a:r>
+            <a:r>
+              <a:rPr lang="ko-KR" sz="2000" b="1">
+                <a:solidFill>
+                  <a:srgbClr val="0611F2"/>
+                </a:solidFill>
+                <a:latin typeface="맑은 고딕" charset="0"/>
+                <a:ea typeface="맑은 고딕" charset="0"/>
+              </a:rPr>
+              <a:t>.</a:t>
             </a:r>
             <a:r>
               <a:rPr lang="ko-KR" sz="2000">
@@ -10196,45 +10984,223 @@
                 <a:latin typeface="맑은 고딕" charset="0"/>
                 <a:ea typeface="맑은 고딕" charset="0"/>
               </a:rPr>
-              <a:t>그리고 함수를 추가하기 위해 PhotonSetting를 선택하시고 </a:t>
+              <a:t>마지막으로 </a:t>
+            </a:r>
+            <a:r>
+              <a:rPr lang="ko-KR" sz="1800">
+                <a:latin typeface="맑은 고딕" charset="0"/>
+                <a:ea typeface="맑은 고딕" charset="0"/>
+              </a:rPr>
+              <a:t>Sign In</a:t>
+            </a:r>
+            <a:r>
+              <a:rPr lang="ko-KR" sz="1800">
+                <a:latin typeface="맑은 고딕" charset="0"/>
+                <a:ea typeface="맑은 고딕" charset="0"/>
+              </a:rPr>
+              <a:t> Button</a:t>
+            </a:r>
+            <a:r>
+              <a:rPr lang="ko-KR" sz="1800">
+                <a:latin typeface="맑은 고딕" charset="0"/>
+                <a:ea typeface="맑은 고딕" charset="0"/>
+              </a:rPr>
+              <a:t> 오브젝트의</a:t>
+            </a:r>
+            <a:r>
+              <a:rPr lang="ko-KR" sz="1800">
+                <a:latin typeface="맑은 고딕" charset="0"/>
+                <a:ea typeface="맑은 고딕" charset="0"/>
+              </a:rPr>
+              <a:t> On Click</a:t>
+            </a:r>
+            <a:r>
+              <a:rPr lang="ko-KR" sz="1800">
+                <a:latin typeface="맑은 고딕" charset="0"/>
+                <a:ea typeface="맑은 고딕" charset="0"/>
+              </a:rPr>
+              <a:t>( ) 함수</a:t>
+            </a:r>
+            <a:r>
+              <a:rPr lang="ko-KR" sz="1800">
+                <a:latin typeface="맑은 고딕" charset="0"/>
+                <a:ea typeface="맑은 고딕" charset="0"/>
+              </a:rPr>
+              <a:t>에 Photon Setting 오브젝트를 넣어줍니다.</a:t>
             </a:r>
             <a:endParaRPr lang="ko-KR" altLang="en-US" sz="1800">
               <a:latin typeface="맑은 고딕" charset="0"/>
               <a:ea typeface="맑은 고딕" charset="0"/>
             </a:endParaRPr>
           </a:p>
-          <a:p>
-            <a:pPr marL="0" indent="0" rtl="0" algn="l" defTabSz="914400" eaLnBrk="1" latinLnBrk="0" hangingPunct="1">
-              <a:buFontTx/>
-              <a:buNone/>
-            </a:pPr>
-            <a:r>
-              <a:rPr lang="ko-KR" sz="1800">
-                <a:solidFill>
-                  <a:srgbClr val="009900"/>
-                </a:solidFill>
-                <a:latin typeface="맑은 고딕" charset="0"/>
-                <a:ea typeface="맑은 고딕" charset="0"/>
-              </a:rPr>
-              <a:t>[ Login( ) ]</a:t>
-            </a:r>
-            <a:r>
-              <a:rPr lang="ko-KR" sz="1800">
-                <a:latin typeface="맑은 고딕" charset="0"/>
-                <a:ea typeface="맑은 고딕" charset="0"/>
-              </a:rPr>
-              <a:t>이라는 함수를 설정합니다. </a:t>
-            </a:r>
-            <a:endParaRPr lang="ko-KR" altLang="en-US" sz="1800">
-              <a:latin typeface="맑은 고딕" charset="0"/>
-              <a:ea typeface="맑은 고딕" charset="0"/>
-            </a:endParaRPr>
-          </a:p>
-        </p:txBody>
-      </p:sp>
-      <p:sp>
-        <p:nvSpPr>
-          <p:cNvPr id="60" name="Rect 0"/>
+        </p:txBody>
+      </p:sp>
+      <p:pic>
+        <p:nvPicPr>
+          <p:cNvPr id="67" name="그림 81" descr="C:/Users/Admin1/AppData/Roaming/PolarisOffice/ETemp/2936_21704408/fImage259843797035.png"/>
+          <p:cNvPicPr>
+            <a:picLocks noChangeAspect="1"/>
+          </p:cNvPicPr>
+          <p:nvPr/>
+        </p:nvPicPr>
+        <p:blipFill rotWithShape="1">
+          <a:blip r:embed="rId4" cstate="hqprint">
+            <a:extLst>
+              <a:ext uri="{28A0092B-C50C-407E-A947-70E740481C1C}">
+                <a14:useLocalDpi xmlns:a14="http://schemas.microsoft.com/office/drawing/2010/main"/>
+              </a:ext>
+            </a:extLst>
+          </a:blip>
+          <a:stretch>
+            <a:fillRect/>
+          </a:stretch>
+        </p:blipFill>
+        <p:spPr>
+          <a:xfrm rot="0">
+            <a:off x="6824980" y="1430020"/>
+            <a:ext cx="4123690" cy="3890645"/>
+          </a:xfrm>
+          <a:prstGeom prst="rect"/>
+          <a:noFill/>
+        </p:spPr>
+      </p:pic>
+      <p:pic>
+        <p:nvPicPr>
+          <p:cNvPr id="68" name="그림 43" descr="C:/Users/Admin1/AppData/Roaming/PolarisOffice/ETemp/2936_21704408/fImage97242394464.png"/>
+          <p:cNvPicPr>
+            <a:picLocks noChangeAspect="1"/>
+          </p:cNvPicPr>
+          <p:nvPr/>
+        </p:nvPicPr>
+        <p:blipFill rotWithShape="1">
+          <a:blip r:embed="rId6" cstate="print">
+            <a:extLst>
+              <a:ext uri="{28A0092B-C50C-407E-A947-70E740481C1C}">
+                <a14:useLocalDpi xmlns:a14="http://schemas.microsoft.com/office/drawing/2010/main" val="0"/>
+              </a:ext>
+            </a:extLst>
+          </a:blip>
+          <a:stretch>
+            <a:fillRect/>
+          </a:stretch>
+        </p:blipFill>
+        <p:spPr>
+          <a:xfrm rot="0">
+            <a:off x="3990340" y="1903730"/>
+            <a:ext cx="1388745" cy="2702560"/>
+          </a:xfrm>
+          <a:prstGeom prst="roundRect"/>
+          <a:solidFill>
+            <a:srgbClr val="EDEDED"/>
+          </a:solidFill>
+        </p:spPr>
+      </p:pic>
+      <p:pic>
+        <p:nvPicPr>
+          <p:cNvPr id="69" name="그림 44" descr="C:/Users/Admin1/AppData/Roaming/PolarisOffice/ETemp/2936_21704408/fImage388572405705.png"/>
+          <p:cNvPicPr>
+            <a:picLocks noChangeAspect="1"/>
+          </p:cNvPicPr>
+          <p:nvPr/>
+        </p:nvPicPr>
+        <p:blipFill rotWithShape="1">
+          <a:blip r:embed="rId7" cstate="print">
+            <a:extLst>
+              <a:ext uri="{28A0092B-C50C-407E-A947-70E740481C1C}">
+                <a14:useLocalDpi xmlns:a14="http://schemas.microsoft.com/office/drawing/2010/main" val="0"/>
+              </a:ext>
+            </a:extLst>
+          </a:blip>
+          <a:stretch>
+            <a:fillRect/>
+          </a:stretch>
+        </p:blipFill>
+        <p:spPr>
+          <a:xfrm rot="0">
+            <a:off x="1222375" y="1427480"/>
+            <a:ext cx="2610485" cy="3652520"/>
+          </a:xfrm>
+          <a:prstGeom prst="roundRect"/>
+          <a:solidFill>
+            <a:srgbClr val="EDEDED"/>
+          </a:solidFill>
+        </p:spPr>
+      </p:pic>
+      <p:cxnSp>
+        <p:nvCxnSpPr>
+          <p:cNvPr id="65" name="Rect 0"/>
+          <p:cNvCxnSpPr/>
+          <p:nvPr/>
+        </p:nvCxnSpPr>
+        <p:spPr>
+          <a:xfrm rot="0" flipH="1">
+            <a:off x="2045335" y="4389120"/>
+            <a:ext cx="2169795" cy="358140"/>
+          </a:xfrm>
+          <a:prstGeom prst="straightConnector1"/>
+          <a:ln w="6350" cap="flat" cmpd="sng">
+            <a:prstDash/>
+            <a:tailEnd type="triangle" w="med" len="med"/>
+          </a:ln>
+        </p:spPr>
+        <p:style>
+          <a:lnRef idx="1">
+            <a:schemeClr val="accent1"/>
+          </a:lnRef>
+          <a:fillRef idx="0">
+            <a:schemeClr val="accent1"/>
+          </a:fillRef>
+          <a:effectRef idx="0">
+            <a:schemeClr val="accent1"/>
+          </a:effectRef>
+          <a:fontRef idx="minor">
+            <a:schemeClr val="tx1"/>
+          </a:fontRef>
+        </p:style>
+      </p:cxnSp>
+    </p:spTree>
+  </p:cSld>
+  <p:clrMapOvr>
+    <a:masterClrMapping/>
+  </p:clrMapOvr>
+  <mc:AlternateContent xmlns:mc="http://schemas.openxmlformats.org/markup-compatibility/2006">
+    <mc:Choice xmlns:p14="http://schemas.microsoft.com/office/powerpoint/2010/main" Requires="p14">
+      <p:transition spd="slow" p14:dur="2000"/>
+    </mc:Choice>
+    <mc:Fallback>
+      <p:transition spd="slow"/>
+    </mc:Fallback>
+  </mc:AlternateContent>
+  <p:timing>
+    <p:tnLst>
+      <p:par>
+        <p:cTn id="1" dur="indefinite" restart="never" nodeType="tmRoot"/>
+      </p:par>
+    </p:tnLst>
+  </p:timing>
+</p:sld>
+</file>
+
+<file path=ppt/slides/slide16.xml><?xml version="1.0" encoding="utf-8"?>
+<p:sld xmlns:a="http://schemas.openxmlformats.org/drawingml/2006/main" xmlns:r="http://schemas.openxmlformats.org/officeDocument/2006/relationships" xmlns:p="http://schemas.openxmlformats.org/presentationml/2006/main">
+  <p:cSld>
+    <p:spTree>
+      <p:nvGrpSpPr>
+        <p:cNvPr id="1" name=""/>
+        <p:cNvGrpSpPr/>
+        <p:nvPr/>
+      </p:nvGrpSpPr>
+      <p:grpSpPr>
+        <a:xfrm>
+          <a:off x="0" y="0"/>
+          <a:ext cx="0" cy="0"/>
+          <a:chOff x="0" y="0"/>
+          <a:chExt cx="0" cy="0"/>
+        </a:xfrm>
+      </p:grpSpPr>
+      <p:sp>
+        <p:nvSpPr>
+          <p:cNvPr id="35" name="Rect 0"/>
           <p:cNvSpPr txBox="1">
             <a:spLocks/>
           </p:cNvSpPr>
@@ -10242,8 +11208,8 @@
         </p:nvSpPr>
         <p:spPr>
           <a:xfrm rot="0">
-            <a:off x="1229360" y="4396740"/>
-            <a:ext cx="4148455" cy="1231265"/>
+            <a:off x="4126865" y="467995"/>
+            <a:ext cx="3938270" cy="554990"/>
           </a:xfrm>
           <a:prstGeom prst="rect"/>
           <a:noFill/>
@@ -10263,6 +11229,74 @@
               <a:buNone/>
             </a:pPr>
             <a:r>
+              <a:rPr lang="ko-KR" sz="3000" b="1">
+                <a:latin typeface="맑은 고딕" charset="0"/>
+                <a:ea typeface="맑은 고딕" charset="0"/>
+              </a:rPr>
+              <a:t>열</a:t>
+            </a:r>
+            <a:r>
+              <a:rPr lang="ko-KR" sz="3000" b="1">
+                <a:latin typeface="맑은 고딕" charset="0"/>
+                <a:ea typeface="맑은 고딕" charset="0"/>
+              </a:rPr>
+              <a:t>여</a:t>
+            </a:r>
+            <a:r>
+              <a:rPr lang="ko-KR" sz="3000" b="1">
+                <a:latin typeface="맑은 고딕" charset="0"/>
+                <a:ea typeface="맑은 고딕" charset="0"/>
+              </a:rPr>
+              <a:t>섯 번째 튜토리얼</a:t>
+            </a:r>
+            <a:r>
+              <a:rPr sz="3000" b="1">
+                <a:latin typeface="맑은 고딕" charset="0"/>
+                <a:ea typeface="맑은 고딕" charset="0"/>
+              </a:rPr>
+              <a:t> </a:t>
+            </a:r>
+            <a:endParaRPr lang="ko-KR" altLang="en-US" sz="3000" b="1">
+              <a:latin typeface="맑은 고딕" charset="0"/>
+              <a:ea typeface="맑은 고딕" charset="0"/>
+            </a:endParaRPr>
+          </a:p>
+        </p:txBody>
+      </p:sp>
+      <p:sp>
+        <p:nvSpPr>
+          <p:cNvPr id="57" name="Rect 0"/>
+          <p:cNvSpPr txBox="1">
+            <a:spLocks/>
+          </p:cNvSpPr>
+          <p:nvPr/>
+        </p:nvSpPr>
+        <p:spPr>
+          <a:xfrm rot="0">
+            <a:off x="6841490" y="5048250"/>
+            <a:ext cx="4098925" cy="1231265"/>
+          </a:xfrm>
+          <a:prstGeom prst="rect"/>
+          <a:noFill/>
+          <a:ln w="0">
+            <a:noFill/>
+            <a:prstDash/>
+          </a:ln>
+        </p:spPr>
+        <p:txBody>
+          <a:bodyPr wrap="square" lIns="89535" tIns="46355" rIns="89535" bIns="46355" numCol="1" vert="horz" anchor="t">
+            <a:spAutoFit/>
+          </a:bodyPr>
+          <a:lstStyle/>
+          <a:p>
+            <a:pPr marL="0" indent="0" rtl="0" algn="l" defTabSz="914400" eaLnBrk="1" latinLnBrk="0" hangingPunct="1">
+              <a:buFontTx/>
+              <a:buNone/>
+              <a:tabLst>
+                <a:tab pos="3869690" algn="l"/>
+              </a:tabLst>
+            </a:pPr>
+            <a:r>
               <a:rPr lang="ko-KR" sz="2000" b="1">
                 <a:solidFill>
                   <a:srgbClr val="0611F2"/>
@@ -10270,7 +11304,27 @@
                 <a:latin typeface="맑은 고딕" charset="0"/>
                 <a:ea typeface="맑은 고딕" charset="0"/>
               </a:rPr>
-              <a:t>29.</a:t>
+              <a:t>3</a:t>
+            </a:r>
+            <a:r>
+              <a:rPr lang="ko-KR" sz="2000" b="1">
+                <a:solidFill>
+                  <a:srgbClr val="0611F2"/>
+                </a:solidFill>
+                <a:latin typeface="맑은 고딕" charset="0"/>
+                <a:ea typeface="맑은 고딕" charset="0"/>
+              </a:rPr>
+              <a:t>5</a:t>
+            </a:r>
+            <a:r>
+              <a:rPr lang="ko-KR" sz="2000" b="1">
+                <a:solidFill>
+                  <a:srgbClr val="0611F2"/>
+                </a:solidFill>
+                <a:latin typeface="맑은 고딕" charset="0"/>
+                <a:ea typeface="맑은 고딕" charset="0"/>
+              </a:rPr>
+              <a:t>.</a:t>
             </a:r>
             <a:r>
               <a:rPr lang="ko-KR" sz="2000">
@@ -10287,7 +11341,14 @@
                 <a:latin typeface="맑은 고딕" charset="0"/>
                 <a:ea typeface="맑은 고딕" charset="0"/>
               </a:rPr>
-              <a:t>마지막으로 Login Button이라는 버튼 컴포넌트의 On Click 함수에 Photon Setting 오브젝트를 넣어줍니다.</a:t>
+              <a:t>그다음 Email Input과 Password Input 그리고 UserName Input 오브젝트의 앵커를 지정하고 위치와 회전 값을 설정합니다.</a:t>
+            </a:r>
+            <a:r>
+              <a:rPr lang="ko-KR" sz="1800">
+                <a:latin typeface="맑은 고딕" charset="0"/>
+                <a:ea typeface="맑은 고딕" charset="0"/>
+              </a:rPr>
+              <a:t> </a:t>
             </a:r>
             <a:endParaRPr lang="ko-KR" altLang="en-US" sz="1800">
               <a:latin typeface="맑은 고딕" charset="0"/>
@@ -10296,9 +11357,83 @@
           </a:p>
         </p:txBody>
       </p:sp>
+      <p:sp>
+        <p:nvSpPr>
+          <p:cNvPr id="60" name="Rect 0"/>
+          <p:cNvSpPr txBox="1">
+            <a:spLocks/>
+          </p:cNvSpPr>
+          <p:nvPr/>
+        </p:nvSpPr>
+        <p:spPr>
+          <a:xfrm rot="0">
+            <a:off x="1237615" y="5319395"/>
+            <a:ext cx="4149090" cy="954405"/>
+          </a:xfrm>
+          <a:prstGeom prst="rect"/>
+          <a:noFill/>
+          <a:ln w="0">
+            <a:noFill/>
+            <a:prstDash/>
+          </a:ln>
+        </p:spPr>
+        <p:txBody>
+          <a:bodyPr wrap="square" lIns="89535" tIns="46355" rIns="89535" bIns="46355" numCol="1" vert="horz" anchor="t">
+            <a:spAutoFit/>
+          </a:bodyPr>
+          <a:lstStyle/>
+          <a:p>
+            <a:pPr marL="0" indent="0" rtl="0" algn="l" defTabSz="914400" eaLnBrk="1" latinLnBrk="0" hangingPunct="1">
+              <a:buFontTx/>
+              <a:buNone/>
+            </a:pPr>
+            <a:r>
+              <a:rPr lang="ko-KR" sz="2000" b="1">
+                <a:solidFill>
+                  <a:srgbClr val="0611F2"/>
+                </a:solidFill>
+                <a:latin typeface="맑은 고딕" charset="0"/>
+                <a:ea typeface="맑은 고딕" charset="0"/>
+              </a:rPr>
+              <a:t>34</a:t>
+            </a:r>
+            <a:r>
+              <a:rPr lang="ko-KR" sz="2000" b="1">
+                <a:solidFill>
+                  <a:srgbClr val="0611F2"/>
+                </a:solidFill>
+                <a:latin typeface="맑은 고딕" charset="0"/>
+                <a:ea typeface="맑은 고딕" charset="0"/>
+              </a:rPr>
+              <a:t>.</a:t>
+            </a:r>
+            <a:r>
+              <a:rPr lang="ko-KR" sz="2000">
+                <a:solidFill>
+                  <a:srgbClr val="0611F2"/>
+                </a:solidFill>
+                <a:latin typeface="맑은 고딕" charset="0"/>
+                <a:ea typeface="맑은 고딕" charset="0"/>
+              </a:rPr>
+              <a:t> </a:t>
+            </a:r>
+            <a:r>
+              <a:rPr lang="ko-KR" sz="1800">
+                <a:latin typeface="맑은 고딕" charset="0"/>
+                <a:ea typeface="맑은 고딕" charset="0"/>
+              </a:rPr>
+              <a:t>그리고 Sign In Button과 Sign Up Button 오브젝트의 앵커를 지정하고 위치와 회전 값을 설정합니다.</a:t>
+            </a:r>
+            <a:endParaRPr lang="ko-KR" altLang="en-US" sz="1800">
+              <a:latin typeface="맑은 고딕" charset="0"/>
+              <a:ea typeface="맑은 고딕" charset="0"/>
+            </a:endParaRPr>
+          </a:p>
+        </p:txBody>
+      </p:sp>
       <p:pic>
         <p:nvPicPr>
-          <p:cNvPr id="64" name="Picture "/>
+          <p:cNvPr id="68" name="그림 51" descr="C:/Users/Admin1/AppData/Roaming/PolarisOffice/ETemp/2936_21704408/fImage127713248145.png"/>
           <p:cNvPicPr>
             <a:picLocks noChangeAspect="1"/>
           </p:cNvPicPr>
@@ -10318,8 +11453,8 @@
         </p:blipFill>
         <p:spPr>
           <a:xfrm rot="0">
-            <a:off x="3776345" y="1704340"/>
-            <a:ext cx="1505585" cy="1943735"/>
+            <a:off x="1237615" y="1403350"/>
+            <a:ext cx="4141470" cy="1772920"/>
           </a:xfrm>
           <a:prstGeom prst="roundRect"/>
           <a:solidFill>
@@ -10329,7 +11464,7 @@
       </p:pic>
       <p:pic>
         <p:nvPicPr>
-          <p:cNvPr id="66" name="그림 80"/>
+          <p:cNvPr id="69" name="그림 54" descr="C:/Users/Admin1/AppData/Roaming/PolarisOffice/ETemp/2936_21704408/fImage130483253281.png"/>
           <p:cNvPicPr>
             <a:picLocks noChangeAspect="1"/>
           </p:cNvPicPr>
@@ -10349,49 +11484,18 @@
         </p:blipFill>
         <p:spPr>
           <a:xfrm rot="0">
-            <a:off x="1229995" y="1325245"/>
-            <a:ext cx="2286635" cy="2961640"/>
-          </a:xfrm>
-          <a:prstGeom prst="rect"/>
-          <a:noFill/>
+            <a:off x="1234440" y="3363595"/>
+            <a:ext cx="4152900" cy="1774190"/>
+          </a:xfrm>
+          <a:prstGeom prst="roundRect"/>
+          <a:solidFill>
+            <a:srgbClr val="EDEDED"/>
+          </a:solidFill>
         </p:spPr>
       </p:pic>
-      <p:cxnSp>
-        <p:nvCxnSpPr>
-          <p:cNvPr id="65" name="Rect 0"/>
-          <p:cNvCxnSpPr/>
-          <p:nvPr/>
-        </p:nvCxnSpPr>
-        <p:spPr>
-          <a:xfrm rot="0" flipH="1">
-            <a:off x="1957070" y="3472180"/>
-            <a:ext cx="2070100" cy="546100"/>
-          </a:xfrm>
-          <a:prstGeom prst="straightConnector1"/>
-          <a:ln w="6350" cap="flat" cmpd="sng">
-            <a:prstDash/>
-            <a:headEnd type="none" w="med" len="med"/>
-            <a:tailEnd type="triangle" w="med" len="med"/>
-          </a:ln>
-        </p:spPr>
-        <p:style>
-          <a:lnRef idx="1">
-            <a:schemeClr val="accent1"/>
-          </a:lnRef>
-          <a:fillRef idx="0">
-            <a:schemeClr val="accent1"/>
-          </a:fillRef>
-          <a:effectRef idx="0">
-            <a:schemeClr val="accent1"/>
-          </a:effectRef>
-          <a:fontRef idx="minor">
-            <a:schemeClr val="tx1"/>
-          </a:fontRef>
-        </p:style>
-      </p:cxnSp>
       <p:pic>
         <p:nvPicPr>
-          <p:cNvPr id="67" name="그림 81"/>
+          <p:cNvPr id="70" name="그림 57" descr="C:/Users/Admin1/AppData/Roaming/PolarisOffice/ETemp/2936_21704408/fImage125453266827.png"/>
           <p:cNvPicPr>
             <a:picLocks noChangeAspect="1"/>
           </p:cNvPicPr>
@@ -10411,11 +11515,75 @@
         </p:blipFill>
         <p:spPr>
           <a:xfrm rot="0">
-            <a:off x="6797675" y="1336675"/>
-            <a:ext cx="4165600" cy="2950210"/>
-          </a:xfrm>
-          <a:prstGeom prst="rect"/>
-          <a:noFill/>
+            <a:off x="6833235" y="1402080"/>
+            <a:ext cx="4115435" cy="1050925"/>
+          </a:xfrm>
+          <a:prstGeom prst="roundRect"/>
+          <a:solidFill>
+            <a:srgbClr val="EDEDED"/>
+          </a:solidFill>
+        </p:spPr>
+      </p:pic>
+      <p:pic>
+        <p:nvPicPr>
+          <p:cNvPr id="71" name="그림 60" descr="C:/Users/Admin1/AppData/Roaming/PolarisOffice/ETemp/2936_21704408/fImage128213279961.png"/>
+          <p:cNvPicPr>
+            <a:picLocks noChangeAspect="1"/>
+          </p:cNvPicPr>
+          <p:nvPr/>
+        </p:nvPicPr>
+        <p:blipFill rotWithShape="1">
+          <a:blip r:embed="rId5" cstate="print">
+            <a:extLst>
+              <a:ext uri="{28A0092B-C50C-407E-A947-70E740481C1C}">
+                <a14:useLocalDpi xmlns:a14="http://schemas.microsoft.com/office/drawing/2010/main" val="0"/>
+              </a:ext>
+            </a:extLst>
+          </a:blip>
+          <a:stretch>
+            <a:fillRect/>
+          </a:stretch>
+        </p:blipFill>
+        <p:spPr>
+          <a:xfrm rot="0">
+            <a:off x="6838315" y="2641600"/>
+            <a:ext cx="4118610" cy="1050290"/>
+          </a:xfrm>
+          <a:prstGeom prst="roundRect"/>
+          <a:solidFill>
+            <a:srgbClr val="EDEDED"/>
+          </a:solidFill>
+        </p:spPr>
+      </p:pic>
+      <p:pic>
+        <p:nvPicPr>
+          <p:cNvPr id="72" name="그림 63" descr="C:/Users/Admin1/AppData/Roaming/PolarisOffice/ETemp/2936_21704408/fImage12761328491.png"/>
+          <p:cNvPicPr>
+            <a:picLocks noChangeAspect="1"/>
+          </p:cNvPicPr>
+          <p:nvPr/>
+        </p:nvPicPr>
+        <p:blipFill rotWithShape="1">
+          <a:blip r:embed="rId6" cstate="print">
+            <a:extLst>
+              <a:ext uri="{28A0092B-C50C-407E-A947-70E740481C1C}">
+                <a14:useLocalDpi xmlns:a14="http://schemas.microsoft.com/office/drawing/2010/main" val="0"/>
+              </a:ext>
+            </a:extLst>
+          </a:blip>
+          <a:stretch>
+            <a:fillRect/>
+          </a:stretch>
+        </p:blipFill>
+        <p:spPr>
+          <a:xfrm rot="0">
+            <a:off x="6841490" y="3865880"/>
+            <a:ext cx="4115435" cy="1047750"/>
+          </a:xfrm>
+          <a:prstGeom prst="roundRect"/>
+          <a:solidFill>
+            <a:srgbClr val="EDEDED"/>
+          </a:solidFill>
         </p:spPr>
       </p:pic>
     </p:spTree>
@@ -10441,8 +11609,8 @@
 </p:sld>
 </file>
 
-<file path=ppt/slides/slide16.xml><?xml version="1.0" encoding="utf-8"?>
-<p:sld xmlns:a="http://schemas.openxmlformats.org/drawingml/2006/main" xmlns:r="http://schemas.openxmlformats.org/officeDocument/2006/relationships" xmlns:p="http://schemas.openxmlformats.org/presentationml/2006/main" xmlns:p14="http://schemas.microsoft.com/office/powerpoint/2010/main">
+<file path=ppt/slides/slide17.xml><?xml version="1.0" encoding="utf-8"?>
+<p:sld xmlns:a="http://schemas.openxmlformats.org/drawingml/2006/main" xmlns:r="http://schemas.openxmlformats.org/officeDocument/2006/relationships" xmlns:p="http://schemas.openxmlformats.org/presentationml/2006/main">
   <p:cSld>
     <p:spTree>
       <p:nvGrpSpPr>
@@ -10460,7 +11628,7 @@
       </p:grpSpPr>
       <p:sp>
         <p:nvSpPr>
-          <p:cNvPr id="29" name="Rect 0"/>
+          <p:cNvPr id="35" name="Rect 0"/>
           <p:cNvSpPr txBox="1">
             <a:spLocks/>
           </p:cNvSpPr>
@@ -10468,8 +11636,8 @@
         </p:nvSpPr>
         <p:spPr>
           <a:xfrm rot="0">
-            <a:off x="1229995" y="1337310"/>
-            <a:ext cx="4039870" cy="371475"/>
+            <a:off x="4126865" y="467995"/>
+            <a:ext cx="3938270" cy="554990"/>
           </a:xfrm>
           <a:prstGeom prst="rect"/>
           <a:noFill/>
@@ -10484,11 +11652,39 @@
           </a:bodyPr>
           <a:lstStyle/>
           <a:p>
-            <a:pPr marL="0" indent="0" algn="l" latinLnBrk="0" hangingPunct="1">
-              <a:buFontTx/>
-              <a:buNone/>
-            </a:pPr>
-            <a:endParaRPr lang="ko-KR" altLang="en-US" sz="1800">
+            <a:pPr marL="0" indent="0" rtl="0" algn="l" defTabSz="914400" eaLnBrk="1" latinLnBrk="0" hangingPunct="1">
+              <a:buFontTx/>
+              <a:buNone/>
+            </a:pPr>
+            <a:r>
+              <a:rPr lang="ko-KR" sz="3000" b="1">
+                <a:latin typeface="맑은 고딕" charset="0"/>
+                <a:ea typeface="맑은 고딕" charset="0"/>
+              </a:rPr>
+              <a:t>열</a:t>
+            </a:r>
+            <a:r>
+              <a:rPr lang="ko-KR" sz="3000" b="1">
+                <a:latin typeface="맑은 고딕" charset="0"/>
+                <a:ea typeface="맑은 고딕" charset="0"/>
+              </a:rPr>
+              <a:t>일곱</a:t>
+            </a:r>
+            <a:r>
+              <a:rPr lang="ko-KR" sz="3000" b="1">
+                <a:latin typeface="맑은 고딕" charset="0"/>
+                <a:ea typeface="맑은 고딕" charset="0"/>
+              </a:rPr>
+              <a:t> 번째 튜토리얼</a:t>
+            </a:r>
+            <a:r>
+              <a:rPr sz="3000" b="1">
+                <a:latin typeface="맑은 고딕" charset="0"/>
+                <a:ea typeface="맑은 고딕" charset="0"/>
+              </a:rPr>
+              <a:t> </a:t>
+            </a:r>
+            <a:endParaRPr lang="ko-KR" altLang="en-US" sz="3000" b="1">
               <a:latin typeface="맑은 고딕" charset="0"/>
               <a:ea typeface="맑은 고딕" charset="0"/>
             </a:endParaRPr>
@@ -10497,16 +11693,16 @@
       </p:sp>
       <p:sp>
         <p:nvSpPr>
-          <p:cNvPr id="35" name="Rect 0"/>
+          <p:cNvPr id="57" name="Rect 0"/>
           <p:cNvSpPr txBox="1">
             <a:spLocks/>
           </p:cNvSpPr>
           <p:nvPr/>
         </p:nvSpPr>
         <p:spPr>
-          <a:xfrm>
-            <a:off x="4156710" y="443230"/>
-            <a:ext cx="3883660" cy="554990"/>
+          <a:xfrm rot="0">
+            <a:off x="6841490" y="4217670"/>
+            <a:ext cx="4098925" cy="2061845"/>
           </a:xfrm>
           <a:prstGeom prst="rect"/>
           <a:noFill/>
@@ -10524,45 +11720,107 @@
             <a:pPr marL="0" indent="0" rtl="0" algn="l" defTabSz="914400" eaLnBrk="1" latinLnBrk="0" hangingPunct="1">
               <a:buFontTx/>
               <a:buNone/>
-            </a:pPr>
-            <a:r>
-              <a:rPr lang="ko-KR" sz="3000" b="1">
-                <a:latin typeface="맑은 고딕" charset="0"/>
-                <a:ea typeface="맑은 고딕" charset="0"/>
-              </a:rPr>
-              <a:t>열</a:t>
-            </a:r>
-            <a:r>
-              <a:rPr lang="ko-KR" sz="3000" b="1">
-                <a:latin typeface="맑은 고딕" charset="0"/>
-                <a:ea typeface="맑은 고딕" charset="0"/>
-              </a:rPr>
-              <a:t>여섯</a:t>
-            </a:r>
-            <a:r>
-              <a:rPr lang="ko-KR" sz="3000" b="1">
-                <a:latin typeface="맑은 고딕" charset="0"/>
-                <a:ea typeface="맑은 고딕" charset="0"/>
-              </a:rPr>
-              <a:t> 번째 튜토리얼</a:t>
-            </a:r>
-            <a:r>
-              <a:rPr sz="3000" b="1">
+              <a:tabLst>
+                <a:tab pos="3869690" algn="l"/>
+              </a:tabLst>
+            </a:pPr>
+            <a:r>
+              <a:rPr lang="ko-KR" sz="2000" b="1">
+                <a:solidFill>
+                  <a:srgbClr val="0611F2"/>
+                </a:solidFill>
+                <a:latin typeface="맑은 고딕" charset="0"/>
+                <a:ea typeface="맑은 고딕" charset="0"/>
+              </a:rPr>
+              <a:t>3</a:t>
+            </a:r>
+            <a:r>
+              <a:rPr lang="ko-KR" sz="2000" b="1">
+                <a:solidFill>
+                  <a:srgbClr val="0611F2"/>
+                </a:solidFill>
+                <a:latin typeface="맑은 고딕" charset="0"/>
+                <a:ea typeface="맑은 고딕" charset="0"/>
+              </a:rPr>
+              <a:t>8</a:t>
+            </a:r>
+            <a:r>
+              <a:rPr lang="ko-KR" sz="2000" b="1">
+                <a:solidFill>
+                  <a:srgbClr val="0611F2"/>
+                </a:solidFill>
+                <a:latin typeface="맑은 고딕" charset="0"/>
+                <a:ea typeface="맑은 고딕" charset="0"/>
+              </a:rPr>
+              <a:t>.</a:t>
+            </a:r>
+            <a:r>
+              <a:rPr lang="ko-KR" sz="2000">
+                <a:solidFill>
+                  <a:srgbClr val="0611F2"/>
+                </a:solidFill>
                 <a:latin typeface="맑은 고딕" charset="0"/>
                 <a:ea typeface="맑은 고딕" charset="0"/>
               </a:rPr>
               <a:t> </a:t>
             </a:r>
-            <a:endParaRPr lang="ko-KR" altLang="en-US" sz="3000" b="1">
+            <a:r>
+              <a:rPr lang="ko-KR" sz="1800">
+                <a:latin typeface="맑은 고딕" charset="0"/>
+                <a:ea typeface="맑은 고딕" charset="0"/>
+              </a:rPr>
+              <a:t>마지막으로 Sign In Button과 Sign Up Button 하위 오브젝트의 Text 오브젝트의 이름을 Sign In Text와 Sign Up Text로 변경합니다.</a:t>
+            </a:r>
+            <a:endParaRPr lang="ko-KR" altLang="en-US" sz="1800">
               <a:latin typeface="맑은 고딕" charset="0"/>
               <a:ea typeface="맑은 고딕" charset="0"/>
             </a:endParaRPr>
           </a:p>
-        </p:txBody>
-      </p:sp>
-      <p:sp>
-        <p:nvSpPr>
-          <p:cNvPr id="57" name="Rect 0"/>
+          <a:p>
+            <a:pPr marL="0" indent="0" rtl="0" algn="l" defTabSz="914400" eaLnBrk="1" latinLnBrk="0" hangingPunct="1">
+              <a:buFontTx/>
+              <a:buNone/>
+              <a:tabLst>
+                <a:tab pos="3869690" algn="l"/>
+              </a:tabLst>
+            </a:pPr>
+            <a:endParaRPr lang="ko-KR" altLang="en-US" sz="1800">
+              <a:latin typeface="맑은 고딕" charset="0"/>
+              <a:ea typeface="맑은 고딕" charset="0"/>
+            </a:endParaRPr>
+          </a:p>
+          <a:p>
+            <a:pPr marL="0" indent="0" rtl="0" algn="l" defTabSz="914400" eaLnBrk="1" latinLnBrk="0" hangingPunct="1">
+              <a:buFontTx/>
+              <a:buNone/>
+              <a:tabLst>
+                <a:tab pos="3869690" algn="l"/>
+              </a:tabLst>
+            </a:pPr>
+            <a:r>
+              <a:rPr lang="ko-KR" sz="1800">
+                <a:latin typeface="맑은 고딕" charset="0"/>
+                <a:ea typeface="맑은 고딕" charset="0"/>
+              </a:rPr>
+              <a:t>그리고 각각의 텍스트의 Font Size와 Font Style을 설정합니다.</a:t>
+            </a:r>
+            <a:r>
+              <a:rPr lang="ko-KR" sz="1800">
+                <a:latin typeface="맑은 고딕" charset="0"/>
+                <a:ea typeface="맑은 고딕" charset="0"/>
+              </a:rPr>
+              <a:t> </a:t>
+            </a:r>
+            <a:endParaRPr lang="ko-KR" altLang="en-US" sz="1800">
+              <a:latin typeface="맑은 고딕" charset="0"/>
+              <a:ea typeface="맑은 고딕" charset="0"/>
+            </a:endParaRPr>
+          </a:p>
+        </p:txBody>
+      </p:sp>
+      <p:sp>
+        <p:nvSpPr>
+          <p:cNvPr id="60" name="Rect 0"/>
           <p:cNvSpPr txBox="1">
             <a:spLocks/>
           </p:cNvSpPr>
@@ -10570,8 +11828,8 @@
         </p:nvSpPr>
         <p:spPr>
           <a:xfrm rot="0">
-            <a:off x="6654800" y="5022850"/>
-            <a:ext cx="4460875" cy="1231900"/>
+            <a:off x="1237615" y="5601970"/>
+            <a:ext cx="4149090" cy="677545"/>
           </a:xfrm>
           <a:prstGeom prst="rect"/>
           <a:noFill/>
@@ -10598,7 +11856,17 @@
                 <a:latin typeface="맑은 고딕" charset="0"/>
                 <a:ea typeface="맑은 고딕" charset="0"/>
               </a:rPr>
-              <a:t>32.</a:t>
+              <a:t>37</a:t>
+            </a:r>
+            <a:r>
+              <a:rPr lang="ko-KR" sz="2000" b="1">
+                <a:solidFill>
+                  <a:srgbClr val="0611F2"/>
+                </a:solidFill>
+                <a:latin typeface="맑은 고딕" charset="0"/>
+                <a:ea typeface="맑은 고딕" charset="0"/>
+              </a:rPr>
+              <a:t>.</a:t>
             </a:r>
             <a:r>
               <a:rPr lang="ko-KR" sz="2000">
@@ -10615,7 +11883,7 @@
                 <a:latin typeface="맑은 고딕" charset="0"/>
                 <a:ea typeface="맑은 고딕" charset="0"/>
               </a:rPr>
-              <a:t>그런 다음 유저의 ID를 선택하면 Master player account에 접근해서 비밀번호를 변경하거나 비밀번호를 직접 볼 수 있습니다.</a:t>
+              <a:t>이제 Region DropDown의 옵션에 KR, JP, AU라는 값을 정의합니다.</a:t>
             </a:r>
             <a:endParaRPr lang="ko-KR" altLang="en-US" sz="1800">
               <a:latin typeface="맑은 고딕" charset="0"/>
@@ -10624,83 +11892,19 @@
           </a:p>
         </p:txBody>
       </p:sp>
-      <p:sp>
-        <p:nvSpPr>
-          <p:cNvPr id="60" name="Rect 0"/>
-          <p:cNvSpPr txBox="1">
-            <a:spLocks/>
-          </p:cNvSpPr>
-          <p:nvPr/>
-        </p:nvSpPr>
-        <p:spPr>
-          <a:xfrm rot="0">
-            <a:off x="1229995" y="5019675"/>
-            <a:ext cx="4173855" cy="1231900"/>
-          </a:xfrm>
-          <a:prstGeom prst="rect"/>
-          <a:noFill/>
-          <a:ln w="0">
-            <a:noFill/>
-            <a:prstDash/>
-          </a:ln>
-        </p:spPr>
-        <p:txBody>
-          <a:bodyPr wrap="square" lIns="89535" tIns="46355" rIns="89535" bIns="46355" numCol="1" vert="horz" anchor="t">
-            <a:spAutoFit/>
-          </a:bodyPr>
-          <a:lstStyle/>
-          <a:p>
-            <a:pPr marL="0" indent="0" rtl="0" algn="l" defTabSz="914400" eaLnBrk="1" latinLnBrk="0" hangingPunct="1">
-              <a:buFontTx/>
-              <a:buNone/>
-            </a:pPr>
-            <a:r>
-              <a:rPr lang="ko-KR" sz="2000" b="1">
-                <a:solidFill>
-                  <a:srgbClr val="0611F2"/>
-                </a:solidFill>
-                <a:latin typeface="맑은 고딕" charset="0"/>
-                <a:ea typeface="맑은 고딕" charset="0"/>
-              </a:rPr>
-              <a:t>31.</a:t>
-            </a:r>
-            <a:r>
-              <a:rPr lang="ko-KR" sz="2000">
-                <a:solidFill>
-                  <a:srgbClr val="0611F2"/>
-                </a:solidFill>
-                <a:latin typeface="맑은 고딕" charset="0"/>
-                <a:ea typeface="맑은 고딕" charset="0"/>
-              </a:rPr>
-              <a:t> </a:t>
-            </a:r>
-            <a:r>
-              <a:rPr lang="ko-KR" sz="1800">
-                <a:latin typeface="맑은 고딕" charset="0"/>
-                <a:ea typeface="맑은 고딕" charset="0"/>
-              </a:rPr>
-              <a:t>게임을 실행하고 회원가입을 완료한 후에 PlayFab의 타이틀로 가서 방금 생성한 유저의 정보가 서버에 저장되게 됩니다.</a:t>
-            </a:r>
-            <a:endParaRPr lang="ko-KR" altLang="en-US" sz="1800">
-              <a:latin typeface="맑은 고딕" charset="0"/>
-              <a:ea typeface="맑은 고딕" charset="0"/>
-            </a:endParaRPr>
-          </a:p>
-        </p:txBody>
-      </p:sp>
       <p:pic>
         <p:nvPicPr>
-          <p:cNvPr id="61" name="그림 2"/>
+          <p:cNvPr id="73" name="그림 67" descr="C:/Users/Admin1/AppData/Roaming/PolarisOffice/ETemp/2936_21704408/fImage131623402995.png"/>
           <p:cNvPicPr>
             <a:picLocks noChangeAspect="1"/>
           </p:cNvPicPr>
           <p:nvPr/>
         </p:nvPicPr>
         <p:blipFill rotWithShape="1">
-          <a:blip r:embed="rId2" cstate="hqprint">
+          <a:blip r:embed="rId2" cstate="print">
             <a:extLst>
               <a:ext uri="{28A0092B-C50C-407E-A947-70E740481C1C}">
-                <a14:useLocalDpi xmlns:a14="http://schemas.microsoft.com/office/drawing/2010/main"/>
+                <a14:useLocalDpi xmlns:a14="http://schemas.microsoft.com/office/drawing/2010/main" val="0"/>
               </a:ext>
             </a:extLst>
           </a:blip>
@@ -10710,8 +11914,8 @@
         </p:blipFill>
         <p:spPr>
           <a:xfrm rot="0">
-            <a:off x="1205230" y="1338580"/>
-            <a:ext cx="4067175" cy="3574415"/>
+            <a:off x="1234440" y="1411605"/>
+            <a:ext cx="4152900" cy="1157605"/>
           </a:xfrm>
           <a:prstGeom prst="roundRect"/>
           <a:solidFill>
@@ -10719,19 +11923,93 @@
           </a:solidFill>
         </p:spPr>
       </p:pic>
+      <p:sp>
+        <p:nvSpPr>
+          <p:cNvPr id="74" name="텍스트 상자 70"/>
+          <p:cNvSpPr txBox="1">
+            <a:spLocks/>
+          </p:cNvSpPr>
+          <p:nvPr/>
+        </p:nvSpPr>
+        <p:spPr>
+          <a:xfrm rot="0">
+            <a:off x="1242695" y="2655570"/>
+            <a:ext cx="4149090" cy="954405"/>
+          </a:xfrm>
+          <a:prstGeom prst="rect"/>
+          <a:noFill/>
+          <a:ln w="0">
+            <a:noFill/>
+            <a:prstDash/>
+          </a:ln>
+        </p:spPr>
+        <p:txBody>
+          <a:bodyPr wrap="square" lIns="89535" tIns="46355" rIns="89535" bIns="46355" numCol="1" vert="horz" anchor="t">
+            <a:spAutoFit/>
+          </a:bodyPr>
+          <a:lstStyle/>
+          <a:p>
+            <a:pPr marL="0" indent="0" rtl="0" algn="l" defTabSz="914400" eaLnBrk="1" latinLnBrk="0" hangingPunct="1">
+              <a:buFontTx/>
+              <a:buNone/>
+            </a:pPr>
+            <a:r>
+              <a:rPr lang="ko-KR" sz="2000" b="1">
+                <a:solidFill>
+                  <a:srgbClr val="0611F2"/>
+                </a:solidFill>
+                <a:latin typeface="맑은 고딕" charset="0"/>
+                <a:ea typeface="맑은 고딕" charset="0"/>
+              </a:rPr>
+              <a:t>36</a:t>
+            </a:r>
+            <a:r>
+              <a:rPr lang="ko-KR" sz="2000" b="1">
+                <a:solidFill>
+                  <a:srgbClr val="0611F2"/>
+                </a:solidFill>
+                <a:latin typeface="맑은 고딕" charset="0"/>
+                <a:ea typeface="맑은 고딕" charset="0"/>
+              </a:rPr>
+              <a:t>.</a:t>
+            </a:r>
+            <a:r>
+              <a:rPr lang="ko-KR" sz="2000">
+                <a:solidFill>
+                  <a:srgbClr val="0611F2"/>
+                </a:solidFill>
+                <a:latin typeface="맑은 고딕" charset="0"/>
+                <a:ea typeface="맑은 고딕" charset="0"/>
+              </a:rPr>
+              <a:t> </a:t>
+            </a:r>
+            <a:r>
+              <a:rPr lang="ko-KR" sz="1800">
+                <a:latin typeface="맑은 고딕" charset="0"/>
+                <a:ea typeface="맑은 고딕" charset="0"/>
+              </a:rPr>
+              <a:t>그런 다음 Region DropDown 오브젝트의 앵커를 지정하고 위치와 회전 값을 설정합니다.</a:t>
+            </a:r>
+            <a:endParaRPr lang="ko-KR" altLang="en-US" sz="1800">
+              <a:latin typeface="맑은 고딕" charset="0"/>
+              <a:ea typeface="맑은 고딕" charset="0"/>
+            </a:endParaRPr>
+          </a:p>
+        </p:txBody>
+      </p:sp>
       <p:pic>
         <p:nvPicPr>
-          <p:cNvPr id="62" name="그림 3"/>
+          <p:cNvPr id="75" name="그림 71" descr="C:/Users/Admin1/AppData/Roaming/PolarisOffice/ETemp/2936_21704408/fImage85723421942.png"/>
           <p:cNvPicPr>
             <a:picLocks noChangeAspect="1"/>
           </p:cNvPicPr>
           <p:nvPr/>
         </p:nvPicPr>
         <p:blipFill rotWithShape="1">
-          <a:blip r:embed="rId3" cstate="hqprint">
+          <a:blip r:embed="rId3" cstate="print">
             <a:extLst>
               <a:ext uri="{28A0092B-C50C-407E-A947-70E740481C1C}">
-                <a14:useLocalDpi xmlns:a14="http://schemas.microsoft.com/office/drawing/2010/main"/>
+                <a14:useLocalDpi xmlns:a14="http://schemas.microsoft.com/office/drawing/2010/main" val="0"/>
               </a:ext>
             </a:extLst>
           </a:blip>
@@ -10741,13 +12019,102 @@
         </p:blipFill>
         <p:spPr>
           <a:xfrm rot="0">
-            <a:off x="6675755" y="1334770"/>
-            <a:ext cx="4457065" cy="3571240"/>
+            <a:off x="1242695" y="3731895"/>
+            <a:ext cx="4152900" cy="1821180"/>
           </a:xfrm>
           <a:prstGeom prst="roundRect"/>
           <a:solidFill>
             <a:srgbClr val="EDEDED"/>
           </a:solidFill>
+        </p:spPr>
+      </p:pic>
+      <p:pic>
+        <p:nvPicPr>
+          <p:cNvPr id="76" name="그림 74" descr="C:/Users/Admin1/AppData/Roaming/PolarisOffice/ETemp/2936_21704408/fImage104553434827.png"/>
+          <p:cNvPicPr>
+            <a:picLocks noChangeAspect="1"/>
+          </p:cNvPicPr>
+          <p:nvPr/>
+        </p:nvPicPr>
+        <p:blipFill rotWithShape="1">
+          <a:blip r:embed="rId4" cstate="print">
+            <a:extLst>
+              <a:ext uri="{28A0092B-C50C-407E-A947-70E740481C1C}">
+                <a14:useLocalDpi xmlns:a14="http://schemas.microsoft.com/office/drawing/2010/main" val="0"/>
+              </a:ext>
+            </a:extLst>
+          </a:blip>
+          <a:stretch>
+            <a:fillRect/>
+          </a:stretch>
+        </p:blipFill>
+        <p:spPr>
+          <a:xfrm rot="0">
+            <a:off x="6833235" y="1424940"/>
+            <a:ext cx="1347470" cy="2707005"/>
+          </a:xfrm>
+          <a:prstGeom prst="roundRect"/>
+          <a:solidFill>
+            <a:srgbClr val="EDEDED"/>
+          </a:solidFill>
+        </p:spPr>
+      </p:pic>
+      <p:pic>
+        <p:nvPicPr>
+          <p:cNvPr id="77" name="그림 77" descr="C:/Users/Admin1/AppData/Roaming/PolarisOffice/ETemp/2936_21704408/fImage106913445436.png"/>
+          <p:cNvPicPr>
+            <a:picLocks noChangeAspect="1"/>
+          </p:cNvPicPr>
+          <p:nvPr/>
+        </p:nvPicPr>
+        <p:blipFill rotWithShape="1">
+          <a:blip r:embed="rId5" cstate="print">
+            <a:extLst>
+              <a:ext uri="{28A0092B-C50C-407E-A947-70E740481C1C}">
+                <a14:useLocalDpi xmlns:a14="http://schemas.microsoft.com/office/drawing/2010/main" val="0"/>
+              </a:ext>
+            </a:extLst>
+          </a:blip>
+          <a:stretch>
+            <a:fillRect/>
+          </a:stretch>
+        </p:blipFill>
+        <p:spPr>
+          <a:xfrm rot="0">
+            <a:off x="8321675" y="1421765"/>
+            <a:ext cx="2618740" cy="1238885"/>
+          </a:xfrm>
+          <a:prstGeom prst="rect"/>
+          <a:noFill/>
+        </p:spPr>
+      </p:pic>
+      <p:pic>
+        <p:nvPicPr>
+          <p:cNvPr id="78" name="그림 80" descr="C:/Users/Admin1/AppData/Roaming/PolarisOffice/ETemp/2936_21704408/fImage104703452391.png"/>
+          <p:cNvPicPr>
+            <a:picLocks noChangeAspect="1"/>
+          </p:cNvPicPr>
+          <p:nvPr/>
+        </p:nvPicPr>
+        <p:blipFill rotWithShape="1">
+          <a:blip r:embed="rId6" cstate="print">
+            <a:extLst>
+              <a:ext uri="{28A0092B-C50C-407E-A947-70E740481C1C}">
+                <a14:useLocalDpi xmlns:a14="http://schemas.microsoft.com/office/drawing/2010/main" val="0"/>
+              </a:ext>
+            </a:extLst>
+          </a:blip>
+          <a:stretch>
+            <a:fillRect/>
+          </a:stretch>
+        </p:blipFill>
+        <p:spPr>
+          <a:xfrm rot="0">
+            <a:off x="8329930" y="2876550"/>
+            <a:ext cx="2610485" cy="1247140"/>
+          </a:xfrm>
+          <a:prstGeom prst="rect"/>
+          <a:noFill/>
         </p:spPr>
       </p:pic>
     </p:spTree>
@@ -10897,7 +12264,7 @@
       </p:sp>
       <p:pic>
         <p:nvPicPr>
-          <p:cNvPr id="9" name="그림 4" descr="C:/Users/Admin1/AppData/Roaming/PolarisOffice/ETemp/17716_5745816/fImage522971406500.png"/>
+          <p:cNvPr id="9" name="그림 4"/>
           <p:cNvPicPr>
             <a:picLocks noChangeAspect="1"/>
           </p:cNvPicPr>
@@ -10928,7 +12295,7 @@
       </p:pic>
       <p:pic>
         <p:nvPicPr>
-          <p:cNvPr id="10" name="그림 6" descr="C:/Users/Admin1/AppData/Roaming/PolarisOffice/ETemp/17716_5745816/fImage409501396334.png"/>
+          <p:cNvPr id="10" name="그림 6"/>
           <p:cNvPicPr>
             <a:picLocks noChangeAspect="1"/>
           </p:cNvPicPr>
@@ -11095,7 +12462,7 @@
       </p:sp>
       <p:pic>
         <p:nvPicPr>
-          <p:cNvPr id="13" name="그림 9" descr="C:/Users/Admin1/AppData/Roaming/PolarisOffice/ETemp/17716_5745816/fImage20639513741.png"/>
+          <p:cNvPr id="13" name="그림 9"/>
           <p:cNvPicPr>
             <a:picLocks noChangeAspect="1"/>
           </p:cNvPicPr>
@@ -11316,7 +12683,7 @@
       </p:sp>
       <p:pic>
         <p:nvPicPr>
-          <p:cNvPr id="26" name="그림 5" descr="C:/Users/Admin1/AppData/Roaming/PolarisOffice/ETemp/17716_5745816/fImage337991419169.png"/>
+          <p:cNvPr id="26" name="그림 5"/>
           <p:cNvPicPr>
             <a:picLocks noChangeAspect="1"/>
           </p:cNvPicPr>
@@ -11347,7 +12714,7 @@
       </p:pic>
       <p:pic>
         <p:nvPicPr>
-          <p:cNvPr id="27" name="그림 6" descr="C:/Users/Admin1/AppData/Roaming/PolarisOffice/ETemp/17716_5745816/fImage178001425724.png"/>
+          <p:cNvPr id="27" name="그림 6"/>
           <p:cNvPicPr>
             <a:picLocks noChangeAspect="1"/>
           </p:cNvPicPr>
@@ -11623,7 +12990,7 @@
       </p:sp>
       <p:pic>
         <p:nvPicPr>
-          <p:cNvPr id="39" name="그림 13" descr="C:/Users/Admin1/AppData/Roaming/PolarisOffice/ETemp/17716_5745816/fImage507371496962.png"/>
+          <p:cNvPr id="39" name="그림 13"/>
           <p:cNvPicPr>
             <a:picLocks noChangeAspect="1"/>
           </p:cNvPicPr>
@@ -11723,7 +13090,7 @@
       </p:sp>
       <p:pic>
         <p:nvPicPr>
-          <p:cNvPr id="41" name="그림 26" descr="C:/Users/Admin1/AppData/Roaming/PolarisOffice/ETemp/17716_5745816/fImage113693008467.png"/>
+          <p:cNvPr id="41" name="그림 26"/>
           <p:cNvPicPr>
             <a:picLocks noChangeAspect="1"/>
           </p:cNvPicPr>
@@ -11752,7 +13119,7 @@
       </p:pic>
       <p:pic>
         <p:nvPicPr>
-          <p:cNvPr id="42" name="그림 31" descr="C:/Users/Admin1/AppData/Roaming/PolarisOffice/ETemp/17716_5745816/fImage364671479358.png"/>
+          <p:cNvPr id="42" name="그림 31"/>
           <p:cNvPicPr>
             <a:picLocks noChangeAspect="1"/>
           </p:cNvPicPr>
@@ -12207,7 +13574,7 @@
       </p:sp>
       <p:pic>
         <p:nvPicPr>
-          <p:cNvPr id="47" name="그림 18" descr="C:/Users/Admin1/AppData/Roaming/PolarisOffice/ETemp/17716_5745816/fImage330901548145.png"/>
+          <p:cNvPr id="47" name="그림 18"/>
           <p:cNvPicPr>
             <a:picLocks noChangeAspect="1"/>
           </p:cNvPicPr>
@@ -12624,7 +13991,7 @@
       </p:sp>
       <p:pic>
         <p:nvPicPr>
-          <p:cNvPr id="49" name="그림 22" descr="C:/Users/Admin1/AppData/Roaming/PolarisOffice/ETemp/17716_5745816/fImage364772413281.png"/>
+          <p:cNvPr id="49" name="그림 22"/>
           <p:cNvPicPr>
             <a:picLocks noChangeAspect="1"/>
           </p:cNvPicPr>
@@ -12653,7 +14020,7 @@
       </p:pic>
       <p:pic>
         <p:nvPicPr>
-          <p:cNvPr id="50" name="그림 23" descr="C:/Users/Admin1/AppData/Roaming/PolarisOffice/ETemp/17716_5745816/fImage183122426827.png"/>
+          <p:cNvPr id="50" name="그림 23"/>
           <p:cNvPicPr>
             <a:picLocks noChangeAspect="1"/>
           </p:cNvPicPr>
@@ -13422,7 +14789,7 @@
       </p:sp>
       <p:pic>
         <p:nvPicPr>
-          <p:cNvPr id="55" name="그림 28" descr="C:/Users/Admin1/AppData/Roaming/PolarisOffice/ETemp/17716_5745816/fImage250602681942.png"/>
+          <p:cNvPr id="55" name="그림 28"/>
           <p:cNvPicPr>
             <a:picLocks noChangeAspect="1"/>
           </p:cNvPicPr>
@@ -13451,7 +14818,7 @@
       </p:pic>
       <p:pic>
         <p:nvPicPr>
-          <p:cNvPr id="56" name="그림 29" descr="C:/Users/Admin1/AppData/Roaming/PolarisOffice/ETemp/17716_5745816/fImage191382694827.png"/>
+          <p:cNvPr id="56" name="그림 29"/>
           <p:cNvPicPr>
             <a:picLocks noChangeAspect="1"/>
           </p:cNvPicPr>
@@ -13482,7 +14849,7 @@
       </p:pic>
       <p:pic>
         <p:nvPicPr>
-          <p:cNvPr id="57" name="그림 34" descr="C:/Users/Admin1/AppData/Roaming/PolarisOffice/ETemp/17716_5745816/fImage64373136334.png"/>
+          <p:cNvPr id="57" name="그림 34"/>
           <p:cNvPicPr>
             <a:picLocks noChangeAspect="1"/>
           </p:cNvPicPr>
@@ -13535,7 +14902,7 @@
 </file>
 
 <file path=ppt/slides/slide9.xml><?xml version="1.0" encoding="utf-8"?>
-<p:sld xmlns:a="http://schemas.openxmlformats.org/drawingml/2006/main" xmlns:r="http://schemas.openxmlformats.org/officeDocument/2006/relationships" xmlns:p="http://schemas.openxmlformats.org/presentationml/2006/main">
+<p:sld xmlns:a="http://schemas.openxmlformats.org/drawingml/2006/main" xmlns:r="http://schemas.openxmlformats.org/officeDocument/2006/relationships" xmlns:p="http://schemas.openxmlformats.org/presentationml/2006/main" xmlns:p14="http://schemas.microsoft.com/office/powerpoint/2010/main">
   <p:cSld>
     <p:spTree>
       <p:nvGrpSpPr>
@@ -13655,9 +15022,9 @@
           <p:nvPr/>
         </p:nvSpPr>
         <p:spPr>
-          <a:xfrm rot="0">
+          <a:xfrm>
             <a:off x="1230630" y="4930140"/>
-            <a:ext cx="4131945" cy="1231265"/>
+            <a:ext cx="4132580" cy="1231265"/>
           </a:xfrm>
           <a:prstGeom prst="rect"/>
           <a:noFill/>
@@ -13684,17 +15051,7 @@
                 <a:latin typeface="맑은 고딕" charset="0"/>
                 <a:ea typeface="맑은 고딕" charset="0"/>
               </a:rPr>
-              <a:t>20</a:t>
-            </a:r>
-            <a:r>
-              <a:rPr lang="ko-KR" sz="2000" b="1">
-                <a:solidFill>
-                  <a:srgbClr val="0611F2"/>
-                </a:solidFill>
-                <a:latin typeface="맑은 고딕" charset="0"/>
-                <a:ea typeface="맑은 고딕" charset="0"/>
-              </a:rPr>
-              <a:t>.</a:t>
+              <a:t>20.</a:t>
             </a:r>
             <a:r>
               <a:rPr lang="ko-KR" sz="2000">
@@ -13711,7 +15068,7 @@
                 <a:latin typeface="맑은 고딕" charset="0"/>
                 <a:ea typeface="맑은 고딕" charset="0"/>
               </a:rPr>
-              <a:t>그런 다음 UI에서 Input Field를 3개 생성하고 각각의 이름을 Email Input과 Password Input 그리고 UserName Input으로 정의합니다.</a:t>
+              <a:t>그런 다음 UI에서 Input Field를 3개 생성하고 각각의 이름을 Email Input과 Password Input그리고 UserName Input으로 정의합니다.</a:t>
             </a:r>
             <a:endParaRPr lang="ko-KR" altLang="en-US" sz="1800">
               <a:latin typeface="맑은 고딕" charset="0"/>
@@ -13722,7 +15079,7 @@
       </p:sp>
       <p:pic>
         <p:nvPicPr>
-          <p:cNvPr id="57" name="Picture " descr="C:/Users/Admin1/AppData/Roaming/PolarisOffice/ETemp/17716_5745816/fImage191502705436.png"/>
+          <p:cNvPr id="57" name="Picture "/>
           <p:cNvPicPr>
             <a:picLocks noChangeAspect="1"/>
           </p:cNvPicPr>
@@ -13753,7 +15110,7 @@
       </p:pic>
       <p:pic>
         <p:nvPicPr>
-          <p:cNvPr id="58" name="그림 37" descr="C:/Users/Admin1/AppData/Roaming/PolarisOffice/ETemp/17716_5745816/fImage83363146500.png"/>
+          <p:cNvPr id="58" name="그림 37"/>
           <p:cNvPicPr>
             <a:picLocks noChangeAspect="1"/>
           </p:cNvPicPr>
@@ -13782,6 +15139,166 @@
           </a:solidFill>
         </p:spPr>
       </p:pic>
+      <p:pic>
+        <p:nvPicPr>
+          <p:cNvPr id="59" name="그림 4" descr="C:/Users/Admin1/AppData/Roaming/PolarisOffice/ETemp/2936_21704408/fImage2008322341.png"/>
+          <p:cNvPicPr>
+            <a:picLocks noChangeAspect="1"/>
+          </p:cNvPicPr>
+          <p:nvPr/>
+        </p:nvPicPr>
+        <p:blipFill rotWithShape="1">
+          <a:blip r:embed="rId5" cstate="print">
+            <a:extLst>
+              <a:ext uri="{28A0092B-C50C-407E-A947-70E740481C1C}">
+                <a14:useLocalDpi xmlns:a14="http://schemas.microsoft.com/office/drawing/2010/main" val="0"/>
+              </a:ext>
+            </a:extLst>
+          </a:blip>
+          <a:stretch>
+            <a:fillRect/>
+          </a:stretch>
+        </p:blipFill>
+        <p:spPr>
+          <a:xfrm rot="0">
+            <a:off x="6808470" y="1339850"/>
+            <a:ext cx="2436495" cy="3706495"/>
+          </a:xfrm>
+          <a:prstGeom prst="roundRect"/>
+          <a:solidFill>
+            <a:srgbClr val="EDEDED"/>
+          </a:solidFill>
+        </p:spPr>
+      </p:pic>
+      <p:pic>
+        <p:nvPicPr>
+          <p:cNvPr id="60" name="그림 7" descr="C:/Users/Admin1/AppData/Roaming/PolarisOffice/ETemp/2936_21704408/fImage90292248467.png"/>
+          <p:cNvPicPr>
+            <a:picLocks noChangeAspect="1"/>
+          </p:cNvPicPr>
+          <p:nvPr/>
+        </p:nvPicPr>
+        <p:blipFill rotWithShape="1">
+          <a:blip r:embed="rId6" cstate="print">
+            <a:extLst>
+              <a:ext uri="{28A0092B-C50C-407E-A947-70E740481C1C}">
+                <a14:useLocalDpi xmlns:a14="http://schemas.microsoft.com/office/drawing/2010/main" val="0"/>
+              </a:ext>
+            </a:extLst>
+          </a:blip>
+          <a:stretch>
+            <a:fillRect/>
+          </a:stretch>
+        </p:blipFill>
+        <p:spPr>
+          <a:xfrm rot="0">
+            <a:off x="9468485" y="1820545"/>
+            <a:ext cx="1473835" cy="2743835"/>
+          </a:xfrm>
+          <a:prstGeom prst="roundRect"/>
+          <a:solidFill>
+            <a:srgbClr val="EDEDED"/>
+          </a:solidFill>
+        </p:spPr>
+      </p:pic>
+      <p:sp>
+        <p:nvSpPr>
+          <p:cNvPr id="61" name="텍스트 상자 10"/>
+          <p:cNvSpPr txBox="1">
+            <a:spLocks/>
+          </p:cNvSpPr>
+          <p:nvPr/>
+        </p:nvSpPr>
+        <p:spPr>
+          <a:xfrm rot="0">
+            <a:off x="6797040" y="5209540"/>
+            <a:ext cx="4132580" cy="954405"/>
+          </a:xfrm>
+          <a:prstGeom prst="rect"/>
+          <a:noFill/>
+          <a:ln w="0">
+            <a:noFill/>
+            <a:prstDash/>
+          </a:ln>
+        </p:spPr>
+        <p:txBody>
+          <a:bodyPr wrap="square" lIns="89535" tIns="46355" rIns="89535" bIns="46355" numCol="1" vert="horz" anchor="t">
+            <a:spAutoFit/>
+          </a:bodyPr>
+          <a:lstStyle/>
+          <a:p>
+            <a:pPr marL="0" indent="0" rtl="0" algn="l" defTabSz="914400" eaLnBrk="1" latinLnBrk="0" hangingPunct="1">
+              <a:buFontTx/>
+              <a:buNone/>
+            </a:pPr>
+            <a:r>
+              <a:rPr lang="ko-KR" sz="2000" b="1">
+                <a:solidFill>
+                  <a:srgbClr val="0611F2"/>
+                </a:solidFill>
+                <a:latin typeface="맑은 고딕" charset="0"/>
+                <a:ea typeface="맑은 고딕" charset="0"/>
+              </a:rPr>
+              <a:t>2</a:t>
+            </a:r>
+            <a:r>
+              <a:rPr lang="ko-KR" sz="2000" b="1">
+                <a:solidFill>
+                  <a:srgbClr val="0611F2"/>
+                </a:solidFill>
+                <a:latin typeface="맑은 고딕" charset="0"/>
+                <a:ea typeface="맑은 고딕" charset="0"/>
+              </a:rPr>
+              <a:t>1</a:t>
+            </a:r>
+            <a:r>
+              <a:rPr lang="ko-KR" sz="2000" b="1">
+                <a:solidFill>
+                  <a:srgbClr val="0611F2"/>
+                </a:solidFill>
+                <a:latin typeface="맑은 고딕" charset="0"/>
+                <a:ea typeface="맑은 고딕" charset="0"/>
+              </a:rPr>
+              <a:t>.</a:t>
+            </a:r>
+            <a:r>
+              <a:rPr lang="ko-KR" sz="2000">
+                <a:solidFill>
+                  <a:srgbClr val="0611F2"/>
+                </a:solidFill>
+                <a:latin typeface="맑은 고딕" charset="0"/>
+                <a:ea typeface="맑은 고딕" charset="0"/>
+              </a:rPr>
+              <a:t> </a:t>
+            </a:r>
+            <a:r>
+              <a:rPr lang="ko-KR" sz="1800">
+                <a:latin typeface="맑은 고딕" charset="0"/>
+                <a:ea typeface="맑은 고딕" charset="0"/>
+              </a:rPr>
+              <a:t>그다음으로</a:t>
+            </a:r>
+            <a:r>
+              <a:rPr lang="ko-KR" sz="1800">
+                <a:latin typeface="맑은 고딕" charset="0"/>
+                <a:ea typeface="맑은 고딕" charset="0"/>
+              </a:rPr>
+              <a:t> </a:t>
+            </a:r>
+            <a:r>
+              <a:rPr lang="ko-KR" sz="1800">
+                <a:latin typeface="맑은 고딕" charset="0"/>
+                <a:ea typeface="맑은 고딕" charset="0"/>
+              </a:rPr>
+              <a:t>UI에서 Dropdown을 생성하고 Region DropDown이라는 이름으로 정의합니다.</a:t>
+            </a:r>
+            <a:endParaRPr lang="ko-KR" altLang="en-US" sz="1800">
+              <a:latin typeface="맑은 고딕" charset="0"/>
+              <a:ea typeface="맑은 고딕" charset="0"/>
+            </a:endParaRPr>
+          </a:p>
+        </p:txBody>
+      </p:sp>
     </p:spTree>
   </p:cSld>
   <p:clrMapOvr>

</xml_diff>

<commit_message>
Implementation of Notification Pop-Up System
- Change to connect to the room
  when the room button is selected

- Implemented so that no more
  pop-ups when a nickname is set

- Implementation of nickname
  storage system

- Add and delete resource data
</commit_message>
<xml_diff>
--- a/Assets/Class/Photon Server/PPT Data/Photon PlayFab.pptx
+++ b/Assets/Class/Photon Server/PPT Data/Photon PlayFab.pptx
@@ -2,29 +2,28 @@
 <file path=ppt/presentation.xml><?xml version="1.0" encoding="utf-8"?>
 <p:presentation xmlns:a="http://schemas.openxmlformats.org/drawingml/2006/main" xmlns:r="http://schemas.openxmlformats.org/officeDocument/2006/relationships" xmlns:p="http://schemas.openxmlformats.org/presentationml/2006/main" xmlns:p14="http://schemas.microsoft.com/office/powerpoint/2010/main" saveSubsetFonts="1" firstSlideNum="0">
   <p:sldMasterIdLst>
-    <p:sldMasterId id="2147486863" r:id="rId12"/>
+    <p:sldMasterId id="2147486875" r:id="rId12"/>
   </p:sldMasterIdLst>
   <p:notesMasterIdLst>
     <p:notesMasterId r:id="rId14"/>
   </p:notesMasterIdLst>
   <p:sldIdLst>
     <p:sldId id="317" r:id="rId16"/>
-    <p:sldId id="316" r:id="rId17"/>
-    <p:sldId id="318" r:id="rId18"/>
-    <p:sldId id="314" r:id="rId19"/>
-    <p:sldId id="319" r:id="rId20"/>
-    <p:sldId id="320" r:id="rId21"/>
-    <p:sldId id="321" r:id="rId22"/>
-    <p:sldId id="322" r:id="rId23"/>
-    <p:sldId id="330" r:id="rId24"/>
-    <p:sldId id="323" r:id="rId25"/>
-    <p:sldId id="324" r:id="rId26"/>
-    <p:sldId id="325" r:id="rId27"/>
-    <p:sldId id="326" r:id="rId28"/>
-    <p:sldId id="327" r:id="rId29"/>
-    <p:sldId id="328" r:id="rId30"/>
-    <p:sldId id="331" r:id="rId31"/>
-    <p:sldId id="332" r:id="rId32"/>
+    <p:sldId id="316" r:id="rId18"/>
+    <p:sldId id="318" r:id="rId20"/>
+    <p:sldId id="314" r:id="rId22"/>
+    <p:sldId id="319" r:id="rId24"/>
+    <p:sldId id="320" r:id="rId26"/>
+    <p:sldId id="321" r:id="rId28"/>
+    <p:sldId id="322" r:id="rId30"/>
+    <p:sldId id="330" r:id="rId32"/>
+    <p:sldId id="323" r:id="rId33"/>
+    <p:sldId id="324" r:id="rId34"/>
+    <p:sldId id="325" r:id="rId35"/>
+    <p:sldId id="326" r:id="rId36"/>
+    <p:sldId id="327" r:id="rId37"/>
+    <p:sldId id="328" r:id="rId38"/>
+    <p:sldId id="331" r:id="rId39"/>
   </p:sldIdLst>
   <p:sldSz cx="12192000" cy="6858000"/>
   <p:notesSz cx="6858000" cy="9144000"/>
@@ -1619,148 +1618,6 @@
 </p:notes>
 </file>
 
-<file path=ppt/notesSlides/notesSlide17.xml><?xml version="1.0" encoding="utf-8"?>
-<p:notes xmlns:a="http://schemas.openxmlformats.org/drawingml/2006/main" xmlns:r="http://schemas.openxmlformats.org/officeDocument/2006/relationships" xmlns:p="http://schemas.openxmlformats.org/presentationml/2006/main">
-  <p:cSld>
-    <p:spTree>
-      <p:nvGrpSpPr>
-        <p:cNvPr id="1" name=""/>
-        <p:cNvGrpSpPr/>
-        <p:nvPr/>
-      </p:nvGrpSpPr>
-      <p:grpSpPr>
-        <a:xfrm>
-          <a:off x="0" y="0"/>
-          <a:ext cx="0" cy="0"/>
-          <a:chOff x="0" y="0"/>
-          <a:chExt cx="0" cy="0"/>
-        </a:xfrm>
-      </p:grpSpPr>
-      <p:sp>
-        <p:nvSpPr>
-          <p:cNvPr id="2" name="슬라이드 이미지 개체 틀 3"/>
-          <p:cNvSpPr>
-            <a:spLocks noChangeAspect="1"/>
-          </p:cNvSpPr>
-          <p:nvPr>
-            <p:ph type="sldImg" idx="2"/>
-          </p:nvPr>
-        </p:nvSpPr>
-        <p:spPr>
-          <a:xfrm rot="0">
-            <a:off x="685800" y="1143000"/>
-            <a:ext cx="5494655" cy="3094355"/>
-          </a:xfrm>
-          <a:prstGeom prst="rect"/>
-          <a:noFill/>
-          <a:ln w="12700" cap="flat" cmpd="sng">
-            <a:solidFill>
-              <a:srgbClr val="000000">
-                <a:alpha val="100000"/>
-              </a:srgbClr>
-            </a:solidFill>
-            <a:prstDash val="solid"/>
-          </a:ln>
-        </p:spPr>
-        <p:txBody>
-          <a:bodyPr wrap="square" lIns="91440" tIns="45720" rIns="91440" bIns="45720" numCol="1" vert="horz" anchor="ctr">
-            <a:noAutofit/>
-          </a:bodyPr>
-          <a:lstStyle/>
-          <a:p>
-            <a:pPr marL="0" indent="0" latinLnBrk="0">
-              <a:buFontTx/>
-              <a:buNone/>
-            </a:pPr>
-          </a:p>
-        </p:txBody>
-      </p:sp>
-      <p:sp>
-        <p:nvSpPr>
-          <p:cNvPr id="3" name="슬라이드 노트 개체 틀 4"/>
-          <p:cNvSpPr txBox="1">
-            <a:spLocks/>
-          </p:cNvSpPr>
-          <p:nvPr>
-            <p:ph type="body" idx="3"/>
-          </p:nvPr>
-        </p:nvSpPr>
-        <p:spPr>
-          <a:xfrm rot="0">
-            <a:off x="685800" y="4400550"/>
-            <a:ext cx="5494655" cy="3608705"/>
-          </a:xfrm>
-          <a:prstGeom prst="rect"/>
-        </p:spPr>
-        <p:txBody>
-          <a:bodyPr wrap="square" lIns="91440" tIns="45720" rIns="91440" bIns="45720" numCol="1" vert="horz" anchor="t">
-            <a:noAutofit/>
-          </a:bodyPr>
-          <a:lstStyle/>
-          <a:p>
-            <a:pPr marL="0" indent="0" latinLnBrk="0">
-              <a:buFontTx/>
-              <a:buNone/>
-            </a:pPr>
-          </a:p>
-        </p:txBody>
-      </p:sp>
-      <p:sp>
-        <p:nvSpPr>
-          <p:cNvPr id="4" name="슬라이드 번호 개체 틀 6"/>
-          <p:cNvSpPr txBox="1">
-            <a:spLocks/>
-          </p:cNvSpPr>
-          <p:nvPr>
-            <p:ph type="sldNum" idx="5"/>
-          </p:nvPr>
-        </p:nvSpPr>
-        <p:spPr>
-          <a:xfrm rot="0">
-            <a:off x="3884930" y="8685530"/>
-            <a:ext cx="2980055" cy="466725"/>
-          </a:xfrm>
-          <a:prstGeom prst="rect"/>
-        </p:spPr>
-        <p:txBody>
-          <a:bodyPr wrap="square" lIns="91440" tIns="45720" rIns="91440" bIns="45720" numCol="1" vert="horz" anchor="b">
-            <a:noAutofit/>
-          </a:bodyPr>
-          <a:lstStyle>
-            <a:lvl1pPr marL="0" indent="0" algn="r" latinLnBrk="0">
-              <a:buFontTx/>
-              <a:buNone/>
-              <a:defRPr lang="en-GB" altLang="en-US" sz="1200"/>
-            </a:lvl1pPr>
-          </a:lstStyle>
-          <a:p>
-            <a:pPr marL="0" indent="0" latinLnBrk="0">
-              <a:buFontTx/>
-              <a:buNone/>
-            </a:pPr>
-            <a:fld id="{B9320F77-B9A0-41C5-862A-B4B631284C64}" type="slidenum">
-              <a:rPr lang="ko-KR" altLang="en-US"/>
-              <a:t>‹#›</a:t>
-            </a:fld>
-          </a:p>
-        </p:txBody>
-      </p:sp>
-    </p:spTree>
-  </p:cSld>
-  <p:clrMapOvr>
-    <a:masterClrMapping/>
-  </p:clrMapOvr>
-  <mc:AlternateContent xmlns:mc="http://schemas.openxmlformats.org/markup-compatibility/2006">
-    <mc:Choice xmlns:p14="http://schemas.microsoft.com/office/powerpoint/2010/main" Requires="p14">
-      <p:transition spd="slow" p14:dur="0"/>
-    </mc:Choice>
-    <mc:Fallback>
-      <p:transition spd="slow"/>
-    </mc:Fallback>
-  </mc:AlternateContent>
-</p:notes>
-</file>
-
 <file path=ppt/notesSlides/notesSlide2.xml><?xml version="1.0" encoding="utf-8"?>
 <p:notes xmlns:a="http://schemas.openxmlformats.org/drawingml/2006/main" xmlns:r="http://schemas.openxmlformats.org/officeDocument/2006/relationships" xmlns:p="http://schemas.openxmlformats.org/presentationml/2006/main">
   <p:cSld>
@@ -8418,7 +8275,7 @@
       </p:sp>
       <p:pic>
         <p:nvPicPr>
-          <p:cNvPr id="59" name="그림 32" descr="C:/Users/Admin1/AppData/Roaming/PolarisOffice/ETemp/2936_21704408/fImage241662822391.png"/>
+          <p:cNvPr id="59" name="그림 32" descr="C:/Users/Admin1/AppData/Roaming/PolarisOffice/ETemp/20636_16816336/fImage241662822391.png"/>
           <p:cNvPicPr>
             <a:picLocks noChangeAspect="1"/>
           </p:cNvPicPr>
@@ -8438,8 +8295,8 @@
         </p:blipFill>
         <p:spPr>
           <a:xfrm rot="0">
-            <a:off x="2950845" y="1336675"/>
-            <a:ext cx="2411730" cy="3701415"/>
+            <a:off x="2785110" y="1336675"/>
+            <a:ext cx="2578100" cy="3702050"/>
           </a:xfrm>
           <a:prstGeom prst="rect"/>
           <a:noFill/>
@@ -8447,7 +8304,7 @@
       </p:pic>
       <p:pic>
         <p:nvPicPr>
-          <p:cNvPr id="61" name="그림 37" descr="C:/Users/Admin1/AppData/Roaming/PolarisOffice/ETemp/2936_21704408/fImage330252883902.png"/>
+          <p:cNvPr id="61" name="그림 37"/>
           <p:cNvPicPr>
             <a:picLocks noChangeAspect="1"/>
           </p:cNvPicPr>
@@ -8478,7 +8335,7 @@
       </p:pic>
       <p:pic>
         <p:nvPicPr>
-          <p:cNvPr id="62" name="그림 38" descr="C:/Users/Admin1/AppData/Roaming/PolarisOffice/ETemp/2936_21704408/fImage2273289153.png"/>
+          <p:cNvPr id="62" name="그림 38" descr="C:/Users/Admin1/AppData/Roaming/PolarisOffice/ETemp/20636_16816336/fImage2273289153.png"/>
           <p:cNvPicPr>
             <a:picLocks noChangeAspect="1"/>
           </p:cNvPicPr>
@@ -8498,8 +8355,8 @@
         </p:blipFill>
         <p:spPr>
           <a:xfrm rot="0">
-            <a:off x="9876155" y="3516630"/>
-            <a:ext cx="699135" cy="705485"/>
+            <a:off x="9917430" y="3516630"/>
+            <a:ext cx="699770" cy="706120"/>
           </a:xfrm>
           <a:prstGeom prst="roundRect"/>
           <a:solidFill>
@@ -8509,17 +8366,17 @@
       </p:pic>
       <p:pic>
         <p:nvPicPr>
-          <p:cNvPr id="65" name="그림 11" descr="C:/Users/Admin1/AppData/Roaming/PolarisOffice/ETemp/2936_21704408/fImage90882266334.png"/>
+          <p:cNvPr id="65" name="그림 11" descr="C:/Users/Admin1/AppData/Roaming/PolarisOffice/ETemp/20636_16816336/fImage90882266334.png"/>
           <p:cNvPicPr>
             <a:picLocks noChangeAspect="1"/>
           </p:cNvPicPr>
           <p:nvPr/>
         </p:nvPicPr>
         <p:blipFill rotWithShape="1">
-          <a:blip r:embed="rId8" cstate="print">
+          <a:blip r:embed="rId8" cstate="hqprint">
             <a:extLst>
               <a:ext uri="{28A0092B-C50C-407E-A947-70E740481C1C}">
-                <a14:useLocalDpi xmlns:a14="http://schemas.microsoft.com/office/drawing/2010/main" val="0"/>
+                <a14:useLocalDpi xmlns:a14="http://schemas.microsoft.com/office/drawing/2010/main"/>
               </a:ext>
             </a:extLst>
           </a:blip>
@@ -8530,38 +8387,7 @@
         <p:spPr>
           <a:xfrm rot="0">
             <a:off x="1233170" y="1812290"/>
-            <a:ext cx="1562735" cy="2752090"/>
-          </a:xfrm>
-          <a:prstGeom prst="roundRect"/>
-          <a:solidFill>
-            <a:srgbClr val="EDEDED"/>
-          </a:solidFill>
-        </p:spPr>
-      </p:pic>
-      <p:pic>
-        <p:nvPicPr>
-          <p:cNvPr id="66" name="그림 14" descr="C:/Users/Admin1/AppData/Roaming/PolarisOffice/ETemp/2936_21704408/fImage97242276500.png"/>
-          <p:cNvPicPr>
-            <a:picLocks noChangeAspect="1"/>
-          </p:cNvPicPr>
-          <p:nvPr/>
-        </p:nvPicPr>
-        <p:blipFill rotWithShape="1">
-          <a:blip r:embed="rId9" cstate="print">
-            <a:extLst>
-              <a:ext uri="{28A0092B-C50C-407E-A947-70E740481C1C}">
-                <a14:useLocalDpi xmlns:a14="http://schemas.microsoft.com/office/drawing/2010/main" val="0"/>
-              </a:ext>
-            </a:extLst>
-          </a:blip>
-          <a:stretch>
-            <a:fillRect/>
-          </a:stretch>
-        </p:blipFill>
-        <p:spPr>
-          <a:xfrm rot="0">
-            <a:off x="9427210" y="1341755"/>
-            <a:ext cx="1588135" cy="1818005"/>
+            <a:ext cx="1419225" cy="2752725"/>
           </a:xfrm>
           <a:prstGeom prst="roundRect"/>
           <a:solidFill>
@@ -8574,19 +8400,18 @@
           <p:cNvPr id="67" name="도형 17"/>
           <p:cNvCxnSpPr>
             <a:stCxn id="62" idx="0"/>
-            <a:endCxn id="66" idx="2"/>
+            <a:endCxn id="68" idx="2"/>
           </p:cNvCxnSpPr>
           <p:nvPr/>
         </p:nvCxnSpPr>
         <p:spPr>
           <a:xfrm rot="0" flipH="1" flipV="1">
-            <a:off x="10220960" y="3159125"/>
-            <a:ext cx="5080" cy="358140"/>
+            <a:off x="10263505" y="3092450"/>
+            <a:ext cx="3810" cy="424815"/>
           </a:xfrm>
           <a:prstGeom prst="straightConnector1"/>
           <a:ln w="6350" cap="flat" cmpd="sng">
             <a:prstDash/>
-            <a:headEnd type="none" w="med" len="med"/>
             <a:tailEnd type="triangle" w="med" len="med"/>
           </a:ln>
         </p:spPr>
@@ -8605,6 +8430,37 @@
           </a:fontRef>
         </p:style>
       </p:cxnSp>
+      <p:pic>
+        <p:nvPicPr>
+          <p:cNvPr id="68" name="그림 7" descr="C:/Users/Admin1/AppData/Roaming/PolarisOffice/ETemp/20636_16816336/fImage94112416334.png"/>
+          <p:cNvPicPr>
+            <a:picLocks noChangeAspect="1"/>
+          </p:cNvPicPr>
+          <p:nvPr/>
+        </p:nvPicPr>
+        <p:blipFill rotWithShape="1">
+          <a:blip r:embed="rId10" cstate="print">
+            <a:extLst>
+              <a:ext uri="{28A0092B-C50C-407E-A947-70E740481C1C}">
+                <a14:useLocalDpi xmlns:a14="http://schemas.microsoft.com/office/drawing/2010/main" val="0"/>
+              </a:ext>
+            </a:extLst>
+          </a:blip>
+          <a:stretch>
+            <a:fillRect/>
+          </a:stretch>
+        </p:blipFill>
+        <p:spPr>
+          <a:xfrm rot="0">
+            <a:off x="9562465" y="1340485"/>
+            <a:ext cx="1403350" cy="1752600"/>
+          </a:xfrm>
+          <a:prstGeom prst="roundRect"/>
+          <a:solidFill>
+            <a:srgbClr val="EDEDED"/>
+          </a:solidFill>
+        </p:spPr>
+      </p:pic>
     </p:spTree>
   </p:cSld>
   <p:clrMapOvr>
@@ -8756,9 +8612,9 @@
           <p:nvPr/>
         </p:nvSpPr>
         <p:spPr>
-          <a:xfrm rot="0">
+          <a:xfrm>
             <a:off x="1229995" y="3903345"/>
-            <a:ext cx="4124325" cy="2338705"/>
+            <a:ext cx="4124960" cy="2338705"/>
           </a:xfrm>
           <a:prstGeom prst="rect"/>
           <a:noFill/>
@@ -8785,27 +8641,7 @@
                 <a:latin typeface="맑은 고딕" charset="0"/>
                 <a:ea typeface="맑은 고딕" charset="0"/>
               </a:rPr>
-              <a:t>2</a:t>
-            </a:r>
-            <a:r>
-              <a:rPr lang="ko-KR" sz="2000" b="1">
-                <a:solidFill>
-                  <a:srgbClr val="0611F2"/>
-                </a:solidFill>
-                <a:latin typeface="맑은 고딕" charset="0"/>
-                <a:ea typeface="맑은 고딕" charset="0"/>
-              </a:rPr>
-              <a:t>4</a:t>
-            </a:r>
-            <a:r>
-              <a:rPr lang="ko-KR" sz="2000" b="1">
-                <a:solidFill>
-                  <a:srgbClr val="0611F2"/>
-                </a:solidFill>
-                <a:latin typeface="맑은 고딕" charset="0"/>
-                <a:ea typeface="맑은 고딕" charset="0"/>
-              </a:rPr>
-              <a:t>.</a:t>
+              <a:t>24.</a:t>
             </a:r>
             <a:r>
               <a:rPr lang="ko-KR" sz="2000">
@@ -8822,35 +8658,7 @@
                 <a:latin typeface="맑은 고딕" charset="0"/>
                 <a:ea typeface="맑은 고딕" charset="0"/>
               </a:rPr>
-              <a:t>그런 다음 P</a:t>
-            </a:r>
-            <a:r>
-              <a:rPr lang="ko-KR" sz="1800">
-                <a:latin typeface="맑은 고딕" charset="0"/>
-                <a:ea typeface="맑은 고딕" charset="0"/>
-              </a:rPr>
-              <a:t>hotonSetting</a:t>
-            </a:r>
-            <a:r>
-              <a:rPr lang="ko-KR" sz="1800">
-                <a:latin typeface="맑은 고딕" charset="0"/>
-                <a:ea typeface="맑은 고딕" charset="0"/>
-              </a:rPr>
-              <a:t> 스크립트</a:t>
-            </a:r>
-            <a:r>
-              <a:rPr lang="ko-KR" sz="1800">
-                <a:latin typeface="맑은 고딕" charset="0"/>
-                <a:ea typeface="맑은 고딕" charset="0"/>
-              </a:rPr>
-              <a:t>에서</a:t>
-            </a:r>
-            <a:r>
-              <a:rPr lang="ko-KR" sz="1800">
-                <a:latin typeface="맑은 고딕" charset="0"/>
-                <a:ea typeface="맑은 고딕" charset="0"/>
-              </a:rPr>
-              <a:t> MonoBehaviourPunCallbacks 클래스를 상속받도록 설정합니다.</a:t>
+              <a:t>그런 다음 PhotonSetting 스크립트에서 MonoBehaviourPunCallbacks 클래스를 상속받도록 설정합니다.</a:t>
             </a:r>
             <a:endParaRPr lang="ko-KR" altLang="en-US" sz="1800">
               <a:latin typeface="맑은 고딕" charset="0"/>
@@ -8877,7 +8685,21 @@
                 <a:latin typeface="맑은 고딕" charset="0"/>
                 <a:ea typeface="맑은 고딕" charset="0"/>
               </a:rPr>
-              <a:t>그다음으로 InputField 변수를 3개 선언하고 DropDown 변수를 선언합니다.</a:t>
+              <a:t>그다음으로 InputField 변수를 </a:t>
+            </a:r>
+            <a:r>
+              <a:rPr lang="ko-KR" sz="1800">
+                <a:latin typeface="맑은 고딕" charset="0"/>
+                <a:ea typeface="맑은 고딕" charset="0"/>
+              </a:rPr>
+              <a:t>2</a:t>
+            </a:r>
+            <a:r>
+              <a:rPr lang="ko-KR" sz="1800">
+                <a:latin typeface="맑은 고딕" charset="0"/>
+                <a:ea typeface="맑은 고딕" charset="0"/>
+              </a:rPr>
+              <a:t>개 선언하고 DropDown 변수를 선언합니다.</a:t>
             </a:r>
             <a:endParaRPr lang="ko-KR" altLang="en-US" sz="1800">
               <a:latin typeface="맑은 고딕" charset="0"/>
@@ -8896,8 +8718,8 @@
         </p:nvSpPr>
         <p:spPr>
           <a:xfrm rot="0">
-            <a:off x="6555105" y="4178300"/>
-            <a:ext cx="4201160" cy="2061845"/>
+            <a:off x="6555105" y="3354705"/>
+            <a:ext cx="4402455" cy="2892425"/>
           </a:xfrm>
           <a:prstGeom prst="rect"/>
           <a:noFill/>
@@ -8924,62 +8746,42 @@
                 <a:latin typeface="맑은 고딕" charset="0"/>
                 <a:ea typeface="맑은 고딕" charset="0"/>
               </a:rPr>
-              <a:t>2</a:t>
-            </a:r>
-            <a:r>
-              <a:rPr lang="ko-KR" sz="2000" b="1">
-                <a:solidFill>
-                  <a:srgbClr val="0611F2"/>
-                </a:solidFill>
-                <a:latin typeface="맑은 고딕" charset="0"/>
-                <a:ea typeface="맑은 고딕" charset="0"/>
-              </a:rPr>
-              <a:t>5</a:t>
-            </a:r>
-            <a:r>
-              <a:rPr lang="ko-KR" sz="2000" b="1">
-                <a:solidFill>
-                  <a:srgbClr val="0611F2"/>
-                </a:solidFill>
-                <a:latin typeface="맑은 고딕" charset="0"/>
-                <a:ea typeface="맑은 고딕" charset="0"/>
-              </a:rPr>
-              <a:t>. </a:t>
+              <a:t>25. </a:t>
             </a:r>
             <a:r>
               <a:rPr lang="ko-KR" sz="1800">
                 <a:latin typeface="맑은 고딕" charset="0"/>
                 <a:ea typeface="맑은 고딕" charset="0"/>
               </a:rPr>
-              <a:t>이제</a:t>
+              <a:t>이제 LoginSuccess( ) 함수를 </a:t>
             </a:r>
             <a:r>
               <a:rPr lang="ko-KR" sz="1800">
                 <a:latin typeface="맑은 고딕" charset="0"/>
                 <a:ea typeface="맑은 고딕" charset="0"/>
               </a:rPr>
-              <a:t> </a:t>
+              <a:t>선언하고</a:t>
             </a:r>
             <a:r>
               <a:rPr lang="ko-KR" sz="1800">
                 <a:latin typeface="맑은 고딕" charset="0"/>
                 <a:ea typeface="맑은 고딕" charset="0"/>
               </a:rPr>
-              <a:t>LoginSuccess( ) 함수를 생성하고 </a:t>
+              <a:t> 게임 버전과 지역</a:t>
             </a:r>
             <a:r>
               <a:rPr lang="ko-KR" sz="1800">
                 <a:latin typeface="맑은 고딕" charset="0"/>
                 <a:ea typeface="맑은 고딕" charset="0"/>
               </a:rPr>
-              <a:t>게임 버전과 지역 그리고 유저 이름을 설정</a:t>
+              <a:t>을 </a:t>
             </a:r>
             <a:r>
               <a:rPr lang="ko-KR" sz="1800">
                 <a:latin typeface="맑은 고딕" charset="0"/>
                 <a:ea typeface="맑은 고딕" charset="0"/>
               </a:rPr>
-              <a:t>합니다.</a:t>
+              <a:t>설정합니다.</a:t>
             </a:r>
             <a:endParaRPr lang="ko-KR" altLang="en-US" sz="1800">
               <a:latin typeface="맑은 고딕" charset="0"/>
@@ -9006,7 +8808,7 @@
                 <a:latin typeface="맑은 고딕" charset="0"/>
                 <a:ea typeface="맑은 고딕" charset="0"/>
               </a:rPr>
-              <a:t>그다음 로그인 절차가 성공적으로 되었다면</a:t>
+              <a:t>그러고 나서</a:t>
             </a:r>
             <a:r>
               <a:rPr lang="ko-KR" sz="1800">
@@ -9020,68 +8822,87 @@
                 <a:latin typeface="맑은 고딕" charset="0"/>
                 <a:ea typeface="맑은 고딕" charset="0"/>
               </a:rPr>
-              <a:t>Photon Lobby 씬으로</a:t>
-            </a:r>
-            <a:r>
-              <a:rPr lang="ko-KR" sz="1800">
-                <a:latin typeface="맑은 고딕" charset="0"/>
-                <a:ea typeface="맑은 고딕" charset="0"/>
-              </a:rPr>
-              <a:t> 이동</a:t>
-            </a:r>
-            <a:r>
-              <a:rPr lang="ko-KR" sz="1800">
-                <a:latin typeface="맑은 고딕" charset="0"/>
-                <a:ea typeface="맑은 고딕" charset="0"/>
-              </a:rPr>
-              <a:t>하도록 설정합니다.</a:t>
+              <a:t>마스터 클라이언트가 씬을 이동했을 때 다른 클라이언트가 영향을 받지 않도록 비활성화합니다.</a:t>
             </a:r>
             <a:endParaRPr lang="ko-KR" altLang="en-US" sz="1800">
               <a:latin typeface="맑은 고딕" charset="0"/>
               <a:ea typeface="맑은 고딕" charset="0"/>
             </a:endParaRPr>
           </a:p>
+          <a:p>
+            <a:pPr marL="0" indent="0" rtl="0" algn="l" defTabSz="914400" eaLnBrk="1" latinLnBrk="0" hangingPunct="1">
+              <a:buFontTx/>
+              <a:buNone/>
+            </a:pPr>
+            <a:endParaRPr lang="ko-KR" altLang="en-US" sz="1800">
+              <a:latin typeface="맑은 고딕" charset="0"/>
+              <a:ea typeface="맑은 고딕" charset="0"/>
+            </a:endParaRPr>
+          </a:p>
+          <a:p>
+            <a:pPr marL="0" indent="0" rtl="0" algn="l" defTabSz="914400" eaLnBrk="1" latinLnBrk="0" hangingPunct="1">
+              <a:buFontTx/>
+              <a:buNone/>
+            </a:pPr>
+            <a:r>
+              <a:rPr lang="ko-KR" sz="1800">
+                <a:latin typeface="맑은 고딕" charset="0"/>
+                <a:ea typeface="맑은 고딕" charset="0"/>
+              </a:rPr>
+              <a:t>그리고 </a:t>
+            </a:r>
+            <a:r>
+              <a:rPr lang="ko-KR" sz="1800">
+                <a:latin typeface="맑은 고딕" charset="0"/>
+                <a:ea typeface="맑은 고딕" charset="0"/>
+              </a:rPr>
+              <a:t>로그인 </a:t>
+            </a:r>
+            <a:r>
+              <a:rPr lang="ko-KR" sz="1800">
+                <a:latin typeface="맑은 고딕" charset="0"/>
+                <a:ea typeface="맑은 고딕" charset="0"/>
+              </a:rPr>
+              <a:t>인증 </a:t>
+            </a:r>
+            <a:r>
+              <a:rPr lang="ko-KR" sz="1800">
+                <a:latin typeface="맑은 고딕" charset="0"/>
+                <a:ea typeface="맑은 고딕" charset="0"/>
+              </a:rPr>
+              <a:t>절차가 성공적으로 </a:t>
+            </a:r>
+            <a:r>
+              <a:rPr lang="ko-KR" sz="1800">
+                <a:latin typeface="맑은 고딕" charset="0"/>
+                <a:ea typeface="맑은 고딕" charset="0"/>
+              </a:rPr>
+              <a:t>완료 </a:t>
+            </a:r>
+            <a:r>
+              <a:rPr lang="ko-KR" sz="1800">
+                <a:latin typeface="맑은 고딕" charset="0"/>
+                <a:ea typeface="맑은 고딕" charset="0"/>
+              </a:rPr>
+              <a:t>되었다면 Photon Lobby씬으로 이동하도록 설정합니다.</a:t>
+            </a:r>
+            <a:endParaRPr lang="ko-KR" altLang="en-US" sz="1800">
+              <a:latin typeface="맑은 고딕" charset="0"/>
+              <a:ea typeface="맑은 고딕" charset="0"/>
+            </a:endParaRPr>
+          </a:p>
         </p:txBody>
       </p:sp>
       <p:pic>
         <p:nvPicPr>
-          <p:cNvPr id="58" name="그림 60" descr="C:/Users/Admin1/AppData/Roaming/PolarisOffice/ETemp/2936_21704408/fImage673483268716.png"/>
+          <p:cNvPr id="59" name="그림 10" descr="C:/Users/Admin1/AppData/Roaming/PolarisOffice/ETemp/20636_16816336/fImage101532426500.png"/>
           <p:cNvPicPr>
             <a:picLocks noChangeAspect="1"/>
           </p:cNvPicPr>
           <p:nvPr/>
         </p:nvPicPr>
         <p:blipFill rotWithShape="1">
-          <a:blip r:embed="rId4" cstate="hqprint">
-            <a:extLst>
-              <a:ext uri="{28A0092B-C50C-407E-A947-70E740481C1C}">
-                <a14:useLocalDpi xmlns:a14="http://schemas.microsoft.com/office/drawing/2010/main"/>
-              </a:ext>
-            </a:extLst>
-          </a:blip>
-          <a:stretch>
-            <a:fillRect/>
-          </a:stretch>
-        </p:blipFill>
-        <p:spPr>
-          <a:xfrm rot="0">
-            <a:off x="6563995" y="1404620"/>
-            <a:ext cx="4193540" cy="2669540"/>
-          </a:xfrm>
-          <a:prstGeom prst="rect"/>
-          <a:noFill/>
-        </p:spPr>
-      </p:pic>
-      <p:pic>
-        <p:nvPicPr>
-          <p:cNvPr id="59" name="그림 21" descr="C:/Users/Admin1/AppData/Roaming/PolarisOffice/ETemp/2936_21704408/fImage621232309169.png"/>
-          <p:cNvPicPr>
-            <a:picLocks noChangeAspect="1"/>
-          </p:cNvPicPr>
-          <p:nvPr/>
-        </p:nvPicPr>
-        <p:blipFill rotWithShape="1">
-          <a:blip r:embed="rId6" cstate="print">
+          <a:blip r:embed="rId7" cstate="print">
             <a:extLst>
               <a:ext uri="{28A0092B-C50C-407E-A947-70E740481C1C}">
                 <a14:useLocalDpi xmlns:a14="http://schemas.microsoft.com/office/drawing/2010/main" val="0"/>
@@ -9094,11 +8915,44 @@
         </p:blipFill>
         <p:spPr>
           <a:xfrm rot="0">
-            <a:off x="1231265" y="1404620"/>
-            <a:ext cx="4131310" cy="2419985"/>
-          </a:xfrm>
-          <a:prstGeom prst="rect"/>
-          <a:noFill/>
+            <a:off x="1222375" y="1414145"/>
+            <a:ext cx="4131945" cy="2360295"/>
+          </a:xfrm>
+          <a:prstGeom prst="roundRect"/>
+          <a:solidFill>
+            <a:srgbClr val="EDEDED"/>
+          </a:solidFill>
+        </p:spPr>
+      </p:pic>
+      <p:pic>
+        <p:nvPicPr>
+          <p:cNvPr id="60" name="그림 27" descr="C:/Users/Admin1/AppData/Roaming/PolarisOffice/ETemp/20636_16816336/fImage522852479169.png"/>
+          <p:cNvPicPr>
+            <a:picLocks noChangeAspect="1"/>
+          </p:cNvPicPr>
+          <p:nvPr/>
+        </p:nvPicPr>
+        <p:blipFill rotWithShape="1">
+          <a:blip r:embed="rId8" cstate="print">
+            <a:extLst>
+              <a:ext uri="{28A0092B-C50C-407E-A947-70E740481C1C}">
+                <a14:useLocalDpi xmlns:a14="http://schemas.microsoft.com/office/drawing/2010/main" val="0"/>
+              </a:ext>
+            </a:extLst>
+          </a:blip>
+          <a:stretch>
+            <a:fillRect/>
+          </a:stretch>
+        </p:blipFill>
+        <p:spPr>
+          <a:xfrm rot="0">
+            <a:off x="6558915" y="1413510"/>
+            <a:ext cx="4398645" cy="1854200"/>
+          </a:xfrm>
+          <a:prstGeom prst="roundRect"/>
+          <a:solidFill>
+            <a:srgbClr val="EDEDED"/>
+          </a:solidFill>
         </p:spPr>
       </p:pic>
     </p:spTree>
@@ -9252,9 +9106,9 @@
           <p:nvPr/>
         </p:nvSpPr>
         <p:spPr>
-          <a:xfrm rot="0">
+          <a:xfrm>
             <a:off x="6816725" y="3858895"/>
-            <a:ext cx="4157345" cy="2338705"/>
+            <a:ext cx="4157980" cy="2338705"/>
           </a:xfrm>
           <a:prstGeom prst="rect"/>
           <a:noFill/>
@@ -9281,27 +9135,7 @@
                 <a:latin typeface="맑은 고딕" charset="0"/>
                 <a:ea typeface="맑은 고딕" charset="0"/>
               </a:rPr>
-              <a:t>2</a:t>
-            </a:r>
-            <a:r>
-              <a:rPr lang="ko-KR" sz="2000" b="1">
-                <a:solidFill>
-                  <a:srgbClr val="0611F2"/>
-                </a:solidFill>
-                <a:latin typeface="맑은 고딕" charset="0"/>
-                <a:ea typeface="맑은 고딕" charset="0"/>
-              </a:rPr>
-              <a:t>7</a:t>
-            </a:r>
-            <a:r>
-              <a:rPr lang="ko-KR" sz="2000" b="1">
-                <a:solidFill>
-                  <a:srgbClr val="0611F2"/>
-                </a:solidFill>
-                <a:latin typeface="맑은 고딕" charset="0"/>
-                <a:ea typeface="맑은 고딕" charset="0"/>
-              </a:rPr>
-              <a:t>.</a:t>
+              <a:t>27.</a:t>
             </a:r>
             <a:r>
               <a:rPr lang="ko-KR" sz="2000">
@@ -9318,35 +9152,21 @@
                 <a:latin typeface="맑은 고딕" charset="0"/>
                 <a:ea typeface="맑은 고딕" charset="0"/>
               </a:rPr>
-              <a:t>그다음</a:t>
+              <a:t>그다음으로 SignUp( ) 함수를 생성하고 RegisterPlayFabUserRequest 클래스에서 Email과 비밀번호</a:t>
             </a:r>
             <a:r>
               <a:rPr lang="ko-KR" sz="1800">
                 <a:latin typeface="맑은 고딕" charset="0"/>
                 <a:ea typeface="맑은 고딕" charset="0"/>
               </a:rPr>
-              <a:t>으로</a:t>
+              <a:t>를</a:t>
             </a:r>
             <a:r>
               <a:rPr lang="ko-KR" sz="1800">
                 <a:latin typeface="맑은 고딕" charset="0"/>
                 <a:ea typeface="맑은 고딕" charset="0"/>
               </a:rPr>
-              <a:t> </a:t>
-            </a:r>
-            <a:r>
-              <a:rPr lang="ko-KR" sz="1800">
-                <a:latin typeface="맑은 고딕" charset="0"/>
-                <a:ea typeface="맑은 고딕" charset="0"/>
-              </a:rPr>
-              <a:t>SignUp( ) 함수를</a:t>
-            </a:r>
-            <a:r>
-              <a:rPr lang="ko-KR" sz="1800">
-                <a:latin typeface="맑은 고딕" charset="0"/>
-                <a:ea typeface="맑은 고딕" charset="0"/>
-              </a:rPr>
-              <a:t> 생성하고 RegisterPlayFabUserRequest 클래스에서 Email과 비밀번호 그리고 유저 이름을 입력해서 저장합니다.</a:t>
+              <a:t> 저장합니다.</a:t>
             </a:r>
             <a:endParaRPr lang="ko-KR" altLang="en-US" sz="1800">
               <a:latin typeface="맑은 고딕" charset="0"/>
@@ -9373,21 +9193,7 @@
                 <a:latin typeface="맑은 고딕" charset="0"/>
                 <a:ea typeface="맑은 고딕" charset="0"/>
               </a:rPr>
-              <a:t>그런 다음 Reg</a:t>
-            </a:r>
-            <a:r>
-              <a:rPr lang="ko-KR" sz="1800">
-                <a:latin typeface="맑은 고딕" charset="0"/>
-                <a:ea typeface="맑은 고딕" charset="0"/>
-              </a:rPr>
-              <a:t>i</a:t>
-            </a:r>
-            <a:r>
-              <a:rPr lang="ko-KR" sz="1800">
-                <a:latin typeface="맑은 고딕" charset="0"/>
-                <a:ea typeface="맑은 고딕" charset="0"/>
-              </a:rPr>
-              <a:t>sterPlayFabUser 라는 함수에서 회원가입의 여부를 확인합니다.</a:t>
+              <a:t>그런 다음 RegisterPlayFabUser 라는 함수에서 회원가입의 여부를 확인합니다.</a:t>
             </a:r>
             <a:endParaRPr lang="ko-KR" altLang="en-US" sz="1800">
               <a:latin typeface="맑은 고딕" charset="0"/>
@@ -9511,14 +9317,14 @@
       </p:pic>
       <p:pic>
         <p:nvPicPr>
-          <p:cNvPr id="61" name="그림 26" descr="C:/Users/Admin1/AppData/Roaming/PolarisOffice/ETemp/2936_21704408/fImage727162315724.png"/>
+          <p:cNvPr id="61" name="그림 33" descr="C:/Users/Admin1/AppData/Roaming/PolarisOffice/ETemp/20636_16816336/fImage753292485724.png"/>
           <p:cNvPicPr>
             <a:picLocks noChangeAspect="1"/>
           </p:cNvPicPr>
           <p:nvPr/>
         </p:nvPicPr>
         <p:blipFill rotWithShape="1">
-          <a:blip r:embed="rId5" cstate="print">
+          <a:blip r:embed="rId6" cstate="print">
             <a:extLst>
               <a:ext uri="{28A0092B-C50C-407E-A947-70E740481C1C}">
                 <a14:useLocalDpi xmlns:a14="http://schemas.microsoft.com/office/drawing/2010/main" val="0"/>
@@ -9531,11 +9337,13 @@
         </p:blipFill>
         <p:spPr>
           <a:xfrm rot="0">
-            <a:off x="6816725" y="1413510"/>
-            <a:ext cx="4157345" cy="2344420"/>
-          </a:xfrm>
-          <a:prstGeom prst="rect"/>
-          <a:noFill/>
+            <a:off x="6816725" y="1446530"/>
+            <a:ext cx="4165600" cy="2303145"/>
+          </a:xfrm>
+          <a:prstGeom prst="roundRect"/>
+          <a:solidFill>
+            <a:srgbClr val="EDEDED"/>
+          </a:solidFill>
         </p:spPr>
       </p:pic>
     </p:spTree>
@@ -9690,8 +9498,8 @@
         </p:nvSpPr>
         <p:spPr>
           <a:xfrm rot="0">
-            <a:off x="6781165" y="4398645"/>
-            <a:ext cx="4117975" cy="1784985"/>
+            <a:off x="6781165" y="2868930"/>
+            <a:ext cx="4167505" cy="954405"/>
           </a:xfrm>
           <a:prstGeom prst="rect"/>
           <a:noFill/>
@@ -9718,27 +9526,7 @@
                 <a:latin typeface="맑은 고딕" charset="0"/>
                 <a:ea typeface="맑은 고딕" charset="0"/>
               </a:rPr>
-              <a:t>2</a:t>
-            </a:r>
-            <a:r>
-              <a:rPr lang="ko-KR" sz="2000" b="1">
-                <a:solidFill>
-                  <a:srgbClr val="0611F2"/>
-                </a:solidFill>
-                <a:latin typeface="맑은 고딕" charset="0"/>
-                <a:ea typeface="맑은 고딕" charset="0"/>
-              </a:rPr>
-              <a:t>9</a:t>
-            </a:r>
-            <a:r>
-              <a:rPr lang="ko-KR" sz="2000" b="1">
-                <a:solidFill>
-                  <a:srgbClr val="0611F2"/>
-                </a:solidFill>
-                <a:latin typeface="맑은 고딕" charset="0"/>
-                <a:ea typeface="맑은 고딕" charset="0"/>
-              </a:rPr>
-              <a:t>.</a:t>
+              <a:t>29.</a:t>
             </a:r>
             <a:r>
               <a:rPr lang="ko-KR" sz="2000">
@@ -9755,68 +9543,13 @@
                 <a:latin typeface="맑은 고딕" charset="0"/>
                 <a:ea typeface="맑은 고딕" charset="0"/>
               </a:rPr>
-              <a:t>이제</a:t>
-            </a:r>
-            <a:r>
-              <a:rPr lang="ko-KR" sz="1800">
-                <a:latin typeface="맑은 고딕" charset="0"/>
-                <a:ea typeface="맑은 고딕" charset="0"/>
-              </a:rPr>
-              <a:t> Photon Setting</a:t>
-            </a:r>
-            <a:r>
-              <a:rPr lang="ko-KR" sz="1800">
-                <a:latin typeface="맑은 고딕" charset="0"/>
-                <a:ea typeface="맑은 고딕" charset="0"/>
-              </a:rPr>
-              <a:t> 오브젝트</a:t>
-            </a:r>
-            <a:r>
-              <a:rPr lang="ko-KR" sz="1800">
-                <a:latin typeface="맑은 고딕" charset="0"/>
-                <a:ea typeface="맑은 고딕" charset="0"/>
-              </a:rPr>
-              <a:t>에 있는 스크립트에 각각의 InputField</a:t>
-            </a:r>
-            <a:r>
-              <a:rPr lang="ko-KR" sz="1800">
-                <a:latin typeface="맑은 고딕" charset="0"/>
-                <a:ea typeface="맑은 고딕" charset="0"/>
-              </a:rPr>
-              <a:t>와 Dropdown 오브젝트를 넣어줍니다.</a:t>
+              <a:t>이제 Photon Setting 오브젝트에 있는 스크립트에 각각의 InputField와 Dropdown 오브젝트를 넣어줍니다.</a:t>
             </a:r>
             <a:endParaRPr lang="ko-KR" altLang="en-US" sz="1800">
               <a:latin typeface="맑은 고딕" charset="0"/>
               <a:ea typeface="맑은 고딕" charset="0"/>
             </a:endParaRPr>
           </a:p>
-          <a:p>
-            <a:pPr marL="0" indent="0" rtl="0" algn="l" defTabSz="914400" eaLnBrk="1" latinLnBrk="0" hangingPunct="1">
-              <a:buFontTx/>
-              <a:buNone/>
-            </a:pPr>
-            <a:endParaRPr lang="ko-KR" altLang="en-US" sz="1800">
-              <a:latin typeface="맑은 고딕" charset="0"/>
-              <a:ea typeface="맑은 고딕" charset="0"/>
-            </a:endParaRPr>
-          </a:p>
-          <a:p>
-            <a:pPr marL="0" indent="0" rtl="0" algn="l" defTabSz="914400" eaLnBrk="1" latinLnBrk="0" hangingPunct="1">
-              <a:buFontTx/>
-              <a:buNone/>
-            </a:pPr>
-            <a:r>
-              <a:rPr lang="ko-KR" sz="1800">
-                <a:latin typeface="맑은 고딕" charset="0"/>
-                <a:ea typeface="맑은 고딕" charset="0"/>
-              </a:rPr>
-              <a:t>그다음 Photon Setting 오브젝트의 위치와 회전 값을 초기화시켜줍니다.</a:t>
-            </a:r>
-            <a:endParaRPr lang="ko-KR" altLang="en-US" sz="1800">
-              <a:latin typeface="맑은 고딕" charset="0"/>
-              <a:ea typeface="맑은 고딕" charset="0"/>
-            </a:endParaRPr>
-          </a:p>
         </p:txBody>
       </p:sp>
       <p:sp>
@@ -9828,9 +9561,9 @@
           <p:nvPr/>
         </p:nvSpPr>
         <p:spPr>
-          <a:xfrm rot="0">
+          <a:xfrm>
             <a:off x="1214120" y="4126865"/>
-            <a:ext cx="4156710" cy="2061845"/>
+            <a:ext cx="4157345" cy="2061845"/>
           </a:xfrm>
           <a:prstGeom prst="rect"/>
           <a:noFill/>
@@ -9857,27 +9590,7 @@
                 <a:latin typeface="맑은 고딕" charset="0"/>
                 <a:ea typeface="맑은 고딕" charset="0"/>
               </a:rPr>
-              <a:t>2</a:t>
-            </a:r>
-            <a:r>
-              <a:rPr lang="ko-KR" sz="2000" b="1">
-                <a:solidFill>
-                  <a:srgbClr val="0611F2"/>
-                </a:solidFill>
-                <a:latin typeface="맑은 고딕" charset="0"/>
-                <a:ea typeface="맑은 고딕" charset="0"/>
-              </a:rPr>
-              <a:t>8</a:t>
-            </a:r>
-            <a:r>
-              <a:rPr lang="ko-KR" sz="2000" b="1">
-                <a:solidFill>
-                  <a:srgbClr val="0611F2"/>
-                </a:solidFill>
-                <a:latin typeface="맑은 고딕" charset="0"/>
-                <a:ea typeface="맑은 고딕" charset="0"/>
-              </a:rPr>
-              <a:t>.</a:t>
+              <a:t>28.</a:t>
             </a:r>
             <a:r>
               <a:rPr lang="ko-KR" sz="2000">
@@ -9894,21 +9607,7 @@
                 <a:latin typeface="맑은 고딕" charset="0"/>
                 <a:ea typeface="맑은 고딕" charset="0"/>
               </a:rPr>
-              <a:t>마지막으로 Login( ) 함수를 생성하고 </a:t>
-            </a:r>
-            <a:r>
-              <a:rPr lang="ko-KR" sz="1800">
-                <a:latin typeface="맑은 고딕" charset="0"/>
-                <a:ea typeface="맑은 고딕" charset="0"/>
-              </a:rPr>
-              <a:t>로그인에 대한 정보를 입력받</a:t>
-            </a:r>
-            <a:r>
-              <a:rPr lang="ko-KR" sz="1800">
-                <a:latin typeface="맑은 고딕" charset="0"/>
-                <a:ea typeface="맑은 고딕" charset="0"/>
-              </a:rPr>
-              <a:t>습니다.</a:t>
+              <a:t>마지막으로 Login( ) 함수를 생성하고 로그인에 대한 정보를 입력받습니다.</a:t>
             </a:r>
             <a:endParaRPr lang="ko-KR" altLang="en-US" sz="1800">
               <a:latin typeface="맑은 고딕" charset="0"/>
@@ -9935,56 +9634,21 @@
                 <a:latin typeface="맑은 고딕" charset="0"/>
                 <a:ea typeface="맑은 고딕" charset="0"/>
               </a:rPr>
-              <a:t>그리고</a:t>
+              <a:t>그</a:t>
             </a:r>
             <a:r>
               <a:rPr lang="ko-KR" sz="1800">
                 <a:latin typeface="맑은 고딕" charset="0"/>
                 <a:ea typeface="맑은 고딕" charset="0"/>
               </a:rPr>
-              <a:t> 로그인의 여부를 설정하는 LoginWithEmailAddress라는 함수로</a:t>
+              <a:t>러고 나서</a:t>
             </a:r>
             <a:r>
               <a:rPr lang="ko-KR" sz="1800">
                 <a:latin typeface="맑은 고딕" charset="0"/>
                 <a:ea typeface="맑은 고딕" charset="0"/>
               </a:rPr>
-              <a:t> 로그인</a:t>
-            </a:r>
-            <a:r>
-              <a:rPr lang="ko-KR" sz="1800">
-                <a:latin typeface="맑은 고딕" charset="0"/>
-                <a:ea typeface="맑은 고딕" charset="0"/>
-              </a:rPr>
-              <a:t> </a:t>
-            </a:r>
-            <a:r>
-              <a:rPr lang="ko-KR" sz="1800">
-                <a:latin typeface="맑은 고딕" charset="0"/>
-                <a:ea typeface="맑은 고딕" charset="0"/>
-              </a:rPr>
-              <a:t>인증 절차</a:t>
-            </a:r>
-            <a:r>
-              <a:rPr lang="ko-KR" sz="1800">
-                <a:latin typeface="맑은 고딕" charset="0"/>
-                <a:ea typeface="맑은 고딕" charset="0"/>
-              </a:rPr>
-              <a:t>를 </a:t>
-            </a:r>
-            <a:r>
-              <a:rPr lang="ko-KR" sz="1800">
-                <a:latin typeface="맑은 고딕" charset="0"/>
-                <a:ea typeface="맑은 고딕" charset="0"/>
-              </a:rPr>
-              <a:t>확인</a:t>
-            </a:r>
-            <a:r>
-              <a:rPr lang="ko-KR" sz="1800">
-                <a:latin typeface="맑은 고딕" charset="0"/>
-                <a:ea typeface="맑은 고딕" charset="0"/>
-              </a:rPr>
-              <a:t>합니다.</a:t>
+              <a:t> 로그인의 여부를 설정하는 LoginWithEmailAddress라는 함수로 로그인 인증 절차를 확인합니다.</a:t>
             </a:r>
             <a:endParaRPr lang="ko-KR" altLang="en-US" sz="1800">
               <a:latin typeface="맑은 고딕" charset="0"/>
@@ -9995,7 +9659,7 @@
       </p:sp>
       <p:pic>
         <p:nvPicPr>
-          <p:cNvPr id="61" name="그림 63" descr="C:/Users/Admin1/AppData/Roaming/PolarisOffice/ETemp/2936_21704408/fImage341333385447.png"/>
+          <p:cNvPr id="61" name="그림 63" descr="C:/Users/Admin1/AppData/Roaming/PolarisOffice/ETemp/20636_16816336/fImage341333385447.png"/>
           <p:cNvPicPr>
             <a:picLocks noChangeAspect="1"/>
           </p:cNvPicPr>
@@ -10016,22 +9680,24 @@
         <p:spPr>
           <a:xfrm rot="0">
             <a:off x="1222375" y="1404620"/>
-            <a:ext cx="4148455" cy="2602865"/>
-          </a:xfrm>
-          <a:prstGeom prst="rect"/>
-          <a:noFill/>
+            <a:ext cx="4149090" cy="2603500"/>
+          </a:xfrm>
+          <a:prstGeom prst="roundRect"/>
+          <a:solidFill>
+            <a:srgbClr val="EDEDED"/>
+          </a:solidFill>
         </p:spPr>
       </p:pic>
       <p:pic>
         <p:nvPicPr>
-          <p:cNvPr id="68" name="그림 27" descr="C:/Users/Admin1/AppData/Roaming/PolarisOffice/ETemp/2936_21704408/fImage98262321478.png"/>
+          <p:cNvPr id="74" name="그림 36" descr="C:/Users/Admin1/AppData/Roaming/PolarisOffice/ETemp/20636_16816336/fImage125122491478.png"/>
           <p:cNvPicPr>
             <a:picLocks noChangeAspect="1"/>
           </p:cNvPicPr>
           <p:nvPr/>
         </p:nvPicPr>
         <p:blipFill rotWithShape="1">
-          <a:blip r:embed="rId6" cstate="print">
+          <a:blip r:embed="rId8" cstate="print">
             <a:extLst>
               <a:ext uri="{28A0092B-C50C-407E-A947-70E740481C1C}">
                 <a14:useLocalDpi xmlns:a14="http://schemas.microsoft.com/office/drawing/2010/main" val="0"/>
@@ -10044,8 +9710,8 @@
         </p:blipFill>
         <p:spPr>
           <a:xfrm rot="0">
-            <a:off x="9651365" y="1762125"/>
-            <a:ext cx="1247775" cy="2129155"/>
+            <a:off x="6784340" y="1410970"/>
+            <a:ext cx="2767965" cy="1374775"/>
           </a:xfrm>
           <a:prstGeom prst="roundRect"/>
           <a:solidFill>
@@ -10055,14 +9721,14 @@
       </p:pic>
       <p:pic>
         <p:nvPicPr>
-          <p:cNvPr id="69" name="그림 30" descr="C:/Users/Admin1/AppData/Roaming/PolarisOffice/ETemp/2936_21704408/fImage282492339358.png"/>
+          <p:cNvPr id="75" name="그림 39" descr="C:/Users/Admin1/AppData/Roaming/PolarisOffice/ETemp/20636_16816336/fImage94542509358.png"/>
           <p:cNvPicPr>
             <a:picLocks noChangeAspect="1"/>
           </p:cNvPicPr>
           <p:nvPr/>
         </p:nvPicPr>
         <p:blipFill rotWithShape="1">
-          <a:blip r:embed="rId7" cstate="print">
+          <a:blip r:embed="rId9" cstate="print">
             <a:extLst>
               <a:ext uri="{28A0092B-C50C-407E-A947-70E740481C1C}">
                 <a14:useLocalDpi xmlns:a14="http://schemas.microsoft.com/office/drawing/2010/main" val="0"/>
@@ -10075,11 +9741,13 @@
         </p:blipFill>
         <p:spPr>
           <a:xfrm rot="0">
-            <a:off x="6794500" y="1396365"/>
-            <a:ext cx="2691130" cy="2852420"/>
-          </a:xfrm>
-          <a:prstGeom prst="rect"/>
-          <a:noFill/>
+            <a:off x="9659620" y="1401445"/>
+            <a:ext cx="1289050" cy="1384300"/>
+          </a:xfrm>
+          <a:prstGeom prst="roundRect"/>
+          <a:solidFill>
+            <a:srgbClr val="EDEDED"/>
+          </a:solidFill>
         </p:spPr>
       </p:pic>
       <p:cxnSp>
@@ -10090,13 +9758,12 @@
         </p:nvCxnSpPr>
         <p:spPr>
           <a:xfrm rot="0" flipH="1">
-            <a:off x="9427210" y="2867660"/>
-            <a:ext cx="457835" cy="798830"/>
+            <a:off x="9460230" y="2194560"/>
+            <a:ext cx="416560" cy="125095"/>
           </a:xfrm>
           <a:prstGeom prst="straightConnector1"/>
           <a:ln w="6350" cap="flat" cmpd="sng">
             <a:prstDash/>
-            <a:headEnd type="none" w="med" len="med"/>
             <a:tailEnd type="triangle" w="med" len="med"/>
           </a:ln>
         </p:spPr>
@@ -10123,13 +9790,12 @@
         </p:nvCxnSpPr>
         <p:spPr>
           <a:xfrm rot="0" flipH="1">
-            <a:off x="9435465" y="3051175"/>
-            <a:ext cx="433070" cy="806450"/>
+            <a:off x="9468485" y="2302510"/>
+            <a:ext cx="408305" cy="258445"/>
           </a:xfrm>
           <a:prstGeom prst="straightConnector1"/>
           <a:ln w="6350" cap="flat" cmpd="sng">
             <a:prstDash/>
-            <a:headEnd type="none" w="med" len="med"/>
             <a:tailEnd type="triangle" w="med" len="med"/>
           </a:ln>
         </p:spPr>
@@ -10155,14 +9821,13 @@
           <p:nvPr/>
         </p:nvCxnSpPr>
         <p:spPr>
-          <a:xfrm rot="0" flipH="1">
-            <a:off x="9427210" y="3234055"/>
-            <a:ext cx="449580" cy="840105"/>
+          <a:xfrm rot="0" flipH="1" flipV="1">
+            <a:off x="9476740" y="2078355"/>
+            <a:ext cx="408305" cy="349885"/>
           </a:xfrm>
           <a:prstGeom prst="straightConnector1"/>
           <a:ln w="6350" cap="flat" cmpd="sng">
             <a:prstDash/>
-            <a:headEnd type="none" w="med" len="med"/>
             <a:tailEnd type="triangle" w="med" len="med"/>
           </a:ln>
         </p:spPr>
@@ -10181,39 +9846,125 @@
           </a:fontRef>
         </p:style>
       </p:cxnSp>
-      <p:cxnSp>
-        <p:nvCxnSpPr>
-          <p:cNvPr id="73" name="도형 38"/>
-          <p:cNvCxnSpPr/>
+      <p:pic>
+        <p:nvPicPr>
+          <p:cNvPr id="76" name="그림 44" descr="C:/Users/Admin1/AppData/Roaming/PolarisOffice/ETemp/20636_16816336/fImage131623402995.png"/>
+          <p:cNvPicPr>
+            <a:picLocks noChangeAspect="1"/>
+          </p:cNvPicPr>
           <p:nvPr/>
-        </p:nvCxnSpPr>
-        <p:spPr>
-          <a:xfrm rot="0" flipH="1">
-            <a:off x="9418955" y="3449955"/>
-            <a:ext cx="457835" cy="8890"/>
-          </a:xfrm>
-          <a:prstGeom prst="straightConnector1"/>
-          <a:ln w="6350" cap="flat" cmpd="sng">
+        </p:nvPicPr>
+        <p:blipFill rotWithShape="1">
+          <a:blip r:embed="rId10" cstate="hqprint">
+            <a:extLst>
+              <a:ext uri="{28A0092B-C50C-407E-A947-70E740481C1C}">
+                <a14:useLocalDpi xmlns:a14="http://schemas.microsoft.com/office/drawing/2010/main"/>
+              </a:ext>
+            </a:extLst>
+          </a:blip>
+          <a:stretch>
+            <a:fillRect/>
+          </a:stretch>
+        </p:blipFill>
+        <p:spPr>
+          <a:xfrm rot="0">
+            <a:off x="6791960" y="3938270"/>
+            <a:ext cx="4148455" cy="1241425"/>
+          </a:xfrm>
+          <a:prstGeom prst="roundRect"/>
+          <a:solidFill>
+            <a:srgbClr val="EDEDED"/>
+          </a:solidFill>
+        </p:spPr>
+      </p:pic>
+      <p:sp>
+        <p:nvSpPr>
+          <p:cNvPr id="77" name="텍스트 상자 45"/>
+          <p:cNvSpPr txBox="1">
+            <a:spLocks/>
+          </p:cNvSpPr>
+          <p:nvPr/>
+        </p:nvSpPr>
+        <p:spPr>
+          <a:xfrm rot="0">
+            <a:off x="6791960" y="5232400"/>
+            <a:ext cx="4156710" cy="954405"/>
+          </a:xfrm>
+          <a:prstGeom prst="rect"/>
+          <a:noFill/>
+          <a:ln w="0">
+            <a:noFill/>
             <a:prstDash/>
-            <a:headEnd type="none" w="med" len="med"/>
-            <a:tailEnd type="triangle" w="med" len="med"/>
           </a:ln>
         </p:spPr>
-        <p:style>
-          <a:lnRef idx="1">
-            <a:schemeClr val="accent1"/>
-          </a:lnRef>
-          <a:fillRef idx="0">
-            <a:schemeClr val="accent1"/>
-          </a:fillRef>
-          <a:effectRef idx="0">
-            <a:schemeClr val="accent1"/>
-          </a:effectRef>
-          <a:fontRef idx="minor">
-            <a:schemeClr val="tx1"/>
-          </a:fontRef>
-        </p:style>
-      </p:cxnSp>
+        <p:txBody>
+          <a:bodyPr wrap="square" lIns="89535" tIns="46355" rIns="89535" bIns="46355" numCol="1" vert="horz" anchor="t">
+            <a:spAutoFit/>
+          </a:bodyPr>
+          <a:lstStyle/>
+          <a:p>
+            <a:pPr marL="0" indent="0" rtl="0" algn="l" defTabSz="914400" eaLnBrk="1" latinLnBrk="0" hangingPunct="1">
+              <a:buFontTx/>
+              <a:buNone/>
+            </a:pPr>
+            <a:r>
+              <a:rPr lang="ko-KR" sz="2000" b="1">
+                <a:solidFill>
+                  <a:srgbClr val="0611F2"/>
+                </a:solidFill>
+                <a:latin typeface="맑은 고딕" charset="0"/>
+                <a:ea typeface="맑은 고딕" charset="0"/>
+              </a:rPr>
+              <a:t>30</a:t>
+            </a:r>
+            <a:r>
+              <a:rPr lang="ko-KR" sz="2000" b="1">
+                <a:solidFill>
+                  <a:srgbClr val="0611F2"/>
+                </a:solidFill>
+                <a:latin typeface="맑은 고딕" charset="0"/>
+                <a:ea typeface="맑은 고딕" charset="0"/>
+              </a:rPr>
+              <a:t>.</a:t>
+            </a:r>
+            <a:r>
+              <a:rPr lang="ko-KR" sz="2000">
+                <a:solidFill>
+                  <a:srgbClr val="0611F2"/>
+                </a:solidFill>
+                <a:latin typeface="맑은 고딕" charset="0"/>
+                <a:ea typeface="맑은 고딕" charset="0"/>
+              </a:rPr>
+              <a:t> </a:t>
+            </a:r>
+            <a:r>
+              <a:rPr lang="ko-KR" sz="1800">
+                <a:latin typeface="맑은 고딕" charset="0"/>
+                <a:ea typeface="맑은 고딕" charset="0"/>
+              </a:rPr>
+              <a:t>그</a:t>
+            </a:r>
+            <a:r>
+              <a:rPr lang="ko-KR" sz="1800">
+                <a:latin typeface="맑은 고딕" charset="0"/>
+                <a:ea typeface="맑은 고딕" charset="0"/>
+              </a:rPr>
+              <a:t>리고</a:t>
+            </a:r>
+            <a:r>
+              <a:rPr lang="ko-KR" sz="1800">
+                <a:latin typeface="맑은 고딕" charset="0"/>
+                <a:ea typeface="맑은 고딕" charset="0"/>
+              </a:rPr>
+              <a:t> Region DropDown 오브젝트의 앵커를 지정하고 위치와 회전 값을 설정합니다.</a:t>
+            </a:r>
+            <a:endParaRPr lang="ko-KR" altLang="en-US" sz="1800">
+              <a:latin typeface="맑은 고딕" charset="0"/>
+              <a:ea typeface="맑은 고딕" charset="0"/>
+            </a:endParaRPr>
+          </a:p>
+        </p:txBody>
+      </p:sp>
     </p:spTree>
   </p:cSld>
   <p:clrMapOvr>
@@ -10365,9 +10116,9 @@
           <p:nvPr/>
         </p:nvSpPr>
         <p:spPr>
-          <a:xfrm rot="0">
+          <a:xfrm>
             <a:off x="6711315" y="5468620"/>
-            <a:ext cx="4271010" cy="677545"/>
+            <a:ext cx="4271645" cy="677545"/>
           </a:xfrm>
           <a:prstGeom prst="rect"/>
           <a:noFill/>
@@ -10394,7 +10145,7 @@
                 <a:latin typeface="맑은 고딕" charset="0"/>
                 <a:ea typeface="맑은 고딕" charset="0"/>
               </a:rPr>
-              <a:t>31</a:t>
+              <a:t>3</a:t>
             </a:r>
             <a:r>
               <a:rPr lang="ko-KR" sz="2000" b="1">
@@ -10404,6 +10155,16 @@
                 <a:latin typeface="맑은 고딕" charset="0"/>
                 <a:ea typeface="맑은 고딕" charset="0"/>
               </a:rPr>
+              <a:t>2</a:t>
+            </a:r>
+            <a:r>
+              <a:rPr lang="ko-KR" sz="2000" b="1">
+                <a:solidFill>
+                  <a:srgbClr val="0611F2"/>
+                </a:solidFill>
+                <a:latin typeface="맑은 고딕" charset="0"/>
+                <a:ea typeface="맑은 고딕" charset="0"/>
+              </a:rPr>
               <a:t>.</a:t>
             </a:r>
             <a:r>
@@ -10421,14 +10182,21 @@
                 <a:latin typeface="맑은 고딕" charset="0"/>
                 <a:ea typeface="맑은 고딕" charset="0"/>
               </a:rPr>
-              <a:t>그리고 PhotonSetting를 선택</a:t>
+              <a:t>그</a:t>
             </a:r>
             <a:r>
               <a:rPr lang="ko-KR" sz="1800">
                 <a:latin typeface="맑은 고딕" charset="0"/>
                 <a:ea typeface="맑은 고딕" charset="0"/>
               </a:rPr>
-              <a:t>하고</a:t>
+              <a:t>다음</a:t>
+            </a:r>
+            <a:r>
+              <a:rPr lang="ko-KR" sz="1800">
+                <a:latin typeface="맑은 고딕" charset="0"/>
+                <a:ea typeface="맑은 고딕" charset="0"/>
+              </a:rPr>
+              <a:t> PhotonSetting를 선택하고</a:t>
             </a:r>
             <a:endParaRPr lang="ko-KR" altLang="en-US" sz="1800">
               <a:latin typeface="맑은 고딕" charset="0"/>
@@ -10473,9 +10241,9 @@
           <p:nvPr/>
         </p:nvSpPr>
         <p:spPr>
-          <a:xfrm rot="0">
+          <a:xfrm>
             <a:off x="1229360" y="5192395"/>
-            <a:ext cx="4116705" cy="954405"/>
+            <a:ext cx="4117340" cy="954405"/>
           </a:xfrm>
           <a:prstGeom prst="rect"/>
           <a:noFill/>
@@ -10502,7 +10270,7 @@
                 <a:latin typeface="맑은 고딕" charset="0"/>
                 <a:ea typeface="맑은 고딕" charset="0"/>
               </a:rPr>
-              <a:t>30</a:t>
+              <a:t>3</a:t>
             </a:r>
             <a:r>
               <a:rPr lang="ko-KR" sz="2000" b="1">
@@ -10512,6 +10280,16 @@
                 <a:latin typeface="맑은 고딕" charset="0"/>
                 <a:ea typeface="맑은 고딕" charset="0"/>
               </a:rPr>
+              <a:t>1</a:t>
+            </a:r>
+            <a:r>
+              <a:rPr lang="ko-KR" sz="2000" b="1">
+                <a:solidFill>
+                  <a:srgbClr val="0611F2"/>
+                </a:solidFill>
+                <a:latin typeface="맑은 고딕" charset="0"/>
+                <a:ea typeface="맑은 고딕" charset="0"/>
+              </a:rPr>
               <a:t>.</a:t>
             </a:r>
             <a:r>
@@ -10529,42 +10307,7 @@
                 <a:latin typeface="맑은 고딕" charset="0"/>
                 <a:ea typeface="맑은 고딕" charset="0"/>
               </a:rPr>
-              <a:t>그런 다음</a:t>
-            </a:r>
-            <a:r>
-              <a:rPr lang="ko-KR" sz="1800">
-                <a:latin typeface="맑은 고딕" charset="0"/>
-                <a:ea typeface="맑은 고딕" charset="0"/>
-              </a:rPr>
-              <a:t> Sign Up Button</a:t>
-            </a:r>
-            <a:r>
-              <a:rPr lang="ko-KR" sz="1800">
-                <a:latin typeface="맑은 고딕" charset="0"/>
-                <a:ea typeface="맑은 고딕" charset="0"/>
-              </a:rPr>
-              <a:t> 오브젝트의</a:t>
-            </a:r>
-            <a:r>
-              <a:rPr lang="ko-KR" sz="1800">
-                <a:latin typeface="맑은 고딕" charset="0"/>
-                <a:ea typeface="맑은 고딕" charset="0"/>
-              </a:rPr>
-              <a:t> On Click</a:t>
-            </a:r>
-            <a:r>
-              <a:rPr lang="ko-KR" sz="1800">
-                <a:latin typeface="맑은 고딕" charset="0"/>
-                <a:ea typeface="맑은 고딕" charset="0"/>
-              </a:rPr>
-              <a:t>( )</a:t>
-            </a:r>
-            <a:r>
-              <a:rPr lang="ko-KR" sz="1800">
-                <a:latin typeface="맑은 고딕" charset="0"/>
-                <a:ea typeface="맑은 고딕" charset="0"/>
-              </a:rPr>
-              <a:t> 함수에 Photon Setting 오브젝트를 넣어줍니다.</a:t>
+              <a:t>그런 다음 Sign Up Button 오브젝트의 On Click( ) 함수에 Photon Setting 오브젝트를 넣어줍니다.</a:t>
             </a:r>
             <a:endParaRPr lang="ko-KR" altLang="en-US" sz="1800">
               <a:latin typeface="맑은 고딕" charset="0"/>
@@ -10575,7 +10318,7 @@
       </p:sp>
       <p:pic>
         <p:nvPicPr>
-          <p:cNvPr id="62" name="그림 73" descr="C:/Users/Admin1/AppData/Roaming/PolarisOffice/ETemp/2936_21704408/fImage259493621538.png"/>
+          <p:cNvPr id="62" name="그림 73" descr="C:/Users/Admin1/AppData/Roaming/PolarisOffice/ETemp/20636_16816336/fImage259493621538.png"/>
           <p:cNvPicPr>
             <a:picLocks noChangeAspect="1"/>
           </p:cNvPicPr>
@@ -10596,7 +10339,7 @@
         <p:spPr>
           <a:xfrm rot="0">
             <a:off x="6708775" y="1521460"/>
-            <a:ext cx="4265295" cy="3766185"/>
+            <a:ext cx="4265930" cy="3766820"/>
           </a:xfrm>
           <a:prstGeom prst="rect"/>
           <a:noFill/>
@@ -10604,7 +10347,7 @@
       </p:pic>
       <p:pic>
         <p:nvPicPr>
-          <p:cNvPr id="63" name="그림 75" descr="C:/Users/Admin1/AppData/Roaming/PolarisOffice/ETemp/2936_21704408/fImage362653641869.png"/>
+          <p:cNvPr id="63" name="그림 75" descr="C:/Users/Admin1/AppData/Roaming/PolarisOffice/ETemp/20636_16816336/fImage362653641869.png"/>
           <p:cNvPicPr>
             <a:picLocks noChangeAspect="1"/>
           </p:cNvPicPr>
@@ -10625,7 +10368,7 @@
         <p:spPr>
           <a:xfrm rot="0">
             <a:off x="1230630" y="1529715"/>
-            <a:ext cx="2260600" cy="3566795"/>
+            <a:ext cx="2502535" cy="3567430"/>
           </a:xfrm>
           <a:prstGeom prst="roundRect"/>
           <a:solidFill>
@@ -10635,14 +10378,14 @@
       </p:pic>
       <p:pic>
         <p:nvPicPr>
-          <p:cNvPr id="66" name="그림 41" descr="C:/Users/Admin1/AppData/Roaming/PolarisOffice/ETemp/2936_21704408/fImage97242386962.png"/>
+          <p:cNvPr id="66" name="그림 46" descr="C:/Users/Admin1/AppData/Roaming/PolarisOffice/ETemp/20636_16816336/fImage94112536962.png"/>
           <p:cNvPicPr>
             <a:picLocks noChangeAspect="1"/>
           </p:cNvPicPr>
           <p:nvPr/>
         </p:nvPicPr>
         <p:blipFill rotWithShape="1">
-          <a:blip r:embed="rId6" cstate="print">
+          <a:blip r:embed="rId7" cstate="print">
             <a:extLst>
               <a:ext uri="{28A0092B-C50C-407E-A947-70E740481C1C}">
                 <a14:useLocalDpi xmlns:a14="http://schemas.microsoft.com/office/drawing/2010/main" val="0"/>
@@ -10655,8 +10398,8 @@
         </p:blipFill>
         <p:spPr>
           <a:xfrm rot="0">
-            <a:off x="3766185" y="1970405"/>
-            <a:ext cx="1579880" cy="2552700"/>
+            <a:off x="3868420" y="2119630"/>
+            <a:ext cx="1485900" cy="2378075"/>
           </a:xfrm>
           <a:prstGeom prst="roundRect"/>
           <a:solidFill>
@@ -10672,8 +10415,8 @@
         </p:nvCxnSpPr>
         <p:spPr>
           <a:xfrm rot="0" flipH="1">
-            <a:off x="1945640" y="4331335"/>
-            <a:ext cx="2070100" cy="457835"/>
+            <a:off x="2003425" y="4305935"/>
+            <a:ext cx="2095500" cy="491490"/>
           </a:xfrm>
           <a:prstGeom prst="straightConnector1"/>
           <a:ln w="6350" cap="flat" cmpd="sng">
@@ -10803,9 +10546,9 @@
           <p:nvPr/>
         </p:nvSpPr>
         <p:spPr>
-          <a:xfrm rot="0">
+          <a:xfrm>
             <a:off x="6824980" y="5480050"/>
-            <a:ext cx="4123690" cy="677545"/>
+            <a:ext cx="4124325" cy="677545"/>
           </a:xfrm>
           <a:prstGeom prst="rect"/>
           <a:noFill/>
@@ -10842,7 +10585,7 @@
                 <a:latin typeface="맑은 고딕" charset="0"/>
                 <a:ea typeface="맑은 고딕" charset="0"/>
               </a:rPr>
-              <a:t>3</a:t>
+              <a:t>4</a:t>
             </a:r>
             <a:r>
               <a:rPr lang="ko-KR" sz="2000" b="1">
@@ -10869,21 +10612,7 @@
                 <a:latin typeface="맑은 고딕" charset="0"/>
                 <a:ea typeface="맑은 고딕" charset="0"/>
               </a:rPr>
-              <a:t>이제</a:t>
-            </a:r>
-            <a:r>
-              <a:rPr lang="ko-KR" sz="1800">
-                <a:latin typeface="맑은 고딕" charset="0"/>
-                <a:ea typeface="맑은 고딕" charset="0"/>
-              </a:rPr>
-              <a:t> PhotonSetting를 선택</a:t>
-            </a:r>
-            <a:r>
-              <a:rPr lang="ko-KR" sz="1800">
-                <a:latin typeface="맑은 고딕" charset="0"/>
-                <a:ea typeface="맑은 고딕" charset="0"/>
-              </a:rPr>
-              <a:t>하고</a:t>
+              <a:t>이제 PhotonSetting를 선택하고</a:t>
             </a:r>
             <a:endParaRPr lang="ko-KR" altLang="en-US" sz="1800">
               <a:latin typeface="맑은 고딕" charset="0"/>
@@ -10928,9 +10657,9 @@
           <p:nvPr/>
         </p:nvSpPr>
         <p:spPr>
-          <a:xfrm rot="0">
+          <a:xfrm>
             <a:off x="1229360" y="5203190"/>
-            <a:ext cx="4149090" cy="954405"/>
+            <a:ext cx="4149725" cy="954405"/>
           </a:xfrm>
           <a:prstGeom prst="rect"/>
           <a:noFill/>
@@ -10957,7 +10686,7 @@
                 <a:latin typeface="맑은 고딕" charset="0"/>
                 <a:ea typeface="맑은 고딕" charset="0"/>
               </a:rPr>
-              <a:t>32</a:t>
+              <a:t>3</a:t>
             </a:r>
             <a:r>
               <a:rPr lang="ko-KR" sz="2000" b="1">
@@ -10967,6 +10696,16 @@
                 <a:latin typeface="맑은 고딕" charset="0"/>
                 <a:ea typeface="맑은 고딕" charset="0"/>
               </a:rPr>
+              <a:t>3</a:t>
+            </a:r>
+            <a:r>
+              <a:rPr lang="ko-KR" sz="2000" b="1">
+                <a:solidFill>
+                  <a:srgbClr val="0611F2"/>
+                </a:solidFill>
+                <a:latin typeface="맑은 고딕" charset="0"/>
+                <a:ea typeface="맑은 고딕" charset="0"/>
+              </a:rPr>
               <a:t>.</a:t>
             </a:r>
             <a:r>
@@ -10984,49 +10723,7 @@
                 <a:latin typeface="맑은 고딕" charset="0"/>
                 <a:ea typeface="맑은 고딕" charset="0"/>
               </a:rPr>
-              <a:t>마지막으로 </a:t>
-            </a:r>
-            <a:r>
-              <a:rPr lang="ko-KR" sz="1800">
-                <a:latin typeface="맑은 고딕" charset="0"/>
-                <a:ea typeface="맑은 고딕" charset="0"/>
-              </a:rPr>
-              <a:t>Sign In</a:t>
-            </a:r>
-            <a:r>
-              <a:rPr lang="ko-KR" sz="1800">
-                <a:latin typeface="맑은 고딕" charset="0"/>
-                <a:ea typeface="맑은 고딕" charset="0"/>
-              </a:rPr>
-              <a:t> Button</a:t>
-            </a:r>
-            <a:r>
-              <a:rPr lang="ko-KR" sz="1800">
-                <a:latin typeface="맑은 고딕" charset="0"/>
-                <a:ea typeface="맑은 고딕" charset="0"/>
-              </a:rPr>
-              <a:t> 오브젝트의</a:t>
-            </a:r>
-            <a:r>
-              <a:rPr lang="ko-KR" sz="1800">
-                <a:latin typeface="맑은 고딕" charset="0"/>
-                <a:ea typeface="맑은 고딕" charset="0"/>
-              </a:rPr>
-              <a:t> On Click</a:t>
-            </a:r>
-            <a:r>
-              <a:rPr lang="ko-KR" sz="1800">
-                <a:latin typeface="맑은 고딕" charset="0"/>
-                <a:ea typeface="맑은 고딕" charset="0"/>
-              </a:rPr>
-              <a:t>( ) 함수</a:t>
-            </a:r>
-            <a:r>
-              <a:rPr lang="ko-KR" sz="1800">
-                <a:latin typeface="맑은 고딕" charset="0"/>
-                <a:ea typeface="맑은 고딕" charset="0"/>
-              </a:rPr>
-              <a:t>에 Photon Setting 오브젝트를 넣어줍니다.</a:t>
+              <a:t>마지막으로 Sign In Button 오브젝트의 On Click( ) 함수에 Photon Setting 오브젝트를 넣어줍니다.</a:t>
             </a:r>
             <a:endParaRPr lang="ko-KR" altLang="en-US" sz="1800">
               <a:latin typeface="맑은 고딕" charset="0"/>
@@ -11037,7 +10734,7 @@
       </p:sp>
       <p:pic>
         <p:nvPicPr>
-          <p:cNvPr id="67" name="그림 81" descr="C:/Users/Admin1/AppData/Roaming/PolarisOffice/ETemp/2936_21704408/fImage259843797035.png"/>
+          <p:cNvPr id="67" name="그림 81" descr="C:/Users/Admin1/AppData/Roaming/PolarisOffice/ETemp/20636_16816336/fImage259843797035.png"/>
           <p:cNvPicPr>
             <a:picLocks noChangeAspect="1"/>
           </p:cNvPicPr>
@@ -11058,7 +10755,7 @@
         <p:spPr>
           <a:xfrm rot="0">
             <a:off x="6824980" y="1430020"/>
-            <a:ext cx="4123690" cy="3890645"/>
+            <a:ext cx="4124325" cy="3816350"/>
           </a:xfrm>
           <a:prstGeom prst="rect"/>
           <a:noFill/>
@@ -11066,38 +10763,7 @@
       </p:pic>
       <p:pic>
         <p:nvPicPr>
-          <p:cNvPr id="68" name="그림 43" descr="C:/Users/Admin1/AppData/Roaming/PolarisOffice/ETemp/2936_21704408/fImage97242394464.png"/>
-          <p:cNvPicPr>
-            <a:picLocks noChangeAspect="1"/>
-          </p:cNvPicPr>
-          <p:nvPr/>
-        </p:nvPicPr>
-        <p:blipFill rotWithShape="1">
-          <a:blip r:embed="rId6" cstate="print">
-            <a:extLst>
-              <a:ext uri="{28A0092B-C50C-407E-A947-70E740481C1C}">
-                <a14:useLocalDpi xmlns:a14="http://schemas.microsoft.com/office/drawing/2010/main" val="0"/>
-              </a:ext>
-            </a:extLst>
-          </a:blip>
-          <a:stretch>
-            <a:fillRect/>
-          </a:stretch>
-        </p:blipFill>
-        <p:spPr>
-          <a:xfrm rot="0">
-            <a:off x="3990340" y="1903730"/>
-            <a:ext cx="1388745" cy="2702560"/>
-          </a:xfrm>
-          <a:prstGeom prst="roundRect"/>
-          <a:solidFill>
-            <a:srgbClr val="EDEDED"/>
-          </a:solidFill>
-        </p:spPr>
-      </p:pic>
-      <p:pic>
-        <p:nvPicPr>
-          <p:cNvPr id="69" name="그림 44" descr="C:/Users/Admin1/AppData/Roaming/PolarisOffice/ETemp/2936_21704408/fImage388572405705.png"/>
+          <p:cNvPr id="69" name="그림 44"/>
           <p:cNvPicPr>
             <a:picLocks noChangeAspect="1"/>
           </p:cNvPicPr>
@@ -11126,6 +10792,37 @@
           </a:solidFill>
         </p:spPr>
       </p:pic>
+      <p:pic>
+        <p:nvPicPr>
+          <p:cNvPr id="70" name="그림 47" descr="C:/Users/Admin1/AppData/Roaming/PolarisOffice/ETemp/20636_16816336/fImage94112544464.png"/>
+          <p:cNvPicPr>
+            <a:picLocks noChangeAspect="1"/>
+          </p:cNvPicPr>
+          <p:nvPr/>
+        </p:nvPicPr>
+        <p:blipFill rotWithShape="1">
+          <a:blip r:embed="rId8" cstate="print">
+            <a:extLst>
+              <a:ext uri="{28A0092B-C50C-407E-A947-70E740481C1C}">
+                <a14:useLocalDpi xmlns:a14="http://schemas.microsoft.com/office/drawing/2010/main" val="0"/>
+              </a:ext>
+            </a:extLst>
+          </a:blip>
+          <a:stretch>
+            <a:fillRect/>
+          </a:stretch>
+        </p:blipFill>
+        <p:spPr>
+          <a:xfrm rot="0">
+            <a:off x="3990340" y="2052955"/>
+            <a:ext cx="1388745" cy="2378075"/>
+          </a:xfrm>
+          <a:prstGeom prst="roundRect"/>
+          <a:solidFill>
+            <a:srgbClr val="EDEDED"/>
+          </a:solidFill>
+        </p:spPr>
+      </p:pic>
       <p:cxnSp>
         <p:nvCxnSpPr>
           <p:cNvPr id="65" name="Rect 0"/>
@@ -11134,8 +10831,8 @@
         </p:nvCxnSpPr>
         <p:spPr>
           <a:xfrm rot="0" flipH="1">
-            <a:off x="2045335" y="4389120"/>
-            <a:ext cx="2169795" cy="358140"/>
+            <a:off x="2011680" y="4231640"/>
+            <a:ext cx="2195195" cy="515620"/>
           </a:xfrm>
           <a:prstGeom prst="straightConnector1"/>
           <a:ln w="6350" cap="flat" cmpd="sng">
@@ -11182,7 +10879,7 @@
 </file>
 
 <file path=ppt/slides/slide16.xml><?xml version="1.0" encoding="utf-8"?>
-<p:sld xmlns:a="http://schemas.openxmlformats.org/drawingml/2006/main" xmlns:r="http://schemas.openxmlformats.org/officeDocument/2006/relationships" xmlns:p="http://schemas.openxmlformats.org/presentationml/2006/main">
+<p:sld xmlns:a="http://schemas.openxmlformats.org/drawingml/2006/main" xmlns:r="http://schemas.openxmlformats.org/officeDocument/2006/relationships" xmlns:p="http://schemas.openxmlformats.org/presentationml/2006/main" xmlns:p14="http://schemas.microsoft.com/office/powerpoint/2010/main">
   <p:cSld>
     <p:spTree>
       <p:nvGrpSpPr>
@@ -11273,8 +10970,8 @@
         </p:nvSpPr>
         <p:spPr>
           <a:xfrm rot="0">
-            <a:off x="6841490" y="5048250"/>
-            <a:ext cx="4098925" cy="1231265"/>
+            <a:off x="6849745" y="5322570"/>
+            <a:ext cx="4099560" cy="954405"/>
           </a:xfrm>
           <a:prstGeom prst="rect"/>
           <a:noFill/>
@@ -11314,7 +11011,7 @@
                 <a:latin typeface="맑은 고딕" charset="0"/>
                 <a:ea typeface="맑은 고딕" charset="0"/>
               </a:rPr>
-              <a:t>5</a:t>
+              <a:t>6</a:t>
             </a:r>
             <a:r>
               <a:rPr lang="ko-KR" sz="2000" b="1">
@@ -11341,14 +11038,7 @@
                 <a:latin typeface="맑은 고딕" charset="0"/>
                 <a:ea typeface="맑은 고딕" charset="0"/>
               </a:rPr>
-              <a:t>그다음 Email Input과 Password Input 그리고 UserName Input 오브젝트의 앵커를 지정하고 위치와 회전 값을 설정합니다.</a:t>
-            </a:r>
-            <a:r>
-              <a:rPr lang="ko-KR" sz="1800">
-                <a:latin typeface="맑은 고딕" charset="0"/>
-                <a:ea typeface="맑은 고딕" charset="0"/>
-              </a:rPr>
-              <a:t> </a:t>
+              <a:t>그다음 Email Input과 Password Input 오브젝트의 앵커를 지정하고 위치와 회전 값을 설정합니다. </a:t>
             </a:r>
             <a:endParaRPr lang="ko-KR" altLang="en-US" sz="1800">
               <a:latin typeface="맑은 고딕" charset="0"/>
@@ -11366,9 +11056,9 @@
           <p:nvPr/>
         </p:nvSpPr>
         <p:spPr>
-          <a:xfrm rot="0">
+          <a:xfrm>
             <a:off x="1237615" y="5319395"/>
-            <a:ext cx="4149090" cy="954405"/>
+            <a:ext cx="4149725" cy="954405"/>
           </a:xfrm>
           <a:prstGeom prst="rect"/>
           <a:noFill/>
@@ -11395,7 +11085,7 @@
                 <a:latin typeface="맑은 고딕" charset="0"/>
                 <a:ea typeface="맑은 고딕" charset="0"/>
               </a:rPr>
-              <a:t>34</a:t>
+              <a:t>3</a:t>
             </a:r>
             <a:r>
               <a:rPr lang="ko-KR" sz="2000" b="1">
@@ -11405,6 +11095,16 @@
                 <a:latin typeface="맑은 고딕" charset="0"/>
                 <a:ea typeface="맑은 고딕" charset="0"/>
               </a:rPr>
+              <a:t>5</a:t>
+            </a:r>
+            <a:r>
+              <a:rPr lang="ko-KR" sz="2000" b="1">
+                <a:solidFill>
+                  <a:srgbClr val="0611F2"/>
+                </a:solidFill>
+                <a:latin typeface="맑은 고딕" charset="0"/>
+                <a:ea typeface="맑은 고딕" charset="0"/>
+              </a:rPr>
               <a:t>.</a:t>
             </a:r>
             <a:r>
@@ -11433,17 +11133,17 @@
       </p:sp>
       <p:pic>
         <p:nvPicPr>
-          <p:cNvPr id="68" name="그림 51" descr="C:/Users/Admin1/AppData/Roaming/PolarisOffice/ETemp/2936_21704408/fImage127713248145.png"/>
+          <p:cNvPr id="68" name="그림 51" descr="C:/Users/Admin1/AppData/Roaming/PolarisOffice/ETemp/20636_16816336/fImage127713248145.png"/>
           <p:cNvPicPr>
             <a:picLocks noChangeAspect="1"/>
           </p:cNvPicPr>
           <p:nvPr/>
         </p:nvPicPr>
         <p:blipFill rotWithShape="1">
-          <a:blip r:embed="rId2" cstate="print">
+          <a:blip r:embed="rId2" cstate="hqprint">
             <a:extLst>
               <a:ext uri="{28A0092B-C50C-407E-A947-70E740481C1C}">
-                <a14:useLocalDpi xmlns:a14="http://schemas.microsoft.com/office/drawing/2010/main" val="0"/>
+                <a14:useLocalDpi xmlns:a14="http://schemas.microsoft.com/office/drawing/2010/main"/>
               </a:ext>
             </a:extLst>
           </a:blip>
@@ -11454,7 +11154,7 @@
         <p:spPr>
           <a:xfrm rot="0">
             <a:off x="1237615" y="1403350"/>
-            <a:ext cx="4141470" cy="1772920"/>
+            <a:ext cx="4142105" cy="1714500"/>
           </a:xfrm>
           <a:prstGeom prst="roundRect"/>
           <a:solidFill>
@@ -11464,7 +11164,7 @@
       </p:pic>
       <p:pic>
         <p:nvPicPr>
-          <p:cNvPr id="69" name="그림 54" descr="C:/Users/Admin1/AppData/Roaming/PolarisOffice/ETemp/2936_21704408/fImage130483253281.png"/>
+          <p:cNvPr id="69" name="그림 54"/>
           <p:cNvPicPr>
             <a:picLocks noChangeAspect="1"/>
           </p:cNvPicPr>
@@ -11495,17 +11195,17 @@
       </p:pic>
       <p:pic>
         <p:nvPicPr>
-          <p:cNvPr id="70" name="그림 57" descr="C:/Users/Admin1/AppData/Roaming/PolarisOffice/ETemp/2936_21704408/fImage125453266827.png"/>
+          <p:cNvPr id="70" name="그림 57" descr="C:/Users/Admin1/AppData/Roaming/PolarisOffice/ETemp/20636_16816336/fImage125453266827.png"/>
           <p:cNvPicPr>
             <a:picLocks noChangeAspect="1"/>
           </p:cNvPicPr>
           <p:nvPr/>
         </p:nvPicPr>
         <p:blipFill rotWithShape="1">
-          <a:blip r:embed="rId4" cstate="print">
+          <a:blip r:embed="rId4" cstate="hqprint">
             <a:extLst>
               <a:ext uri="{28A0092B-C50C-407E-A947-70E740481C1C}">
-                <a14:useLocalDpi xmlns:a14="http://schemas.microsoft.com/office/drawing/2010/main" val="0"/>
+                <a14:useLocalDpi xmlns:a14="http://schemas.microsoft.com/office/drawing/2010/main"/>
               </a:ext>
             </a:extLst>
           </a:blip>
@@ -11515,8 +11215,8 @@
         </p:blipFill>
         <p:spPr>
           <a:xfrm rot="0">
-            <a:off x="6833235" y="1402080"/>
-            <a:ext cx="4115435" cy="1050925"/>
+            <a:off x="6841490" y="1402080"/>
+            <a:ext cx="4116070" cy="1715770"/>
           </a:xfrm>
           <a:prstGeom prst="roundRect"/>
           <a:solidFill>
@@ -11526,17 +11226,17 @@
       </p:pic>
       <p:pic>
         <p:nvPicPr>
-          <p:cNvPr id="71" name="그림 60" descr="C:/Users/Admin1/AppData/Roaming/PolarisOffice/ETemp/2936_21704408/fImage128213279961.png"/>
+          <p:cNvPr id="71" name="그림 60" descr="C:/Users/Admin1/AppData/Roaming/PolarisOffice/ETemp/20636_16816336/fImage128213279961.png"/>
           <p:cNvPicPr>
             <a:picLocks noChangeAspect="1"/>
           </p:cNvPicPr>
           <p:nvPr/>
         </p:nvPicPr>
         <p:blipFill rotWithShape="1">
-          <a:blip r:embed="rId5" cstate="print">
+          <a:blip r:embed="rId5" cstate="hqprint">
             <a:extLst>
               <a:ext uri="{28A0092B-C50C-407E-A947-70E740481C1C}">
-                <a14:useLocalDpi xmlns:a14="http://schemas.microsoft.com/office/drawing/2010/main" val="0"/>
+                <a14:useLocalDpi xmlns:a14="http://schemas.microsoft.com/office/drawing/2010/main"/>
               </a:ext>
             </a:extLst>
           </a:blip>
@@ -11546,575 +11246,13 @@
         </p:blipFill>
         <p:spPr>
           <a:xfrm rot="0">
-            <a:off x="6838315" y="2641600"/>
-            <a:ext cx="4118610" cy="1050290"/>
+            <a:off x="6846570" y="3358515"/>
+            <a:ext cx="4127500" cy="1788160"/>
           </a:xfrm>
           <a:prstGeom prst="roundRect"/>
           <a:solidFill>
             <a:srgbClr val="EDEDED"/>
           </a:solidFill>
-        </p:spPr>
-      </p:pic>
-      <p:pic>
-        <p:nvPicPr>
-          <p:cNvPr id="72" name="그림 63" descr="C:/Users/Admin1/AppData/Roaming/PolarisOffice/ETemp/2936_21704408/fImage12761328491.png"/>
-          <p:cNvPicPr>
-            <a:picLocks noChangeAspect="1"/>
-          </p:cNvPicPr>
-          <p:nvPr/>
-        </p:nvPicPr>
-        <p:blipFill rotWithShape="1">
-          <a:blip r:embed="rId6" cstate="print">
-            <a:extLst>
-              <a:ext uri="{28A0092B-C50C-407E-A947-70E740481C1C}">
-                <a14:useLocalDpi xmlns:a14="http://schemas.microsoft.com/office/drawing/2010/main" val="0"/>
-              </a:ext>
-            </a:extLst>
-          </a:blip>
-          <a:stretch>
-            <a:fillRect/>
-          </a:stretch>
-        </p:blipFill>
-        <p:spPr>
-          <a:xfrm rot="0">
-            <a:off x="6841490" y="3865880"/>
-            <a:ext cx="4115435" cy="1047750"/>
-          </a:xfrm>
-          <a:prstGeom prst="roundRect"/>
-          <a:solidFill>
-            <a:srgbClr val="EDEDED"/>
-          </a:solidFill>
-        </p:spPr>
-      </p:pic>
-    </p:spTree>
-  </p:cSld>
-  <p:clrMapOvr>
-    <a:masterClrMapping/>
-  </p:clrMapOvr>
-  <mc:AlternateContent xmlns:mc="http://schemas.openxmlformats.org/markup-compatibility/2006">
-    <mc:Choice xmlns:p14="http://schemas.microsoft.com/office/powerpoint/2010/main" Requires="p14">
-      <p:transition spd="slow" p14:dur="2000"/>
-    </mc:Choice>
-    <mc:Fallback>
-      <p:transition spd="slow"/>
-    </mc:Fallback>
-  </mc:AlternateContent>
-  <p:timing>
-    <p:tnLst>
-      <p:par>
-        <p:cTn id="1" dur="indefinite" restart="never" nodeType="tmRoot"/>
-      </p:par>
-    </p:tnLst>
-  </p:timing>
-</p:sld>
-</file>
-
-<file path=ppt/slides/slide17.xml><?xml version="1.0" encoding="utf-8"?>
-<p:sld xmlns:a="http://schemas.openxmlformats.org/drawingml/2006/main" xmlns:r="http://schemas.openxmlformats.org/officeDocument/2006/relationships" xmlns:p="http://schemas.openxmlformats.org/presentationml/2006/main">
-  <p:cSld>
-    <p:spTree>
-      <p:nvGrpSpPr>
-        <p:cNvPr id="1" name=""/>
-        <p:cNvGrpSpPr/>
-        <p:nvPr/>
-      </p:nvGrpSpPr>
-      <p:grpSpPr>
-        <a:xfrm>
-          <a:off x="0" y="0"/>
-          <a:ext cx="0" cy="0"/>
-          <a:chOff x="0" y="0"/>
-          <a:chExt cx="0" cy="0"/>
-        </a:xfrm>
-      </p:grpSpPr>
-      <p:sp>
-        <p:nvSpPr>
-          <p:cNvPr id="35" name="Rect 0"/>
-          <p:cNvSpPr txBox="1">
-            <a:spLocks/>
-          </p:cNvSpPr>
-          <p:nvPr/>
-        </p:nvSpPr>
-        <p:spPr>
-          <a:xfrm rot="0">
-            <a:off x="4126865" y="467995"/>
-            <a:ext cx="3938270" cy="554990"/>
-          </a:xfrm>
-          <a:prstGeom prst="rect"/>
-          <a:noFill/>
-          <a:ln w="0">
-            <a:noFill/>
-            <a:prstDash/>
-          </a:ln>
-        </p:spPr>
-        <p:txBody>
-          <a:bodyPr wrap="square" lIns="89535" tIns="46355" rIns="89535" bIns="46355" numCol="1" vert="horz" anchor="t">
-            <a:spAutoFit/>
-          </a:bodyPr>
-          <a:lstStyle/>
-          <a:p>
-            <a:pPr marL="0" indent="0" rtl="0" algn="l" defTabSz="914400" eaLnBrk="1" latinLnBrk="0" hangingPunct="1">
-              <a:buFontTx/>
-              <a:buNone/>
-            </a:pPr>
-            <a:r>
-              <a:rPr lang="ko-KR" sz="3000" b="1">
-                <a:latin typeface="맑은 고딕" charset="0"/>
-                <a:ea typeface="맑은 고딕" charset="0"/>
-              </a:rPr>
-              <a:t>열</a:t>
-            </a:r>
-            <a:r>
-              <a:rPr lang="ko-KR" sz="3000" b="1">
-                <a:latin typeface="맑은 고딕" charset="0"/>
-                <a:ea typeface="맑은 고딕" charset="0"/>
-              </a:rPr>
-              <a:t>일곱</a:t>
-            </a:r>
-            <a:r>
-              <a:rPr lang="ko-KR" sz="3000" b="1">
-                <a:latin typeface="맑은 고딕" charset="0"/>
-                <a:ea typeface="맑은 고딕" charset="0"/>
-              </a:rPr>
-              <a:t> 번째 튜토리얼</a:t>
-            </a:r>
-            <a:r>
-              <a:rPr sz="3000" b="1">
-                <a:latin typeface="맑은 고딕" charset="0"/>
-                <a:ea typeface="맑은 고딕" charset="0"/>
-              </a:rPr>
-              <a:t> </a:t>
-            </a:r>
-            <a:endParaRPr lang="ko-KR" altLang="en-US" sz="3000" b="1">
-              <a:latin typeface="맑은 고딕" charset="0"/>
-              <a:ea typeface="맑은 고딕" charset="0"/>
-            </a:endParaRPr>
-          </a:p>
-        </p:txBody>
-      </p:sp>
-      <p:sp>
-        <p:nvSpPr>
-          <p:cNvPr id="57" name="Rect 0"/>
-          <p:cNvSpPr txBox="1">
-            <a:spLocks/>
-          </p:cNvSpPr>
-          <p:nvPr/>
-        </p:nvSpPr>
-        <p:spPr>
-          <a:xfrm rot="0">
-            <a:off x="6841490" y="4217670"/>
-            <a:ext cx="4098925" cy="2061845"/>
-          </a:xfrm>
-          <a:prstGeom prst="rect"/>
-          <a:noFill/>
-          <a:ln w="0">
-            <a:noFill/>
-            <a:prstDash/>
-          </a:ln>
-        </p:spPr>
-        <p:txBody>
-          <a:bodyPr wrap="square" lIns="89535" tIns="46355" rIns="89535" bIns="46355" numCol="1" vert="horz" anchor="t">
-            <a:spAutoFit/>
-          </a:bodyPr>
-          <a:lstStyle/>
-          <a:p>
-            <a:pPr marL="0" indent="0" rtl="0" algn="l" defTabSz="914400" eaLnBrk="1" latinLnBrk="0" hangingPunct="1">
-              <a:buFontTx/>
-              <a:buNone/>
-              <a:tabLst>
-                <a:tab pos="3869690" algn="l"/>
-              </a:tabLst>
-            </a:pPr>
-            <a:r>
-              <a:rPr lang="ko-KR" sz="2000" b="1">
-                <a:solidFill>
-                  <a:srgbClr val="0611F2"/>
-                </a:solidFill>
-                <a:latin typeface="맑은 고딕" charset="0"/>
-                <a:ea typeface="맑은 고딕" charset="0"/>
-              </a:rPr>
-              <a:t>3</a:t>
-            </a:r>
-            <a:r>
-              <a:rPr lang="ko-KR" sz="2000" b="1">
-                <a:solidFill>
-                  <a:srgbClr val="0611F2"/>
-                </a:solidFill>
-                <a:latin typeface="맑은 고딕" charset="0"/>
-                <a:ea typeface="맑은 고딕" charset="0"/>
-              </a:rPr>
-              <a:t>8</a:t>
-            </a:r>
-            <a:r>
-              <a:rPr lang="ko-KR" sz="2000" b="1">
-                <a:solidFill>
-                  <a:srgbClr val="0611F2"/>
-                </a:solidFill>
-                <a:latin typeface="맑은 고딕" charset="0"/>
-                <a:ea typeface="맑은 고딕" charset="0"/>
-              </a:rPr>
-              <a:t>.</a:t>
-            </a:r>
-            <a:r>
-              <a:rPr lang="ko-KR" sz="2000">
-                <a:solidFill>
-                  <a:srgbClr val="0611F2"/>
-                </a:solidFill>
-                <a:latin typeface="맑은 고딕" charset="0"/>
-                <a:ea typeface="맑은 고딕" charset="0"/>
-              </a:rPr>
-              <a:t> </a:t>
-            </a:r>
-            <a:r>
-              <a:rPr lang="ko-KR" sz="1800">
-                <a:latin typeface="맑은 고딕" charset="0"/>
-                <a:ea typeface="맑은 고딕" charset="0"/>
-              </a:rPr>
-              <a:t>마지막으로 Sign In Button과 Sign Up Button 하위 오브젝트의 Text 오브젝트의 이름을 Sign In Text와 Sign Up Text로 변경합니다.</a:t>
-            </a:r>
-            <a:endParaRPr lang="ko-KR" altLang="en-US" sz="1800">
-              <a:latin typeface="맑은 고딕" charset="0"/>
-              <a:ea typeface="맑은 고딕" charset="0"/>
-            </a:endParaRPr>
-          </a:p>
-          <a:p>
-            <a:pPr marL="0" indent="0" rtl="0" algn="l" defTabSz="914400" eaLnBrk="1" latinLnBrk="0" hangingPunct="1">
-              <a:buFontTx/>
-              <a:buNone/>
-              <a:tabLst>
-                <a:tab pos="3869690" algn="l"/>
-              </a:tabLst>
-            </a:pPr>
-            <a:endParaRPr lang="ko-KR" altLang="en-US" sz="1800">
-              <a:latin typeface="맑은 고딕" charset="0"/>
-              <a:ea typeface="맑은 고딕" charset="0"/>
-            </a:endParaRPr>
-          </a:p>
-          <a:p>
-            <a:pPr marL="0" indent="0" rtl="0" algn="l" defTabSz="914400" eaLnBrk="1" latinLnBrk="0" hangingPunct="1">
-              <a:buFontTx/>
-              <a:buNone/>
-              <a:tabLst>
-                <a:tab pos="3869690" algn="l"/>
-              </a:tabLst>
-            </a:pPr>
-            <a:r>
-              <a:rPr lang="ko-KR" sz="1800">
-                <a:latin typeface="맑은 고딕" charset="0"/>
-                <a:ea typeface="맑은 고딕" charset="0"/>
-              </a:rPr>
-              <a:t>그리고 각각의 텍스트의 Font Size와 Font Style을 설정합니다.</a:t>
-            </a:r>
-            <a:r>
-              <a:rPr lang="ko-KR" sz="1800">
-                <a:latin typeface="맑은 고딕" charset="0"/>
-                <a:ea typeface="맑은 고딕" charset="0"/>
-              </a:rPr>
-              <a:t> </a:t>
-            </a:r>
-            <a:endParaRPr lang="ko-KR" altLang="en-US" sz="1800">
-              <a:latin typeface="맑은 고딕" charset="0"/>
-              <a:ea typeface="맑은 고딕" charset="0"/>
-            </a:endParaRPr>
-          </a:p>
-        </p:txBody>
-      </p:sp>
-      <p:sp>
-        <p:nvSpPr>
-          <p:cNvPr id="60" name="Rect 0"/>
-          <p:cNvSpPr txBox="1">
-            <a:spLocks/>
-          </p:cNvSpPr>
-          <p:nvPr/>
-        </p:nvSpPr>
-        <p:spPr>
-          <a:xfrm rot="0">
-            <a:off x="1237615" y="5601970"/>
-            <a:ext cx="4149090" cy="677545"/>
-          </a:xfrm>
-          <a:prstGeom prst="rect"/>
-          <a:noFill/>
-          <a:ln w="0">
-            <a:noFill/>
-            <a:prstDash/>
-          </a:ln>
-        </p:spPr>
-        <p:txBody>
-          <a:bodyPr wrap="square" lIns="89535" tIns="46355" rIns="89535" bIns="46355" numCol="1" vert="horz" anchor="t">
-            <a:spAutoFit/>
-          </a:bodyPr>
-          <a:lstStyle/>
-          <a:p>
-            <a:pPr marL="0" indent="0" rtl="0" algn="l" defTabSz="914400" eaLnBrk="1" latinLnBrk="0" hangingPunct="1">
-              <a:buFontTx/>
-              <a:buNone/>
-            </a:pPr>
-            <a:r>
-              <a:rPr lang="ko-KR" sz="2000" b="1">
-                <a:solidFill>
-                  <a:srgbClr val="0611F2"/>
-                </a:solidFill>
-                <a:latin typeface="맑은 고딕" charset="0"/>
-                <a:ea typeface="맑은 고딕" charset="0"/>
-              </a:rPr>
-              <a:t>37</a:t>
-            </a:r>
-            <a:r>
-              <a:rPr lang="ko-KR" sz="2000" b="1">
-                <a:solidFill>
-                  <a:srgbClr val="0611F2"/>
-                </a:solidFill>
-                <a:latin typeface="맑은 고딕" charset="0"/>
-                <a:ea typeface="맑은 고딕" charset="0"/>
-              </a:rPr>
-              <a:t>.</a:t>
-            </a:r>
-            <a:r>
-              <a:rPr lang="ko-KR" sz="2000">
-                <a:solidFill>
-                  <a:srgbClr val="0611F2"/>
-                </a:solidFill>
-                <a:latin typeface="맑은 고딕" charset="0"/>
-                <a:ea typeface="맑은 고딕" charset="0"/>
-              </a:rPr>
-              <a:t> </a:t>
-            </a:r>
-            <a:r>
-              <a:rPr lang="ko-KR" sz="1800">
-                <a:latin typeface="맑은 고딕" charset="0"/>
-                <a:ea typeface="맑은 고딕" charset="0"/>
-              </a:rPr>
-              <a:t>이제 Region DropDown의 옵션에 KR, JP, AU라는 값을 정의합니다.</a:t>
-            </a:r>
-            <a:endParaRPr lang="ko-KR" altLang="en-US" sz="1800">
-              <a:latin typeface="맑은 고딕" charset="0"/>
-              <a:ea typeface="맑은 고딕" charset="0"/>
-            </a:endParaRPr>
-          </a:p>
-        </p:txBody>
-      </p:sp>
-      <p:pic>
-        <p:nvPicPr>
-          <p:cNvPr id="73" name="그림 67" descr="C:/Users/Admin1/AppData/Roaming/PolarisOffice/ETemp/2936_21704408/fImage131623402995.png"/>
-          <p:cNvPicPr>
-            <a:picLocks noChangeAspect="1"/>
-          </p:cNvPicPr>
-          <p:nvPr/>
-        </p:nvPicPr>
-        <p:blipFill rotWithShape="1">
-          <a:blip r:embed="rId2" cstate="print">
-            <a:extLst>
-              <a:ext uri="{28A0092B-C50C-407E-A947-70E740481C1C}">
-                <a14:useLocalDpi xmlns:a14="http://schemas.microsoft.com/office/drawing/2010/main" val="0"/>
-              </a:ext>
-            </a:extLst>
-          </a:blip>
-          <a:stretch>
-            <a:fillRect/>
-          </a:stretch>
-        </p:blipFill>
-        <p:spPr>
-          <a:xfrm rot="0">
-            <a:off x="1234440" y="1411605"/>
-            <a:ext cx="4152900" cy="1157605"/>
-          </a:xfrm>
-          <a:prstGeom prst="roundRect"/>
-          <a:solidFill>
-            <a:srgbClr val="EDEDED"/>
-          </a:solidFill>
-        </p:spPr>
-      </p:pic>
-      <p:sp>
-        <p:nvSpPr>
-          <p:cNvPr id="74" name="텍스트 상자 70"/>
-          <p:cNvSpPr txBox="1">
-            <a:spLocks/>
-          </p:cNvSpPr>
-          <p:nvPr/>
-        </p:nvSpPr>
-        <p:spPr>
-          <a:xfrm rot="0">
-            <a:off x="1242695" y="2655570"/>
-            <a:ext cx="4149090" cy="954405"/>
-          </a:xfrm>
-          <a:prstGeom prst="rect"/>
-          <a:noFill/>
-          <a:ln w="0">
-            <a:noFill/>
-            <a:prstDash/>
-          </a:ln>
-        </p:spPr>
-        <p:txBody>
-          <a:bodyPr wrap="square" lIns="89535" tIns="46355" rIns="89535" bIns="46355" numCol="1" vert="horz" anchor="t">
-            <a:spAutoFit/>
-          </a:bodyPr>
-          <a:lstStyle/>
-          <a:p>
-            <a:pPr marL="0" indent="0" rtl="0" algn="l" defTabSz="914400" eaLnBrk="1" latinLnBrk="0" hangingPunct="1">
-              <a:buFontTx/>
-              <a:buNone/>
-            </a:pPr>
-            <a:r>
-              <a:rPr lang="ko-KR" sz="2000" b="1">
-                <a:solidFill>
-                  <a:srgbClr val="0611F2"/>
-                </a:solidFill>
-                <a:latin typeface="맑은 고딕" charset="0"/>
-                <a:ea typeface="맑은 고딕" charset="0"/>
-              </a:rPr>
-              <a:t>36</a:t>
-            </a:r>
-            <a:r>
-              <a:rPr lang="ko-KR" sz="2000" b="1">
-                <a:solidFill>
-                  <a:srgbClr val="0611F2"/>
-                </a:solidFill>
-                <a:latin typeface="맑은 고딕" charset="0"/>
-                <a:ea typeface="맑은 고딕" charset="0"/>
-              </a:rPr>
-              <a:t>.</a:t>
-            </a:r>
-            <a:r>
-              <a:rPr lang="ko-KR" sz="2000">
-                <a:solidFill>
-                  <a:srgbClr val="0611F2"/>
-                </a:solidFill>
-                <a:latin typeface="맑은 고딕" charset="0"/>
-                <a:ea typeface="맑은 고딕" charset="0"/>
-              </a:rPr>
-              <a:t> </a:t>
-            </a:r>
-            <a:r>
-              <a:rPr lang="ko-KR" sz="1800">
-                <a:latin typeface="맑은 고딕" charset="0"/>
-                <a:ea typeface="맑은 고딕" charset="0"/>
-              </a:rPr>
-              <a:t>그런 다음 Region DropDown 오브젝트의 앵커를 지정하고 위치와 회전 값을 설정합니다.</a:t>
-            </a:r>
-            <a:endParaRPr lang="ko-KR" altLang="en-US" sz="1800">
-              <a:latin typeface="맑은 고딕" charset="0"/>
-              <a:ea typeface="맑은 고딕" charset="0"/>
-            </a:endParaRPr>
-          </a:p>
-        </p:txBody>
-      </p:sp>
-      <p:pic>
-        <p:nvPicPr>
-          <p:cNvPr id="75" name="그림 71" descr="C:/Users/Admin1/AppData/Roaming/PolarisOffice/ETemp/2936_21704408/fImage85723421942.png"/>
-          <p:cNvPicPr>
-            <a:picLocks noChangeAspect="1"/>
-          </p:cNvPicPr>
-          <p:nvPr/>
-        </p:nvPicPr>
-        <p:blipFill rotWithShape="1">
-          <a:blip r:embed="rId3" cstate="print">
-            <a:extLst>
-              <a:ext uri="{28A0092B-C50C-407E-A947-70E740481C1C}">
-                <a14:useLocalDpi xmlns:a14="http://schemas.microsoft.com/office/drawing/2010/main" val="0"/>
-              </a:ext>
-            </a:extLst>
-          </a:blip>
-          <a:stretch>
-            <a:fillRect/>
-          </a:stretch>
-        </p:blipFill>
-        <p:spPr>
-          <a:xfrm rot="0">
-            <a:off x="1242695" y="3731895"/>
-            <a:ext cx="4152900" cy="1821180"/>
-          </a:xfrm>
-          <a:prstGeom prst="roundRect"/>
-          <a:solidFill>
-            <a:srgbClr val="EDEDED"/>
-          </a:solidFill>
-        </p:spPr>
-      </p:pic>
-      <p:pic>
-        <p:nvPicPr>
-          <p:cNvPr id="76" name="그림 74" descr="C:/Users/Admin1/AppData/Roaming/PolarisOffice/ETemp/2936_21704408/fImage104553434827.png"/>
-          <p:cNvPicPr>
-            <a:picLocks noChangeAspect="1"/>
-          </p:cNvPicPr>
-          <p:nvPr/>
-        </p:nvPicPr>
-        <p:blipFill rotWithShape="1">
-          <a:blip r:embed="rId4" cstate="print">
-            <a:extLst>
-              <a:ext uri="{28A0092B-C50C-407E-A947-70E740481C1C}">
-                <a14:useLocalDpi xmlns:a14="http://schemas.microsoft.com/office/drawing/2010/main" val="0"/>
-              </a:ext>
-            </a:extLst>
-          </a:blip>
-          <a:stretch>
-            <a:fillRect/>
-          </a:stretch>
-        </p:blipFill>
-        <p:spPr>
-          <a:xfrm rot="0">
-            <a:off x="6833235" y="1424940"/>
-            <a:ext cx="1347470" cy="2707005"/>
-          </a:xfrm>
-          <a:prstGeom prst="roundRect"/>
-          <a:solidFill>
-            <a:srgbClr val="EDEDED"/>
-          </a:solidFill>
-        </p:spPr>
-      </p:pic>
-      <p:pic>
-        <p:nvPicPr>
-          <p:cNvPr id="77" name="그림 77" descr="C:/Users/Admin1/AppData/Roaming/PolarisOffice/ETemp/2936_21704408/fImage106913445436.png"/>
-          <p:cNvPicPr>
-            <a:picLocks noChangeAspect="1"/>
-          </p:cNvPicPr>
-          <p:nvPr/>
-        </p:nvPicPr>
-        <p:blipFill rotWithShape="1">
-          <a:blip r:embed="rId5" cstate="print">
-            <a:extLst>
-              <a:ext uri="{28A0092B-C50C-407E-A947-70E740481C1C}">
-                <a14:useLocalDpi xmlns:a14="http://schemas.microsoft.com/office/drawing/2010/main" val="0"/>
-              </a:ext>
-            </a:extLst>
-          </a:blip>
-          <a:stretch>
-            <a:fillRect/>
-          </a:stretch>
-        </p:blipFill>
-        <p:spPr>
-          <a:xfrm rot="0">
-            <a:off x="8321675" y="1421765"/>
-            <a:ext cx="2618740" cy="1238885"/>
-          </a:xfrm>
-          <a:prstGeom prst="rect"/>
-          <a:noFill/>
-        </p:spPr>
-      </p:pic>
-      <p:pic>
-        <p:nvPicPr>
-          <p:cNvPr id="78" name="그림 80" descr="C:/Users/Admin1/AppData/Roaming/PolarisOffice/ETemp/2936_21704408/fImage104703452391.png"/>
-          <p:cNvPicPr>
-            <a:picLocks noChangeAspect="1"/>
-          </p:cNvPicPr>
-          <p:nvPr/>
-        </p:nvPicPr>
-        <p:blipFill rotWithShape="1">
-          <a:blip r:embed="rId6" cstate="print">
-            <a:extLst>
-              <a:ext uri="{28A0092B-C50C-407E-A947-70E740481C1C}">
-                <a14:useLocalDpi xmlns:a14="http://schemas.microsoft.com/office/drawing/2010/main" val="0"/>
-              </a:ext>
-            </a:extLst>
-          </a:blip>
-          <a:stretch>
-            <a:fillRect/>
-          </a:stretch>
-        </p:blipFill>
-        <p:spPr>
-          <a:xfrm rot="0">
-            <a:off x="8329930" y="2876550"/>
-            <a:ext cx="2610485" cy="1247140"/>
-          </a:xfrm>
-          <a:prstGeom prst="rect"/>
-          <a:noFill/>
         </p:spPr>
       </p:pic>
     </p:spTree>
@@ -15022,9 +14160,9 @@
           <p:nvPr/>
         </p:nvSpPr>
         <p:spPr>
-          <a:xfrm>
+          <a:xfrm rot="0">
             <a:off x="1230630" y="4930140"/>
-            <a:ext cx="4132580" cy="1231265"/>
+            <a:ext cx="4133215" cy="1231265"/>
           </a:xfrm>
           <a:prstGeom prst="rect"/>
           <a:noFill/>
@@ -15068,7 +14206,21 @@
                 <a:latin typeface="맑은 고딕" charset="0"/>
                 <a:ea typeface="맑은 고딕" charset="0"/>
               </a:rPr>
-              <a:t>그런 다음 UI에서 Input Field를 3개 생성하고 각각의 이름을 Email Input과 Password Input그리고 UserName Input으로 정의합니다.</a:t>
+              <a:t>그런 다음 UI에서 Input Field를 </a:t>
+            </a:r>
+            <a:r>
+              <a:rPr lang="ko-KR" sz="1800">
+                <a:latin typeface="맑은 고딕" charset="0"/>
+                <a:ea typeface="맑은 고딕" charset="0"/>
+              </a:rPr>
+              <a:t>2</a:t>
+            </a:r>
+            <a:r>
+              <a:rPr lang="ko-KR" sz="1800">
+                <a:latin typeface="맑은 고딕" charset="0"/>
+                <a:ea typeface="맑은 고딕" charset="0"/>
+              </a:rPr>
+              <a:t>개 생성하고 각각의 이름을 Email Input과 Password Input으로 정의합니다.</a:t>
             </a:r>
             <a:endParaRPr lang="ko-KR" altLang="en-US" sz="1800">
               <a:latin typeface="맑은 고딕" charset="0"/>
@@ -15110,38 +14262,7 @@
       </p:pic>
       <p:pic>
         <p:nvPicPr>
-          <p:cNvPr id="58" name="그림 37"/>
-          <p:cNvPicPr>
-            <a:picLocks noChangeAspect="1"/>
-          </p:cNvPicPr>
-          <p:nvPr/>
-        </p:nvPicPr>
-        <p:blipFill rotWithShape="1">
-          <a:blip r:embed="rId3" cstate="print">
-            <a:extLst>
-              <a:ext uri="{28A0092B-C50C-407E-A947-70E740481C1C}">
-                <a14:useLocalDpi xmlns:a14="http://schemas.microsoft.com/office/drawing/2010/main" val="0"/>
-              </a:ext>
-            </a:extLst>
-          </a:blip>
-          <a:stretch>
-            <a:fillRect/>
-          </a:stretch>
-        </p:blipFill>
-        <p:spPr>
-          <a:xfrm rot="0">
-            <a:off x="3890645" y="1855470"/>
-            <a:ext cx="1463675" cy="2385060"/>
-          </a:xfrm>
-          <a:prstGeom prst="roundRect"/>
-          <a:solidFill>
-            <a:srgbClr val="EDEDED"/>
-          </a:solidFill>
-        </p:spPr>
-      </p:pic>
-      <p:pic>
-        <p:nvPicPr>
-          <p:cNvPr id="59" name="그림 4" descr="C:/Users/Admin1/AppData/Roaming/PolarisOffice/ETemp/2936_21704408/fImage2008322341.png"/>
+          <p:cNvPr id="59" name="그림 4"/>
           <p:cNvPicPr>
             <a:picLocks noChangeAspect="1"/>
           </p:cNvPicPr>
@@ -15170,16 +14291,114 @@
           </a:solidFill>
         </p:spPr>
       </p:pic>
+      <p:sp>
+        <p:nvSpPr>
+          <p:cNvPr id="61" name="텍스트 상자 10"/>
+          <p:cNvSpPr txBox="1">
+            <a:spLocks/>
+          </p:cNvSpPr>
+          <p:nvPr/>
+        </p:nvSpPr>
+        <p:spPr>
+          <a:xfrm rot="0">
+            <a:off x="6797040" y="5209540"/>
+            <a:ext cx="4132580" cy="954405"/>
+          </a:xfrm>
+          <a:prstGeom prst="rect"/>
+          <a:noFill/>
+          <a:ln w="0">
+            <a:noFill/>
+            <a:prstDash/>
+          </a:ln>
+        </p:spPr>
+        <p:txBody>
+          <a:bodyPr wrap="square" lIns="89535" tIns="46355" rIns="89535" bIns="46355" numCol="1" vert="horz" anchor="t">
+            <a:spAutoFit/>
+          </a:bodyPr>
+          <a:lstStyle/>
+          <a:p>
+            <a:pPr marL="0" indent="0" rtl="0" algn="l" defTabSz="914400" eaLnBrk="1" latinLnBrk="0" hangingPunct="1">
+              <a:buFontTx/>
+              <a:buNone/>
+            </a:pPr>
+            <a:r>
+              <a:rPr lang="ko-KR" sz="2000" b="1">
+                <a:solidFill>
+                  <a:srgbClr val="0611F2"/>
+                </a:solidFill>
+                <a:latin typeface="맑은 고딕" charset="0"/>
+                <a:ea typeface="맑은 고딕" charset="0"/>
+              </a:rPr>
+              <a:t>2</a:t>
+            </a:r>
+            <a:r>
+              <a:rPr lang="ko-KR" sz="2000" b="1">
+                <a:solidFill>
+                  <a:srgbClr val="0611F2"/>
+                </a:solidFill>
+                <a:latin typeface="맑은 고딕" charset="0"/>
+                <a:ea typeface="맑은 고딕" charset="0"/>
+              </a:rPr>
+              <a:t>1</a:t>
+            </a:r>
+            <a:r>
+              <a:rPr lang="ko-KR" sz="2000" b="1">
+                <a:solidFill>
+                  <a:srgbClr val="0611F2"/>
+                </a:solidFill>
+                <a:latin typeface="맑은 고딕" charset="0"/>
+                <a:ea typeface="맑은 고딕" charset="0"/>
+              </a:rPr>
+              <a:t>.</a:t>
+            </a:r>
+            <a:r>
+              <a:rPr lang="ko-KR" sz="2000">
+                <a:solidFill>
+                  <a:srgbClr val="0611F2"/>
+                </a:solidFill>
+                <a:latin typeface="맑은 고딕" charset="0"/>
+                <a:ea typeface="맑은 고딕" charset="0"/>
+              </a:rPr>
+              <a:t> </a:t>
+            </a:r>
+            <a:r>
+              <a:rPr lang="ko-KR" sz="1800">
+                <a:latin typeface="맑은 고딕" charset="0"/>
+                <a:ea typeface="맑은 고딕" charset="0"/>
+              </a:rPr>
+              <a:t>그다음으로</a:t>
+            </a:r>
+            <a:r>
+              <a:rPr lang="ko-KR" sz="1800">
+                <a:latin typeface="맑은 고딕" charset="0"/>
+                <a:ea typeface="맑은 고딕" charset="0"/>
+              </a:rPr>
+              <a:t> </a:t>
+            </a:r>
+            <a:r>
+              <a:rPr lang="ko-KR" sz="1800">
+                <a:latin typeface="맑은 고딕" charset="0"/>
+                <a:ea typeface="맑은 고딕" charset="0"/>
+              </a:rPr>
+              <a:t>UI에서 Dropdown을 생성하고 Region DropDown이라는 이름으로 정의합니다.</a:t>
+            </a:r>
+            <a:endParaRPr lang="ko-KR" altLang="en-US" sz="1800">
+              <a:latin typeface="맑은 고딕" charset="0"/>
+              <a:ea typeface="맑은 고딕" charset="0"/>
+            </a:endParaRPr>
+          </a:p>
+        </p:txBody>
+      </p:sp>
       <p:pic>
         <p:nvPicPr>
-          <p:cNvPr id="60" name="그림 7" descr="C:/Users/Admin1/AppData/Roaming/PolarisOffice/ETemp/2936_21704408/fImage90292248467.png"/>
+          <p:cNvPr id="62" name="그림 1" descr="C:/Users/Admin1/AppData/Roaming/PolarisOffice/ETemp/20636_16816336/fImage766223941.png"/>
           <p:cNvPicPr>
             <a:picLocks noChangeAspect="1"/>
           </p:cNvPicPr>
           <p:nvPr/>
         </p:nvPicPr>
         <p:blipFill rotWithShape="1">
-          <a:blip r:embed="rId6" cstate="print">
+          <a:blip r:embed="rId7" cstate="print">
             <a:extLst>
               <a:ext uri="{28A0092B-C50C-407E-A947-70E740481C1C}">
                 <a14:useLocalDpi xmlns:a14="http://schemas.microsoft.com/office/drawing/2010/main" val="0"/>
@@ -15192,8 +14411,8 @@
         </p:blipFill>
         <p:spPr>
           <a:xfrm rot="0">
-            <a:off x="9468485" y="1820545"/>
-            <a:ext cx="1473835" cy="2743835"/>
+            <a:off x="3934460" y="2078355"/>
+            <a:ext cx="1419860" cy="1937385"/>
           </a:xfrm>
           <a:prstGeom prst="roundRect"/>
           <a:solidFill>
@@ -15201,104 +14420,37 @@
           </a:solidFill>
         </p:spPr>
       </p:pic>
-      <p:sp>
-        <p:nvSpPr>
-          <p:cNvPr id="61" name="텍스트 상자 10"/>
-          <p:cNvSpPr txBox="1">
-            <a:spLocks/>
-          </p:cNvSpPr>
+      <p:pic>
+        <p:nvPicPr>
+          <p:cNvPr id="63" name="그림 4" descr="C:/Users/Admin1/AppData/Roaming/PolarisOffice/ETemp/20636_16816336/fImage85282408467.png"/>
+          <p:cNvPicPr>
+            <a:picLocks noChangeAspect="1"/>
+          </p:cNvPicPr>
           <p:nvPr/>
-        </p:nvSpPr>
-        <p:spPr>
-          <a:xfrm rot="0">
-            <a:off x="6797040" y="5209540"/>
-            <a:ext cx="4132580" cy="954405"/>
-          </a:xfrm>
-          <a:prstGeom prst="rect"/>
-          <a:noFill/>
-          <a:ln w="0">
-            <a:noFill/>
-            <a:prstDash/>
-          </a:ln>
-        </p:spPr>
-        <p:txBody>
-          <a:bodyPr wrap="square" lIns="89535" tIns="46355" rIns="89535" bIns="46355" numCol="1" vert="horz" anchor="t">
-            <a:spAutoFit/>
-          </a:bodyPr>
-          <a:lstStyle/>
-          <a:p>
-            <a:pPr marL="0" indent="0" rtl="0" algn="l" defTabSz="914400" eaLnBrk="1" latinLnBrk="0" hangingPunct="1">
-              <a:buFontTx/>
-              <a:buNone/>
-            </a:pPr>
-            <a:r>
-              <a:rPr lang="ko-KR" sz="2000" b="1">
-                <a:solidFill>
-                  <a:srgbClr val="0611F2"/>
-                </a:solidFill>
-                <a:latin typeface="맑은 고딕" charset="0"/>
-                <a:ea typeface="맑은 고딕" charset="0"/>
-              </a:rPr>
-              <a:t>2</a:t>
-            </a:r>
-            <a:r>
-              <a:rPr lang="ko-KR" sz="2000" b="1">
-                <a:solidFill>
-                  <a:srgbClr val="0611F2"/>
-                </a:solidFill>
-                <a:latin typeface="맑은 고딕" charset="0"/>
-                <a:ea typeface="맑은 고딕" charset="0"/>
-              </a:rPr>
-              <a:t>1</a:t>
-            </a:r>
-            <a:r>
-              <a:rPr lang="ko-KR" sz="2000" b="1">
-                <a:solidFill>
-                  <a:srgbClr val="0611F2"/>
-                </a:solidFill>
-                <a:latin typeface="맑은 고딕" charset="0"/>
-                <a:ea typeface="맑은 고딕" charset="0"/>
-              </a:rPr>
-              <a:t>.</a:t>
-            </a:r>
-            <a:r>
-              <a:rPr lang="ko-KR" sz="2000">
-                <a:solidFill>
-                  <a:srgbClr val="0611F2"/>
-                </a:solidFill>
-                <a:latin typeface="맑은 고딕" charset="0"/>
-                <a:ea typeface="맑은 고딕" charset="0"/>
-              </a:rPr>
-              <a:t> </a:t>
-            </a:r>
-            <a:r>
-              <a:rPr lang="ko-KR" sz="1800">
-                <a:latin typeface="맑은 고딕" charset="0"/>
-                <a:ea typeface="맑은 고딕" charset="0"/>
-              </a:rPr>
-              <a:t>그다음으로</a:t>
-            </a:r>
-            <a:r>
-              <a:rPr lang="ko-KR" sz="1800">
-                <a:latin typeface="맑은 고딕" charset="0"/>
-                <a:ea typeface="맑은 고딕" charset="0"/>
-              </a:rPr>
-              <a:t> </a:t>
-            </a:r>
-            <a:r>
-              <a:rPr lang="ko-KR" sz="1800">
-                <a:latin typeface="맑은 고딕" charset="0"/>
-                <a:ea typeface="맑은 고딕" charset="0"/>
-              </a:rPr>
-              <a:t>UI에서 Dropdown을 생성하고 Region DropDown이라는 이름으로 정의합니다.</a:t>
-            </a:r>
-            <a:endParaRPr lang="ko-KR" altLang="en-US" sz="1800">
-              <a:latin typeface="맑은 고딕" charset="0"/>
-              <a:ea typeface="맑은 고딕" charset="0"/>
-            </a:endParaRPr>
-          </a:p>
-        </p:txBody>
-      </p:sp>
+        </p:nvPicPr>
+        <p:blipFill rotWithShape="1">
+          <a:blip r:embed="rId8" cstate="print">
+            <a:extLst>
+              <a:ext uri="{28A0092B-C50C-407E-A947-70E740481C1C}">
+                <a14:useLocalDpi xmlns:a14="http://schemas.microsoft.com/office/drawing/2010/main" val="0"/>
+              </a:ext>
+            </a:extLst>
+          </a:blip>
+          <a:stretch>
+            <a:fillRect/>
+          </a:stretch>
+        </p:blipFill>
+        <p:spPr>
+          <a:xfrm rot="0">
+            <a:off x="9451340" y="2136140"/>
+            <a:ext cx="1480820" cy="2137410"/>
+          </a:xfrm>
+          <a:prstGeom prst="roundRect"/>
+          <a:solidFill>
+            <a:srgbClr val="EDEDED"/>
+          </a:solidFill>
+        </p:spPr>
+      </p:pic>
     </p:spTree>
   </p:cSld>
   <p:clrMapOvr>

</xml_diff>